<commit_message>
[UIMA-5137] update v3 docs, slight reorg, clarifications
git-svn-id: https://svn.apache.org/repos/asf/uima/uimaj/branches/experiment-v3-jcas@1769685 13f79535-47bb-0310-9956-ffa450edef68
</commit_message>
<xml_diff>
--- a/uima-docbook-v3-users-guide/src/image-source/source.pptx
+++ b/uima-docbook-v3-users-guide/src/image-source/source.pptx
@@ -9876,7 +9876,7 @@
           <a:p>
             <a:fld id="{FA88A723-210D-49FB-911D-CC70F62696A5}" type="datetimeFigureOut">
               <a:rPr lang="en-US" smtClean="0"/>
-              <a:t>10/31/2016</a:t>
+              <a:t>11/14/2016</a:t>
             </a:fld>
             <a:endParaRPr lang="en-US"/>
           </a:p>
@@ -10046,7 +10046,7 @@
           <a:p>
             <a:fld id="{FA88A723-210D-49FB-911D-CC70F62696A5}" type="datetimeFigureOut">
               <a:rPr lang="en-US" smtClean="0"/>
-              <a:t>10/31/2016</a:t>
+              <a:t>11/14/2016</a:t>
             </a:fld>
             <a:endParaRPr lang="en-US"/>
           </a:p>
@@ -10226,7 +10226,7 @@
           <a:p>
             <a:fld id="{FA88A723-210D-49FB-911D-CC70F62696A5}" type="datetimeFigureOut">
               <a:rPr lang="en-US" smtClean="0"/>
-              <a:t>10/31/2016</a:t>
+              <a:t>11/14/2016</a:t>
             </a:fld>
             <a:endParaRPr lang="en-US"/>
           </a:p>
@@ -10396,7 +10396,7 @@
           <a:p>
             <a:fld id="{FA88A723-210D-49FB-911D-CC70F62696A5}" type="datetimeFigureOut">
               <a:rPr lang="en-US" smtClean="0"/>
-              <a:t>10/31/2016</a:t>
+              <a:t>11/14/2016</a:t>
             </a:fld>
             <a:endParaRPr lang="en-US"/>
           </a:p>
@@ -10642,7 +10642,7 @@
           <a:p>
             <a:fld id="{FA88A723-210D-49FB-911D-CC70F62696A5}" type="datetimeFigureOut">
               <a:rPr lang="en-US" smtClean="0"/>
-              <a:t>10/31/2016</a:t>
+              <a:t>11/14/2016</a:t>
             </a:fld>
             <a:endParaRPr lang="en-US"/>
           </a:p>
@@ -10874,7 +10874,7 @@
           <a:p>
             <a:fld id="{FA88A723-210D-49FB-911D-CC70F62696A5}" type="datetimeFigureOut">
               <a:rPr lang="en-US" smtClean="0"/>
-              <a:t>10/31/2016</a:t>
+              <a:t>11/14/2016</a:t>
             </a:fld>
             <a:endParaRPr lang="en-US"/>
           </a:p>
@@ -11241,7 +11241,7 @@
           <a:p>
             <a:fld id="{FA88A723-210D-49FB-911D-CC70F62696A5}" type="datetimeFigureOut">
               <a:rPr lang="en-US" smtClean="0"/>
-              <a:t>10/31/2016</a:t>
+              <a:t>11/14/2016</a:t>
             </a:fld>
             <a:endParaRPr lang="en-US"/>
           </a:p>
@@ -11359,7 +11359,7 @@
           <a:p>
             <a:fld id="{FA88A723-210D-49FB-911D-CC70F62696A5}" type="datetimeFigureOut">
               <a:rPr lang="en-US" smtClean="0"/>
-              <a:t>10/31/2016</a:t>
+              <a:t>11/14/2016</a:t>
             </a:fld>
             <a:endParaRPr lang="en-US"/>
           </a:p>
@@ -11454,7 +11454,7 @@
           <a:p>
             <a:fld id="{FA88A723-210D-49FB-911D-CC70F62696A5}" type="datetimeFigureOut">
               <a:rPr lang="en-US" smtClean="0"/>
-              <a:t>10/31/2016</a:t>
+              <a:t>11/14/2016</a:t>
             </a:fld>
             <a:endParaRPr lang="en-US"/>
           </a:p>
@@ -11731,7 +11731,7 @@
           <a:p>
             <a:fld id="{FA88A723-210D-49FB-911D-CC70F62696A5}" type="datetimeFigureOut">
               <a:rPr lang="en-US" smtClean="0"/>
-              <a:t>10/31/2016</a:t>
+              <a:t>11/14/2016</a:t>
             </a:fld>
             <a:endParaRPr lang="en-US"/>
           </a:p>
@@ -11984,7 +11984,7 @@
           <a:p>
             <a:fld id="{FA88A723-210D-49FB-911D-CC70F62696A5}" type="datetimeFigureOut">
               <a:rPr lang="en-US" smtClean="0"/>
-              <a:t>10/31/2016</a:t>
+              <a:t>11/14/2016</a:t>
             </a:fld>
             <a:endParaRPr lang="en-US"/>
           </a:p>
@@ -12197,7 +12197,7 @@
           <a:p>
             <a:fld id="{FA88A723-210D-49FB-911D-CC70F62696A5}" type="datetimeFigureOut">
               <a:rPr lang="en-US" smtClean="0"/>
-              <a:t>10/31/2016</a:t>
+              <a:t>11/14/2016</a:t>
             </a:fld>
             <a:endParaRPr lang="en-US"/>
           </a:p>
@@ -12654,29 +12654,341 @@
           <a:chExt cx="0" cy="0"/>
         </a:xfrm>
       </p:grpSpPr>
+      <p:sp>
+        <p:nvSpPr>
+          <p:cNvPr id="6" name="Freeform 5"/>
+          <p:cNvSpPr/>
+          <p:nvPr/>
+        </p:nvSpPr>
+        <p:spPr>
+          <a:xfrm>
+            <a:off x="6445116" y="359542"/>
+            <a:ext cx="1641491" cy="984895"/>
+          </a:xfrm>
+          <a:custGeom>
+            <a:avLst/>
+            <a:gdLst>
+              <a:gd name="connsiteX0" fmla="*/ 0 w 2135187"/>
+              <a:gd name="connsiteY0" fmla="*/ 128111 h 1281112"/>
+              <a:gd name="connsiteX1" fmla="*/ 128111 w 2135187"/>
+              <a:gd name="connsiteY1" fmla="*/ 0 h 1281112"/>
+              <a:gd name="connsiteX2" fmla="*/ 2007076 w 2135187"/>
+              <a:gd name="connsiteY2" fmla="*/ 0 h 1281112"/>
+              <a:gd name="connsiteX3" fmla="*/ 2135187 w 2135187"/>
+              <a:gd name="connsiteY3" fmla="*/ 128111 h 1281112"/>
+              <a:gd name="connsiteX4" fmla="*/ 2135187 w 2135187"/>
+              <a:gd name="connsiteY4" fmla="*/ 1153001 h 1281112"/>
+              <a:gd name="connsiteX5" fmla="*/ 2007076 w 2135187"/>
+              <a:gd name="connsiteY5" fmla="*/ 1281112 h 1281112"/>
+              <a:gd name="connsiteX6" fmla="*/ 128111 w 2135187"/>
+              <a:gd name="connsiteY6" fmla="*/ 1281112 h 1281112"/>
+              <a:gd name="connsiteX7" fmla="*/ 0 w 2135187"/>
+              <a:gd name="connsiteY7" fmla="*/ 1153001 h 1281112"/>
+              <a:gd name="connsiteX8" fmla="*/ 0 w 2135187"/>
+              <a:gd name="connsiteY8" fmla="*/ 128111 h 1281112"/>
+            </a:gdLst>
+            <a:ahLst/>
+            <a:cxnLst>
+              <a:cxn ang="0">
+                <a:pos x="connsiteX0" y="connsiteY0"/>
+              </a:cxn>
+              <a:cxn ang="0">
+                <a:pos x="connsiteX1" y="connsiteY1"/>
+              </a:cxn>
+              <a:cxn ang="0">
+                <a:pos x="connsiteX2" y="connsiteY2"/>
+              </a:cxn>
+              <a:cxn ang="0">
+                <a:pos x="connsiteX3" y="connsiteY3"/>
+              </a:cxn>
+              <a:cxn ang="0">
+                <a:pos x="connsiteX4" y="connsiteY4"/>
+              </a:cxn>
+              <a:cxn ang="0">
+                <a:pos x="connsiteX5" y="connsiteY5"/>
+              </a:cxn>
+              <a:cxn ang="0">
+                <a:pos x="connsiteX6" y="connsiteY6"/>
+              </a:cxn>
+              <a:cxn ang="0">
+                <a:pos x="connsiteX7" y="connsiteY7"/>
+              </a:cxn>
+              <a:cxn ang="0">
+                <a:pos x="connsiteX8" y="connsiteY8"/>
+              </a:cxn>
+            </a:cxnLst>
+            <a:rect l="l" t="t" r="r" b="b"/>
+            <a:pathLst>
+              <a:path w="2135187" h="1281112">
+                <a:moveTo>
+                  <a:pt x="0" y="128111"/>
+                </a:moveTo>
+                <a:cubicBezTo>
+                  <a:pt x="0" y="57357"/>
+                  <a:pt x="57357" y="0"/>
+                  <a:pt x="128111" y="0"/>
+                </a:cubicBezTo>
+                <a:lnTo>
+                  <a:pt x="2007076" y="0"/>
+                </a:lnTo>
+                <a:cubicBezTo>
+                  <a:pt x="2077830" y="0"/>
+                  <a:pt x="2135187" y="57357"/>
+                  <a:pt x="2135187" y="128111"/>
+                </a:cubicBezTo>
+                <a:lnTo>
+                  <a:pt x="2135187" y="1153001"/>
+                </a:lnTo>
+                <a:cubicBezTo>
+                  <a:pt x="2135187" y="1223755"/>
+                  <a:pt x="2077830" y="1281112"/>
+                  <a:pt x="2007076" y="1281112"/>
+                </a:cubicBezTo>
+                <a:lnTo>
+                  <a:pt x="128111" y="1281112"/>
+                </a:lnTo>
+                <a:cubicBezTo>
+                  <a:pt x="57357" y="1281112"/>
+                  <a:pt x="0" y="1223755"/>
+                  <a:pt x="0" y="1153001"/>
+                </a:cubicBezTo>
+                <a:lnTo>
+                  <a:pt x="0" y="128111"/>
+                </a:lnTo>
+                <a:close/>
+              </a:path>
+            </a:pathLst>
+          </a:custGeom>
+          <a:ln w="9525">
+            <a:solidFill>
+              <a:scrgbClr r="0" g="0" b="0"/>
+            </a:solidFill>
+          </a:ln>
+          <a:scene3d>
+            <a:camera prst="orthographicFront"/>
+            <a:lightRig rig="flat" dir="t"/>
+          </a:scene3d>
+          <a:sp3d prstMaterial="dkEdge">
+            <a:bevelT w="8200" h="38100"/>
+          </a:sp3d>
+        </p:spPr>
+        <p:style>
+          <a:lnRef idx="0">
+            <a:scrgbClr r="0" g="0" b="0"/>
+          </a:lnRef>
+          <a:fillRef idx="2">
+            <a:schemeClr val="accent4">
+              <a:hueOff val="0"/>
+              <a:satOff val="0"/>
+              <a:lumOff val="0"/>
+              <a:alphaOff val="0"/>
+            </a:schemeClr>
+          </a:fillRef>
+          <a:effectRef idx="1">
+            <a:schemeClr val="accent4">
+              <a:hueOff val="0"/>
+              <a:satOff val="0"/>
+              <a:lumOff val="0"/>
+              <a:alphaOff val="0"/>
+            </a:schemeClr>
+          </a:effectRef>
+          <a:fontRef idx="minor">
+            <a:schemeClr val="dk1"/>
+          </a:fontRef>
+        </p:style>
+        <p:txBody>
+          <a:bodyPr spcFirstLastPara="0" vert="horz" wrap="square" lIns="140392" tIns="140392" rIns="140392" bIns="140392" numCol="1" spcCol="1270" anchor="ctr" anchorCtr="0">
+            <a:noAutofit/>
+          </a:bodyPr>
+          <a:lstStyle/>
+          <a:p>
+            <a:pPr lvl="0" algn="ctr" defTabSz="1200150">
+              <a:lnSpc>
+                <a:spcPct val="90000"/>
+              </a:lnSpc>
+              <a:spcBef>
+                <a:spcPct val="0"/>
+              </a:spcBef>
+              <a:spcAft>
+                <a:spcPct val="35000"/>
+              </a:spcAft>
+            </a:pPr>
+            <a:r>
+              <a:rPr lang="en-US" sz="2700" kern="1200" dirty="0" smtClean="0"/>
+              <a:t>Sources</a:t>
+            </a:r>
+            <a:endParaRPr lang="en-US" sz="2700" kern="1200" dirty="0"/>
+          </a:p>
+        </p:txBody>
+      </p:sp>
       <p:grpSp>
         <p:nvGrpSpPr>
-          <p:cNvPr id="2" name="Group 1"/>
+          <p:cNvPr id="11" name="Group 10"/>
           <p:cNvGrpSpPr/>
           <p:nvPr/>
         </p:nvGrpSpPr>
         <p:grpSpPr>
           <a:xfrm>
-            <a:off x="4166755" y="359542"/>
-            <a:ext cx="7097864" cy="4571197"/>
-            <a:chOff x="2031999" y="359542"/>
-            <a:chExt cx="9232620" cy="5946032"/>
+            <a:off x="8216586" y="583491"/>
+            <a:ext cx="3048033" cy="536997"/>
+            <a:chOff x="4289406" y="1112042"/>
+            <a:chExt cx="5749149" cy="1319213"/>
           </a:xfrm>
         </p:grpSpPr>
         <p:sp>
           <p:nvSpPr>
-            <p:cNvPr id="6" name="Freeform 5"/>
+            <p:cNvPr id="7" name="Freeform 6"/>
+            <p:cNvSpPr/>
+            <p:nvPr/>
+          </p:nvSpPr>
+          <p:spPr>
+            <a:xfrm rot="21557097">
+              <a:off x="4289406" y="1506714"/>
+              <a:ext cx="486352" cy="529526"/>
+            </a:xfrm>
+            <a:custGeom>
+              <a:avLst/>
+              <a:gdLst>
+                <a:gd name="connsiteX0" fmla="*/ 0 w 486352"/>
+                <a:gd name="connsiteY0" fmla="*/ 105905 h 529526"/>
+                <a:gd name="connsiteX1" fmla="*/ 243176 w 486352"/>
+                <a:gd name="connsiteY1" fmla="*/ 105905 h 529526"/>
+                <a:gd name="connsiteX2" fmla="*/ 243176 w 486352"/>
+                <a:gd name="connsiteY2" fmla="*/ 0 h 529526"/>
+                <a:gd name="connsiteX3" fmla="*/ 486352 w 486352"/>
+                <a:gd name="connsiteY3" fmla="*/ 264763 h 529526"/>
+                <a:gd name="connsiteX4" fmla="*/ 243176 w 486352"/>
+                <a:gd name="connsiteY4" fmla="*/ 529526 h 529526"/>
+                <a:gd name="connsiteX5" fmla="*/ 243176 w 486352"/>
+                <a:gd name="connsiteY5" fmla="*/ 423621 h 529526"/>
+                <a:gd name="connsiteX6" fmla="*/ 0 w 486352"/>
+                <a:gd name="connsiteY6" fmla="*/ 423621 h 529526"/>
+                <a:gd name="connsiteX7" fmla="*/ 0 w 486352"/>
+                <a:gd name="connsiteY7" fmla="*/ 105905 h 529526"/>
+              </a:gdLst>
+              <a:ahLst/>
+              <a:cxnLst>
+                <a:cxn ang="0">
+                  <a:pos x="connsiteX0" y="connsiteY0"/>
+                </a:cxn>
+                <a:cxn ang="0">
+                  <a:pos x="connsiteX1" y="connsiteY1"/>
+                </a:cxn>
+                <a:cxn ang="0">
+                  <a:pos x="connsiteX2" y="connsiteY2"/>
+                </a:cxn>
+                <a:cxn ang="0">
+                  <a:pos x="connsiteX3" y="connsiteY3"/>
+                </a:cxn>
+                <a:cxn ang="0">
+                  <a:pos x="connsiteX4" y="connsiteY4"/>
+                </a:cxn>
+                <a:cxn ang="0">
+                  <a:pos x="connsiteX5" y="connsiteY5"/>
+                </a:cxn>
+                <a:cxn ang="0">
+                  <a:pos x="connsiteX6" y="connsiteY6"/>
+                </a:cxn>
+                <a:cxn ang="0">
+                  <a:pos x="connsiteX7" y="connsiteY7"/>
+                </a:cxn>
+              </a:cxnLst>
+              <a:rect l="l" t="t" r="r" b="b"/>
+              <a:pathLst>
+                <a:path w="486352" h="529526">
+                  <a:moveTo>
+                    <a:pt x="0" y="105905"/>
+                  </a:moveTo>
+                  <a:lnTo>
+                    <a:pt x="243176" y="105905"/>
+                  </a:lnTo>
+                  <a:lnTo>
+                    <a:pt x="243176" y="0"/>
+                  </a:lnTo>
+                  <a:lnTo>
+                    <a:pt x="486352" y="264763"/>
+                  </a:lnTo>
+                  <a:lnTo>
+                    <a:pt x="243176" y="529526"/>
+                  </a:lnTo>
+                  <a:lnTo>
+                    <a:pt x="243176" y="423621"/>
+                  </a:lnTo>
+                  <a:lnTo>
+                    <a:pt x="0" y="423621"/>
+                  </a:lnTo>
+                  <a:lnTo>
+                    <a:pt x="0" y="105905"/>
+                  </a:lnTo>
+                  <a:close/>
+                </a:path>
+              </a:pathLst>
+            </a:custGeom>
+            <a:ln>
+              <a:solidFill>
+                <a:schemeClr val="tx1"/>
+              </a:solidFill>
+            </a:ln>
+          </p:spPr>
+          <p:style>
+            <a:lnRef idx="0">
+              <a:schemeClr val="lt1">
+                <a:hueOff val="0"/>
+                <a:satOff val="0"/>
+                <a:lumOff val="0"/>
+                <a:alphaOff val="0"/>
+              </a:schemeClr>
+            </a:lnRef>
+            <a:fillRef idx="2">
+              <a:schemeClr val="accent4">
+                <a:hueOff val="0"/>
+                <a:satOff val="0"/>
+                <a:lumOff val="0"/>
+                <a:alphaOff val="0"/>
+              </a:schemeClr>
+            </a:fillRef>
+            <a:effectRef idx="1">
+              <a:schemeClr val="accent4">
+                <a:hueOff val="0"/>
+                <a:satOff val="0"/>
+                <a:lumOff val="0"/>
+                <a:alphaOff val="0"/>
+              </a:schemeClr>
+            </a:effectRef>
+            <a:fontRef idx="minor">
+              <a:schemeClr val="dk1"/>
+            </a:fontRef>
+          </p:style>
+          <p:txBody>
+            <a:bodyPr spcFirstLastPara="0" vert="horz" wrap="square" lIns="0" tIns="105904" rIns="145905" bIns="105905" numCol="1" spcCol="1270" anchor="ctr" anchorCtr="0">
+              <a:noAutofit/>
+            </a:bodyPr>
+            <a:lstStyle/>
+            <a:p>
+              <a:pPr lvl="0" algn="ctr" defTabSz="977900">
+                <a:lnSpc>
+                  <a:spcPct val="90000"/>
+                </a:lnSpc>
+                <a:spcBef>
+                  <a:spcPct val="0"/>
+                </a:spcBef>
+                <a:spcAft>
+                  <a:spcPct val="35000"/>
+                </a:spcAft>
+              </a:pPr>
+              <a:endParaRPr lang="en-US" sz="2200" kern="1200"/>
+            </a:p>
+          </p:txBody>
+        </p:sp>
+        <p:sp>
+          <p:nvSpPr>
+            <p:cNvPr id="8" name="Freeform 7"/>
             <p:cNvSpPr/>
             <p:nvPr/>
           </p:nvSpPr>
           <p:spPr>
             <a:xfrm>
-              <a:off x="4995601" y="359542"/>
+              <a:off x="4977606" y="1112042"/>
               <a:ext cx="2135187" cy="1281112"/>
             </a:xfrm>
             <a:custGeom>
@@ -12773,7 +13085,7 @@
                 </a:path>
               </a:pathLst>
             </a:custGeom>
-            <a:ln w="9525">
+            <a:ln>
               <a:solidFill>
                 <a:scrgbClr r="0" g="0" b="0"/>
               </a:solidFill>
@@ -12792,17 +13104,17 @@
             </a:lnRef>
             <a:fillRef idx="2">
               <a:schemeClr val="accent4">
-                <a:hueOff val="0"/>
-                <a:satOff val="0"/>
-                <a:lumOff val="0"/>
+                <a:hueOff val="5197846"/>
+                <a:satOff val="-23984"/>
+                <a:lumOff val="883"/>
                 <a:alphaOff val="0"/>
               </a:schemeClr>
             </a:fillRef>
             <a:effectRef idx="1">
               <a:schemeClr val="accent4">
-                <a:hueOff val="0"/>
-                <a:satOff val="0"/>
-                <a:lumOff val="0"/>
+                <a:hueOff val="5197846"/>
+                <a:satOff val="-23984"/>
+                <a:lumOff val="883"/>
                 <a:alphaOff val="0"/>
               </a:schemeClr>
             </a:effectRef>
@@ -12828,728 +13140,208 @@
                 </a:spcAft>
               </a:pPr>
               <a:r>
-                <a:rPr lang="en-US" sz="2700" kern="1200" dirty="0" smtClean="0"/>
-                <a:t>Sources</a:t>
+                <a:rPr lang="en-US" sz="1200" kern="1200" dirty="0" smtClean="0">
+                  <a:ln/>
+                </a:rPr>
+                <a:t>Selection</a:t>
               </a:r>
-              <a:endParaRPr lang="en-US" sz="2700" kern="1200" dirty="0"/>
+              <a:br>
+                <a:rPr lang="en-US" sz="1200" kern="1200" dirty="0" smtClean="0">
+                  <a:ln/>
+                </a:rPr>
+              </a:br>
+              <a:r>
+                <a:rPr lang="en-US" sz="1200" kern="1200" dirty="0" smtClean="0"/>
+                <a:t>and</a:t>
+              </a:r>
+              <a:br>
+                <a:rPr lang="en-US" sz="1200" kern="1200" dirty="0" smtClean="0"/>
+              </a:br>
+              <a:r>
+                <a:rPr lang="en-US" sz="1200" kern="1200" dirty="0" smtClean="0"/>
+                <a:t>ordering</a:t>
+              </a:r>
+              <a:endParaRPr lang="en-US" sz="1200" kern="1200" dirty="0"/>
             </a:p>
           </p:txBody>
         </p:sp>
-        <p:grpSp>
-          <p:nvGrpSpPr>
-            <p:cNvPr id="11" name="Group 10"/>
-            <p:cNvGrpSpPr/>
-            <p:nvPr/>
-          </p:nvGrpSpPr>
-          <p:grpSpPr>
-            <a:xfrm>
-              <a:off x="7299859" y="650846"/>
-              <a:ext cx="3964760" cy="698504"/>
-              <a:chOff x="4289406" y="1112042"/>
-              <a:chExt cx="5749149" cy="1319213"/>
-            </a:xfrm>
-          </p:grpSpPr>
-          <p:sp>
-            <p:nvSpPr>
-              <p:cNvPr id="7" name="Freeform 6"/>
-              <p:cNvSpPr/>
-              <p:nvPr/>
-            </p:nvSpPr>
-            <p:spPr>
-              <a:xfrm rot="21557097">
-                <a:off x="4289406" y="1506714"/>
-                <a:ext cx="486352" cy="529526"/>
-              </a:xfrm>
-              <a:custGeom>
-                <a:avLst/>
-                <a:gdLst>
-                  <a:gd name="connsiteX0" fmla="*/ 0 w 486352"/>
-                  <a:gd name="connsiteY0" fmla="*/ 105905 h 529526"/>
-                  <a:gd name="connsiteX1" fmla="*/ 243176 w 486352"/>
-                  <a:gd name="connsiteY1" fmla="*/ 105905 h 529526"/>
-                  <a:gd name="connsiteX2" fmla="*/ 243176 w 486352"/>
-                  <a:gd name="connsiteY2" fmla="*/ 0 h 529526"/>
-                  <a:gd name="connsiteX3" fmla="*/ 486352 w 486352"/>
-                  <a:gd name="connsiteY3" fmla="*/ 264763 h 529526"/>
-                  <a:gd name="connsiteX4" fmla="*/ 243176 w 486352"/>
-                  <a:gd name="connsiteY4" fmla="*/ 529526 h 529526"/>
-                  <a:gd name="connsiteX5" fmla="*/ 243176 w 486352"/>
-                  <a:gd name="connsiteY5" fmla="*/ 423621 h 529526"/>
-                  <a:gd name="connsiteX6" fmla="*/ 0 w 486352"/>
-                  <a:gd name="connsiteY6" fmla="*/ 423621 h 529526"/>
-                  <a:gd name="connsiteX7" fmla="*/ 0 w 486352"/>
-                  <a:gd name="connsiteY7" fmla="*/ 105905 h 529526"/>
-                </a:gdLst>
-                <a:ahLst/>
-                <a:cxnLst>
-                  <a:cxn ang="0">
-                    <a:pos x="connsiteX0" y="connsiteY0"/>
-                  </a:cxn>
-                  <a:cxn ang="0">
-                    <a:pos x="connsiteX1" y="connsiteY1"/>
-                  </a:cxn>
-                  <a:cxn ang="0">
-                    <a:pos x="connsiteX2" y="connsiteY2"/>
-                  </a:cxn>
-                  <a:cxn ang="0">
-                    <a:pos x="connsiteX3" y="connsiteY3"/>
-                  </a:cxn>
-                  <a:cxn ang="0">
-                    <a:pos x="connsiteX4" y="connsiteY4"/>
-                  </a:cxn>
-                  <a:cxn ang="0">
-                    <a:pos x="connsiteX5" y="connsiteY5"/>
-                  </a:cxn>
-                  <a:cxn ang="0">
-                    <a:pos x="connsiteX6" y="connsiteY6"/>
-                  </a:cxn>
-                  <a:cxn ang="0">
-                    <a:pos x="connsiteX7" y="connsiteY7"/>
-                  </a:cxn>
-                </a:cxnLst>
-                <a:rect l="l" t="t" r="r" b="b"/>
-                <a:pathLst>
-                  <a:path w="486352" h="529526">
-                    <a:moveTo>
-                      <a:pt x="0" y="105905"/>
-                    </a:moveTo>
-                    <a:lnTo>
-                      <a:pt x="243176" y="105905"/>
-                    </a:lnTo>
-                    <a:lnTo>
-                      <a:pt x="243176" y="0"/>
-                    </a:lnTo>
-                    <a:lnTo>
-                      <a:pt x="486352" y="264763"/>
-                    </a:lnTo>
-                    <a:lnTo>
-                      <a:pt x="243176" y="529526"/>
-                    </a:lnTo>
-                    <a:lnTo>
-                      <a:pt x="243176" y="423621"/>
-                    </a:lnTo>
-                    <a:lnTo>
-                      <a:pt x="0" y="423621"/>
-                    </a:lnTo>
-                    <a:lnTo>
-                      <a:pt x="0" y="105905"/>
-                    </a:lnTo>
-                    <a:close/>
-                  </a:path>
-                </a:pathLst>
-              </a:custGeom>
-              <a:ln>
-                <a:solidFill>
-                  <a:schemeClr val="tx1"/>
-                </a:solidFill>
-              </a:ln>
-            </p:spPr>
-            <p:style>
-              <a:lnRef idx="0">
-                <a:schemeClr val="lt1">
-                  <a:hueOff val="0"/>
-                  <a:satOff val="0"/>
-                  <a:lumOff val="0"/>
-                  <a:alphaOff val="0"/>
-                </a:schemeClr>
-              </a:lnRef>
-              <a:fillRef idx="2">
-                <a:schemeClr val="accent4">
-                  <a:hueOff val="0"/>
-                  <a:satOff val="0"/>
-                  <a:lumOff val="0"/>
-                  <a:alphaOff val="0"/>
-                </a:schemeClr>
-              </a:fillRef>
-              <a:effectRef idx="1">
-                <a:schemeClr val="accent4">
-                  <a:hueOff val="0"/>
-                  <a:satOff val="0"/>
-                  <a:lumOff val="0"/>
-                  <a:alphaOff val="0"/>
-                </a:schemeClr>
-              </a:effectRef>
-              <a:fontRef idx="minor">
-                <a:schemeClr val="dk1"/>
-              </a:fontRef>
-            </p:style>
-            <p:txBody>
-              <a:bodyPr spcFirstLastPara="0" vert="horz" wrap="square" lIns="0" tIns="105904" rIns="145905" bIns="105905" numCol="1" spcCol="1270" anchor="ctr" anchorCtr="0">
-                <a:noAutofit/>
-              </a:bodyPr>
-              <a:lstStyle/>
-              <a:p>
-                <a:pPr lvl="0" algn="ctr" defTabSz="977900">
-                  <a:lnSpc>
-                    <a:spcPct val="90000"/>
-                  </a:lnSpc>
-                  <a:spcBef>
-                    <a:spcPct val="0"/>
-                  </a:spcBef>
-                  <a:spcAft>
-                    <a:spcPct val="35000"/>
-                  </a:spcAft>
-                </a:pPr>
-                <a:endParaRPr lang="en-US" sz="2200" kern="1200"/>
-              </a:p>
-            </p:txBody>
-          </p:sp>
-          <p:sp>
-            <p:nvSpPr>
-              <p:cNvPr id="8" name="Freeform 7"/>
-              <p:cNvSpPr/>
-              <p:nvPr/>
-            </p:nvSpPr>
-            <p:spPr>
-              <a:xfrm>
-                <a:off x="4977606" y="1112042"/>
-                <a:ext cx="2135187" cy="1281112"/>
-              </a:xfrm>
-              <a:custGeom>
-                <a:avLst/>
-                <a:gdLst>
-                  <a:gd name="connsiteX0" fmla="*/ 0 w 2135187"/>
-                  <a:gd name="connsiteY0" fmla="*/ 128111 h 1281112"/>
-                  <a:gd name="connsiteX1" fmla="*/ 128111 w 2135187"/>
-                  <a:gd name="connsiteY1" fmla="*/ 0 h 1281112"/>
-                  <a:gd name="connsiteX2" fmla="*/ 2007076 w 2135187"/>
-                  <a:gd name="connsiteY2" fmla="*/ 0 h 1281112"/>
-                  <a:gd name="connsiteX3" fmla="*/ 2135187 w 2135187"/>
-                  <a:gd name="connsiteY3" fmla="*/ 128111 h 1281112"/>
-                  <a:gd name="connsiteX4" fmla="*/ 2135187 w 2135187"/>
-                  <a:gd name="connsiteY4" fmla="*/ 1153001 h 1281112"/>
-                  <a:gd name="connsiteX5" fmla="*/ 2007076 w 2135187"/>
-                  <a:gd name="connsiteY5" fmla="*/ 1281112 h 1281112"/>
-                  <a:gd name="connsiteX6" fmla="*/ 128111 w 2135187"/>
-                  <a:gd name="connsiteY6" fmla="*/ 1281112 h 1281112"/>
-                  <a:gd name="connsiteX7" fmla="*/ 0 w 2135187"/>
-                  <a:gd name="connsiteY7" fmla="*/ 1153001 h 1281112"/>
-                  <a:gd name="connsiteX8" fmla="*/ 0 w 2135187"/>
-                  <a:gd name="connsiteY8" fmla="*/ 128111 h 1281112"/>
-                </a:gdLst>
-                <a:ahLst/>
-                <a:cxnLst>
-                  <a:cxn ang="0">
-                    <a:pos x="connsiteX0" y="connsiteY0"/>
-                  </a:cxn>
-                  <a:cxn ang="0">
-                    <a:pos x="connsiteX1" y="connsiteY1"/>
-                  </a:cxn>
-                  <a:cxn ang="0">
-                    <a:pos x="connsiteX2" y="connsiteY2"/>
-                  </a:cxn>
-                  <a:cxn ang="0">
-                    <a:pos x="connsiteX3" y="connsiteY3"/>
-                  </a:cxn>
-                  <a:cxn ang="0">
-                    <a:pos x="connsiteX4" y="connsiteY4"/>
-                  </a:cxn>
-                  <a:cxn ang="0">
-                    <a:pos x="connsiteX5" y="connsiteY5"/>
-                  </a:cxn>
-                  <a:cxn ang="0">
-                    <a:pos x="connsiteX6" y="connsiteY6"/>
-                  </a:cxn>
-                  <a:cxn ang="0">
-                    <a:pos x="connsiteX7" y="connsiteY7"/>
-                  </a:cxn>
-                  <a:cxn ang="0">
-                    <a:pos x="connsiteX8" y="connsiteY8"/>
-                  </a:cxn>
-                </a:cxnLst>
-                <a:rect l="l" t="t" r="r" b="b"/>
-                <a:pathLst>
-                  <a:path w="2135187" h="1281112">
-                    <a:moveTo>
-                      <a:pt x="0" y="128111"/>
-                    </a:moveTo>
-                    <a:cubicBezTo>
-                      <a:pt x="0" y="57357"/>
-                      <a:pt x="57357" y="0"/>
-                      <a:pt x="128111" y="0"/>
-                    </a:cubicBezTo>
-                    <a:lnTo>
-                      <a:pt x="2007076" y="0"/>
-                    </a:lnTo>
-                    <a:cubicBezTo>
-                      <a:pt x="2077830" y="0"/>
-                      <a:pt x="2135187" y="57357"/>
-                      <a:pt x="2135187" y="128111"/>
-                    </a:cubicBezTo>
-                    <a:lnTo>
-                      <a:pt x="2135187" y="1153001"/>
-                    </a:lnTo>
-                    <a:cubicBezTo>
-                      <a:pt x="2135187" y="1223755"/>
-                      <a:pt x="2077830" y="1281112"/>
-                      <a:pt x="2007076" y="1281112"/>
-                    </a:cubicBezTo>
-                    <a:lnTo>
-                      <a:pt x="128111" y="1281112"/>
-                    </a:lnTo>
-                    <a:cubicBezTo>
-                      <a:pt x="57357" y="1281112"/>
-                      <a:pt x="0" y="1223755"/>
-                      <a:pt x="0" y="1153001"/>
-                    </a:cubicBezTo>
-                    <a:lnTo>
-                      <a:pt x="0" y="128111"/>
-                    </a:lnTo>
-                    <a:close/>
-                  </a:path>
-                </a:pathLst>
-              </a:custGeom>
-              <a:ln>
-                <a:solidFill>
-                  <a:scrgbClr r="0" g="0" b="0"/>
-                </a:solidFill>
-              </a:ln>
-              <a:scene3d>
-                <a:camera prst="orthographicFront"/>
-                <a:lightRig rig="flat" dir="t"/>
-              </a:scene3d>
-              <a:sp3d prstMaterial="dkEdge">
-                <a:bevelT w="8200" h="38100"/>
-              </a:sp3d>
-            </p:spPr>
-            <p:style>
-              <a:lnRef idx="0">
-                <a:scrgbClr r="0" g="0" b="0"/>
-              </a:lnRef>
-              <a:fillRef idx="2">
-                <a:schemeClr val="accent4">
-                  <a:hueOff val="5197846"/>
-                  <a:satOff val="-23984"/>
-                  <a:lumOff val="883"/>
-                  <a:alphaOff val="0"/>
-                </a:schemeClr>
-              </a:fillRef>
-              <a:effectRef idx="1">
-                <a:schemeClr val="accent4">
-                  <a:hueOff val="5197846"/>
-                  <a:satOff val="-23984"/>
-                  <a:lumOff val="883"/>
-                  <a:alphaOff val="0"/>
-                </a:schemeClr>
-              </a:effectRef>
-              <a:fontRef idx="minor">
-                <a:schemeClr val="dk1"/>
-              </a:fontRef>
-            </p:style>
-            <p:txBody>
-              <a:bodyPr spcFirstLastPara="0" vert="horz" wrap="square" lIns="140392" tIns="140392" rIns="140392" bIns="140392" numCol="1" spcCol="1270" anchor="ctr" anchorCtr="0">
-                <a:noAutofit/>
-              </a:bodyPr>
-              <a:lstStyle/>
-              <a:p>
-                <a:pPr lvl="0" algn="ctr" defTabSz="1200150">
-                  <a:lnSpc>
-                    <a:spcPct val="90000"/>
-                  </a:lnSpc>
-                  <a:spcBef>
-                    <a:spcPct val="0"/>
-                  </a:spcBef>
-                  <a:spcAft>
-                    <a:spcPct val="35000"/>
-                  </a:spcAft>
-                </a:pPr>
-                <a:r>
-                  <a:rPr lang="en-US" sz="1200" kern="1200" dirty="0" smtClean="0">
-                    <a:ln/>
-                  </a:rPr>
-                  <a:t>Selection</a:t>
-                </a:r>
-                <a:br>
-                  <a:rPr lang="en-US" sz="1200" kern="1200" dirty="0" smtClean="0">
-                    <a:ln/>
-                  </a:rPr>
-                </a:br>
-                <a:r>
-                  <a:rPr lang="en-US" sz="1200" kern="1200" dirty="0" smtClean="0"/>
-                  <a:t>and</a:t>
-                </a:r>
-                <a:br>
-                  <a:rPr lang="en-US" sz="1200" kern="1200" dirty="0" smtClean="0"/>
-                </a:br>
-                <a:r>
-                  <a:rPr lang="en-US" sz="1200" kern="1200" dirty="0" smtClean="0"/>
-                  <a:t>ordering</a:t>
-                </a:r>
-                <a:endParaRPr lang="en-US" sz="1200" kern="1200" dirty="0"/>
-              </a:p>
-            </p:txBody>
-          </p:sp>
-          <p:sp>
-            <p:nvSpPr>
-              <p:cNvPr id="9" name="Freeform 8"/>
-              <p:cNvSpPr/>
-              <p:nvPr/>
-            </p:nvSpPr>
-            <p:spPr>
-              <a:xfrm rot="44765">
-                <a:off x="7310420" y="1507040"/>
-                <a:ext cx="419040" cy="529526"/>
-              </a:xfrm>
-              <a:custGeom>
-                <a:avLst/>
-                <a:gdLst>
-                  <a:gd name="connsiteX0" fmla="*/ 0 w 419040"/>
-                  <a:gd name="connsiteY0" fmla="*/ 105905 h 529526"/>
-                  <a:gd name="connsiteX1" fmla="*/ 209520 w 419040"/>
-                  <a:gd name="connsiteY1" fmla="*/ 105905 h 529526"/>
-                  <a:gd name="connsiteX2" fmla="*/ 209520 w 419040"/>
-                  <a:gd name="connsiteY2" fmla="*/ 0 h 529526"/>
-                  <a:gd name="connsiteX3" fmla="*/ 419040 w 419040"/>
-                  <a:gd name="connsiteY3" fmla="*/ 264763 h 529526"/>
-                  <a:gd name="connsiteX4" fmla="*/ 209520 w 419040"/>
-                  <a:gd name="connsiteY4" fmla="*/ 529526 h 529526"/>
-                  <a:gd name="connsiteX5" fmla="*/ 209520 w 419040"/>
-                  <a:gd name="connsiteY5" fmla="*/ 423621 h 529526"/>
-                  <a:gd name="connsiteX6" fmla="*/ 0 w 419040"/>
-                  <a:gd name="connsiteY6" fmla="*/ 423621 h 529526"/>
-                  <a:gd name="connsiteX7" fmla="*/ 0 w 419040"/>
-                  <a:gd name="connsiteY7" fmla="*/ 105905 h 529526"/>
-                </a:gdLst>
-                <a:ahLst/>
-                <a:cxnLst>
-                  <a:cxn ang="0">
-                    <a:pos x="connsiteX0" y="connsiteY0"/>
-                  </a:cxn>
-                  <a:cxn ang="0">
-                    <a:pos x="connsiteX1" y="connsiteY1"/>
-                  </a:cxn>
-                  <a:cxn ang="0">
-                    <a:pos x="connsiteX2" y="connsiteY2"/>
-                  </a:cxn>
-                  <a:cxn ang="0">
-                    <a:pos x="connsiteX3" y="connsiteY3"/>
-                  </a:cxn>
-                  <a:cxn ang="0">
-                    <a:pos x="connsiteX4" y="connsiteY4"/>
-                  </a:cxn>
-                  <a:cxn ang="0">
-                    <a:pos x="connsiteX5" y="connsiteY5"/>
-                  </a:cxn>
-                  <a:cxn ang="0">
-                    <a:pos x="connsiteX6" y="connsiteY6"/>
-                  </a:cxn>
-                  <a:cxn ang="0">
-                    <a:pos x="connsiteX7" y="connsiteY7"/>
-                  </a:cxn>
-                </a:cxnLst>
-                <a:rect l="l" t="t" r="r" b="b"/>
-                <a:pathLst>
-                  <a:path w="419040" h="529526">
-                    <a:moveTo>
-                      <a:pt x="0" y="105905"/>
-                    </a:moveTo>
-                    <a:lnTo>
-                      <a:pt x="209520" y="105905"/>
-                    </a:lnTo>
-                    <a:lnTo>
-                      <a:pt x="209520" y="0"/>
-                    </a:lnTo>
-                    <a:lnTo>
-                      <a:pt x="419040" y="264763"/>
-                    </a:lnTo>
-                    <a:lnTo>
-                      <a:pt x="209520" y="529526"/>
-                    </a:lnTo>
-                    <a:lnTo>
-                      <a:pt x="209520" y="423621"/>
-                    </a:lnTo>
-                    <a:lnTo>
-                      <a:pt x="0" y="423621"/>
-                    </a:lnTo>
-                    <a:lnTo>
-                      <a:pt x="0" y="105905"/>
-                    </a:lnTo>
-                    <a:close/>
-                  </a:path>
-                </a:pathLst>
-              </a:custGeom>
-              <a:ln>
-                <a:solidFill>
-                  <a:schemeClr val="tx1"/>
-                </a:solidFill>
-              </a:ln>
-            </p:spPr>
-            <p:style>
-              <a:lnRef idx="0">
-                <a:schemeClr val="lt1">
-                  <a:hueOff val="0"/>
-                  <a:satOff val="0"/>
-                  <a:lumOff val="0"/>
-                  <a:alphaOff val="0"/>
-                </a:schemeClr>
-              </a:lnRef>
-              <a:fillRef idx="2">
-                <a:schemeClr val="accent4">
-                  <a:hueOff val="10395692"/>
-                  <a:satOff val="-47968"/>
-                  <a:lumOff val="1765"/>
-                  <a:alphaOff val="0"/>
-                </a:schemeClr>
-              </a:fillRef>
-              <a:effectRef idx="1">
-                <a:schemeClr val="accent4">
-                  <a:hueOff val="10395692"/>
-                  <a:satOff val="-47968"/>
-                  <a:lumOff val="1765"/>
-                  <a:alphaOff val="0"/>
-                </a:schemeClr>
-              </a:effectRef>
-              <a:fontRef idx="minor">
-                <a:schemeClr val="dk1"/>
-              </a:fontRef>
-            </p:style>
-            <p:txBody>
-              <a:bodyPr spcFirstLastPara="0" vert="horz" wrap="square" lIns="-1" tIns="105905" rIns="125712" bIns="105904" numCol="1" spcCol="1270" anchor="ctr" anchorCtr="0">
-                <a:noAutofit/>
-              </a:bodyPr>
-              <a:lstStyle/>
-              <a:p>
-                <a:pPr lvl="0" algn="ctr" defTabSz="977900">
-                  <a:lnSpc>
-                    <a:spcPct val="90000"/>
-                  </a:lnSpc>
-                  <a:spcBef>
-                    <a:spcPct val="0"/>
-                  </a:spcBef>
-                  <a:spcAft>
-                    <a:spcPct val="35000"/>
-                  </a:spcAft>
-                </a:pPr>
-                <a:endParaRPr lang="en-US" sz="2200" kern="1200"/>
-              </a:p>
-            </p:txBody>
-          </p:sp>
-          <p:sp>
-            <p:nvSpPr>
-              <p:cNvPr id="10" name="Freeform 9"/>
-              <p:cNvSpPr/>
-              <p:nvPr/>
-            </p:nvSpPr>
-            <p:spPr>
-              <a:xfrm>
-                <a:off x="7903368" y="1150143"/>
-                <a:ext cx="2135187" cy="1281112"/>
-              </a:xfrm>
-              <a:custGeom>
-                <a:avLst/>
-                <a:gdLst>
-                  <a:gd name="connsiteX0" fmla="*/ 0 w 2135187"/>
-                  <a:gd name="connsiteY0" fmla="*/ 128111 h 1281112"/>
-                  <a:gd name="connsiteX1" fmla="*/ 128111 w 2135187"/>
-                  <a:gd name="connsiteY1" fmla="*/ 0 h 1281112"/>
-                  <a:gd name="connsiteX2" fmla="*/ 2007076 w 2135187"/>
-                  <a:gd name="connsiteY2" fmla="*/ 0 h 1281112"/>
-                  <a:gd name="connsiteX3" fmla="*/ 2135187 w 2135187"/>
-                  <a:gd name="connsiteY3" fmla="*/ 128111 h 1281112"/>
-                  <a:gd name="connsiteX4" fmla="*/ 2135187 w 2135187"/>
-                  <a:gd name="connsiteY4" fmla="*/ 1153001 h 1281112"/>
-                  <a:gd name="connsiteX5" fmla="*/ 2007076 w 2135187"/>
-                  <a:gd name="connsiteY5" fmla="*/ 1281112 h 1281112"/>
-                  <a:gd name="connsiteX6" fmla="*/ 128111 w 2135187"/>
-                  <a:gd name="connsiteY6" fmla="*/ 1281112 h 1281112"/>
-                  <a:gd name="connsiteX7" fmla="*/ 0 w 2135187"/>
-                  <a:gd name="connsiteY7" fmla="*/ 1153001 h 1281112"/>
-                  <a:gd name="connsiteX8" fmla="*/ 0 w 2135187"/>
-                  <a:gd name="connsiteY8" fmla="*/ 128111 h 1281112"/>
-                </a:gdLst>
-                <a:ahLst/>
-                <a:cxnLst>
-                  <a:cxn ang="0">
-                    <a:pos x="connsiteX0" y="connsiteY0"/>
-                  </a:cxn>
-                  <a:cxn ang="0">
-                    <a:pos x="connsiteX1" y="connsiteY1"/>
-                  </a:cxn>
-                  <a:cxn ang="0">
-                    <a:pos x="connsiteX2" y="connsiteY2"/>
-                  </a:cxn>
-                  <a:cxn ang="0">
-                    <a:pos x="connsiteX3" y="connsiteY3"/>
-                  </a:cxn>
-                  <a:cxn ang="0">
-                    <a:pos x="connsiteX4" y="connsiteY4"/>
-                  </a:cxn>
-                  <a:cxn ang="0">
-                    <a:pos x="connsiteX5" y="connsiteY5"/>
-                  </a:cxn>
-                  <a:cxn ang="0">
-                    <a:pos x="connsiteX6" y="connsiteY6"/>
-                  </a:cxn>
-                  <a:cxn ang="0">
-                    <a:pos x="connsiteX7" y="connsiteY7"/>
-                  </a:cxn>
-                  <a:cxn ang="0">
-                    <a:pos x="connsiteX8" y="connsiteY8"/>
-                  </a:cxn>
-                </a:cxnLst>
-                <a:rect l="l" t="t" r="r" b="b"/>
-                <a:pathLst>
-                  <a:path w="2135187" h="1281112">
-                    <a:moveTo>
-                      <a:pt x="0" y="128111"/>
-                    </a:moveTo>
-                    <a:cubicBezTo>
-                      <a:pt x="0" y="57357"/>
-                      <a:pt x="57357" y="0"/>
-                      <a:pt x="128111" y="0"/>
-                    </a:cubicBezTo>
-                    <a:lnTo>
-                      <a:pt x="2007076" y="0"/>
-                    </a:lnTo>
-                    <a:cubicBezTo>
-                      <a:pt x="2077830" y="0"/>
-                      <a:pt x="2135187" y="57357"/>
-                      <a:pt x="2135187" y="128111"/>
-                    </a:cubicBezTo>
-                    <a:lnTo>
-                      <a:pt x="2135187" y="1153001"/>
-                    </a:lnTo>
-                    <a:cubicBezTo>
-                      <a:pt x="2135187" y="1223755"/>
-                      <a:pt x="2077830" y="1281112"/>
-                      <a:pt x="2007076" y="1281112"/>
-                    </a:cubicBezTo>
-                    <a:lnTo>
-                      <a:pt x="128111" y="1281112"/>
-                    </a:lnTo>
-                    <a:cubicBezTo>
-                      <a:pt x="57357" y="1281112"/>
-                      <a:pt x="0" y="1223755"/>
-                      <a:pt x="0" y="1153001"/>
-                    </a:cubicBezTo>
-                    <a:lnTo>
-                      <a:pt x="0" y="128111"/>
-                    </a:lnTo>
-                    <a:close/>
-                  </a:path>
-                </a:pathLst>
-              </a:custGeom>
-              <a:ln>
-                <a:solidFill>
-                  <a:scrgbClr r="0" g="0" b="0"/>
-                </a:solidFill>
-              </a:ln>
-              <a:scene3d>
-                <a:camera prst="orthographicFront"/>
-                <a:lightRig rig="flat" dir="t"/>
-              </a:scene3d>
-              <a:sp3d prstMaterial="dkEdge">
-                <a:bevelT w="8200" h="38100"/>
-              </a:sp3d>
-            </p:spPr>
-            <p:style>
-              <a:lnRef idx="0">
-                <a:scrgbClr r="0" g="0" b="0"/>
-              </a:lnRef>
-              <a:fillRef idx="2">
-                <a:schemeClr val="accent4">
-                  <a:hueOff val="10395692"/>
-                  <a:satOff val="-47968"/>
-                  <a:lumOff val="1765"/>
-                  <a:alphaOff val="0"/>
-                </a:schemeClr>
-              </a:fillRef>
-              <a:effectRef idx="1">
-                <a:schemeClr val="accent4">
-                  <a:hueOff val="10395692"/>
-                  <a:satOff val="-47968"/>
-                  <a:lumOff val="1765"/>
-                  <a:alphaOff val="0"/>
-                </a:schemeClr>
-              </a:effectRef>
-              <a:fontRef idx="minor">
-                <a:schemeClr val="dk1"/>
-              </a:fontRef>
-            </p:style>
-            <p:txBody>
-              <a:bodyPr spcFirstLastPara="0" vert="horz" wrap="square" lIns="140392" tIns="140392" rIns="140392" bIns="140392" numCol="1" spcCol="1270" anchor="ctr" anchorCtr="0">
-                <a:noAutofit/>
-              </a:bodyPr>
-              <a:lstStyle/>
-              <a:p>
-                <a:pPr lvl="0" algn="ctr" defTabSz="1200150">
-                  <a:lnSpc>
-                    <a:spcPct val="90000"/>
-                  </a:lnSpc>
-                  <a:spcBef>
-                    <a:spcPct val="0"/>
-                  </a:spcBef>
-                  <a:spcAft>
-                    <a:spcPct val="35000"/>
-                  </a:spcAft>
-                </a:pPr>
-                <a:r>
-                  <a:rPr lang="en-US" sz="1200" kern="1200" dirty="0" smtClean="0">
-                    <a:ln/>
-                  </a:rPr>
-                  <a:t>Terminal</a:t>
-                </a:r>
-                <a:br>
-                  <a:rPr lang="en-US" sz="1200" kern="1200" dirty="0" smtClean="0">
-                    <a:ln/>
-                  </a:rPr>
-                </a:br>
-                <a:r>
-                  <a:rPr lang="en-US" sz="1200" kern="1200" dirty="0" smtClean="0">
-                    <a:ln/>
-                  </a:rPr>
-                  <a:t>Form</a:t>
-                </a:r>
-                <a:br>
-                  <a:rPr lang="en-US" sz="1200" kern="1200" dirty="0" smtClean="0">
-                    <a:ln/>
-                  </a:rPr>
-                </a:br>
-                <a:r>
-                  <a:rPr lang="en-US" sz="1200" kern="1200" dirty="0" smtClean="0">
-                    <a:ln/>
-                  </a:rPr>
-                  <a:t>action</a:t>
-                </a:r>
-                <a:endParaRPr lang="en-US" sz="1200" kern="1200" dirty="0">
-                  <a:ln/>
-                </a:endParaRPr>
-              </a:p>
-            </p:txBody>
-          </p:sp>
-        </p:grpSp>
         <p:sp>
           <p:nvSpPr>
-            <p:cNvPr id="17" name="Freeform 16"/>
+            <p:cNvPr id="9" name="Freeform 8"/>
+            <p:cNvSpPr/>
+            <p:nvPr/>
+          </p:nvSpPr>
+          <p:spPr>
+            <a:xfrm rot="44765">
+              <a:off x="7310420" y="1507040"/>
+              <a:ext cx="419040" cy="529526"/>
+            </a:xfrm>
+            <a:custGeom>
+              <a:avLst/>
+              <a:gdLst>
+                <a:gd name="connsiteX0" fmla="*/ 0 w 419040"/>
+                <a:gd name="connsiteY0" fmla="*/ 105905 h 529526"/>
+                <a:gd name="connsiteX1" fmla="*/ 209520 w 419040"/>
+                <a:gd name="connsiteY1" fmla="*/ 105905 h 529526"/>
+                <a:gd name="connsiteX2" fmla="*/ 209520 w 419040"/>
+                <a:gd name="connsiteY2" fmla="*/ 0 h 529526"/>
+                <a:gd name="connsiteX3" fmla="*/ 419040 w 419040"/>
+                <a:gd name="connsiteY3" fmla="*/ 264763 h 529526"/>
+                <a:gd name="connsiteX4" fmla="*/ 209520 w 419040"/>
+                <a:gd name="connsiteY4" fmla="*/ 529526 h 529526"/>
+                <a:gd name="connsiteX5" fmla="*/ 209520 w 419040"/>
+                <a:gd name="connsiteY5" fmla="*/ 423621 h 529526"/>
+                <a:gd name="connsiteX6" fmla="*/ 0 w 419040"/>
+                <a:gd name="connsiteY6" fmla="*/ 423621 h 529526"/>
+                <a:gd name="connsiteX7" fmla="*/ 0 w 419040"/>
+                <a:gd name="connsiteY7" fmla="*/ 105905 h 529526"/>
+              </a:gdLst>
+              <a:ahLst/>
+              <a:cxnLst>
+                <a:cxn ang="0">
+                  <a:pos x="connsiteX0" y="connsiteY0"/>
+                </a:cxn>
+                <a:cxn ang="0">
+                  <a:pos x="connsiteX1" y="connsiteY1"/>
+                </a:cxn>
+                <a:cxn ang="0">
+                  <a:pos x="connsiteX2" y="connsiteY2"/>
+                </a:cxn>
+                <a:cxn ang="0">
+                  <a:pos x="connsiteX3" y="connsiteY3"/>
+                </a:cxn>
+                <a:cxn ang="0">
+                  <a:pos x="connsiteX4" y="connsiteY4"/>
+                </a:cxn>
+                <a:cxn ang="0">
+                  <a:pos x="connsiteX5" y="connsiteY5"/>
+                </a:cxn>
+                <a:cxn ang="0">
+                  <a:pos x="connsiteX6" y="connsiteY6"/>
+                </a:cxn>
+                <a:cxn ang="0">
+                  <a:pos x="connsiteX7" y="connsiteY7"/>
+                </a:cxn>
+              </a:cxnLst>
+              <a:rect l="l" t="t" r="r" b="b"/>
+              <a:pathLst>
+                <a:path w="419040" h="529526">
+                  <a:moveTo>
+                    <a:pt x="0" y="105905"/>
+                  </a:moveTo>
+                  <a:lnTo>
+                    <a:pt x="209520" y="105905"/>
+                  </a:lnTo>
+                  <a:lnTo>
+                    <a:pt x="209520" y="0"/>
+                  </a:lnTo>
+                  <a:lnTo>
+                    <a:pt x="419040" y="264763"/>
+                  </a:lnTo>
+                  <a:lnTo>
+                    <a:pt x="209520" y="529526"/>
+                  </a:lnTo>
+                  <a:lnTo>
+                    <a:pt x="209520" y="423621"/>
+                  </a:lnTo>
+                  <a:lnTo>
+                    <a:pt x="0" y="423621"/>
+                  </a:lnTo>
+                  <a:lnTo>
+                    <a:pt x="0" y="105905"/>
+                  </a:lnTo>
+                  <a:close/>
+                </a:path>
+              </a:pathLst>
+            </a:custGeom>
+            <a:ln>
+              <a:solidFill>
+                <a:schemeClr val="tx1"/>
+              </a:solidFill>
+            </a:ln>
+          </p:spPr>
+          <p:style>
+            <a:lnRef idx="0">
+              <a:schemeClr val="lt1">
+                <a:hueOff val="0"/>
+                <a:satOff val="0"/>
+                <a:lumOff val="0"/>
+                <a:alphaOff val="0"/>
+              </a:schemeClr>
+            </a:lnRef>
+            <a:fillRef idx="2">
+              <a:schemeClr val="accent4">
+                <a:hueOff val="10395692"/>
+                <a:satOff val="-47968"/>
+                <a:lumOff val="1765"/>
+                <a:alphaOff val="0"/>
+              </a:schemeClr>
+            </a:fillRef>
+            <a:effectRef idx="1">
+              <a:schemeClr val="accent4">
+                <a:hueOff val="10395692"/>
+                <a:satOff val="-47968"/>
+                <a:lumOff val="1765"/>
+                <a:alphaOff val="0"/>
+              </a:schemeClr>
+            </a:effectRef>
+            <a:fontRef idx="minor">
+              <a:schemeClr val="dk1"/>
+            </a:fontRef>
+          </p:style>
+          <p:txBody>
+            <a:bodyPr spcFirstLastPara="0" vert="horz" wrap="square" lIns="-1" tIns="105905" rIns="125712" bIns="105904" numCol="1" spcCol="1270" anchor="ctr" anchorCtr="0">
+              <a:noAutofit/>
+            </a:bodyPr>
+            <a:lstStyle/>
+            <a:p>
+              <a:pPr lvl="0" algn="ctr" defTabSz="977900">
+                <a:lnSpc>
+                  <a:spcPct val="90000"/>
+                </a:lnSpc>
+                <a:spcBef>
+                  <a:spcPct val="0"/>
+                </a:spcBef>
+                <a:spcAft>
+                  <a:spcPct val="35000"/>
+                </a:spcAft>
+              </a:pPr>
+              <a:endParaRPr lang="en-US" sz="2200" kern="1200"/>
+            </a:p>
+          </p:txBody>
+        </p:sp>
+        <p:sp>
+          <p:nvSpPr>
+            <p:cNvPr id="10" name="Freeform 9"/>
             <p:cNvSpPr/>
             <p:nvPr/>
           </p:nvSpPr>
           <p:spPr>
             <a:xfrm>
-              <a:off x="2032000" y="2498379"/>
-              <a:ext cx="1869440" cy="838160"/>
+              <a:off x="7903368" y="1150143"/>
+              <a:ext cx="2135187" cy="1281112"/>
             </a:xfrm>
             <a:custGeom>
               <a:avLst/>
               <a:gdLst>
-                <a:gd name="connsiteX0" fmla="*/ 0 w 1869440"/>
-                <a:gd name="connsiteY0" fmla="*/ 139696 h 838160"/>
-                <a:gd name="connsiteX1" fmla="*/ 139696 w 1869440"/>
-                <a:gd name="connsiteY1" fmla="*/ 0 h 838160"/>
-                <a:gd name="connsiteX2" fmla="*/ 1729744 w 1869440"/>
-                <a:gd name="connsiteY2" fmla="*/ 0 h 838160"/>
-                <a:gd name="connsiteX3" fmla="*/ 1869440 w 1869440"/>
-                <a:gd name="connsiteY3" fmla="*/ 139696 h 838160"/>
-                <a:gd name="connsiteX4" fmla="*/ 1869440 w 1869440"/>
-                <a:gd name="connsiteY4" fmla="*/ 698464 h 838160"/>
-                <a:gd name="connsiteX5" fmla="*/ 1729744 w 1869440"/>
-                <a:gd name="connsiteY5" fmla="*/ 838160 h 838160"/>
-                <a:gd name="connsiteX6" fmla="*/ 139696 w 1869440"/>
-                <a:gd name="connsiteY6" fmla="*/ 838160 h 838160"/>
-                <a:gd name="connsiteX7" fmla="*/ 0 w 1869440"/>
-                <a:gd name="connsiteY7" fmla="*/ 698464 h 838160"/>
-                <a:gd name="connsiteX8" fmla="*/ 0 w 1869440"/>
-                <a:gd name="connsiteY8" fmla="*/ 139696 h 838160"/>
+                <a:gd name="connsiteX0" fmla="*/ 0 w 2135187"/>
+                <a:gd name="connsiteY0" fmla="*/ 128111 h 1281112"/>
+                <a:gd name="connsiteX1" fmla="*/ 128111 w 2135187"/>
+                <a:gd name="connsiteY1" fmla="*/ 0 h 1281112"/>
+                <a:gd name="connsiteX2" fmla="*/ 2007076 w 2135187"/>
+                <a:gd name="connsiteY2" fmla="*/ 0 h 1281112"/>
+                <a:gd name="connsiteX3" fmla="*/ 2135187 w 2135187"/>
+                <a:gd name="connsiteY3" fmla="*/ 128111 h 1281112"/>
+                <a:gd name="connsiteX4" fmla="*/ 2135187 w 2135187"/>
+                <a:gd name="connsiteY4" fmla="*/ 1153001 h 1281112"/>
+                <a:gd name="connsiteX5" fmla="*/ 2007076 w 2135187"/>
+                <a:gd name="connsiteY5" fmla="*/ 1281112 h 1281112"/>
+                <a:gd name="connsiteX6" fmla="*/ 128111 w 2135187"/>
+                <a:gd name="connsiteY6" fmla="*/ 1281112 h 1281112"/>
+                <a:gd name="connsiteX7" fmla="*/ 0 w 2135187"/>
+                <a:gd name="connsiteY7" fmla="*/ 1153001 h 1281112"/>
+                <a:gd name="connsiteX8" fmla="*/ 0 w 2135187"/>
+                <a:gd name="connsiteY8" fmla="*/ 128111 h 1281112"/>
               </a:gdLst>
               <a:ahLst/>
               <a:cxnLst>
@@ -13583,73 +13375,90 @@
               </a:cxnLst>
               <a:rect l="l" t="t" r="r" b="b"/>
               <a:pathLst>
-                <a:path w="1869440" h="838160">
+                <a:path w="2135187" h="1281112">
                   <a:moveTo>
-                    <a:pt x="0" y="139696"/>
+                    <a:pt x="0" y="128111"/>
                   </a:moveTo>
                   <a:cubicBezTo>
-                    <a:pt x="0" y="62544"/>
-                    <a:pt x="62544" y="0"/>
-                    <a:pt x="139696" y="0"/>
+                    <a:pt x="0" y="57357"/>
+                    <a:pt x="57357" y="0"/>
+                    <a:pt x="128111" y="0"/>
                   </a:cubicBezTo>
                   <a:lnTo>
-                    <a:pt x="1729744" y="0"/>
+                    <a:pt x="2007076" y="0"/>
                   </a:lnTo>
                   <a:cubicBezTo>
-                    <a:pt x="1806896" y="0"/>
-                    <a:pt x="1869440" y="62544"/>
-                    <a:pt x="1869440" y="139696"/>
+                    <a:pt x="2077830" y="0"/>
+                    <a:pt x="2135187" y="57357"/>
+                    <a:pt x="2135187" y="128111"/>
                   </a:cubicBezTo>
                   <a:lnTo>
-                    <a:pt x="1869440" y="698464"/>
+                    <a:pt x="2135187" y="1153001"/>
                   </a:lnTo>
                   <a:cubicBezTo>
-                    <a:pt x="1869440" y="775616"/>
-                    <a:pt x="1806896" y="838160"/>
-                    <a:pt x="1729744" y="838160"/>
+                    <a:pt x="2135187" y="1223755"/>
+                    <a:pt x="2077830" y="1281112"/>
+                    <a:pt x="2007076" y="1281112"/>
                   </a:cubicBezTo>
                   <a:lnTo>
-                    <a:pt x="139696" y="838160"/>
+                    <a:pt x="128111" y="1281112"/>
                   </a:lnTo>
                   <a:cubicBezTo>
-                    <a:pt x="62544" y="838160"/>
-                    <a:pt x="0" y="775616"/>
-                    <a:pt x="0" y="698464"/>
+                    <a:pt x="57357" y="1281112"/>
+                    <a:pt x="0" y="1223755"/>
+                    <a:pt x="0" y="1153001"/>
                   </a:cubicBezTo>
                   <a:lnTo>
-                    <a:pt x="0" y="139696"/>
+                    <a:pt x="0" y="128111"/>
                   </a:lnTo>
                   <a:close/>
                 </a:path>
               </a:pathLst>
             </a:custGeom>
-            <a:ln w="12700">
+            <a:ln>
               <a:solidFill>
-                <a:schemeClr val="tx1"/>
+                <a:scrgbClr r="0" g="0" b="0"/>
               </a:solidFill>
             </a:ln>
+            <a:scene3d>
+              <a:camera prst="orthographicFront"/>
+              <a:lightRig rig="flat" dir="t"/>
+            </a:scene3d>
+            <a:sp3d prstMaterial="dkEdge">
+              <a:bevelT w="8200" h="38100"/>
+            </a:sp3d>
           </p:spPr>
           <p:style>
-            <a:lnRef idx="1">
-              <a:schemeClr val="accent4"/>
+            <a:lnRef idx="0">
+              <a:scrgbClr r="0" g="0" b="0"/>
             </a:lnRef>
             <a:fillRef idx="2">
-              <a:schemeClr val="accent4"/>
+              <a:schemeClr val="accent4">
+                <a:hueOff val="10395692"/>
+                <a:satOff val="-47968"/>
+                <a:lumOff val="1765"/>
+                <a:alphaOff val="0"/>
+              </a:schemeClr>
             </a:fillRef>
             <a:effectRef idx="1">
-              <a:schemeClr val="accent4"/>
+              <a:schemeClr val="accent4">
+                <a:hueOff val="10395692"/>
+                <a:satOff val="-47968"/>
+                <a:lumOff val="1765"/>
+                <a:alphaOff val="0"/>
+              </a:schemeClr>
             </a:effectRef>
             <a:fontRef idx="minor">
               <a:schemeClr val="dk1"/>
             </a:fontRef>
           </p:style>
           <p:txBody>
-            <a:bodyPr spcFirstLastPara="0" vert="horz" wrap="square" lIns="200936" tIns="120926" rIns="200936" bIns="120926" numCol="1" spcCol="1270" anchor="ctr" anchorCtr="0">
+            <a:bodyPr spcFirstLastPara="0" vert="horz" wrap="square" lIns="140392" tIns="140392" rIns="140392" bIns="140392" numCol="1" spcCol="1270" anchor="ctr" anchorCtr="0">
               <a:noAutofit/>
             </a:bodyPr>
             <a:lstStyle/>
             <a:p>
-              <a:pPr lvl="0" algn="ctr" defTabSz="1866900">
+              <a:pPr lvl="0" algn="ctr" defTabSz="1200150">
                 <a:lnSpc>
                   <a:spcPct val="90000"/>
                 </a:lnSpc>
@@ -13661,1168 +13470,1725 @@
                 </a:spcAft>
               </a:pPr>
               <a:r>
-                <a:rPr lang="en-US" sz="2400" dirty="0" smtClean="0">
-                  <a:ln w="12700">
-                    <a:noFill/>
-                  </a:ln>
+                <a:rPr lang="en-US" sz="1200" kern="1200" dirty="0" smtClean="0">
+                  <a:ln/>
                 </a:rPr>
-                <a:t>CAS</a:t>
+                <a:t>Terminal</a:t>
               </a:r>
-              <a:endParaRPr lang="en-US" sz="2400" kern="1200" dirty="0">
-                <a:ln w="12700">
-                  <a:noFill/>
-                </a:ln>
+              <a:br>
+                <a:rPr lang="en-US" sz="1200" kern="1200" dirty="0" smtClean="0">
+                  <a:ln/>
+                </a:rPr>
+              </a:br>
+              <a:r>
+                <a:rPr lang="en-US" sz="1200" kern="1200" dirty="0" smtClean="0">
+                  <a:ln/>
+                </a:rPr>
+                <a:t>Form</a:t>
+              </a:r>
+              <a:br>
+                <a:rPr lang="en-US" sz="1200" kern="1200" dirty="0" smtClean="0">
+                  <a:ln/>
+                </a:rPr>
+              </a:br>
+              <a:r>
+                <a:rPr lang="en-US" sz="1200" kern="1200" dirty="0" smtClean="0">
+                  <a:ln/>
+                </a:rPr>
+                <a:t>action</a:t>
+              </a:r>
+              <a:endParaRPr lang="en-US" sz="1200" kern="1200" dirty="0">
+                <a:ln/>
               </a:endParaRPr>
             </a:p>
           </p:txBody>
         </p:sp>
-        <p:sp>
-          <p:nvSpPr>
-            <p:cNvPr id="19" name="Freeform 18"/>
-            <p:cNvSpPr/>
-            <p:nvPr/>
-          </p:nvSpPr>
-          <p:spPr>
-            <a:xfrm>
-              <a:off x="2032000" y="3416403"/>
-              <a:ext cx="1869440" cy="838160"/>
-            </a:xfrm>
-            <a:custGeom>
-              <a:avLst/>
-              <a:gdLst>
-                <a:gd name="connsiteX0" fmla="*/ 0 w 1869440"/>
-                <a:gd name="connsiteY0" fmla="*/ 139696 h 838160"/>
-                <a:gd name="connsiteX1" fmla="*/ 139696 w 1869440"/>
-                <a:gd name="connsiteY1" fmla="*/ 0 h 838160"/>
-                <a:gd name="connsiteX2" fmla="*/ 1729744 w 1869440"/>
-                <a:gd name="connsiteY2" fmla="*/ 0 h 838160"/>
-                <a:gd name="connsiteX3" fmla="*/ 1869440 w 1869440"/>
-                <a:gd name="connsiteY3" fmla="*/ 139696 h 838160"/>
-                <a:gd name="connsiteX4" fmla="*/ 1869440 w 1869440"/>
-                <a:gd name="connsiteY4" fmla="*/ 698464 h 838160"/>
-                <a:gd name="connsiteX5" fmla="*/ 1729744 w 1869440"/>
-                <a:gd name="connsiteY5" fmla="*/ 838160 h 838160"/>
-                <a:gd name="connsiteX6" fmla="*/ 139696 w 1869440"/>
-                <a:gd name="connsiteY6" fmla="*/ 838160 h 838160"/>
-                <a:gd name="connsiteX7" fmla="*/ 0 w 1869440"/>
-                <a:gd name="connsiteY7" fmla="*/ 698464 h 838160"/>
-                <a:gd name="connsiteX8" fmla="*/ 0 w 1869440"/>
-                <a:gd name="connsiteY8" fmla="*/ 139696 h 838160"/>
-              </a:gdLst>
-              <a:ahLst/>
-              <a:cxnLst>
-                <a:cxn ang="0">
-                  <a:pos x="connsiteX0" y="connsiteY0"/>
-                </a:cxn>
-                <a:cxn ang="0">
-                  <a:pos x="connsiteX1" y="connsiteY1"/>
-                </a:cxn>
-                <a:cxn ang="0">
-                  <a:pos x="connsiteX2" y="connsiteY2"/>
-                </a:cxn>
-                <a:cxn ang="0">
-                  <a:pos x="connsiteX3" y="connsiteY3"/>
-                </a:cxn>
-                <a:cxn ang="0">
-                  <a:pos x="connsiteX4" y="connsiteY4"/>
-                </a:cxn>
-                <a:cxn ang="0">
-                  <a:pos x="connsiteX5" y="connsiteY5"/>
-                </a:cxn>
-                <a:cxn ang="0">
-                  <a:pos x="connsiteX6" y="connsiteY6"/>
-                </a:cxn>
-                <a:cxn ang="0">
-                  <a:pos x="connsiteX7" y="connsiteY7"/>
-                </a:cxn>
-                <a:cxn ang="0">
-                  <a:pos x="connsiteX8" y="connsiteY8"/>
-                </a:cxn>
-              </a:cxnLst>
-              <a:rect l="l" t="t" r="r" b="b"/>
-              <a:pathLst>
-                <a:path w="1869440" h="838160">
-                  <a:moveTo>
-                    <a:pt x="0" y="139696"/>
-                  </a:moveTo>
-                  <a:cubicBezTo>
-                    <a:pt x="0" y="62544"/>
-                    <a:pt x="62544" y="0"/>
-                    <a:pt x="139696" y="0"/>
-                  </a:cubicBezTo>
-                  <a:lnTo>
-                    <a:pt x="1729744" y="0"/>
-                  </a:lnTo>
-                  <a:cubicBezTo>
-                    <a:pt x="1806896" y="0"/>
-                    <a:pt x="1869440" y="62544"/>
-                    <a:pt x="1869440" y="139696"/>
-                  </a:cubicBezTo>
-                  <a:lnTo>
-                    <a:pt x="1869440" y="698464"/>
-                  </a:lnTo>
-                  <a:cubicBezTo>
-                    <a:pt x="1869440" y="775616"/>
-                    <a:pt x="1806896" y="838160"/>
-                    <a:pt x="1729744" y="838160"/>
-                  </a:cubicBezTo>
-                  <a:lnTo>
-                    <a:pt x="139696" y="838160"/>
-                  </a:lnTo>
-                  <a:cubicBezTo>
-                    <a:pt x="62544" y="838160"/>
-                    <a:pt x="0" y="775616"/>
-                    <a:pt x="0" y="698464"/>
-                  </a:cubicBezTo>
-                  <a:lnTo>
-                    <a:pt x="0" y="139696"/>
-                  </a:lnTo>
-                  <a:close/>
-                </a:path>
-              </a:pathLst>
-            </a:custGeom>
-            <a:ln w="12700">
-              <a:solidFill>
-                <a:schemeClr val="tx1"/>
-              </a:solidFill>
-            </a:ln>
-          </p:spPr>
-          <p:style>
-            <a:lnRef idx="1">
-              <a:schemeClr val="accent4"/>
-            </a:lnRef>
-            <a:fillRef idx="2">
-              <a:schemeClr val="accent4"/>
-            </a:fillRef>
-            <a:effectRef idx="1">
-              <a:schemeClr val="accent4"/>
-            </a:effectRef>
-            <a:fontRef idx="minor">
-              <a:schemeClr val="dk1"/>
-            </a:fontRef>
-          </p:style>
-          <p:txBody>
-            <a:bodyPr spcFirstLastPara="0" vert="horz" wrap="square" lIns="200936" tIns="120926" rIns="200936" bIns="120926" numCol="1" spcCol="1270" anchor="ctr" anchorCtr="0">
-              <a:noAutofit/>
-            </a:bodyPr>
-            <a:lstStyle/>
-            <a:p>
-              <a:pPr lvl="0" algn="ctr" defTabSz="1866900">
-                <a:lnSpc>
-                  <a:spcPct val="90000"/>
-                </a:lnSpc>
-                <a:spcBef>
-                  <a:spcPct val="0"/>
-                </a:spcBef>
-                <a:spcAft>
-                  <a:spcPct val="35000"/>
-                </a:spcAft>
-              </a:pPr>
-              <a:r>
-                <a:rPr lang="en-US" sz="2400" kern="1200" dirty="0" smtClean="0">
-                  <a:ln w="12700">
-                    <a:noFill/>
-                  </a:ln>
-                </a:rPr>
-                <a:t>Index</a:t>
-              </a:r>
-              <a:endParaRPr lang="en-US" sz="2400" kern="1200" dirty="0">
+      </p:grpSp>
+      <p:sp>
+        <p:nvSpPr>
+          <p:cNvPr id="17" name="Freeform 16"/>
+          <p:cNvSpPr/>
+          <p:nvPr/>
+        </p:nvSpPr>
+        <p:spPr>
+          <a:xfrm>
+            <a:off x="4166756" y="2003839"/>
+            <a:ext cx="1437190" cy="644362"/>
+          </a:xfrm>
+          <a:custGeom>
+            <a:avLst/>
+            <a:gdLst>
+              <a:gd name="connsiteX0" fmla="*/ 0 w 1869440"/>
+              <a:gd name="connsiteY0" fmla="*/ 139696 h 838160"/>
+              <a:gd name="connsiteX1" fmla="*/ 139696 w 1869440"/>
+              <a:gd name="connsiteY1" fmla="*/ 0 h 838160"/>
+              <a:gd name="connsiteX2" fmla="*/ 1729744 w 1869440"/>
+              <a:gd name="connsiteY2" fmla="*/ 0 h 838160"/>
+              <a:gd name="connsiteX3" fmla="*/ 1869440 w 1869440"/>
+              <a:gd name="connsiteY3" fmla="*/ 139696 h 838160"/>
+              <a:gd name="connsiteX4" fmla="*/ 1869440 w 1869440"/>
+              <a:gd name="connsiteY4" fmla="*/ 698464 h 838160"/>
+              <a:gd name="connsiteX5" fmla="*/ 1729744 w 1869440"/>
+              <a:gd name="connsiteY5" fmla="*/ 838160 h 838160"/>
+              <a:gd name="connsiteX6" fmla="*/ 139696 w 1869440"/>
+              <a:gd name="connsiteY6" fmla="*/ 838160 h 838160"/>
+              <a:gd name="connsiteX7" fmla="*/ 0 w 1869440"/>
+              <a:gd name="connsiteY7" fmla="*/ 698464 h 838160"/>
+              <a:gd name="connsiteX8" fmla="*/ 0 w 1869440"/>
+              <a:gd name="connsiteY8" fmla="*/ 139696 h 838160"/>
+            </a:gdLst>
+            <a:ahLst/>
+            <a:cxnLst>
+              <a:cxn ang="0">
+                <a:pos x="connsiteX0" y="connsiteY0"/>
+              </a:cxn>
+              <a:cxn ang="0">
+                <a:pos x="connsiteX1" y="connsiteY1"/>
+              </a:cxn>
+              <a:cxn ang="0">
+                <a:pos x="connsiteX2" y="connsiteY2"/>
+              </a:cxn>
+              <a:cxn ang="0">
+                <a:pos x="connsiteX3" y="connsiteY3"/>
+              </a:cxn>
+              <a:cxn ang="0">
+                <a:pos x="connsiteX4" y="connsiteY4"/>
+              </a:cxn>
+              <a:cxn ang="0">
+                <a:pos x="connsiteX5" y="connsiteY5"/>
+              </a:cxn>
+              <a:cxn ang="0">
+                <a:pos x="connsiteX6" y="connsiteY6"/>
+              </a:cxn>
+              <a:cxn ang="0">
+                <a:pos x="connsiteX7" y="connsiteY7"/>
+              </a:cxn>
+              <a:cxn ang="0">
+                <a:pos x="connsiteX8" y="connsiteY8"/>
+              </a:cxn>
+            </a:cxnLst>
+            <a:rect l="l" t="t" r="r" b="b"/>
+            <a:pathLst>
+              <a:path w="1869440" h="838160">
+                <a:moveTo>
+                  <a:pt x="0" y="139696"/>
+                </a:moveTo>
+                <a:cubicBezTo>
+                  <a:pt x="0" y="62544"/>
+                  <a:pt x="62544" y="0"/>
+                  <a:pt x="139696" y="0"/>
+                </a:cubicBezTo>
+                <a:lnTo>
+                  <a:pt x="1729744" y="0"/>
+                </a:lnTo>
+                <a:cubicBezTo>
+                  <a:pt x="1806896" y="0"/>
+                  <a:pt x="1869440" y="62544"/>
+                  <a:pt x="1869440" y="139696"/>
+                </a:cubicBezTo>
+                <a:lnTo>
+                  <a:pt x="1869440" y="698464"/>
+                </a:lnTo>
+                <a:cubicBezTo>
+                  <a:pt x="1869440" y="775616"/>
+                  <a:pt x="1806896" y="838160"/>
+                  <a:pt x="1729744" y="838160"/>
+                </a:cubicBezTo>
+                <a:lnTo>
+                  <a:pt x="139696" y="838160"/>
+                </a:lnTo>
+                <a:cubicBezTo>
+                  <a:pt x="62544" y="838160"/>
+                  <a:pt x="0" y="775616"/>
+                  <a:pt x="0" y="698464"/>
+                </a:cubicBezTo>
+                <a:lnTo>
+                  <a:pt x="0" y="139696"/>
+                </a:lnTo>
+                <a:close/>
+              </a:path>
+            </a:pathLst>
+          </a:custGeom>
+          <a:gradFill flip="none" rotWithShape="1">
+            <a:gsLst>
+              <a:gs pos="0">
+                <a:srgbClr val="FFAF99">
+                  <a:alpha val="48000"/>
+                  <a:lumMod val="54000"/>
+                  <a:lumOff val="46000"/>
+                </a:srgbClr>
+              </a:gs>
+              <a:gs pos="100000">
+                <a:srgbClr val="FFAF99"/>
+              </a:gs>
+            </a:gsLst>
+            <a:lin ang="2700000" scaled="1"/>
+            <a:tileRect/>
+          </a:gradFill>
+          <a:ln w="12700">
+            <a:solidFill>
+              <a:schemeClr val="tx1"/>
+            </a:solidFill>
+          </a:ln>
+        </p:spPr>
+        <p:style>
+          <a:lnRef idx="1">
+            <a:schemeClr val="accent4"/>
+          </a:lnRef>
+          <a:fillRef idx="2">
+            <a:schemeClr val="accent4"/>
+          </a:fillRef>
+          <a:effectRef idx="1">
+            <a:schemeClr val="accent4"/>
+          </a:effectRef>
+          <a:fontRef idx="minor">
+            <a:schemeClr val="dk1"/>
+          </a:fontRef>
+        </p:style>
+        <p:txBody>
+          <a:bodyPr spcFirstLastPara="0" vert="horz" wrap="square" lIns="200936" tIns="120926" rIns="200936" bIns="120926" numCol="1" spcCol="1270" anchor="ctr" anchorCtr="0">
+            <a:noAutofit/>
+          </a:bodyPr>
+          <a:lstStyle/>
+          <a:p>
+            <a:pPr lvl="0" algn="ctr" defTabSz="1866900">
+              <a:lnSpc>
+                <a:spcPct val="90000"/>
+              </a:lnSpc>
+              <a:spcBef>
+                <a:spcPct val="0"/>
+              </a:spcBef>
+              <a:spcAft>
+                <a:spcPct val="35000"/>
+              </a:spcAft>
+            </a:pPr>
+            <a:r>
+              <a:rPr lang="en-US" sz="2400" dirty="0" smtClean="0">
                 <a:ln w="12700">
                   <a:noFill/>
                 </a:ln>
-              </a:endParaRPr>
-            </a:p>
-          </p:txBody>
-        </p:sp>
-        <p:sp>
-          <p:nvSpPr>
-            <p:cNvPr id="21" name="Freeform 20"/>
-            <p:cNvSpPr/>
-            <p:nvPr/>
-          </p:nvSpPr>
-          <p:spPr>
-            <a:xfrm>
-              <a:off x="2032000" y="4557377"/>
-              <a:ext cx="1869440" cy="838160"/>
-            </a:xfrm>
-            <a:custGeom>
-              <a:avLst/>
-              <a:gdLst>
-                <a:gd name="connsiteX0" fmla="*/ 0 w 1869440"/>
-                <a:gd name="connsiteY0" fmla="*/ 139696 h 838160"/>
-                <a:gd name="connsiteX1" fmla="*/ 139696 w 1869440"/>
-                <a:gd name="connsiteY1" fmla="*/ 0 h 838160"/>
-                <a:gd name="connsiteX2" fmla="*/ 1729744 w 1869440"/>
-                <a:gd name="connsiteY2" fmla="*/ 0 h 838160"/>
-                <a:gd name="connsiteX3" fmla="*/ 1869440 w 1869440"/>
-                <a:gd name="connsiteY3" fmla="*/ 139696 h 838160"/>
-                <a:gd name="connsiteX4" fmla="*/ 1869440 w 1869440"/>
-                <a:gd name="connsiteY4" fmla="*/ 698464 h 838160"/>
-                <a:gd name="connsiteX5" fmla="*/ 1729744 w 1869440"/>
-                <a:gd name="connsiteY5" fmla="*/ 838160 h 838160"/>
-                <a:gd name="connsiteX6" fmla="*/ 139696 w 1869440"/>
-                <a:gd name="connsiteY6" fmla="*/ 838160 h 838160"/>
-                <a:gd name="connsiteX7" fmla="*/ 0 w 1869440"/>
-                <a:gd name="connsiteY7" fmla="*/ 698464 h 838160"/>
-                <a:gd name="connsiteX8" fmla="*/ 0 w 1869440"/>
-                <a:gd name="connsiteY8" fmla="*/ 139696 h 838160"/>
-              </a:gdLst>
-              <a:ahLst/>
-              <a:cxnLst>
-                <a:cxn ang="0">
-                  <a:pos x="connsiteX0" y="connsiteY0"/>
-                </a:cxn>
-                <a:cxn ang="0">
-                  <a:pos x="connsiteX1" y="connsiteY1"/>
-                </a:cxn>
-                <a:cxn ang="0">
-                  <a:pos x="connsiteX2" y="connsiteY2"/>
-                </a:cxn>
-                <a:cxn ang="0">
-                  <a:pos x="connsiteX3" y="connsiteY3"/>
-                </a:cxn>
-                <a:cxn ang="0">
-                  <a:pos x="connsiteX4" y="connsiteY4"/>
-                </a:cxn>
-                <a:cxn ang="0">
-                  <a:pos x="connsiteX5" y="connsiteY5"/>
-                </a:cxn>
-                <a:cxn ang="0">
-                  <a:pos x="connsiteX6" y="connsiteY6"/>
-                </a:cxn>
-                <a:cxn ang="0">
-                  <a:pos x="connsiteX7" y="connsiteY7"/>
-                </a:cxn>
-                <a:cxn ang="0">
-                  <a:pos x="connsiteX8" y="connsiteY8"/>
-                </a:cxn>
-              </a:cxnLst>
-              <a:rect l="l" t="t" r="r" b="b"/>
-              <a:pathLst>
-                <a:path w="1869440" h="838160">
-                  <a:moveTo>
-                    <a:pt x="0" y="139696"/>
-                  </a:moveTo>
-                  <a:cubicBezTo>
-                    <a:pt x="0" y="62544"/>
-                    <a:pt x="62544" y="0"/>
-                    <a:pt x="139696" y="0"/>
-                  </a:cubicBezTo>
-                  <a:lnTo>
-                    <a:pt x="1729744" y="0"/>
-                  </a:lnTo>
-                  <a:cubicBezTo>
-                    <a:pt x="1806896" y="0"/>
-                    <a:pt x="1869440" y="62544"/>
-                    <a:pt x="1869440" y="139696"/>
-                  </a:cubicBezTo>
-                  <a:lnTo>
-                    <a:pt x="1869440" y="698464"/>
-                  </a:lnTo>
-                  <a:cubicBezTo>
-                    <a:pt x="1869440" y="775616"/>
-                    <a:pt x="1806896" y="838160"/>
-                    <a:pt x="1729744" y="838160"/>
-                  </a:cubicBezTo>
-                  <a:lnTo>
-                    <a:pt x="139696" y="838160"/>
-                  </a:lnTo>
-                  <a:cubicBezTo>
-                    <a:pt x="62544" y="838160"/>
-                    <a:pt x="0" y="775616"/>
-                    <a:pt x="0" y="698464"/>
-                  </a:cubicBezTo>
-                  <a:lnTo>
-                    <a:pt x="0" y="139696"/>
-                  </a:lnTo>
-                  <a:close/>
-                </a:path>
-              </a:pathLst>
-            </a:custGeom>
-            <a:ln w="12700">
-              <a:solidFill>
-                <a:schemeClr val="tx1"/>
-              </a:solidFill>
-            </a:ln>
-          </p:spPr>
-          <p:style>
-            <a:lnRef idx="1">
-              <a:schemeClr val="accent4"/>
-            </a:lnRef>
-            <a:fillRef idx="2">
-              <a:schemeClr val="accent4"/>
-            </a:fillRef>
-            <a:effectRef idx="1">
-              <a:schemeClr val="accent4"/>
-            </a:effectRef>
-            <a:fontRef idx="minor">
-              <a:schemeClr val="dk1"/>
-            </a:fontRef>
-          </p:style>
-          <p:txBody>
-            <a:bodyPr spcFirstLastPara="0" vert="horz" wrap="square" lIns="200936" tIns="120926" rIns="200936" bIns="120926" numCol="1" spcCol="1270" anchor="ctr" anchorCtr="0">
-              <a:noAutofit/>
-            </a:bodyPr>
-            <a:lstStyle/>
-            <a:p>
-              <a:pPr lvl="0" algn="ctr" defTabSz="1866900">
-                <a:lnSpc>
-                  <a:spcPct val="90000"/>
-                </a:lnSpc>
-                <a:spcBef>
-                  <a:spcPct val="0"/>
-                </a:spcBef>
-                <a:spcAft>
-                  <a:spcPct val="35000"/>
-                </a:spcAft>
-              </a:pPr>
-              <a:r>
-                <a:rPr lang="en-US" sz="2400" kern="1200" dirty="0" err="1" smtClean="0">
-                  <a:ln w="12700">
-                    <a:noFill/>
-                  </a:ln>
-                </a:rPr>
-                <a:t>FSArray</a:t>
-              </a:r>
-              <a:endParaRPr lang="en-US" sz="2400" kern="1200" dirty="0">
+              </a:rPr>
+              <a:t>CAS</a:t>
+            </a:r>
+            <a:endParaRPr lang="en-US" sz="2400" kern="1200" dirty="0">
+              <a:ln w="12700">
+                <a:noFill/>
+              </a:ln>
+            </a:endParaRPr>
+          </a:p>
+        </p:txBody>
+      </p:sp>
+      <p:sp>
+        <p:nvSpPr>
+          <p:cNvPr id="19" name="Freeform 18"/>
+          <p:cNvSpPr/>
+          <p:nvPr/>
+        </p:nvSpPr>
+        <p:spPr>
+          <a:xfrm>
+            <a:off x="4166756" y="2709599"/>
+            <a:ext cx="1437190" cy="644362"/>
+          </a:xfrm>
+          <a:custGeom>
+            <a:avLst/>
+            <a:gdLst>
+              <a:gd name="connsiteX0" fmla="*/ 0 w 1869440"/>
+              <a:gd name="connsiteY0" fmla="*/ 139696 h 838160"/>
+              <a:gd name="connsiteX1" fmla="*/ 139696 w 1869440"/>
+              <a:gd name="connsiteY1" fmla="*/ 0 h 838160"/>
+              <a:gd name="connsiteX2" fmla="*/ 1729744 w 1869440"/>
+              <a:gd name="connsiteY2" fmla="*/ 0 h 838160"/>
+              <a:gd name="connsiteX3" fmla="*/ 1869440 w 1869440"/>
+              <a:gd name="connsiteY3" fmla="*/ 139696 h 838160"/>
+              <a:gd name="connsiteX4" fmla="*/ 1869440 w 1869440"/>
+              <a:gd name="connsiteY4" fmla="*/ 698464 h 838160"/>
+              <a:gd name="connsiteX5" fmla="*/ 1729744 w 1869440"/>
+              <a:gd name="connsiteY5" fmla="*/ 838160 h 838160"/>
+              <a:gd name="connsiteX6" fmla="*/ 139696 w 1869440"/>
+              <a:gd name="connsiteY6" fmla="*/ 838160 h 838160"/>
+              <a:gd name="connsiteX7" fmla="*/ 0 w 1869440"/>
+              <a:gd name="connsiteY7" fmla="*/ 698464 h 838160"/>
+              <a:gd name="connsiteX8" fmla="*/ 0 w 1869440"/>
+              <a:gd name="connsiteY8" fmla="*/ 139696 h 838160"/>
+            </a:gdLst>
+            <a:ahLst/>
+            <a:cxnLst>
+              <a:cxn ang="0">
+                <a:pos x="connsiteX0" y="connsiteY0"/>
+              </a:cxn>
+              <a:cxn ang="0">
+                <a:pos x="connsiteX1" y="connsiteY1"/>
+              </a:cxn>
+              <a:cxn ang="0">
+                <a:pos x="connsiteX2" y="connsiteY2"/>
+              </a:cxn>
+              <a:cxn ang="0">
+                <a:pos x="connsiteX3" y="connsiteY3"/>
+              </a:cxn>
+              <a:cxn ang="0">
+                <a:pos x="connsiteX4" y="connsiteY4"/>
+              </a:cxn>
+              <a:cxn ang="0">
+                <a:pos x="connsiteX5" y="connsiteY5"/>
+              </a:cxn>
+              <a:cxn ang="0">
+                <a:pos x="connsiteX6" y="connsiteY6"/>
+              </a:cxn>
+              <a:cxn ang="0">
+                <a:pos x="connsiteX7" y="connsiteY7"/>
+              </a:cxn>
+              <a:cxn ang="0">
+                <a:pos x="connsiteX8" y="connsiteY8"/>
+              </a:cxn>
+            </a:cxnLst>
+            <a:rect l="l" t="t" r="r" b="b"/>
+            <a:pathLst>
+              <a:path w="1869440" h="838160">
+                <a:moveTo>
+                  <a:pt x="0" y="139696"/>
+                </a:moveTo>
+                <a:cubicBezTo>
+                  <a:pt x="0" y="62544"/>
+                  <a:pt x="62544" y="0"/>
+                  <a:pt x="139696" y="0"/>
+                </a:cubicBezTo>
+                <a:lnTo>
+                  <a:pt x="1729744" y="0"/>
+                </a:lnTo>
+                <a:cubicBezTo>
+                  <a:pt x="1806896" y="0"/>
+                  <a:pt x="1869440" y="62544"/>
+                  <a:pt x="1869440" y="139696"/>
+                </a:cubicBezTo>
+                <a:lnTo>
+                  <a:pt x="1869440" y="698464"/>
+                </a:lnTo>
+                <a:cubicBezTo>
+                  <a:pt x="1869440" y="775616"/>
+                  <a:pt x="1806896" y="838160"/>
+                  <a:pt x="1729744" y="838160"/>
+                </a:cubicBezTo>
+                <a:lnTo>
+                  <a:pt x="139696" y="838160"/>
+                </a:lnTo>
+                <a:cubicBezTo>
+                  <a:pt x="62544" y="838160"/>
+                  <a:pt x="0" y="775616"/>
+                  <a:pt x="0" y="698464"/>
+                </a:cubicBezTo>
+                <a:lnTo>
+                  <a:pt x="0" y="139696"/>
+                </a:lnTo>
+                <a:close/>
+              </a:path>
+            </a:pathLst>
+          </a:custGeom>
+          <a:gradFill flip="none" rotWithShape="1">
+            <a:gsLst>
+              <a:gs pos="0">
+                <a:srgbClr val="FFFF00">
+                  <a:lumMod val="48000"/>
+                  <a:lumOff val="52000"/>
+                  <a:alpha val="52000"/>
+                </a:srgbClr>
+              </a:gs>
+              <a:gs pos="100000">
+                <a:srgbClr val="FFFF00"/>
+              </a:gs>
+            </a:gsLst>
+            <a:lin ang="2700000" scaled="1"/>
+            <a:tileRect/>
+          </a:gradFill>
+          <a:ln w="12700">
+            <a:solidFill>
+              <a:schemeClr val="tx1"/>
+            </a:solidFill>
+          </a:ln>
+        </p:spPr>
+        <p:style>
+          <a:lnRef idx="1">
+            <a:schemeClr val="accent4"/>
+          </a:lnRef>
+          <a:fillRef idx="2">
+            <a:schemeClr val="accent4"/>
+          </a:fillRef>
+          <a:effectRef idx="1">
+            <a:schemeClr val="accent4"/>
+          </a:effectRef>
+          <a:fontRef idx="minor">
+            <a:schemeClr val="dk1"/>
+          </a:fontRef>
+        </p:style>
+        <p:txBody>
+          <a:bodyPr spcFirstLastPara="0" vert="horz" wrap="square" lIns="200936" tIns="120926" rIns="200936" bIns="120926" numCol="1" spcCol="1270" anchor="ctr" anchorCtr="0">
+            <a:noAutofit/>
+          </a:bodyPr>
+          <a:lstStyle/>
+          <a:p>
+            <a:pPr lvl="0" algn="ctr" defTabSz="1866900">
+              <a:lnSpc>
+                <a:spcPct val="90000"/>
+              </a:lnSpc>
+              <a:spcBef>
+                <a:spcPct val="0"/>
+              </a:spcBef>
+              <a:spcAft>
+                <a:spcPct val="35000"/>
+              </a:spcAft>
+            </a:pPr>
+            <a:r>
+              <a:rPr lang="en-US" sz="2400" kern="1200" dirty="0" smtClean="0">
                 <a:ln w="12700">
                   <a:noFill/>
                 </a:ln>
-              </a:endParaRPr>
-            </a:p>
-          </p:txBody>
-        </p:sp>
-        <p:sp>
-          <p:nvSpPr>
-            <p:cNvPr id="22" name="Freeform 21"/>
-            <p:cNvSpPr/>
-            <p:nvPr/>
-          </p:nvSpPr>
-          <p:spPr>
-            <a:xfrm>
-              <a:off x="5099164" y="3219243"/>
-              <a:ext cx="4806836" cy="2176294"/>
-            </a:xfrm>
-            <a:custGeom>
-              <a:avLst/>
-              <a:gdLst>
-                <a:gd name="connsiteX0" fmla="*/ 0 w 1869440"/>
-                <a:gd name="connsiteY0" fmla="*/ 139696 h 838160"/>
-                <a:gd name="connsiteX1" fmla="*/ 139696 w 1869440"/>
-                <a:gd name="connsiteY1" fmla="*/ 0 h 838160"/>
-                <a:gd name="connsiteX2" fmla="*/ 1729744 w 1869440"/>
-                <a:gd name="connsiteY2" fmla="*/ 0 h 838160"/>
-                <a:gd name="connsiteX3" fmla="*/ 1869440 w 1869440"/>
-                <a:gd name="connsiteY3" fmla="*/ 139696 h 838160"/>
-                <a:gd name="connsiteX4" fmla="*/ 1869440 w 1869440"/>
-                <a:gd name="connsiteY4" fmla="*/ 698464 h 838160"/>
-                <a:gd name="connsiteX5" fmla="*/ 1729744 w 1869440"/>
-                <a:gd name="connsiteY5" fmla="*/ 838160 h 838160"/>
-                <a:gd name="connsiteX6" fmla="*/ 139696 w 1869440"/>
-                <a:gd name="connsiteY6" fmla="*/ 838160 h 838160"/>
-                <a:gd name="connsiteX7" fmla="*/ 0 w 1869440"/>
-                <a:gd name="connsiteY7" fmla="*/ 698464 h 838160"/>
-                <a:gd name="connsiteX8" fmla="*/ 0 w 1869440"/>
-                <a:gd name="connsiteY8" fmla="*/ 139696 h 838160"/>
-              </a:gdLst>
-              <a:ahLst/>
-              <a:cxnLst>
-                <a:cxn ang="0">
-                  <a:pos x="connsiteX0" y="connsiteY0"/>
-                </a:cxn>
-                <a:cxn ang="0">
-                  <a:pos x="connsiteX1" y="connsiteY1"/>
-                </a:cxn>
-                <a:cxn ang="0">
-                  <a:pos x="connsiteX2" y="connsiteY2"/>
-                </a:cxn>
-                <a:cxn ang="0">
-                  <a:pos x="connsiteX3" y="connsiteY3"/>
-                </a:cxn>
-                <a:cxn ang="0">
-                  <a:pos x="connsiteX4" y="connsiteY4"/>
-                </a:cxn>
-                <a:cxn ang="0">
-                  <a:pos x="connsiteX5" y="connsiteY5"/>
-                </a:cxn>
-                <a:cxn ang="0">
-                  <a:pos x="connsiteX6" y="connsiteY6"/>
-                </a:cxn>
-                <a:cxn ang="0">
-                  <a:pos x="connsiteX7" y="connsiteY7"/>
-                </a:cxn>
-                <a:cxn ang="0">
-                  <a:pos x="connsiteX8" y="connsiteY8"/>
-                </a:cxn>
-              </a:cxnLst>
-              <a:rect l="l" t="t" r="r" b="b"/>
-              <a:pathLst>
-                <a:path w="1869440" h="838160">
-                  <a:moveTo>
-                    <a:pt x="0" y="139696"/>
-                  </a:moveTo>
-                  <a:cubicBezTo>
-                    <a:pt x="0" y="62544"/>
-                    <a:pt x="62544" y="0"/>
-                    <a:pt x="139696" y="0"/>
-                  </a:cubicBezTo>
-                  <a:lnTo>
-                    <a:pt x="1729744" y="0"/>
-                  </a:lnTo>
-                  <a:cubicBezTo>
-                    <a:pt x="1806896" y="0"/>
-                    <a:pt x="1869440" y="62544"/>
-                    <a:pt x="1869440" y="139696"/>
-                  </a:cubicBezTo>
-                  <a:lnTo>
-                    <a:pt x="1869440" y="698464"/>
-                  </a:lnTo>
-                  <a:cubicBezTo>
-                    <a:pt x="1869440" y="775616"/>
-                    <a:pt x="1806896" y="838160"/>
-                    <a:pt x="1729744" y="838160"/>
-                  </a:cubicBezTo>
-                  <a:lnTo>
-                    <a:pt x="139696" y="838160"/>
-                  </a:lnTo>
-                  <a:cubicBezTo>
-                    <a:pt x="62544" y="838160"/>
-                    <a:pt x="0" y="775616"/>
-                    <a:pt x="0" y="698464"/>
-                  </a:cubicBezTo>
-                  <a:lnTo>
-                    <a:pt x="0" y="139696"/>
-                  </a:lnTo>
-                  <a:close/>
-                </a:path>
-              </a:pathLst>
-            </a:custGeom>
-            <a:gradFill>
-              <a:gsLst>
-                <a:gs pos="0">
-                  <a:schemeClr val="accent2">
-                    <a:satMod val="105000"/>
-                    <a:tint val="67000"/>
-                    <a:alpha val="56000"/>
-                    <a:lumMod val="81000"/>
-                    <a:lumOff val="19000"/>
-                  </a:schemeClr>
-                </a:gs>
-                <a:gs pos="45000">
-                  <a:schemeClr val="accent2">
-                    <a:satMod val="103000"/>
-                    <a:tint val="73000"/>
-                    <a:lumMod val="90000"/>
-                    <a:lumOff val="10000"/>
-                    <a:alpha val="60000"/>
-                  </a:schemeClr>
-                </a:gs>
-                <a:gs pos="100000">
-                  <a:schemeClr val="accent2">
-                    <a:satMod val="109000"/>
-                    <a:tint val="81000"/>
-                    <a:alpha val="54000"/>
-                    <a:lumMod val="100000"/>
-                  </a:schemeClr>
-                </a:gs>
-              </a:gsLst>
-            </a:gradFill>
-            <a:ln>
-              <a:solidFill>
-                <a:schemeClr val="tx1"/>
-              </a:solidFill>
-            </a:ln>
-          </p:spPr>
-          <p:style>
-            <a:lnRef idx="1">
-              <a:schemeClr val="accent2"/>
-            </a:lnRef>
-            <a:fillRef idx="2">
-              <a:schemeClr val="accent2"/>
-            </a:fillRef>
-            <a:effectRef idx="1">
-              <a:schemeClr val="accent2"/>
-            </a:effectRef>
-            <a:fontRef idx="minor">
-              <a:schemeClr val="dk1"/>
-            </a:fontRef>
-          </p:style>
-          <p:txBody>
-            <a:bodyPr spcFirstLastPara="0" vert="horz" wrap="square" lIns="200936" tIns="120926" rIns="200936" bIns="120926" numCol="1" spcCol="1270" anchor="ctr" anchorCtr="0">
-              <a:noAutofit/>
-            </a:bodyPr>
-            <a:lstStyle/>
-            <a:p>
-              <a:pPr lvl="0" defTabSz="1866900">
-                <a:lnSpc>
-                  <a:spcPct val="90000"/>
-                </a:lnSpc>
-                <a:spcBef>
-                  <a:spcPct val="0"/>
-                </a:spcBef>
-                <a:spcAft>
-                  <a:spcPct val="35000"/>
-                </a:spcAft>
-              </a:pPr>
-              <a:r>
-                <a:rPr lang="en-US" sz="1600" dirty="0" smtClean="0">
-                  <a:ln w="12700">
-                    <a:noFill/>
-                  </a:ln>
-                </a:rPr>
-                <a:t>Type:</a:t>
-              </a:r>
-            </a:p>
-            <a:p>
-              <a:pPr defTabSz="1866900">
-                <a:lnSpc>
-                  <a:spcPct val="90000"/>
-                </a:lnSpc>
-                <a:spcBef>
-                  <a:spcPct val="0"/>
-                </a:spcBef>
-                <a:spcAft>
-                  <a:spcPct val="35000"/>
-                </a:spcAft>
-              </a:pPr>
-              <a:r>
-                <a:rPr lang="en-US" sz="1600" dirty="0" smtClean="0">
-                  <a:ln w="12700">
-                    <a:noFill/>
-                  </a:ln>
-                </a:rPr>
-                <a:t>- (omitted)   </a:t>
-              </a:r>
-              <a:r>
-                <a:rPr lang="en-US" sz="1600" dirty="0">
-                  <a:ln w="12700">
-                    <a:noFill/>
-                  </a:ln>
-                </a:rPr>
-                <a:t> </a:t>
-              </a:r>
-              <a:r>
-                <a:rPr lang="en-US" sz="1600" dirty="0" smtClean="0">
-                  <a:ln w="12700">
-                    <a:noFill/>
-                  </a:ln>
-                </a:rPr>
-                <a:t> </a:t>
-              </a:r>
-              <a:r>
-                <a:rPr lang="en-US" sz="1600" dirty="0" err="1" smtClean="0">
-                  <a:ln w="12700">
-                    <a:noFill/>
-                  </a:ln>
-                </a:rPr>
-                <a:t>xx.select</a:t>
-              </a:r>
-              <a:r>
-                <a:rPr lang="en-US" sz="1600" dirty="0" smtClean="0">
-                  <a:ln w="12700">
-                    <a:noFill/>
-                  </a:ln>
-                </a:rPr>
-                <a:t>()</a:t>
-              </a:r>
-              <a:br>
-                <a:rPr lang="en-US" sz="1600" dirty="0" smtClean="0">
-                  <a:ln w="12700">
-                    <a:noFill/>
-                  </a:ln>
-                </a:rPr>
-              </a:br>
-              <a:r>
-                <a:rPr lang="en-US" sz="1600" dirty="0" smtClean="0">
-                  <a:ln w="12700">
-                    <a:noFill/>
-                  </a:ln>
-                </a:rPr>
-                <a:t>-</a:t>
-              </a:r>
-              <a:r>
-                <a:rPr lang="en-US" sz="1600" kern="1200" dirty="0" smtClean="0">
-                  <a:ln w="12700">
-                    <a:noFill/>
-                  </a:ln>
-                </a:rPr>
-                <a:t> Class           </a:t>
-              </a:r>
-              <a:r>
-                <a:rPr lang="en-US" sz="1600" dirty="0">
-                  <a:ln w="12700">
-                    <a:noFill/>
-                  </a:ln>
-                </a:rPr>
-                <a:t> </a:t>
-              </a:r>
-              <a:r>
-                <a:rPr lang="en-US" sz="1600" dirty="0" smtClean="0">
-                  <a:ln w="12700">
-                    <a:noFill/>
-                  </a:ln>
-                </a:rPr>
-                <a:t> </a:t>
-              </a:r>
-              <a:r>
-                <a:rPr lang="en-US" sz="1600" kern="1200" dirty="0" err="1" smtClean="0">
-                  <a:ln w="12700">
-                    <a:noFill/>
-                  </a:ln>
-                </a:rPr>
-                <a:t>xx.select</a:t>
-              </a:r>
-              <a:r>
-                <a:rPr lang="en-US" sz="1600" kern="1200" dirty="0" smtClean="0">
-                  <a:ln w="12700">
-                    <a:noFill/>
-                  </a:ln>
-                </a:rPr>
-                <a:t>(</a:t>
-              </a:r>
-              <a:r>
-                <a:rPr lang="en-US" sz="1600" kern="1200" dirty="0" err="1" smtClean="0">
-                  <a:ln w="12700">
-                    <a:noFill/>
-                  </a:ln>
-                </a:rPr>
-                <a:t>Token.class</a:t>
-              </a:r>
-              <a:r>
-                <a:rPr lang="en-US" sz="1600" kern="1200" dirty="0" smtClean="0">
-                  <a:ln w="12700">
-                    <a:noFill/>
-                  </a:ln>
-                </a:rPr>
-                <a:t>)</a:t>
-              </a:r>
-              <a:br>
-                <a:rPr lang="en-US" sz="1600" kern="1200" dirty="0" smtClean="0">
-                  <a:ln w="12700">
-                    <a:noFill/>
-                  </a:ln>
-                </a:rPr>
-              </a:br>
-              <a:r>
-                <a:rPr lang="en-US" sz="1600" kern="1200" dirty="0" smtClean="0">
-                  <a:ln w="12700">
-                    <a:noFill/>
-                  </a:ln>
-                </a:rPr>
-                <a:t>- </a:t>
-              </a:r>
-              <a:r>
-                <a:rPr lang="en-US" sz="1600" dirty="0" err="1" smtClean="0">
-                  <a:ln w="12700">
-                    <a:noFill/>
-                  </a:ln>
-                </a:rPr>
-                <a:t>uima_Type</a:t>
-              </a:r>
-              <a:r>
-                <a:rPr lang="en-US" sz="1600" dirty="0" smtClean="0">
-                  <a:ln w="12700">
-                    <a:noFill/>
-                  </a:ln>
-                </a:rPr>
-                <a:t>  </a:t>
-              </a:r>
-              <a:r>
-                <a:rPr lang="en-US" sz="1600" dirty="0" err="1" smtClean="0">
-                  <a:ln w="12700">
-                    <a:noFill/>
-                  </a:ln>
-                </a:rPr>
-                <a:t>xx.select</a:t>
-              </a:r>
-              <a:r>
-                <a:rPr lang="en-US" sz="1600" dirty="0" smtClean="0">
-                  <a:ln w="12700">
-                    <a:noFill/>
-                  </a:ln>
-                </a:rPr>
-                <a:t>(token)</a:t>
-              </a:r>
-              <a:br>
-                <a:rPr lang="en-US" sz="1600" dirty="0" smtClean="0">
-                  <a:ln w="12700">
-                    <a:noFill/>
-                  </a:ln>
-                </a:rPr>
-              </a:br>
-              <a:r>
-                <a:rPr lang="en-US" sz="1600" dirty="0" smtClean="0">
-                  <a:ln w="12700">
-                    <a:noFill/>
-                  </a:ln>
-                </a:rPr>
-                <a:t>- </a:t>
-              </a:r>
-              <a:r>
-                <a:rPr lang="en-US" sz="1600" dirty="0" err="1" smtClean="0">
-                  <a:ln w="12700">
-                    <a:noFill/>
-                  </a:ln>
-                </a:rPr>
-                <a:t>JCas.type</a:t>
-              </a:r>
-              <a:r>
-                <a:rPr lang="en-US" sz="1600" dirty="0" smtClean="0">
-                  <a:ln w="12700">
-                    <a:noFill/>
-                  </a:ln>
-                </a:rPr>
-                <a:t>     </a:t>
-              </a:r>
-              <a:r>
-                <a:rPr lang="en-US" sz="1600" dirty="0" err="1" smtClean="0">
-                  <a:ln w="12700">
-                    <a:noFill/>
-                  </a:ln>
-                </a:rPr>
-                <a:t>xx.select</a:t>
-              </a:r>
-              <a:r>
-                <a:rPr lang="en-US" sz="1600" dirty="0" smtClean="0">
-                  <a:ln w="12700">
-                    <a:noFill/>
-                  </a:ln>
-                </a:rPr>
-                <a:t>(</a:t>
-              </a:r>
-              <a:r>
-                <a:rPr lang="en-US" sz="1600" dirty="0" err="1" smtClean="0">
-                  <a:ln w="12700">
-                    <a:noFill/>
-                  </a:ln>
-                </a:rPr>
-                <a:t>Token.type</a:t>
-              </a:r>
-              <a:r>
-                <a:rPr lang="en-US" sz="1600" dirty="0" smtClean="0">
-                  <a:ln w="12700">
-                    <a:noFill/>
-                  </a:ln>
-                </a:rPr>
-                <a:t>)</a:t>
-              </a:r>
-              <a:r>
-                <a:rPr lang="en-US" sz="1600" kern="1200" dirty="0" smtClean="0">
-                  <a:ln w="12700">
-                    <a:noFill/>
-                  </a:ln>
-                </a:rPr>
-                <a:t/>
-              </a:r>
-              <a:br>
-                <a:rPr lang="en-US" sz="1600" kern="1200" dirty="0" smtClean="0">
-                  <a:ln w="12700">
-                    <a:noFill/>
-                  </a:ln>
-                </a:rPr>
-              </a:br>
-              <a:r>
-                <a:rPr lang="en-US" sz="1600" kern="1200" dirty="0" smtClean="0">
-                  <a:ln w="12700">
-                    <a:noFill/>
-                  </a:ln>
-                </a:rPr>
-                <a:t>- </a:t>
-              </a:r>
-              <a:r>
-                <a:rPr lang="en-US" sz="1600" dirty="0" smtClean="0">
-                  <a:ln w="12700">
-                    <a:noFill/>
-                  </a:ln>
-                </a:rPr>
-                <a:t>“name”        </a:t>
-              </a:r>
-              <a:r>
-                <a:rPr lang="en-US" sz="1600" dirty="0" err="1" smtClean="0">
-                  <a:ln w="12700">
-                    <a:noFill/>
-                  </a:ln>
-                </a:rPr>
-                <a:t>xx.select</a:t>
-              </a:r>
-              <a:r>
-                <a:rPr lang="en-US" sz="1600" dirty="0" smtClean="0">
-                  <a:ln w="12700">
-                    <a:noFill/>
-                  </a:ln>
-                </a:rPr>
-                <a:t>(“</a:t>
-              </a:r>
-              <a:r>
-                <a:rPr lang="en-US" sz="1600" dirty="0" err="1" smtClean="0">
-                  <a:ln w="12700">
-                    <a:noFill/>
-                  </a:ln>
-                </a:rPr>
-                <a:t>pkg.Token</a:t>
-              </a:r>
-              <a:r>
-                <a:rPr lang="en-US" sz="1600" dirty="0" smtClean="0">
-                  <a:ln w="12700">
-                    <a:noFill/>
-                  </a:ln>
-                </a:rPr>
-                <a:t>”)</a:t>
-              </a:r>
-              <a:endParaRPr lang="en-US" sz="1600" kern="1200" dirty="0">
+              </a:rPr>
+              <a:t>Index</a:t>
+            </a:r>
+            <a:endParaRPr lang="en-US" sz="2400" kern="1200" dirty="0">
+              <a:ln w="12700">
+                <a:noFill/>
+              </a:ln>
+            </a:endParaRPr>
+          </a:p>
+        </p:txBody>
+      </p:sp>
+      <p:sp>
+        <p:nvSpPr>
+          <p:cNvPr id="21" name="Freeform 20"/>
+          <p:cNvSpPr/>
+          <p:nvPr/>
+        </p:nvSpPr>
+        <p:spPr>
+          <a:xfrm>
+            <a:off x="5974957" y="3244109"/>
+            <a:ext cx="1437190" cy="1038301"/>
+          </a:xfrm>
+          <a:custGeom>
+            <a:avLst/>
+            <a:gdLst>
+              <a:gd name="connsiteX0" fmla="*/ 0 w 1869440"/>
+              <a:gd name="connsiteY0" fmla="*/ 139696 h 838160"/>
+              <a:gd name="connsiteX1" fmla="*/ 139696 w 1869440"/>
+              <a:gd name="connsiteY1" fmla="*/ 0 h 838160"/>
+              <a:gd name="connsiteX2" fmla="*/ 1729744 w 1869440"/>
+              <a:gd name="connsiteY2" fmla="*/ 0 h 838160"/>
+              <a:gd name="connsiteX3" fmla="*/ 1869440 w 1869440"/>
+              <a:gd name="connsiteY3" fmla="*/ 139696 h 838160"/>
+              <a:gd name="connsiteX4" fmla="*/ 1869440 w 1869440"/>
+              <a:gd name="connsiteY4" fmla="*/ 698464 h 838160"/>
+              <a:gd name="connsiteX5" fmla="*/ 1729744 w 1869440"/>
+              <a:gd name="connsiteY5" fmla="*/ 838160 h 838160"/>
+              <a:gd name="connsiteX6" fmla="*/ 139696 w 1869440"/>
+              <a:gd name="connsiteY6" fmla="*/ 838160 h 838160"/>
+              <a:gd name="connsiteX7" fmla="*/ 0 w 1869440"/>
+              <a:gd name="connsiteY7" fmla="*/ 698464 h 838160"/>
+              <a:gd name="connsiteX8" fmla="*/ 0 w 1869440"/>
+              <a:gd name="connsiteY8" fmla="*/ 139696 h 838160"/>
+            </a:gdLst>
+            <a:ahLst/>
+            <a:cxnLst>
+              <a:cxn ang="0">
+                <a:pos x="connsiteX0" y="connsiteY0"/>
+              </a:cxn>
+              <a:cxn ang="0">
+                <a:pos x="connsiteX1" y="connsiteY1"/>
+              </a:cxn>
+              <a:cxn ang="0">
+                <a:pos x="connsiteX2" y="connsiteY2"/>
+              </a:cxn>
+              <a:cxn ang="0">
+                <a:pos x="connsiteX3" y="connsiteY3"/>
+              </a:cxn>
+              <a:cxn ang="0">
+                <a:pos x="connsiteX4" y="connsiteY4"/>
+              </a:cxn>
+              <a:cxn ang="0">
+                <a:pos x="connsiteX5" y="connsiteY5"/>
+              </a:cxn>
+              <a:cxn ang="0">
+                <a:pos x="connsiteX6" y="connsiteY6"/>
+              </a:cxn>
+              <a:cxn ang="0">
+                <a:pos x="connsiteX7" y="connsiteY7"/>
+              </a:cxn>
+              <a:cxn ang="0">
+                <a:pos x="connsiteX8" y="connsiteY8"/>
+              </a:cxn>
+            </a:cxnLst>
+            <a:rect l="l" t="t" r="r" b="b"/>
+            <a:pathLst>
+              <a:path w="1869440" h="838160">
+                <a:moveTo>
+                  <a:pt x="0" y="139696"/>
+                </a:moveTo>
+                <a:cubicBezTo>
+                  <a:pt x="0" y="62544"/>
+                  <a:pt x="62544" y="0"/>
+                  <a:pt x="139696" y="0"/>
+                </a:cubicBezTo>
+                <a:lnTo>
+                  <a:pt x="1729744" y="0"/>
+                </a:lnTo>
+                <a:cubicBezTo>
+                  <a:pt x="1806896" y="0"/>
+                  <a:pt x="1869440" y="62544"/>
+                  <a:pt x="1869440" y="139696"/>
+                </a:cubicBezTo>
+                <a:lnTo>
+                  <a:pt x="1869440" y="698464"/>
+                </a:lnTo>
+                <a:cubicBezTo>
+                  <a:pt x="1869440" y="775616"/>
+                  <a:pt x="1806896" y="838160"/>
+                  <a:pt x="1729744" y="838160"/>
+                </a:cubicBezTo>
+                <a:lnTo>
+                  <a:pt x="139696" y="838160"/>
+                </a:lnTo>
+                <a:cubicBezTo>
+                  <a:pt x="62544" y="838160"/>
+                  <a:pt x="0" y="775616"/>
+                  <a:pt x="0" y="698464"/>
+                </a:cubicBezTo>
+                <a:lnTo>
+                  <a:pt x="0" y="139696"/>
+                </a:lnTo>
+                <a:close/>
+              </a:path>
+            </a:pathLst>
+          </a:custGeom>
+          <a:gradFill flip="none" rotWithShape="1">
+            <a:gsLst>
+              <a:gs pos="0">
+                <a:srgbClr val="00B050">
+                  <a:lumMod val="53000"/>
+                  <a:lumOff val="47000"/>
+                  <a:alpha val="52000"/>
+                </a:srgbClr>
+              </a:gs>
+              <a:gs pos="100000">
+                <a:srgbClr val="00B050"/>
+              </a:gs>
+            </a:gsLst>
+            <a:lin ang="2700000" scaled="1"/>
+            <a:tileRect/>
+          </a:gradFill>
+          <a:ln w="12700">
+            <a:solidFill>
+              <a:schemeClr val="tx1"/>
+            </a:solidFill>
+          </a:ln>
+        </p:spPr>
+        <p:style>
+          <a:lnRef idx="1">
+            <a:schemeClr val="accent4"/>
+          </a:lnRef>
+          <a:fillRef idx="2">
+            <a:schemeClr val="accent4"/>
+          </a:fillRef>
+          <a:effectRef idx="1">
+            <a:schemeClr val="accent4"/>
+          </a:effectRef>
+          <a:fontRef idx="minor">
+            <a:schemeClr val="dk1"/>
+          </a:fontRef>
+        </p:style>
+        <p:txBody>
+          <a:bodyPr spcFirstLastPara="0" vert="horz" wrap="square" lIns="200936" tIns="120926" rIns="200936" bIns="120926" numCol="1" spcCol="1270" anchor="ctr" anchorCtr="0">
+            <a:noAutofit/>
+          </a:bodyPr>
+          <a:lstStyle/>
+          <a:p>
+            <a:pPr lvl="0" algn="ctr" defTabSz="1866900">
+              <a:lnSpc>
+                <a:spcPct val="90000"/>
+              </a:lnSpc>
+              <a:spcBef>
+                <a:spcPct val="0"/>
+              </a:spcBef>
+              <a:spcAft>
+                <a:spcPct val="35000"/>
+              </a:spcAft>
+            </a:pPr>
+            <a:r>
+              <a:rPr lang="en-US" kern="1200" dirty="0" err="1" smtClean="0">
                 <a:ln w="12700">
                   <a:noFill/>
                 </a:ln>
-              </a:endParaRPr>
-            </a:p>
-          </p:txBody>
-        </p:sp>
-        <p:sp>
-          <p:nvSpPr>
-            <p:cNvPr id="23" name="Freeform 22"/>
-            <p:cNvSpPr/>
-            <p:nvPr/>
-          </p:nvSpPr>
-          <p:spPr>
-            <a:xfrm>
-              <a:off x="2031999" y="5467414"/>
-              <a:ext cx="1869440" cy="838160"/>
-            </a:xfrm>
-            <a:custGeom>
-              <a:avLst/>
-              <a:gdLst>
-                <a:gd name="connsiteX0" fmla="*/ 0 w 1869440"/>
-                <a:gd name="connsiteY0" fmla="*/ 139696 h 838160"/>
-                <a:gd name="connsiteX1" fmla="*/ 139696 w 1869440"/>
-                <a:gd name="connsiteY1" fmla="*/ 0 h 838160"/>
-                <a:gd name="connsiteX2" fmla="*/ 1729744 w 1869440"/>
-                <a:gd name="connsiteY2" fmla="*/ 0 h 838160"/>
-                <a:gd name="connsiteX3" fmla="*/ 1869440 w 1869440"/>
-                <a:gd name="connsiteY3" fmla="*/ 139696 h 838160"/>
-                <a:gd name="connsiteX4" fmla="*/ 1869440 w 1869440"/>
-                <a:gd name="connsiteY4" fmla="*/ 698464 h 838160"/>
-                <a:gd name="connsiteX5" fmla="*/ 1729744 w 1869440"/>
-                <a:gd name="connsiteY5" fmla="*/ 838160 h 838160"/>
-                <a:gd name="connsiteX6" fmla="*/ 139696 w 1869440"/>
-                <a:gd name="connsiteY6" fmla="*/ 838160 h 838160"/>
-                <a:gd name="connsiteX7" fmla="*/ 0 w 1869440"/>
-                <a:gd name="connsiteY7" fmla="*/ 698464 h 838160"/>
-                <a:gd name="connsiteX8" fmla="*/ 0 w 1869440"/>
-                <a:gd name="connsiteY8" fmla="*/ 139696 h 838160"/>
-              </a:gdLst>
-              <a:ahLst/>
-              <a:cxnLst>
-                <a:cxn ang="0">
-                  <a:pos x="connsiteX0" y="connsiteY0"/>
-                </a:cxn>
-                <a:cxn ang="0">
-                  <a:pos x="connsiteX1" y="connsiteY1"/>
-                </a:cxn>
-                <a:cxn ang="0">
-                  <a:pos x="connsiteX2" y="connsiteY2"/>
-                </a:cxn>
-                <a:cxn ang="0">
-                  <a:pos x="connsiteX3" y="connsiteY3"/>
-                </a:cxn>
-                <a:cxn ang="0">
-                  <a:pos x="connsiteX4" y="connsiteY4"/>
-                </a:cxn>
-                <a:cxn ang="0">
-                  <a:pos x="connsiteX5" y="connsiteY5"/>
-                </a:cxn>
-                <a:cxn ang="0">
-                  <a:pos x="connsiteX6" y="connsiteY6"/>
-                </a:cxn>
-                <a:cxn ang="0">
-                  <a:pos x="connsiteX7" y="connsiteY7"/>
-                </a:cxn>
-                <a:cxn ang="0">
-                  <a:pos x="connsiteX8" y="connsiteY8"/>
-                </a:cxn>
-              </a:cxnLst>
-              <a:rect l="l" t="t" r="r" b="b"/>
-              <a:pathLst>
-                <a:path w="1869440" h="838160">
-                  <a:moveTo>
-                    <a:pt x="0" y="139696"/>
-                  </a:moveTo>
-                  <a:cubicBezTo>
-                    <a:pt x="0" y="62544"/>
-                    <a:pt x="62544" y="0"/>
-                    <a:pt x="139696" y="0"/>
-                  </a:cubicBezTo>
-                  <a:lnTo>
-                    <a:pt x="1729744" y="0"/>
-                  </a:lnTo>
-                  <a:cubicBezTo>
-                    <a:pt x="1806896" y="0"/>
-                    <a:pt x="1869440" y="62544"/>
-                    <a:pt x="1869440" y="139696"/>
-                  </a:cubicBezTo>
-                  <a:lnTo>
-                    <a:pt x="1869440" y="698464"/>
-                  </a:lnTo>
-                  <a:cubicBezTo>
-                    <a:pt x="1869440" y="775616"/>
-                    <a:pt x="1806896" y="838160"/>
-                    <a:pt x="1729744" y="838160"/>
-                  </a:cubicBezTo>
-                  <a:lnTo>
-                    <a:pt x="139696" y="838160"/>
-                  </a:lnTo>
-                  <a:cubicBezTo>
-                    <a:pt x="62544" y="838160"/>
-                    <a:pt x="0" y="775616"/>
-                    <a:pt x="0" y="698464"/>
-                  </a:cubicBezTo>
-                  <a:lnTo>
-                    <a:pt x="0" y="139696"/>
-                  </a:lnTo>
-                  <a:close/>
-                </a:path>
-              </a:pathLst>
-            </a:custGeom>
-            <a:ln w="12700">
-              <a:solidFill>
-                <a:schemeClr val="tx1"/>
-              </a:solidFill>
-            </a:ln>
-          </p:spPr>
-          <p:style>
-            <a:lnRef idx="1">
-              <a:schemeClr val="accent4"/>
-            </a:lnRef>
-            <a:fillRef idx="2">
-              <a:schemeClr val="accent4"/>
-            </a:fillRef>
-            <a:effectRef idx="1">
-              <a:schemeClr val="accent4"/>
-            </a:effectRef>
-            <a:fontRef idx="minor">
-              <a:schemeClr val="dk1"/>
-            </a:fontRef>
-          </p:style>
-          <p:txBody>
-            <a:bodyPr spcFirstLastPara="0" vert="horz" wrap="square" lIns="200936" tIns="120926" rIns="200936" bIns="120926" numCol="1" spcCol="1270" anchor="ctr" anchorCtr="0">
-              <a:noAutofit/>
-            </a:bodyPr>
-            <a:lstStyle/>
-            <a:p>
-              <a:pPr lvl="0" algn="ctr" defTabSz="1866900">
-                <a:lnSpc>
-                  <a:spcPct val="90000"/>
-                </a:lnSpc>
-                <a:spcBef>
-                  <a:spcPct val="0"/>
-                </a:spcBef>
-                <a:spcAft>
-                  <a:spcPct val="35000"/>
-                </a:spcAft>
-              </a:pPr>
-              <a:r>
-                <a:rPr lang="en-US" sz="2400" kern="1200" dirty="0" err="1" smtClean="0">
-                  <a:ln w="12700">
-                    <a:noFill/>
-                  </a:ln>
-                </a:rPr>
-                <a:t>FSList</a:t>
-              </a:r>
-              <a:endParaRPr lang="en-US" sz="2400" kern="1200" dirty="0">
+              </a:rPr>
+              <a:t>FSArray</a:t>
+            </a:r>
+            <a:r>
+              <a:rPr lang="en-US" kern="1200" dirty="0" smtClean="0">
                 <a:ln w="12700">
                   <a:noFill/>
                 </a:ln>
-              </a:endParaRPr>
-            </a:p>
-          </p:txBody>
-        </p:sp>
-        <p:cxnSp>
-          <p:nvCxnSpPr>
-            <p:cNvPr id="26" name="Straight Arrow Connector 25"/>
-            <p:cNvCxnSpPr/>
-            <p:nvPr/>
-          </p:nvCxnSpPr>
-          <p:spPr>
-            <a:xfrm>
-              <a:off x="3901439" y="2882900"/>
-              <a:ext cx="1197725" cy="1016000"/>
-            </a:xfrm>
-            <a:prstGeom prst="straightConnector1">
-              <a:avLst/>
-            </a:prstGeom>
-            <a:ln w="19050">
-              <a:tailEnd type="triangle"/>
-            </a:ln>
-          </p:spPr>
-          <p:style>
-            <a:lnRef idx="1">
-              <a:schemeClr val="accent1"/>
-            </a:lnRef>
-            <a:fillRef idx="0">
-              <a:schemeClr val="accent1"/>
-            </a:fillRef>
-            <a:effectRef idx="0">
-              <a:schemeClr val="accent1"/>
-            </a:effectRef>
-            <a:fontRef idx="minor">
+              </a:rPr>
+              <a:t/>
+            </a:r>
+            <a:br>
+              <a:rPr lang="en-US" kern="1200" dirty="0" smtClean="0">
+                <a:ln w="12700">
+                  <a:noFill/>
+                </a:ln>
+              </a:rPr>
+            </a:br>
+            <a:r>
+              <a:rPr lang="en-US" kern="1200" dirty="0" err="1" smtClean="0">
+                <a:ln w="12700">
+                  <a:noFill/>
+                </a:ln>
+              </a:rPr>
+              <a:t>FSArrayList</a:t>
+            </a:r>
+            <a:r>
+              <a:rPr lang="en-US" kern="1200" dirty="0" smtClean="0">
+                <a:ln w="12700">
+                  <a:noFill/>
+                </a:ln>
+              </a:rPr>
+              <a:t/>
+            </a:r>
+            <a:br>
+              <a:rPr lang="en-US" kern="1200" dirty="0" smtClean="0">
+                <a:ln w="12700">
+                  <a:noFill/>
+                </a:ln>
+              </a:rPr>
+            </a:br>
+            <a:r>
+              <a:rPr lang="en-US" kern="1200" dirty="0" err="1" smtClean="0">
+                <a:ln w="12700">
+                  <a:noFill/>
+                </a:ln>
+              </a:rPr>
+              <a:t>FSList</a:t>
+            </a:r>
+            <a:r>
+              <a:rPr lang="en-US" kern="1200" dirty="0" smtClean="0">
+                <a:ln w="12700">
+                  <a:noFill/>
+                </a:ln>
+              </a:rPr>
+              <a:t/>
+            </a:r>
+            <a:br>
+              <a:rPr lang="en-US" kern="1200" dirty="0" smtClean="0">
+                <a:ln w="12700">
+                  <a:noFill/>
+                </a:ln>
+              </a:rPr>
+            </a:br>
+            <a:r>
+              <a:rPr lang="en-US" kern="1200" dirty="0" err="1" smtClean="0">
+                <a:ln w="12700">
+                  <a:noFill/>
+                </a:ln>
+              </a:rPr>
+              <a:t>FSHashSet</a:t>
+            </a:r>
+            <a:endParaRPr lang="en-US" kern="1200" dirty="0">
+              <a:ln w="12700">
+                <a:noFill/>
+              </a:ln>
+            </a:endParaRPr>
+          </a:p>
+        </p:txBody>
+      </p:sp>
+      <p:sp>
+        <p:nvSpPr>
+          <p:cNvPr id="22" name="Freeform 21"/>
+          <p:cNvSpPr/>
+          <p:nvPr/>
+        </p:nvSpPr>
+        <p:spPr>
+          <a:xfrm>
+            <a:off x="7957751" y="2014326"/>
+            <a:ext cx="3306868" cy="1673094"/>
+          </a:xfrm>
+          <a:custGeom>
+            <a:avLst/>
+            <a:gdLst>
+              <a:gd name="connsiteX0" fmla="*/ 0 w 1869440"/>
+              <a:gd name="connsiteY0" fmla="*/ 139696 h 838160"/>
+              <a:gd name="connsiteX1" fmla="*/ 139696 w 1869440"/>
+              <a:gd name="connsiteY1" fmla="*/ 0 h 838160"/>
+              <a:gd name="connsiteX2" fmla="*/ 1729744 w 1869440"/>
+              <a:gd name="connsiteY2" fmla="*/ 0 h 838160"/>
+              <a:gd name="connsiteX3" fmla="*/ 1869440 w 1869440"/>
+              <a:gd name="connsiteY3" fmla="*/ 139696 h 838160"/>
+              <a:gd name="connsiteX4" fmla="*/ 1869440 w 1869440"/>
+              <a:gd name="connsiteY4" fmla="*/ 698464 h 838160"/>
+              <a:gd name="connsiteX5" fmla="*/ 1729744 w 1869440"/>
+              <a:gd name="connsiteY5" fmla="*/ 838160 h 838160"/>
+              <a:gd name="connsiteX6" fmla="*/ 139696 w 1869440"/>
+              <a:gd name="connsiteY6" fmla="*/ 838160 h 838160"/>
+              <a:gd name="connsiteX7" fmla="*/ 0 w 1869440"/>
+              <a:gd name="connsiteY7" fmla="*/ 698464 h 838160"/>
+              <a:gd name="connsiteX8" fmla="*/ 0 w 1869440"/>
+              <a:gd name="connsiteY8" fmla="*/ 139696 h 838160"/>
+            </a:gdLst>
+            <a:ahLst/>
+            <a:cxnLst>
+              <a:cxn ang="0">
+                <a:pos x="connsiteX0" y="connsiteY0"/>
+              </a:cxn>
+              <a:cxn ang="0">
+                <a:pos x="connsiteX1" y="connsiteY1"/>
+              </a:cxn>
+              <a:cxn ang="0">
+                <a:pos x="connsiteX2" y="connsiteY2"/>
+              </a:cxn>
+              <a:cxn ang="0">
+                <a:pos x="connsiteX3" y="connsiteY3"/>
+              </a:cxn>
+              <a:cxn ang="0">
+                <a:pos x="connsiteX4" y="connsiteY4"/>
+              </a:cxn>
+              <a:cxn ang="0">
+                <a:pos x="connsiteX5" y="connsiteY5"/>
+              </a:cxn>
+              <a:cxn ang="0">
+                <a:pos x="connsiteX6" y="connsiteY6"/>
+              </a:cxn>
+              <a:cxn ang="0">
+                <a:pos x="connsiteX7" y="connsiteY7"/>
+              </a:cxn>
+              <a:cxn ang="0">
+                <a:pos x="connsiteX8" y="connsiteY8"/>
+              </a:cxn>
+            </a:cxnLst>
+            <a:rect l="l" t="t" r="r" b="b"/>
+            <a:pathLst>
+              <a:path w="1869440" h="838160">
+                <a:moveTo>
+                  <a:pt x="0" y="139696"/>
+                </a:moveTo>
+                <a:cubicBezTo>
+                  <a:pt x="0" y="62544"/>
+                  <a:pt x="62544" y="0"/>
+                  <a:pt x="139696" y="0"/>
+                </a:cubicBezTo>
+                <a:lnTo>
+                  <a:pt x="1729744" y="0"/>
+                </a:lnTo>
+                <a:cubicBezTo>
+                  <a:pt x="1806896" y="0"/>
+                  <a:pt x="1869440" y="62544"/>
+                  <a:pt x="1869440" y="139696"/>
+                </a:cubicBezTo>
+                <a:lnTo>
+                  <a:pt x="1869440" y="698464"/>
+                </a:lnTo>
+                <a:cubicBezTo>
+                  <a:pt x="1869440" y="775616"/>
+                  <a:pt x="1806896" y="838160"/>
+                  <a:pt x="1729744" y="838160"/>
+                </a:cubicBezTo>
+                <a:lnTo>
+                  <a:pt x="139696" y="838160"/>
+                </a:lnTo>
+                <a:cubicBezTo>
+                  <a:pt x="62544" y="838160"/>
+                  <a:pt x="0" y="775616"/>
+                  <a:pt x="0" y="698464"/>
+                </a:cubicBezTo>
+                <a:lnTo>
+                  <a:pt x="0" y="139696"/>
+                </a:lnTo>
+                <a:close/>
+              </a:path>
+            </a:pathLst>
+          </a:custGeom>
+          <a:gradFill>
+            <a:gsLst>
+              <a:gs pos="0">
+                <a:schemeClr val="accent2">
+                  <a:satMod val="105000"/>
+                  <a:tint val="67000"/>
+                  <a:alpha val="56000"/>
+                  <a:lumMod val="81000"/>
+                  <a:lumOff val="19000"/>
+                </a:schemeClr>
+              </a:gs>
+              <a:gs pos="45000">
+                <a:schemeClr val="accent2">
+                  <a:satMod val="103000"/>
+                  <a:tint val="73000"/>
+                  <a:lumMod val="90000"/>
+                  <a:lumOff val="10000"/>
+                  <a:alpha val="60000"/>
+                </a:schemeClr>
+              </a:gs>
+              <a:gs pos="100000">
+                <a:schemeClr val="accent2">
+                  <a:satMod val="109000"/>
+                  <a:tint val="81000"/>
+                  <a:alpha val="54000"/>
+                  <a:lumMod val="100000"/>
+                </a:schemeClr>
+              </a:gs>
+            </a:gsLst>
+          </a:gradFill>
+          <a:ln>
+            <a:solidFill>
               <a:schemeClr val="tx1"/>
-            </a:fontRef>
-          </p:style>
-        </p:cxnSp>
-        <p:cxnSp>
-          <p:nvCxnSpPr>
-            <p:cNvPr id="28" name="Straight Arrow Connector 27"/>
-            <p:cNvCxnSpPr/>
-            <p:nvPr/>
-          </p:nvCxnSpPr>
-          <p:spPr>
-            <a:xfrm>
-              <a:off x="3901439" y="3822700"/>
-              <a:ext cx="1197725" cy="353502"/>
-            </a:xfrm>
-            <a:prstGeom prst="straightConnector1">
-              <a:avLst/>
-            </a:prstGeom>
-            <a:ln w="19050">
-              <a:tailEnd type="triangle"/>
-            </a:ln>
-          </p:spPr>
-          <p:style>
-            <a:lnRef idx="1">
-              <a:schemeClr val="accent1"/>
-            </a:lnRef>
-            <a:fillRef idx="0">
-              <a:schemeClr val="accent1"/>
-            </a:fillRef>
-            <a:effectRef idx="0">
-              <a:schemeClr val="accent1"/>
-            </a:effectRef>
-            <a:fontRef idx="minor">
+            </a:solidFill>
+          </a:ln>
+        </p:spPr>
+        <p:style>
+          <a:lnRef idx="1">
+            <a:schemeClr val="accent2"/>
+          </a:lnRef>
+          <a:fillRef idx="2">
+            <a:schemeClr val="accent2"/>
+          </a:fillRef>
+          <a:effectRef idx="1">
+            <a:schemeClr val="accent2"/>
+          </a:effectRef>
+          <a:fontRef idx="minor">
+            <a:schemeClr val="dk1"/>
+          </a:fontRef>
+        </p:style>
+        <p:txBody>
+          <a:bodyPr spcFirstLastPara="0" vert="horz" wrap="square" lIns="200936" tIns="120926" rIns="200936" bIns="120926" numCol="1" spcCol="1270" anchor="ctr" anchorCtr="0">
+            <a:noAutofit/>
+          </a:bodyPr>
+          <a:lstStyle/>
+          <a:p>
+            <a:pPr lvl="0" defTabSz="1866900">
+              <a:lnSpc>
+                <a:spcPct val="90000"/>
+              </a:lnSpc>
+              <a:spcBef>
+                <a:spcPct val="0"/>
+              </a:spcBef>
+              <a:spcAft>
+                <a:spcPct val="35000"/>
+              </a:spcAft>
+            </a:pPr>
+            <a:r>
+              <a:rPr lang="en-US" sz="1600" dirty="0" smtClean="0">
+                <a:ln w="12700">
+                  <a:noFill/>
+                </a:ln>
+              </a:rPr>
+              <a:t>Type:</a:t>
+            </a:r>
+          </a:p>
+          <a:p>
+            <a:pPr defTabSz="1866900">
+              <a:lnSpc>
+                <a:spcPct val="90000"/>
+              </a:lnSpc>
+              <a:spcBef>
+                <a:spcPct val="0"/>
+              </a:spcBef>
+              <a:spcAft>
+                <a:spcPct val="35000"/>
+              </a:spcAft>
+            </a:pPr>
+            <a:r>
+              <a:rPr lang="en-US" sz="1600" dirty="0" smtClean="0">
+                <a:ln w="12700">
+                  <a:noFill/>
+                </a:ln>
+              </a:rPr>
+              <a:t>- (omitted)   </a:t>
+            </a:r>
+            <a:r>
+              <a:rPr lang="en-US" sz="1600" dirty="0">
+                <a:ln w="12700">
+                  <a:noFill/>
+                </a:ln>
+              </a:rPr>
+              <a:t> </a:t>
+            </a:r>
+            <a:r>
+              <a:rPr lang="en-US" sz="1600" dirty="0" smtClean="0">
+                <a:ln w="12700">
+                  <a:noFill/>
+                </a:ln>
+              </a:rPr>
+              <a:t> </a:t>
+            </a:r>
+            <a:r>
+              <a:rPr lang="en-US" sz="1600" dirty="0" err="1" smtClean="0">
+                <a:ln w="12700">
+                  <a:noFill/>
+                </a:ln>
+              </a:rPr>
+              <a:t>xx.select</a:t>
+            </a:r>
+            <a:r>
+              <a:rPr lang="en-US" sz="1600" dirty="0" smtClean="0">
+                <a:ln w="12700">
+                  <a:noFill/>
+                </a:ln>
+              </a:rPr>
+              <a:t>()</a:t>
+            </a:r>
+            <a:br>
+              <a:rPr lang="en-US" sz="1600" dirty="0" smtClean="0">
+                <a:ln w="12700">
+                  <a:noFill/>
+                </a:ln>
+              </a:rPr>
+            </a:br>
+            <a:r>
+              <a:rPr lang="en-US" sz="1600" dirty="0" smtClean="0">
+                <a:ln w="12700">
+                  <a:noFill/>
+                </a:ln>
+              </a:rPr>
+              <a:t>-</a:t>
+            </a:r>
+            <a:r>
+              <a:rPr lang="en-US" sz="1600" kern="1200" dirty="0" smtClean="0">
+                <a:ln w="12700">
+                  <a:noFill/>
+                </a:ln>
+              </a:rPr>
+              <a:t> Class           </a:t>
+            </a:r>
+            <a:r>
+              <a:rPr lang="en-US" sz="1600" dirty="0">
+                <a:ln w="12700">
+                  <a:noFill/>
+                </a:ln>
+              </a:rPr>
+              <a:t> </a:t>
+            </a:r>
+            <a:r>
+              <a:rPr lang="en-US" sz="1600" dirty="0" smtClean="0">
+                <a:ln w="12700">
+                  <a:noFill/>
+                </a:ln>
+              </a:rPr>
+              <a:t> </a:t>
+            </a:r>
+            <a:r>
+              <a:rPr lang="en-US" sz="1600" kern="1200" dirty="0" err="1" smtClean="0">
+                <a:ln w="12700">
+                  <a:noFill/>
+                </a:ln>
+              </a:rPr>
+              <a:t>xx.select</a:t>
+            </a:r>
+            <a:r>
+              <a:rPr lang="en-US" sz="1600" kern="1200" dirty="0" smtClean="0">
+                <a:ln w="12700">
+                  <a:noFill/>
+                </a:ln>
+              </a:rPr>
+              <a:t>(</a:t>
+            </a:r>
+            <a:r>
+              <a:rPr lang="en-US" sz="1600" kern="1200" dirty="0" err="1" smtClean="0">
+                <a:ln w="12700">
+                  <a:noFill/>
+                </a:ln>
+              </a:rPr>
+              <a:t>Token.class</a:t>
+            </a:r>
+            <a:r>
+              <a:rPr lang="en-US" sz="1600" kern="1200" dirty="0" smtClean="0">
+                <a:ln w="12700">
+                  <a:noFill/>
+                </a:ln>
+              </a:rPr>
+              <a:t>)</a:t>
+            </a:r>
+            <a:br>
+              <a:rPr lang="en-US" sz="1600" kern="1200" dirty="0" smtClean="0">
+                <a:ln w="12700">
+                  <a:noFill/>
+                </a:ln>
+              </a:rPr>
+            </a:br>
+            <a:r>
+              <a:rPr lang="en-US" sz="1600" kern="1200" dirty="0" smtClean="0">
+                <a:ln w="12700">
+                  <a:noFill/>
+                </a:ln>
+              </a:rPr>
+              <a:t>- </a:t>
+            </a:r>
+            <a:r>
+              <a:rPr lang="en-US" sz="1600" dirty="0" err="1" smtClean="0">
+                <a:ln w="12700">
+                  <a:noFill/>
+                </a:ln>
+              </a:rPr>
+              <a:t>uima_Type</a:t>
+            </a:r>
+            <a:r>
+              <a:rPr lang="en-US" sz="1600" dirty="0" smtClean="0">
+                <a:ln w="12700">
+                  <a:noFill/>
+                </a:ln>
+              </a:rPr>
+              <a:t>  </a:t>
+            </a:r>
+            <a:r>
+              <a:rPr lang="en-US" sz="1600" dirty="0" err="1" smtClean="0">
+                <a:ln w="12700">
+                  <a:noFill/>
+                </a:ln>
+              </a:rPr>
+              <a:t>xx.select</a:t>
+            </a:r>
+            <a:r>
+              <a:rPr lang="en-US" sz="1600" dirty="0" smtClean="0">
+                <a:ln w="12700">
+                  <a:noFill/>
+                </a:ln>
+              </a:rPr>
+              <a:t>(token)</a:t>
+            </a:r>
+            <a:br>
+              <a:rPr lang="en-US" sz="1600" dirty="0" smtClean="0">
+                <a:ln w="12700">
+                  <a:noFill/>
+                </a:ln>
+              </a:rPr>
+            </a:br>
+            <a:r>
+              <a:rPr lang="en-US" sz="1600" dirty="0" smtClean="0">
+                <a:ln w="12700">
+                  <a:noFill/>
+                </a:ln>
+              </a:rPr>
+              <a:t>- </a:t>
+            </a:r>
+            <a:r>
+              <a:rPr lang="en-US" sz="1600" dirty="0" err="1" smtClean="0">
+                <a:ln w="12700">
+                  <a:noFill/>
+                </a:ln>
+              </a:rPr>
+              <a:t>JCas.type</a:t>
+            </a:r>
+            <a:r>
+              <a:rPr lang="en-US" sz="1600" dirty="0" smtClean="0">
+                <a:ln w="12700">
+                  <a:noFill/>
+                </a:ln>
+              </a:rPr>
+              <a:t>     </a:t>
+            </a:r>
+            <a:r>
+              <a:rPr lang="en-US" sz="1600" dirty="0" err="1" smtClean="0">
+                <a:ln w="12700">
+                  <a:noFill/>
+                </a:ln>
+              </a:rPr>
+              <a:t>xx.select</a:t>
+            </a:r>
+            <a:r>
+              <a:rPr lang="en-US" sz="1600" dirty="0" smtClean="0">
+                <a:ln w="12700">
+                  <a:noFill/>
+                </a:ln>
+              </a:rPr>
+              <a:t>(</a:t>
+            </a:r>
+            <a:r>
+              <a:rPr lang="en-US" sz="1600" dirty="0" err="1" smtClean="0">
+                <a:ln w="12700">
+                  <a:noFill/>
+                </a:ln>
+              </a:rPr>
+              <a:t>Token.type</a:t>
+            </a:r>
+            <a:r>
+              <a:rPr lang="en-US" sz="1600" dirty="0" smtClean="0">
+                <a:ln w="12700">
+                  <a:noFill/>
+                </a:ln>
+              </a:rPr>
+              <a:t>)</a:t>
+            </a:r>
+            <a:r>
+              <a:rPr lang="en-US" sz="1600" kern="1200" dirty="0" smtClean="0">
+                <a:ln w="12700">
+                  <a:noFill/>
+                </a:ln>
+              </a:rPr>
+              <a:t/>
+            </a:r>
+            <a:br>
+              <a:rPr lang="en-US" sz="1600" kern="1200" dirty="0" smtClean="0">
+                <a:ln w="12700">
+                  <a:noFill/>
+                </a:ln>
+              </a:rPr>
+            </a:br>
+            <a:r>
+              <a:rPr lang="en-US" sz="1600" kern="1200" dirty="0" smtClean="0">
+                <a:ln w="12700">
+                  <a:noFill/>
+                </a:ln>
+              </a:rPr>
+              <a:t>- </a:t>
+            </a:r>
+            <a:r>
+              <a:rPr lang="en-US" sz="1600" dirty="0" smtClean="0">
+                <a:ln w="12700">
+                  <a:noFill/>
+                </a:ln>
+              </a:rPr>
+              <a:t>“name”        </a:t>
+            </a:r>
+            <a:r>
+              <a:rPr lang="en-US" sz="1600" dirty="0" err="1" smtClean="0">
+                <a:ln w="12700">
+                  <a:noFill/>
+                </a:ln>
+              </a:rPr>
+              <a:t>xx.select</a:t>
+            </a:r>
+            <a:r>
+              <a:rPr lang="en-US" sz="1600" dirty="0" smtClean="0">
+                <a:ln w="12700">
+                  <a:noFill/>
+                </a:ln>
+              </a:rPr>
+              <a:t>(“</a:t>
+            </a:r>
+            <a:r>
+              <a:rPr lang="en-US" sz="1400" dirty="0" err="1" smtClean="0">
+                <a:ln w="12700">
+                  <a:noFill/>
+                </a:ln>
+              </a:rPr>
+              <a:t>pkg.Token</a:t>
+            </a:r>
+            <a:r>
+              <a:rPr lang="en-US" sz="1600" dirty="0" smtClean="0">
+                <a:ln w="12700">
+                  <a:noFill/>
+                </a:ln>
+              </a:rPr>
+              <a:t>”)</a:t>
+            </a:r>
+            <a:endParaRPr lang="en-US" sz="1600" kern="1200" dirty="0">
+              <a:ln w="12700">
+                <a:noFill/>
+              </a:ln>
+            </a:endParaRPr>
+          </a:p>
+        </p:txBody>
+      </p:sp>
+      <p:sp>
+        <p:nvSpPr>
+          <p:cNvPr id="37" name="Flowchart: Extract 36"/>
+          <p:cNvSpPr/>
+          <p:nvPr/>
+        </p:nvSpPr>
+        <p:spPr>
+          <a:xfrm>
+            <a:off x="4166755" y="1363552"/>
+            <a:ext cx="6053384" cy="552727"/>
+          </a:xfrm>
+          <a:prstGeom prst="flowChartExtract">
+            <a:avLst/>
+          </a:prstGeom>
+          <a:pattFill prst="pct60">
+            <a:fgClr>
+              <a:schemeClr val="bg2">
+                <a:lumMod val="90000"/>
+              </a:schemeClr>
+            </a:fgClr>
+            <a:bgClr>
+              <a:srgbClr val="92D050"/>
+            </a:bgClr>
+          </a:pattFill>
+          <a:ln>
+            <a:solidFill>
               <a:schemeClr val="tx1"/>
-            </a:fontRef>
-          </p:style>
-        </p:cxnSp>
-        <p:cxnSp>
-          <p:nvCxnSpPr>
-            <p:cNvPr id="30" name="Straight Arrow Connector 29"/>
-            <p:cNvCxnSpPr/>
-            <p:nvPr/>
-          </p:nvCxnSpPr>
-          <p:spPr>
-            <a:xfrm flipV="1">
-              <a:off x="3901439" y="4502357"/>
-              <a:ext cx="1197725" cy="448205"/>
-            </a:xfrm>
-            <a:prstGeom prst="straightConnector1">
-              <a:avLst/>
-            </a:prstGeom>
-            <a:ln w="19050">
-              <a:tailEnd type="triangle"/>
-            </a:ln>
-          </p:spPr>
-          <p:style>
-            <a:lnRef idx="1">
-              <a:schemeClr val="accent1"/>
-            </a:lnRef>
-            <a:fillRef idx="0">
-              <a:schemeClr val="accent1"/>
-            </a:fillRef>
-            <a:effectRef idx="0">
-              <a:schemeClr val="accent1"/>
-            </a:effectRef>
-            <a:fontRef idx="minor">
+            </a:solidFill>
+          </a:ln>
+        </p:spPr>
+        <p:style>
+          <a:lnRef idx="2">
+            <a:schemeClr val="accent1">
+              <a:shade val="50000"/>
+            </a:schemeClr>
+          </a:lnRef>
+          <a:fillRef idx="1">
+            <a:schemeClr val="accent1"/>
+          </a:fillRef>
+          <a:effectRef idx="0">
+            <a:schemeClr val="accent1"/>
+          </a:effectRef>
+          <a:fontRef idx="minor">
+            <a:schemeClr val="lt1"/>
+          </a:fontRef>
+        </p:style>
+        <p:txBody>
+          <a:bodyPr rtlCol="0" anchor="ctr"/>
+          <a:lstStyle/>
+          <a:p>
+            <a:pPr algn="ctr"/>
+            <a:endParaRPr lang="en-US"/>
+          </a:p>
+        </p:txBody>
+      </p:sp>
+      <p:sp>
+        <p:nvSpPr>
+          <p:cNvPr id="20" name="Freeform 19"/>
+          <p:cNvSpPr/>
+          <p:nvPr/>
+        </p:nvSpPr>
+        <p:spPr>
+          <a:xfrm>
+            <a:off x="4166756" y="3621623"/>
+            <a:ext cx="1437190" cy="644362"/>
+          </a:xfrm>
+          <a:custGeom>
+            <a:avLst/>
+            <a:gdLst>
+              <a:gd name="connsiteX0" fmla="*/ 0 w 1869440"/>
+              <a:gd name="connsiteY0" fmla="*/ 139696 h 838160"/>
+              <a:gd name="connsiteX1" fmla="*/ 139696 w 1869440"/>
+              <a:gd name="connsiteY1" fmla="*/ 0 h 838160"/>
+              <a:gd name="connsiteX2" fmla="*/ 1729744 w 1869440"/>
+              <a:gd name="connsiteY2" fmla="*/ 0 h 838160"/>
+              <a:gd name="connsiteX3" fmla="*/ 1869440 w 1869440"/>
+              <a:gd name="connsiteY3" fmla="*/ 139696 h 838160"/>
+              <a:gd name="connsiteX4" fmla="*/ 1869440 w 1869440"/>
+              <a:gd name="connsiteY4" fmla="*/ 698464 h 838160"/>
+              <a:gd name="connsiteX5" fmla="*/ 1729744 w 1869440"/>
+              <a:gd name="connsiteY5" fmla="*/ 838160 h 838160"/>
+              <a:gd name="connsiteX6" fmla="*/ 139696 w 1869440"/>
+              <a:gd name="connsiteY6" fmla="*/ 838160 h 838160"/>
+              <a:gd name="connsiteX7" fmla="*/ 0 w 1869440"/>
+              <a:gd name="connsiteY7" fmla="*/ 698464 h 838160"/>
+              <a:gd name="connsiteX8" fmla="*/ 0 w 1869440"/>
+              <a:gd name="connsiteY8" fmla="*/ 139696 h 838160"/>
+            </a:gdLst>
+            <a:ahLst/>
+            <a:cxnLst>
+              <a:cxn ang="0">
+                <a:pos x="connsiteX0" y="connsiteY0"/>
+              </a:cxn>
+              <a:cxn ang="0">
+                <a:pos x="connsiteX1" y="connsiteY1"/>
+              </a:cxn>
+              <a:cxn ang="0">
+                <a:pos x="connsiteX2" y="connsiteY2"/>
+              </a:cxn>
+              <a:cxn ang="0">
+                <a:pos x="connsiteX3" y="connsiteY3"/>
+              </a:cxn>
+              <a:cxn ang="0">
+                <a:pos x="connsiteX4" y="connsiteY4"/>
+              </a:cxn>
+              <a:cxn ang="0">
+                <a:pos x="connsiteX5" y="connsiteY5"/>
+              </a:cxn>
+              <a:cxn ang="0">
+                <a:pos x="connsiteX6" y="connsiteY6"/>
+              </a:cxn>
+              <a:cxn ang="0">
+                <a:pos x="connsiteX7" y="connsiteY7"/>
+              </a:cxn>
+              <a:cxn ang="0">
+                <a:pos x="connsiteX8" y="connsiteY8"/>
+              </a:cxn>
+            </a:cxnLst>
+            <a:rect l="l" t="t" r="r" b="b"/>
+            <a:pathLst>
+              <a:path w="1869440" h="838160">
+                <a:moveTo>
+                  <a:pt x="0" y="139696"/>
+                </a:moveTo>
+                <a:cubicBezTo>
+                  <a:pt x="0" y="62544"/>
+                  <a:pt x="62544" y="0"/>
+                  <a:pt x="139696" y="0"/>
+                </a:cubicBezTo>
+                <a:lnTo>
+                  <a:pt x="1729744" y="0"/>
+                </a:lnTo>
+                <a:cubicBezTo>
+                  <a:pt x="1806896" y="0"/>
+                  <a:pt x="1869440" y="62544"/>
+                  <a:pt x="1869440" y="139696"/>
+                </a:cubicBezTo>
+                <a:lnTo>
+                  <a:pt x="1869440" y="698464"/>
+                </a:lnTo>
+                <a:cubicBezTo>
+                  <a:pt x="1869440" y="775616"/>
+                  <a:pt x="1806896" y="838160"/>
+                  <a:pt x="1729744" y="838160"/>
+                </a:cubicBezTo>
+                <a:lnTo>
+                  <a:pt x="139696" y="838160"/>
+                </a:lnTo>
+                <a:cubicBezTo>
+                  <a:pt x="62544" y="838160"/>
+                  <a:pt x="0" y="775616"/>
+                  <a:pt x="0" y="698464"/>
+                </a:cubicBezTo>
+                <a:lnTo>
+                  <a:pt x="0" y="139696"/>
+                </a:lnTo>
+                <a:close/>
+              </a:path>
+            </a:pathLst>
+          </a:custGeom>
+          <a:gradFill flip="none" rotWithShape="1">
+            <a:gsLst>
+              <a:gs pos="0">
+                <a:srgbClr val="92D050">
+                  <a:alpha val="49000"/>
+                  <a:lumMod val="50000"/>
+                  <a:lumOff val="50000"/>
+                </a:srgbClr>
+              </a:gs>
+              <a:gs pos="100000">
+                <a:srgbClr val="92D050"/>
+              </a:gs>
+            </a:gsLst>
+            <a:lin ang="2700000" scaled="1"/>
+            <a:tileRect/>
+          </a:gradFill>
+          <a:ln w="12700">
+            <a:solidFill>
               <a:schemeClr val="tx1"/>
-            </a:fontRef>
-          </p:style>
-        </p:cxnSp>
-        <p:cxnSp>
-          <p:nvCxnSpPr>
-            <p:cNvPr id="32" name="Straight Arrow Connector 31"/>
-            <p:cNvCxnSpPr/>
-            <p:nvPr/>
-          </p:nvCxnSpPr>
-          <p:spPr>
-            <a:xfrm flipV="1">
-              <a:off x="3901439" y="4838700"/>
-              <a:ext cx="1197725" cy="1104900"/>
-            </a:xfrm>
-            <a:prstGeom prst="straightConnector1">
-              <a:avLst/>
-            </a:prstGeom>
-            <a:ln w="19050">
-              <a:tailEnd type="triangle"/>
-            </a:ln>
-          </p:spPr>
-          <p:style>
-            <a:lnRef idx="1">
-              <a:schemeClr val="accent1"/>
-            </a:lnRef>
-            <a:fillRef idx="0">
-              <a:schemeClr val="accent1"/>
-            </a:fillRef>
-            <a:effectRef idx="0">
-              <a:schemeClr val="accent1"/>
-            </a:effectRef>
-            <a:fontRef idx="minor">
+            </a:solidFill>
+          </a:ln>
+        </p:spPr>
+        <p:style>
+          <a:lnRef idx="1">
+            <a:schemeClr val="accent4"/>
+          </a:lnRef>
+          <a:fillRef idx="2">
+            <a:schemeClr val="accent4"/>
+          </a:fillRef>
+          <a:effectRef idx="1">
+            <a:schemeClr val="accent4"/>
+          </a:effectRef>
+          <a:fontRef idx="minor">
+            <a:schemeClr val="dk1"/>
+          </a:fontRef>
+        </p:style>
+        <p:txBody>
+          <a:bodyPr spcFirstLastPara="0" vert="horz" wrap="square" lIns="200936" tIns="120926" rIns="200936" bIns="120926" numCol="1" spcCol="1270" anchor="ctr" anchorCtr="0">
+            <a:noAutofit/>
+          </a:bodyPr>
+          <a:lstStyle/>
+          <a:p>
+            <a:pPr lvl="0" algn="ctr" defTabSz="1866900">
+              <a:lnSpc>
+                <a:spcPct val="90000"/>
+              </a:lnSpc>
+              <a:spcBef>
+                <a:spcPct val="0"/>
+              </a:spcBef>
+              <a:spcAft>
+                <a:spcPct val="35000"/>
+              </a:spcAft>
+            </a:pPr>
+            <a:r>
+              <a:rPr lang="en-US" dirty="0" smtClean="0">
+                <a:ln w="12700">
+                  <a:noFill/>
+                </a:ln>
+              </a:rPr>
+              <a:t>Collections</a:t>
+            </a:r>
+            <a:r>
+              <a:rPr lang="en-US" dirty="0">
+                <a:ln w="12700">
+                  <a:noFill/>
+                </a:ln>
+              </a:rPr>
+              <a:t/>
+            </a:r>
+            <a:br>
+              <a:rPr lang="en-US" dirty="0">
+                <a:ln w="12700">
+                  <a:noFill/>
+                </a:ln>
+              </a:rPr>
+            </a:br>
+            <a:r>
+              <a:rPr lang="en-US" dirty="0" smtClean="0">
+                <a:ln w="12700">
+                  <a:noFill/>
+                </a:ln>
+              </a:rPr>
+              <a:t>built-in</a:t>
+            </a:r>
+          </a:p>
+        </p:txBody>
+      </p:sp>
+      <p:sp>
+        <p:nvSpPr>
+          <p:cNvPr id="25" name="Freeform 24"/>
+          <p:cNvSpPr/>
+          <p:nvPr/>
+        </p:nvSpPr>
+        <p:spPr>
+          <a:xfrm>
+            <a:off x="4166755" y="4515818"/>
+            <a:ext cx="2116811" cy="556649"/>
+          </a:xfrm>
+          <a:custGeom>
+            <a:avLst/>
+            <a:gdLst>
+              <a:gd name="connsiteX0" fmla="*/ 0 w 1869440"/>
+              <a:gd name="connsiteY0" fmla="*/ 139696 h 838160"/>
+              <a:gd name="connsiteX1" fmla="*/ 139696 w 1869440"/>
+              <a:gd name="connsiteY1" fmla="*/ 0 h 838160"/>
+              <a:gd name="connsiteX2" fmla="*/ 1729744 w 1869440"/>
+              <a:gd name="connsiteY2" fmla="*/ 0 h 838160"/>
+              <a:gd name="connsiteX3" fmla="*/ 1869440 w 1869440"/>
+              <a:gd name="connsiteY3" fmla="*/ 139696 h 838160"/>
+              <a:gd name="connsiteX4" fmla="*/ 1869440 w 1869440"/>
+              <a:gd name="connsiteY4" fmla="*/ 698464 h 838160"/>
+              <a:gd name="connsiteX5" fmla="*/ 1729744 w 1869440"/>
+              <a:gd name="connsiteY5" fmla="*/ 838160 h 838160"/>
+              <a:gd name="connsiteX6" fmla="*/ 139696 w 1869440"/>
+              <a:gd name="connsiteY6" fmla="*/ 838160 h 838160"/>
+              <a:gd name="connsiteX7" fmla="*/ 0 w 1869440"/>
+              <a:gd name="connsiteY7" fmla="*/ 698464 h 838160"/>
+              <a:gd name="connsiteX8" fmla="*/ 0 w 1869440"/>
+              <a:gd name="connsiteY8" fmla="*/ 139696 h 838160"/>
+            </a:gdLst>
+            <a:ahLst/>
+            <a:cxnLst>
+              <a:cxn ang="0">
+                <a:pos x="connsiteX0" y="connsiteY0"/>
+              </a:cxn>
+              <a:cxn ang="0">
+                <a:pos x="connsiteX1" y="connsiteY1"/>
+              </a:cxn>
+              <a:cxn ang="0">
+                <a:pos x="connsiteX2" y="connsiteY2"/>
+              </a:cxn>
+              <a:cxn ang="0">
+                <a:pos x="connsiteX3" y="connsiteY3"/>
+              </a:cxn>
+              <a:cxn ang="0">
+                <a:pos x="connsiteX4" y="connsiteY4"/>
+              </a:cxn>
+              <a:cxn ang="0">
+                <a:pos x="connsiteX5" y="connsiteY5"/>
+              </a:cxn>
+              <a:cxn ang="0">
+                <a:pos x="connsiteX6" y="connsiteY6"/>
+              </a:cxn>
+              <a:cxn ang="0">
+                <a:pos x="connsiteX7" y="connsiteY7"/>
+              </a:cxn>
+              <a:cxn ang="0">
+                <a:pos x="connsiteX8" y="connsiteY8"/>
+              </a:cxn>
+            </a:cxnLst>
+            <a:rect l="l" t="t" r="r" b="b"/>
+            <a:pathLst>
+              <a:path w="1869440" h="838160">
+                <a:moveTo>
+                  <a:pt x="0" y="139696"/>
+                </a:moveTo>
+                <a:cubicBezTo>
+                  <a:pt x="0" y="62544"/>
+                  <a:pt x="62544" y="0"/>
+                  <a:pt x="139696" y="0"/>
+                </a:cubicBezTo>
+                <a:lnTo>
+                  <a:pt x="1729744" y="0"/>
+                </a:lnTo>
+                <a:cubicBezTo>
+                  <a:pt x="1806896" y="0"/>
+                  <a:pt x="1869440" y="62544"/>
+                  <a:pt x="1869440" y="139696"/>
+                </a:cubicBezTo>
+                <a:lnTo>
+                  <a:pt x="1869440" y="698464"/>
+                </a:lnTo>
+                <a:cubicBezTo>
+                  <a:pt x="1869440" y="775616"/>
+                  <a:pt x="1806896" y="838160"/>
+                  <a:pt x="1729744" y="838160"/>
+                </a:cubicBezTo>
+                <a:lnTo>
+                  <a:pt x="139696" y="838160"/>
+                </a:lnTo>
+                <a:cubicBezTo>
+                  <a:pt x="62544" y="838160"/>
+                  <a:pt x="0" y="775616"/>
+                  <a:pt x="0" y="698464"/>
+                </a:cubicBezTo>
+                <a:lnTo>
+                  <a:pt x="0" y="139696"/>
+                </a:lnTo>
+                <a:close/>
+              </a:path>
+            </a:pathLst>
+          </a:custGeom>
+          <a:gradFill flip="none" rotWithShape="1">
+            <a:gsLst>
+              <a:gs pos="0">
+                <a:srgbClr val="00B0F0">
+                  <a:lumMod val="53000"/>
+                  <a:lumOff val="47000"/>
+                  <a:alpha val="49000"/>
+                </a:srgbClr>
+              </a:gs>
+              <a:gs pos="100000">
+                <a:srgbClr val="00B0F0"/>
+              </a:gs>
+            </a:gsLst>
+            <a:lin ang="2700000" scaled="1"/>
+            <a:tileRect/>
+          </a:gradFill>
+          <a:ln w="12700">
+            <a:solidFill>
               <a:schemeClr val="tx1"/>
-            </a:fontRef>
-          </p:style>
-        </p:cxnSp>
-        <p:sp>
-          <p:nvSpPr>
-            <p:cNvPr id="37" name="Flowchart: Extract 36"/>
-            <p:cNvSpPr/>
-            <p:nvPr/>
-          </p:nvSpPr>
-          <p:spPr>
-            <a:xfrm>
-              <a:off x="2031999" y="1665519"/>
-              <a:ext cx="7874002" cy="718965"/>
-            </a:xfrm>
-            <a:prstGeom prst="flowChartExtract">
-              <a:avLst/>
-            </a:prstGeom>
-            <a:pattFill prst="pct60">
-              <a:fgClr>
-                <a:schemeClr val="bg2">
-                  <a:lumMod val="90000"/>
-                </a:schemeClr>
-              </a:fgClr>
-              <a:bgClr>
-                <a:srgbClr val="92D050"/>
-              </a:bgClr>
-            </a:pattFill>
-            <a:ln>
-              <a:solidFill>
-                <a:schemeClr val="tx1"/>
-              </a:solidFill>
-            </a:ln>
-          </p:spPr>
-          <p:style>
-            <a:lnRef idx="2">
-              <a:schemeClr val="accent1">
-                <a:shade val="50000"/>
-              </a:schemeClr>
-            </a:lnRef>
-            <a:fillRef idx="1">
-              <a:schemeClr val="accent1"/>
-            </a:fillRef>
-            <a:effectRef idx="0">
-              <a:schemeClr val="accent1"/>
-            </a:effectRef>
-            <a:fontRef idx="minor">
-              <a:schemeClr val="lt1"/>
-            </a:fontRef>
-          </p:style>
-          <p:txBody>
-            <a:bodyPr rtlCol="0" anchor="ctr"/>
-            <a:lstStyle/>
-            <a:p>
-              <a:pPr algn="ctr"/>
-              <a:endParaRPr lang="en-US"/>
-            </a:p>
-          </p:txBody>
-        </p:sp>
-      </p:grpSp>
+            </a:solidFill>
+          </a:ln>
+        </p:spPr>
+        <p:style>
+          <a:lnRef idx="1">
+            <a:schemeClr val="accent4"/>
+          </a:lnRef>
+          <a:fillRef idx="2">
+            <a:schemeClr val="accent4"/>
+          </a:fillRef>
+          <a:effectRef idx="1">
+            <a:schemeClr val="accent4"/>
+          </a:effectRef>
+          <a:fontRef idx="minor">
+            <a:schemeClr val="dk1"/>
+          </a:fontRef>
+        </p:style>
+        <p:txBody>
+          <a:bodyPr spcFirstLastPara="0" vert="horz" wrap="square" lIns="200936" tIns="120926" rIns="200936" bIns="120926" numCol="1" spcCol="1270" anchor="ctr" anchorCtr="0">
+            <a:noAutofit/>
+          </a:bodyPr>
+          <a:lstStyle/>
+          <a:p>
+            <a:pPr lvl="0" algn="ctr" defTabSz="1866900">
+              <a:lnSpc>
+                <a:spcPct val="90000"/>
+              </a:lnSpc>
+              <a:spcBef>
+                <a:spcPct val="0"/>
+              </a:spcBef>
+              <a:spcAft>
+                <a:spcPct val="35000"/>
+              </a:spcAft>
+            </a:pPr>
+            <a:r>
+              <a:rPr lang="en-US" dirty="0" smtClean="0">
+                <a:ln w="12700">
+                  <a:noFill/>
+                </a:ln>
+              </a:rPr>
+              <a:t>User-defined JCas collections</a:t>
+            </a:r>
+            <a:endParaRPr lang="en-US" kern="1200" dirty="0">
+              <a:ln w="12700">
+                <a:noFill/>
+              </a:ln>
+            </a:endParaRPr>
+          </a:p>
+        </p:txBody>
+      </p:sp>
+      <p:cxnSp>
+        <p:nvCxnSpPr>
+          <p:cNvPr id="4" name="Straight Arrow Connector 3"/>
+          <p:cNvCxnSpPr>
+            <a:endCxn id="22" idx="0"/>
+          </p:cNvCxnSpPr>
+          <p:nvPr/>
+        </p:nvCxnSpPr>
+        <p:spPr>
+          <a:xfrm flipV="1">
+            <a:off x="5603946" y="2293180"/>
+            <a:ext cx="2353805" cy="25356"/>
+          </a:xfrm>
+          <a:prstGeom prst="straightConnector1">
+            <a:avLst/>
+          </a:prstGeom>
+          <a:ln>
+            <a:solidFill>
+              <a:schemeClr val="tx1"/>
+            </a:solidFill>
+            <a:tailEnd type="triangle" w="lg" len="lg"/>
+          </a:ln>
+        </p:spPr>
+        <p:style>
+          <a:lnRef idx="1">
+            <a:schemeClr val="accent1"/>
+          </a:lnRef>
+          <a:fillRef idx="0">
+            <a:schemeClr val="accent1"/>
+          </a:fillRef>
+          <a:effectRef idx="0">
+            <a:schemeClr val="accent1"/>
+          </a:effectRef>
+          <a:fontRef idx="minor">
+            <a:schemeClr val="tx1"/>
+          </a:fontRef>
+        </p:style>
+      </p:cxnSp>
+      <p:cxnSp>
+        <p:nvCxnSpPr>
+          <p:cNvPr id="12" name="Straight Arrow Connector 11"/>
+          <p:cNvCxnSpPr/>
+          <p:nvPr/>
+        </p:nvCxnSpPr>
+        <p:spPr>
+          <a:xfrm flipV="1">
+            <a:off x="5603946" y="2516589"/>
+            <a:ext cx="2353805" cy="515191"/>
+          </a:xfrm>
+          <a:prstGeom prst="straightConnector1">
+            <a:avLst/>
+          </a:prstGeom>
+          <a:ln>
+            <a:solidFill>
+              <a:schemeClr val="tx1"/>
+            </a:solidFill>
+            <a:tailEnd type="triangle" w="lg" len="lg"/>
+          </a:ln>
+        </p:spPr>
+        <p:style>
+          <a:lnRef idx="1">
+            <a:schemeClr val="accent1"/>
+          </a:lnRef>
+          <a:fillRef idx="0">
+            <a:schemeClr val="accent1"/>
+          </a:fillRef>
+          <a:effectRef idx="0">
+            <a:schemeClr val="accent1"/>
+          </a:effectRef>
+          <a:fontRef idx="minor">
+            <a:schemeClr val="tx1"/>
+          </a:fontRef>
+        </p:style>
+      </p:cxnSp>
+      <p:cxnSp>
+        <p:nvCxnSpPr>
+          <p:cNvPr id="16" name="Straight Arrow Connector 15"/>
+          <p:cNvCxnSpPr/>
+          <p:nvPr/>
+        </p:nvCxnSpPr>
+        <p:spPr>
+          <a:xfrm flipV="1">
+            <a:off x="5603946" y="3787030"/>
+            <a:ext cx="371011" cy="150403"/>
+          </a:xfrm>
+          <a:prstGeom prst="straightConnector1">
+            <a:avLst/>
+          </a:prstGeom>
+          <a:ln>
+            <a:solidFill>
+              <a:schemeClr val="tx1"/>
+            </a:solidFill>
+            <a:tailEnd type="triangle" w="lg" len="lg"/>
+          </a:ln>
+        </p:spPr>
+        <p:style>
+          <a:lnRef idx="1">
+            <a:schemeClr val="accent1"/>
+          </a:lnRef>
+          <a:fillRef idx="0">
+            <a:schemeClr val="accent1"/>
+          </a:fillRef>
+          <a:effectRef idx="0">
+            <a:schemeClr val="accent1"/>
+          </a:effectRef>
+          <a:fontRef idx="minor">
+            <a:schemeClr val="tx1"/>
+          </a:fontRef>
+        </p:style>
+      </p:cxnSp>
+      <p:cxnSp>
+        <p:nvCxnSpPr>
+          <p:cNvPr id="31" name="Straight Arrow Connector 30"/>
+          <p:cNvCxnSpPr>
+            <a:stCxn id="21" idx="3"/>
+          </p:cNvCxnSpPr>
+          <p:nvPr/>
+        </p:nvCxnSpPr>
+        <p:spPr>
+          <a:xfrm flipV="1">
+            <a:off x="7412147" y="2776796"/>
+            <a:ext cx="537362" cy="640366"/>
+          </a:xfrm>
+          <a:prstGeom prst="straightConnector1">
+            <a:avLst/>
+          </a:prstGeom>
+          <a:ln>
+            <a:solidFill>
+              <a:schemeClr val="tx1"/>
+            </a:solidFill>
+            <a:tailEnd type="triangle" w="lg" len="lg"/>
+          </a:ln>
+        </p:spPr>
+        <p:style>
+          <a:lnRef idx="1">
+            <a:schemeClr val="accent1"/>
+          </a:lnRef>
+          <a:fillRef idx="0">
+            <a:schemeClr val="accent1"/>
+          </a:fillRef>
+          <a:effectRef idx="0">
+            <a:schemeClr val="accent1"/>
+          </a:effectRef>
+          <a:fontRef idx="minor">
+            <a:schemeClr val="tx1"/>
+          </a:fontRef>
+        </p:style>
+      </p:cxnSp>
+      <p:cxnSp>
+        <p:nvCxnSpPr>
+          <p:cNvPr id="39" name="Elbow Connector 38"/>
+          <p:cNvCxnSpPr>
+            <a:endCxn id="22" idx="7"/>
+          </p:cNvCxnSpPr>
+          <p:nvPr/>
+        </p:nvCxnSpPr>
+        <p:spPr>
+          <a:xfrm flipV="1">
+            <a:off x="6283566" y="3408566"/>
+            <a:ext cx="1674185" cy="1440711"/>
+          </a:xfrm>
+          <a:prstGeom prst="bentConnector3">
+            <a:avLst>
+              <a:gd name="adj1" fmla="val 82372"/>
+            </a:avLst>
+          </a:prstGeom>
+          <a:ln>
+            <a:solidFill>
+              <a:schemeClr val="tx1"/>
+            </a:solidFill>
+            <a:tailEnd type="triangle" w="lg" len="lg"/>
+          </a:ln>
+        </p:spPr>
+        <p:style>
+          <a:lnRef idx="1">
+            <a:schemeClr val="accent1"/>
+          </a:lnRef>
+          <a:fillRef idx="0">
+            <a:schemeClr val="accent1"/>
+          </a:fillRef>
+          <a:effectRef idx="0">
+            <a:schemeClr val="accent1"/>
+          </a:effectRef>
+          <a:fontRef idx="minor">
+            <a:schemeClr val="tx1"/>
+          </a:fontRef>
+        </p:style>
+      </p:cxnSp>
     </p:spTree>
     <p:extLst>
       <p:ext uri="{BB962C8B-B14F-4D97-AF65-F5344CB8AC3E}">

</xml_diff>

<commit_message>
no Jira, fix some formatting, clarify a few things.
git-svn-id: https://svn.apache.org/repos/asf/uima/uimaj/branches/experiment-v3-jcas@1781183 13f79535-47bb-0310-9956-ffa450edef68
</commit_message>
<xml_diff>
--- a/uima-docbook-v3-users-guide/src/image-source/source.pptx
+++ b/uima-docbook-v3-users-guide/src/image-source/source.pptx
@@ -4795,15 +4795,7 @@
         <a:p>
           <a:r>
             <a:rPr lang="en-US" dirty="0" smtClean="0"/>
-            <a:t>Run </a:t>
-          </a:r>
-          <a:r>
-            <a:rPr lang="en-US" dirty="0" err="1" smtClean="0"/>
-            <a:t>JcasGen</a:t>
-          </a:r>
-          <a:r>
-            <a:rPr lang="en-US" dirty="0" smtClean="0"/>
-            <a:t> to get the initial prototype for this class</a:t>
+            <a:t>Run JCasGen to get the initial prototype for this class</a:t>
           </a:r>
           <a:endParaRPr lang="en-US" dirty="0"/>
         </a:p>
@@ -5043,10 +5035,235 @@
     <dgm:pt modelId="{610CFC5F-F71C-4609-85E3-4E91E6BA23BD}" type="parTrans" cxnId="{7BDA078E-243E-45A0-9FB4-5D016FD867D9}">
       <dgm:prSet/>
       <dgm:spPr/>
+      <dgm:t>
+        <a:bodyPr/>
+        <a:lstStyle/>
+        <a:p>
+          <a:endParaRPr lang="en-US"/>
+        </a:p>
+      </dgm:t>
     </dgm:pt>
     <dgm:pt modelId="{E3EEB503-89BB-4F57-ABCB-E98D699C4B6A}" type="sibTrans" cxnId="{7BDA078E-243E-45A0-9FB4-5D016FD867D9}">
       <dgm:prSet/>
       <dgm:spPr/>
+      <dgm:t>
+        <a:bodyPr/>
+        <a:lstStyle/>
+        <a:p>
+          <a:endParaRPr lang="en-US"/>
+        </a:p>
+      </dgm:t>
+    </dgm:pt>
+    <dgm:pt modelId="{24646FDE-A7A6-49C9-B6D3-A7746FBE23FD}">
+      <dgm:prSet phldrT="[Text]">
+        <dgm:style>
+          <a:lnRef idx="1">
+            <a:schemeClr val="accent1"/>
+          </a:lnRef>
+          <a:fillRef idx="2">
+            <a:schemeClr val="accent1"/>
+          </a:fillRef>
+          <a:effectRef idx="1">
+            <a:schemeClr val="accent1"/>
+          </a:effectRef>
+          <a:fontRef idx="minor">
+            <a:schemeClr val="dk1"/>
+          </a:fontRef>
+        </dgm:style>
+      </dgm:prSet>
+      <dgm:spPr>
+        <a:noFill/>
+        <a:ln w="12700">
+          <a:noFill/>
+        </a:ln>
+      </dgm:spPr>
+      <dgm:t>
+        <a:bodyPr/>
+        <a:lstStyle/>
+        <a:p>
+          <a:r>
+            <a:rPr lang="en-US" dirty="0" smtClean="0"/>
+            <a:t>(optional)</a:t>
+          </a:r>
+          <a:endParaRPr lang="en-US" dirty="0"/>
+        </a:p>
+      </dgm:t>
+    </dgm:pt>
+    <dgm:pt modelId="{F2C4528D-A411-4968-8DE0-CE26438227E0}" type="parTrans" cxnId="{C881AC3F-7B2C-4328-8138-82D51AEAF5B8}">
+      <dgm:prSet/>
+      <dgm:spPr/>
+      <dgm:t>
+        <a:bodyPr/>
+        <a:lstStyle/>
+        <a:p>
+          <a:endParaRPr lang="en-US"/>
+        </a:p>
+      </dgm:t>
+    </dgm:pt>
+    <dgm:pt modelId="{6EF50196-3068-4C6C-BE7E-721736B91853}" type="sibTrans" cxnId="{C881AC3F-7B2C-4328-8138-82D51AEAF5B8}">
+      <dgm:prSet/>
+      <dgm:spPr/>
+      <dgm:t>
+        <a:bodyPr/>
+        <a:lstStyle/>
+        <a:p>
+          <a:endParaRPr lang="en-US"/>
+        </a:p>
+      </dgm:t>
+    </dgm:pt>
+    <dgm:pt modelId="{573A4C89-B15D-436D-AD79-383E719631BF}">
+      <dgm:prSet phldrT="[Text]">
+        <dgm:style>
+          <a:lnRef idx="1">
+            <a:schemeClr val="accent1"/>
+          </a:lnRef>
+          <a:fillRef idx="2">
+            <a:schemeClr val="accent1"/>
+          </a:fillRef>
+          <a:effectRef idx="1">
+            <a:schemeClr val="accent1"/>
+          </a:effectRef>
+          <a:fontRef idx="minor">
+            <a:schemeClr val="dk1"/>
+          </a:fontRef>
+        </dgm:style>
+      </dgm:prSet>
+      <dgm:spPr>
+        <a:gradFill rotWithShape="0">
+          <a:gsLst>
+            <a:gs pos="0">
+              <a:srgbClr val="00B0F0">
+                <a:alpha val="25000"/>
+                <a:lumMod val="50000"/>
+                <a:lumOff val="50000"/>
+              </a:srgbClr>
+            </a:gs>
+            <a:gs pos="100000">
+              <a:srgbClr val="00B0F0">
+                <a:alpha val="50000"/>
+                <a:lumMod val="75000"/>
+                <a:lumOff val="25000"/>
+              </a:srgbClr>
+            </a:gs>
+          </a:gsLst>
+          <a:lin ang="2400000" scaled="0"/>
+        </a:gradFill>
+        <a:ln w="12700">
+          <a:solidFill>
+            <a:schemeClr val="tx1"/>
+          </a:solidFill>
+        </a:ln>
+      </dgm:spPr>
+      <dgm:t>
+        <a:bodyPr/>
+        <a:lstStyle/>
+        <a:p>
+          <a:r>
+            <a:rPr lang="en-US" dirty="0" smtClean="0"/>
+            <a:t>Support Select</a:t>
+          </a:r>
+          <a:endParaRPr lang="en-US" dirty="0"/>
+        </a:p>
+      </dgm:t>
+    </dgm:pt>
+    <dgm:pt modelId="{FBABB7F8-7BB2-4F2B-9D7D-794C04E8475E}" type="parTrans" cxnId="{E974D44E-55F7-4455-8565-A8AA0E6A338B}">
+      <dgm:prSet/>
+      <dgm:spPr/>
+      <dgm:t>
+        <a:bodyPr/>
+        <a:lstStyle/>
+        <a:p>
+          <a:endParaRPr lang="en-US"/>
+        </a:p>
+      </dgm:t>
+    </dgm:pt>
+    <dgm:pt modelId="{F6E17F33-A769-4554-8809-8A4F4FB5CD71}" type="sibTrans" cxnId="{E974D44E-55F7-4455-8565-A8AA0E6A338B}">
+      <dgm:prSet/>
+      <dgm:spPr/>
+      <dgm:t>
+        <a:bodyPr/>
+        <a:lstStyle/>
+        <a:p>
+          <a:endParaRPr lang="en-US"/>
+        </a:p>
+      </dgm:t>
+    </dgm:pt>
+    <dgm:pt modelId="{881A90BF-7FCA-4536-A458-EBB6A0309B15}">
+      <dgm:prSet phldrT="[Text]">
+        <dgm:style>
+          <a:lnRef idx="1">
+            <a:schemeClr val="accent1"/>
+          </a:lnRef>
+          <a:fillRef idx="2">
+            <a:schemeClr val="accent1"/>
+          </a:fillRef>
+          <a:effectRef idx="1">
+            <a:schemeClr val="accent1"/>
+          </a:effectRef>
+          <a:fontRef idx="minor">
+            <a:schemeClr val="dk1"/>
+          </a:fontRef>
+        </dgm:style>
+      </dgm:prSet>
+      <dgm:spPr>
+        <a:gradFill rotWithShape="0">
+          <a:gsLst>
+            <a:gs pos="0">
+              <a:srgbClr val="00B0F0">
+                <a:alpha val="25000"/>
+                <a:lumMod val="50000"/>
+                <a:lumOff val="50000"/>
+              </a:srgbClr>
+            </a:gs>
+            <a:gs pos="100000">
+              <a:srgbClr val="00B0F0">
+                <a:alpha val="50000"/>
+                <a:lumMod val="75000"/>
+                <a:lumOff val="25000"/>
+              </a:srgbClr>
+            </a:gs>
+          </a:gsLst>
+          <a:lin ang="2400000" scaled="0"/>
+        </a:gradFill>
+        <a:ln w="12700">
+          <a:solidFill>
+            <a:schemeClr val="tx1"/>
+          </a:solidFill>
+        </a:ln>
+      </dgm:spPr>
+      <dgm:t>
+        <a:bodyPr/>
+        <a:lstStyle/>
+        <a:p>
+          <a:r>
+            <a:rPr lang="en-US" smtClean="0"/>
+            <a:t>Implement SelectViaCopyToArray</a:t>
+          </a:r>
+          <a:endParaRPr lang="en-US" dirty="0"/>
+        </a:p>
+      </dgm:t>
+    </dgm:pt>
+    <dgm:pt modelId="{5B06E933-CF23-4DE2-AA71-A572D9BD2215}" type="parTrans" cxnId="{BC6F89CC-641D-4584-9884-9BDE13E7F31D}">
+      <dgm:prSet/>
+      <dgm:spPr/>
+      <dgm:t>
+        <a:bodyPr/>
+        <a:lstStyle/>
+        <a:p>
+          <a:endParaRPr lang="en-US"/>
+        </a:p>
+      </dgm:t>
+    </dgm:pt>
+    <dgm:pt modelId="{B696E601-4C26-469A-886E-60122FC4CA59}" type="sibTrans" cxnId="{BC6F89CC-641D-4584-9884-9BDE13E7F31D}">
+      <dgm:prSet/>
+      <dgm:spPr/>
+      <dgm:t>
+        <a:bodyPr/>
+        <a:lstStyle/>
+        <a:p>
+          <a:endParaRPr lang="en-US"/>
+        </a:p>
+      </dgm:t>
     </dgm:pt>
     <dgm:pt modelId="{3FB101F4-D626-4CB9-B46F-A5D1E728A3EF}" type="pres">
       <dgm:prSet presAssocID="{71C4F53D-73F7-43C0-8068-C97792B04C36}" presName="Name0" presStyleCnt="0">
@@ -5070,7 +5287,7 @@
       <dgm:spPr/>
     </dgm:pt>
     <dgm:pt modelId="{7750B759-A213-40FA-BEB4-4C184A1AF0F6}" type="pres">
-      <dgm:prSet presAssocID="{DE6D2516-4118-4481-9AE1-239E68CF98D2}" presName="parTx" presStyleLbl="revTx" presStyleIdx="0" presStyleCnt="5">
+      <dgm:prSet presAssocID="{DE6D2516-4118-4481-9AE1-239E68CF98D2}" presName="parTx" presStyleLbl="revTx" presStyleIdx="0" presStyleCnt="6">
         <dgm:presLayoutVars>
           <dgm:chMax val="1"/>
           <dgm:bulletEnabled val="1"/>
@@ -5086,7 +5303,7 @@
       </dgm:t>
     </dgm:pt>
     <dgm:pt modelId="{43C750AB-DAD2-4C07-9CAF-0A2F6A1FA388}" type="pres">
-      <dgm:prSet presAssocID="{DE6D2516-4118-4481-9AE1-239E68CF98D2}" presName="bracket" presStyleLbl="parChTrans1D1" presStyleIdx="0" presStyleCnt="5"/>
+      <dgm:prSet presAssocID="{DE6D2516-4118-4481-9AE1-239E68CF98D2}" presName="bracket" presStyleLbl="parChTrans1D1" presStyleIdx="0" presStyleCnt="6"/>
       <dgm:spPr/>
     </dgm:pt>
     <dgm:pt modelId="{BECBF111-CED3-47AA-B4FC-C2FF52F882A2}" type="pres">
@@ -5094,7 +5311,7 @@
       <dgm:spPr/>
     </dgm:pt>
     <dgm:pt modelId="{446D2CC6-7E84-42BD-AD30-32D47A0F0399}" type="pres">
-      <dgm:prSet presAssocID="{DE6D2516-4118-4481-9AE1-239E68CF98D2}" presName="desTx" presStyleLbl="node1" presStyleIdx="0" presStyleCnt="5">
+      <dgm:prSet presAssocID="{DE6D2516-4118-4481-9AE1-239E68CF98D2}" presName="desTx" presStyleLbl="node1" presStyleIdx="0" presStyleCnt="6">
         <dgm:presLayoutVars>
           <dgm:bulletEnabled val="1"/>
         </dgm:presLayoutVars>
@@ -5117,7 +5334,7 @@
       <dgm:spPr/>
     </dgm:pt>
     <dgm:pt modelId="{F7B03BAF-4A61-4897-885F-5DEDC69024C3}" type="pres">
-      <dgm:prSet presAssocID="{21C4817F-65F1-42DC-AEC0-8A3876F5CF6B}" presName="parTx" presStyleLbl="revTx" presStyleIdx="1" presStyleCnt="5">
+      <dgm:prSet presAssocID="{21C4817F-65F1-42DC-AEC0-8A3876F5CF6B}" presName="parTx" presStyleLbl="revTx" presStyleIdx="1" presStyleCnt="6">
         <dgm:presLayoutVars>
           <dgm:chMax val="1"/>
           <dgm:bulletEnabled val="1"/>
@@ -5133,7 +5350,7 @@
       </dgm:t>
     </dgm:pt>
     <dgm:pt modelId="{BEB0E3EA-8B29-4C3D-AD33-C275354954B4}" type="pres">
-      <dgm:prSet presAssocID="{21C4817F-65F1-42DC-AEC0-8A3876F5CF6B}" presName="bracket" presStyleLbl="parChTrans1D1" presStyleIdx="1" presStyleCnt="5"/>
+      <dgm:prSet presAssocID="{21C4817F-65F1-42DC-AEC0-8A3876F5CF6B}" presName="bracket" presStyleLbl="parChTrans1D1" presStyleIdx="1" presStyleCnt="6"/>
       <dgm:spPr/>
     </dgm:pt>
     <dgm:pt modelId="{7ADAD0CA-BB6E-497F-8FCB-C0AAD91049E5}" type="pres">
@@ -5141,7 +5358,7 @@
       <dgm:spPr/>
     </dgm:pt>
     <dgm:pt modelId="{D35AC0B4-0EA2-4E5A-8208-E9F15E287E2B}" type="pres">
-      <dgm:prSet presAssocID="{21C4817F-65F1-42DC-AEC0-8A3876F5CF6B}" presName="desTx" presStyleLbl="node1" presStyleIdx="1" presStyleCnt="5">
+      <dgm:prSet presAssocID="{21C4817F-65F1-42DC-AEC0-8A3876F5CF6B}" presName="desTx" presStyleLbl="node1" presStyleIdx="1" presStyleCnt="6">
         <dgm:presLayoutVars>
           <dgm:bulletEnabled val="1"/>
         </dgm:presLayoutVars>
@@ -5164,7 +5381,7 @@
       <dgm:spPr/>
     </dgm:pt>
     <dgm:pt modelId="{786962EE-063A-444D-9F24-DA8806182FC3}" type="pres">
-      <dgm:prSet presAssocID="{0A2BB538-E9A2-40F3-BA82-76728829BBBF}" presName="parTx" presStyleLbl="revTx" presStyleIdx="2" presStyleCnt="5">
+      <dgm:prSet presAssocID="{0A2BB538-E9A2-40F3-BA82-76728829BBBF}" presName="parTx" presStyleLbl="revTx" presStyleIdx="2" presStyleCnt="6">
         <dgm:presLayoutVars>
           <dgm:chMax val="1"/>
           <dgm:bulletEnabled val="1"/>
@@ -5180,7 +5397,7 @@
       </dgm:t>
     </dgm:pt>
     <dgm:pt modelId="{15C7BA9C-CF1F-4900-91E5-B2B5C4E3CC1C}" type="pres">
-      <dgm:prSet presAssocID="{0A2BB538-E9A2-40F3-BA82-76728829BBBF}" presName="bracket" presStyleLbl="parChTrans1D1" presStyleIdx="2" presStyleCnt="5"/>
+      <dgm:prSet presAssocID="{0A2BB538-E9A2-40F3-BA82-76728829BBBF}" presName="bracket" presStyleLbl="parChTrans1D1" presStyleIdx="2" presStyleCnt="6"/>
       <dgm:spPr/>
     </dgm:pt>
     <dgm:pt modelId="{3E495D8E-5B38-4DBA-878D-9CE1A5D1112E}" type="pres">
@@ -5188,7 +5405,7 @@
       <dgm:spPr/>
     </dgm:pt>
     <dgm:pt modelId="{79FE4C6C-0939-4E76-8471-EC38D3CAFE0F}" type="pres">
-      <dgm:prSet presAssocID="{0A2BB538-E9A2-40F3-BA82-76728829BBBF}" presName="desTx" presStyleLbl="node1" presStyleIdx="2" presStyleCnt="5">
+      <dgm:prSet presAssocID="{0A2BB538-E9A2-40F3-BA82-76728829BBBF}" presName="desTx" presStyleLbl="node1" presStyleIdx="2" presStyleCnt="6">
         <dgm:presLayoutVars>
           <dgm:bulletEnabled val="1"/>
         </dgm:presLayoutVars>
@@ -5211,7 +5428,7 @@
       <dgm:spPr/>
     </dgm:pt>
     <dgm:pt modelId="{BA2B4D5C-F1D5-4206-89F2-1A674F6ECC6F}" type="pres">
-      <dgm:prSet presAssocID="{B442EC3C-8DB9-4C63-A99D-58A8EAEE2802}" presName="parTx" presStyleLbl="revTx" presStyleIdx="3" presStyleCnt="5">
+      <dgm:prSet presAssocID="{B442EC3C-8DB9-4C63-A99D-58A8EAEE2802}" presName="parTx" presStyleLbl="revTx" presStyleIdx="3" presStyleCnt="6">
         <dgm:presLayoutVars>
           <dgm:chMax val="1"/>
           <dgm:bulletEnabled val="1"/>
@@ -5227,7 +5444,7 @@
       </dgm:t>
     </dgm:pt>
     <dgm:pt modelId="{D66DA694-36E9-4D92-82B6-8C5FDBDB073A}" type="pres">
-      <dgm:prSet presAssocID="{B442EC3C-8DB9-4C63-A99D-58A8EAEE2802}" presName="bracket" presStyleLbl="parChTrans1D1" presStyleIdx="3" presStyleCnt="5"/>
+      <dgm:prSet presAssocID="{B442EC3C-8DB9-4C63-A99D-58A8EAEE2802}" presName="bracket" presStyleLbl="parChTrans1D1" presStyleIdx="3" presStyleCnt="6"/>
       <dgm:spPr/>
     </dgm:pt>
     <dgm:pt modelId="{ADE4C9D3-BFE9-4E5E-ACD4-56E0B92931C8}" type="pres">
@@ -5235,7 +5452,7 @@
       <dgm:spPr/>
     </dgm:pt>
     <dgm:pt modelId="{CAF7A30C-32B5-439A-AD55-840996077434}" type="pres">
-      <dgm:prSet presAssocID="{B442EC3C-8DB9-4C63-A99D-58A8EAEE2802}" presName="desTx" presStyleLbl="node1" presStyleIdx="3" presStyleCnt="5">
+      <dgm:prSet presAssocID="{B442EC3C-8DB9-4C63-A99D-58A8EAEE2802}" presName="desTx" presStyleLbl="node1" presStyleIdx="3" presStyleCnt="6">
         <dgm:presLayoutVars>
           <dgm:bulletEnabled val="1"/>
         </dgm:presLayoutVars>
@@ -5258,7 +5475,7 @@
       <dgm:spPr/>
     </dgm:pt>
     <dgm:pt modelId="{FF5960F5-4FEE-476C-A20A-30D655E9D5D1}" type="pres">
-      <dgm:prSet presAssocID="{1E4B0BD3-5642-4823-B6A4-04352150942B}" presName="parTx" presStyleLbl="revTx" presStyleIdx="4" presStyleCnt="5">
+      <dgm:prSet presAssocID="{1E4B0BD3-5642-4823-B6A4-04352150942B}" presName="parTx" presStyleLbl="revTx" presStyleIdx="4" presStyleCnt="6">
         <dgm:presLayoutVars>
           <dgm:chMax val="1"/>
           <dgm:bulletEnabled val="1"/>
@@ -5274,7 +5491,7 @@
       </dgm:t>
     </dgm:pt>
     <dgm:pt modelId="{50D48225-666A-40A3-BF9F-60CC702DB955}" type="pres">
-      <dgm:prSet presAssocID="{1E4B0BD3-5642-4823-B6A4-04352150942B}" presName="bracket" presStyleLbl="parChTrans1D1" presStyleIdx="4" presStyleCnt="5"/>
+      <dgm:prSet presAssocID="{1E4B0BD3-5642-4823-B6A4-04352150942B}" presName="bracket" presStyleLbl="parChTrans1D1" presStyleIdx="4" presStyleCnt="6"/>
       <dgm:spPr/>
     </dgm:pt>
     <dgm:pt modelId="{C582106F-D2C2-490B-AD2A-ACD26BC0D750}" type="pres">
@@ -5282,7 +5499,54 @@
       <dgm:spPr/>
     </dgm:pt>
     <dgm:pt modelId="{82C1E690-C8C5-481D-98BD-DA98E4A16FE5}" type="pres">
-      <dgm:prSet presAssocID="{1E4B0BD3-5642-4823-B6A4-04352150942B}" presName="desTx" presStyleLbl="node1" presStyleIdx="4" presStyleCnt="5">
+      <dgm:prSet presAssocID="{1E4B0BD3-5642-4823-B6A4-04352150942B}" presName="desTx" presStyleLbl="node1" presStyleIdx="4" presStyleCnt="6">
+        <dgm:presLayoutVars>
+          <dgm:bulletEnabled val="1"/>
+        </dgm:presLayoutVars>
+      </dgm:prSet>
+      <dgm:spPr/>
+      <dgm:t>
+        <a:bodyPr/>
+        <a:lstStyle/>
+        <a:p>
+          <a:endParaRPr lang="en-US"/>
+        </a:p>
+      </dgm:t>
+    </dgm:pt>
+    <dgm:pt modelId="{3D1BBA5C-FB3C-4CBE-84BD-4456BF042B20}" type="pres">
+      <dgm:prSet presAssocID="{F559ED90-7F33-4E03-9F77-C34595E03981}" presName="spV" presStyleCnt="0"/>
+      <dgm:spPr/>
+    </dgm:pt>
+    <dgm:pt modelId="{BB7620A0-7830-45D8-B1D1-5BE0854AD1FC}" type="pres">
+      <dgm:prSet presAssocID="{24646FDE-A7A6-49C9-B6D3-A7746FBE23FD}" presName="linNode" presStyleCnt="0"/>
+      <dgm:spPr/>
+    </dgm:pt>
+    <dgm:pt modelId="{865354EB-F09A-4BEF-9288-CED6E42B7F5F}" type="pres">
+      <dgm:prSet presAssocID="{24646FDE-A7A6-49C9-B6D3-A7746FBE23FD}" presName="parTx" presStyleLbl="revTx" presStyleIdx="5" presStyleCnt="6">
+        <dgm:presLayoutVars>
+          <dgm:chMax val="1"/>
+          <dgm:bulletEnabled val="1"/>
+        </dgm:presLayoutVars>
+      </dgm:prSet>
+      <dgm:spPr/>
+      <dgm:t>
+        <a:bodyPr/>
+        <a:lstStyle/>
+        <a:p>
+          <a:endParaRPr lang="en-US"/>
+        </a:p>
+      </dgm:t>
+    </dgm:pt>
+    <dgm:pt modelId="{EBE01F4D-61AC-4040-9EDE-4466A6279156}" type="pres">
+      <dgm:prSet presAssocID="{24646FDE-A7A6-49C9-B6D3-A7746FBE23FD}" presName="bracket" presStyleLbl="parChTrans1D1" presStyleIdx="5" presStyleCnt="6"/>
+      <dgm:spPr/>
+    </dgm:pt>
+    <dgm:pt modelId="{61088FF2-9756-4606-AB52-1FF293EED3D0}" type="pres">
+      <dgm:prSet presAssocID="{24646FDE-A7A6-49C9-B6D3-A7746FBE23FD}" presName="spH" presStyleCnt="0"/>
+      <dgm:spPr/>
+    </dgm:pt>
+    <dgm:pt modelId="{8BBB3DE3-53A4-455F-BA3A-A24D00B6F76E}" type="pres">
+      <dgm:prSet presAssocID="{24646FDE-A7A6-49C9-B6D3-A7746FBE23FD}" presName="desTx" presStyleLbl="node1" presStyleIdx="5" presStyleCnt="6">
         <dgm:presLayoutVars>
           <dgm:bulletEnabled val="1"/>
         </dgm:presLayoutVars>
@@ -5298,35 +5562,41 @@
     </dgm:pt>
   </dgm:ptLst>
   <dgm:cxnLst>
+    <dgm:cxn modelId="{0CD0F2D8-6DCD-4F3D-8ADE-ABB364EBC543}" srcId="{71C4F53D-73F7-43C0-8068-C97792B04C36}" destId="{1E4B0BD3-5642-4823-B6A4-04352150942B}" srcOrd="4" destOrd="0" parTransId="{E79CB9DB-6B06-4ABA-8770-B4212675838B}" sibTransId="{F559ED90-7F33-4E03-9F77-C34595E03981}"/>
+    <dgm:cxn modelId="{C881AC3F-7B2C-4328-8138-82D51AEAF5B8}" srcId="{71C4F53D-73F7-43C0-8068-C97792B04C36}" destId="{24646FDE-A7A6-49C9-B6D3-A7746FBE23FD}" srcOrd="5" destOrd="0" parTransId="{F2C4528D-A411-4968-8DE0-CE26438227E0}" sibTransId="{6EF50196-3068-4C6C-BE7E-721736B91853}"/>
+    <dgm:cxn modelId="{0B7039BD-7F96-4664-9AC3-77425F9607C6}" srcId="{71C4F53D-73F7-43C0-8068-C97792B04C36}" destId="{21C4817F-65F1-42DC-AEC0-8A3876F5CF6B}" srcOrd="1" destOrd="0" parTransId="{BCFF8BE3-7893-4363-92EB-DB424B6C8284}" sibTransId="{49C5D47E-F908-429B-A1A4-3B10CF93975A}"/>
+    <dgm:cxn modelId="{E974D44E-55F7-4455-8565-A8AA0E6A338B}" srcId="{24646FDE-A7A6-49C9-B6D3-A7746FBE23FD}" destId="{573A4C89-B15D-436D-AD79-383E719631BF}" srcOrd="0" destOrd="0" parTransId="{FBABB7F8-7BB2-4F2B-9D7D-794C04E8475E}" sibTransId="{F6E17F33-A769-4554-8809-8A4F4FB5CD71}"/>
+    <dgm:cxn modelId="{79CDB838-F679-4B1C-A773-E10676986FA3}" type="presOf" srcId="{699459BF-9F52-4253-B5ED-310473273EAB}" destId="{446D2CC6-7E84-42BD-AD30-32D47A0F0399}" srcOrd="0" destOrd="0" presId="urn:diagrams.loki3.com/BracketList"/>
+    <dgm:cxn modelId="{B42CF900-1AF2-40E5-BC06-6E0C0807F12F}" srcId="{DE6D2516-4118-4481-9AE1-239E68CF98D2}" destId="{C8E40756-9366-4A5B-9723-0598A69970E0}" srcOrd="2" destOrd="0" parTransId="{128A2309-F248-4823-A0B9-D7CB12CC1775}" sibTransId="{057B20A8-F038-437E-81E3-4AF3FAEBB302}"/>
+    <dgm:cxn modelId="{CB4426B8-C639-4F8B-916C-E9126ABB2581}" type="presOf" srcId="{05964A79-4725-4883-B839-DB50CA2A0D19}" destId="{D35AC0B4-0EA2-4E5A-8208-E9F15E287E2B}" srcOrd="0" destOrd="0" presId="urn:diagrams.loki3.com/BracketList"/>
+    <dgm:cxn modelId="{532888F1-D219-4FD3-8122-0B00C0AEB935}" srcId="{21C4817F-65F1-42DC-AEC0-8A3876F5CF6B}" destId="{05964A79-4725-4883-B839-DB50CA2A0D19}" srcOrd="0" destOrd="0" parTransId="{040CD8DF-5FD5-4DAB-8A45-F1DB1554849C}" sibTransId="{35CB8696-C443-418A-B1F0-94EB8919A29F}"/>
+    <dgm:cxn modelId="{D672D515-0195-46DF-84B2-580C0353061E}" srcId="{1E4B0BD3-5642-4823-B6A4-04352150942B}" destId="{497D0993-E84E-4510-AD28-62C51A318D82}" srcOrd="2" destOrd="0" parTransId="{79DA9500-5861-468E-99B2-0842D723D03C}" sibTransId="{2574475E-935E-4511-9547-7D5ACDB4FA29}"/>
+    <dgm:cxn modelId="{4CC13B6B-0E6E-432D-9108-128E5D91DE05}" srcId="{DE6D2516-4118-4481-9AE1-239E68CF98D2}" destId="{699459BF-9F52-4253-B5ED-310473273EAB}" srcOrd="0" destOrd="0" parTransId="{F8AB79B3-5B8A-49DD-8D81-C7C4BCD66DDD}" sibTransId="{78AE9A96-D090-4F74-8A5A-6706E6A31281}"/>
+    <dgm:cxn modelId="{6E70C445-2C7B-44D2-A1D4-23AE6EEC0801}" type="presOf" srcId="{573A4C89-B15D-436D-AD79-383E719631BF}" destId="{8BBB3DE3-53A4-455F-BA3A-A24D00B6F76E}" srcOrd="0" destOrd="0" presId="urn:diagrams.loki3.com/BracketList"/>
+    <dgm:cxn modelId="{D893A8DA-7E8E-465B-9619-FCF50A16B90F}" type="presOf" srcId="{24646FDE-A7A6-49C9-B6D3-A7746FBE23FD}" destId="{865354EB-F09A-4BEF-9288-CED6E42B7F5F}" srcOrd="0" destOrd="0" presId="urn:diagrams.loki3.com/BracketList"/>
     <dgm:cxn modelId="{F5B3F094-AACC-4C56-AA31-CCDF3304A544}" type="presOf" srcId="{1E4B0BD3-5642-4823-B6A4-04352150942B}" destId="{FF5960F5-4FEE-476C-A20A-30D655E9D5D1}" srcOrd="0" destOrd="0" presId="urn:diagrams.loki3.com/BracketList"/>
+    <dgm:cxn modelId="{96738B1D-A52D-4037-BD62-F43BE962A4C8}" type="presOf" srcId="{4A0F1DA1-DE38-4685-BB51-5B84C5F89053}" destId="{79FE4C6C-0939-4E76-8471-EC38D3CAFE0F}" srcOrd="0" destOrd="0" presId="urn:diagrams.loki3.com/BracketList"/>
+    <dgm:cxn modelId="{BE13A29D-4F5C-4A70-AD6D-72E3992DDA3B}" type="presOf" srcId="{B442EC3C-8DB9-4C63-A99D-58A8EAEE2802}" destId="{BA2B4D5C-F1D5-4206-89F2-1A674F6ECC6F}" srcOrd="0" destOrd="0" presId="urn:diagrams.loki3.com/BracketList"/>
     <dgm:cxn modelId="{FE54E0F5-D8DF-471D-85F0-76BDF08471AE}" type="presOf" srcId="{8A0E79FD-2837-4BFD-AC46-A82EA174AC4A}" destId="{CAF7A30C-32B5-439A-AD55-840996077434}" srcOrd="0" destOrd="0" presId="urn:diagrams.loki3.com/BracketList"/>
+    <dgm:cxn modelId="{2273A345-52DF-4A8B-9E47-08AA4E347DFA}" type="presOf" srcId="{21C4817F-65F1-42DC-AEC0-8A3876F5CF6B}" destId="{F7B03BAF-4A61-4897-885F-5DEDC69024C3}" srcOrd="0" destOrd="0" presId="urn:diagrams.loki3.com/BracketList"/>
+    <dgm:cxn modelId="{E708F748-6CB1-43D8-BE76-57A8EA7A9D98}" type="presOf" srcId="{881A90BF-7FCA-4536-A458-EBB6A0309B15}" destId="{8BBB3DE3-53A4-455F-BA3A-A24D00B6F76E}" srcOrd="0" destOrd="1" presId="urn:diagrams.loki3.com/BracketList"/>
+    <dgm:cxn modelId="{CDC8B92B-465A-4DF0-AABA-F04E27DA36F8}" srcId="{71C4F53D-73F7-43C0-8068-C97792B04C36}" destId="{DE6D2516-4118-4481-9AE1-239E68CF98D2}" srcOrd="0" destOrd="0" parTransId="{A4C3CBF8-74E7-4C81-A89F-610B6D1D3679}" sibTransId="{12AE46C6-7A59-448D-B86D-4297AEB7A754}"/>
+    <dgm:cxn modelId="{6C5CFD74-18E3-4EB1-B7FD-EEE4A1EC4E08}" type="presOf" srcId="{0A2BB538-E9A2-40F3-BA82-76728829BBBF}" destId="{786962EE-063A-444D-9F24-DA8806182FC3}" srcOrd="0" destOrd="0" presId="urn:diagrams.loki3.com/BracketList"/>
+    <dgm:cxn modelId="{B194201A-6F4A-4426-91A6-02F91E3EEA1F}" type="presOf" srcId="{DE6D2516-4118-4481-9AE1-239E68CF98D2}" destId="{7750B759-A213-40FA-BEB4-4C184A1AF0F6}" srcOrd="0" destOrd="0" presId="urn:diagrams.loki3.com/BracketList"/>
+    <dgm:cxn modelId="{55132EF4-AF34-467D-81C9-92CE7CD5C56C}" srcId="{B442EC3C-8DB9-4C63-A99D-58A8EAEE2802}" destId="{8A0E79FD-2837-4BFD-AC46-A82EA174AC4A}" srcOrd="0" destOrd="0" parTransId="{AD3B7FEB-B437-40F8-826B-CF4876EB1F3F}" sibTransId="{CCE41D1F-C35B-4D30-80B4-3CB0F19C92A4}"/>
+    <dgm:cxn modelId="{BCE7DD19-A062-479F-AC95-179080679FA3}" type="presOf" srcId="{774E5BB6-F157-406A-9CD7-C68B5D201872}" destId="{82C1E690-C8C5-481D-98BD-DA98E4A16FE5}" srcOrd="0" destOrd="1" presId="urn:diagrams.loki3.com/BracketList"/>
+    <dgm:cxn modelId="{7BDA078E-243E-45A0-9FB4-5D016FD867D9}" srcId="{1E4B0BD3-5642-4823-B6A4-04352150942B}" destId="{774E5BB6-F157-406A-9CD7-C68B5D201872}" srcOrd="1" destOrd="0" parTransId="{610CFC5F-F71C-4609-85E3-4E91E6BA23BD}" sibTransId="{E3EEB503-89BB-4F57-ABCB-E98D699C4B6A}"/>
+    <dgm:cxn modelId="{70FB38AE-14C2-4F49-9C69-6E0770251A65}" srcId="{DE6D2516-4118-4481-9AE1-239E68CF98D2}" destId="{A171A341-94B2-4D0E-A907-28EEDFED180C}" srcOrd="1" destOrd="0" parTransId="{794BA199-F8B9-420C-BC82-438436E7615C}" sibTransId="{A5867818-EBD0-4C68-B512-B0ED2157ED5B}"/>
     <dgm:cxn modelId="{45282E5A-FF3E-4E5C-A35F-EF95318CE13F}" type="presOf" srcId="{C8E40756-9366-4A5B-9723-0598A69970E0}" destId="{446D2CC6-7E84-42BD-AD30-32D47A0F0399}" srcOrd="0" destOrd="2" presId="urn:diagrams.loki3.com/BracketList"/>
-    <dgm:cxn modelId="{0CD0F2D8-6DCD-4F3D-8ADE-ABB364EBC543}" srcId="{71C4F53D-73F7-43C0-8068-C97792B04C36}" destId="{1E4B0BD3-5642-4823-B6A4-04352150942B}" srcOrd="4" destOrd="0" parTransId="{E79CB9DB-6B06-4ABA-8770-B4212675838B}" sibTransId="{F559ED90-7F33-4E03-9F77-C34595E03981}"/>
-    <dgm:cxn modelId="{532888F1-D219-4FD3-8122-0B00C0AEB935}" srcId="{21C4817F-65F1-42DC-AEC0-8A3876F5CF6B}" destId="{05964A79-4725-4883-B839-DB50CA2A0D19}" srcOrd="0" destOrd="0" parTransId="{040CD8DF-5FD5-4DAB-8A45-F1DB1554849C}" sibTransId="{35CB8696-C443-418A-B1F0-94EB8919A29F}"/>
-    <dgm:cxn modelId="{CB4426B8-C639-4F8B-916C-E9126ABB2581}" type="presOf" srcId="{05964A79-4725-4883-B839-DB50CA2A0D19}" destId="{D35AC0B4-0EA2-4E5A-8208-E9F15E287E2B}" srcOrd="0" destOrd="0" presId="urn:diagrams.loki3.com/BracketList"/>
-    <dgm:cxn modelId="{2273A345-52DF-4A8B-9E47-08AA4E347DFA}" type="presOf" srcId="{21C4817F-65F1-42DC-AEC0-8A3876F5CF6B}" destId="{F7B03BAF-4A61-4897-885F-5DEDC69024C3}" srcOrd="0" destOrd="0" presId="urn:diagrams.loki3.com/BracketList"/>
-    <dgm:cxn modelId="{BE13A29D-4F5C-4A70-AD6D-72E3992DDA3B}" type="presOf" srcId="{B442EC3C-8DB9-4C63-A99D-58A8EAEE2802}" destId="{BA2B4D5C-F1D5-4206-89F2-1A674F6ECC6F}" srcOrd="0" destOrd="0" presId="urn:diagrams.loki3.com/BracketList"/>
+    <dgm:cxn modelId="{CB4D371E-7619-41CC-8393-2BD5205FC1D4}" type="presOf" srcId="{3ECF5029-6465-4278-B12D-C24019B5ABED}" destId="{82C1E690-C8C5-481D-98BD-DA98E4A16FE5}" srcOrd="0" destOrd="0" presId="urn:diagrams.loki3.com/BracketList"/>
+    <dgm:cxn modelId="{C332B8DE-D2C8-4439-A58D-F94BA8E99C12}" srcId="{0A2BB538-E9A2-40F3-BA82-76728829BBBF}" destId="{4A0F1DA1-DE38-4685-BB51-5B84C5F89053}" srcOrd="0" destOrd="0" parTransId="{641B1121-467B-4A8B-9663-8649557FB65A}" sibTransId="{FFFC0C6C-F03B-4B7B-9781-ADA4B3AA4DCB}"/>
+    <dgm:cxn modelId="{4ACA428F-439F-447A-9419-7D258E36BA2C}" srcId="{71C4F53D-73F7-43C0-8068-C97792B04C36}" destId="{0A2BB538-E9A2-40F3-BA82-76728829BBBF}" srcOrd="2" destOrd="0" parTransId="{5043B0DE-DBFC-4188-BDC2-B808304C89B4}" sibTransId="{DDD00D69-B8C3-48AD-B53E-FE038DACC3AA}"/>
+    <dgm:cxn modelId="{866BA3BD-CBFD-49DB-B175-2CDDF4A7DD74}" type="presOf" srcId="{497D0993-E84E-4510-AD28-62C51A318D82}" destId="{82C1E690-C8C5-481D-98BD-DA98E4A16FE5}" srcOrd="0" destOrd="2" presId="urn:diagrams.loki3.com/BracketList"/>
     <dgm:cxn modelId="{6B6C317A-8573-404F-B7CF-4B3DC9C38DAD}" srcId="{71C4F53D-73F7-43C0-8068-C97792B04C36}" destId="{B442EC3C-8DB9-4C63-A99D-58A8EAEE2802}" srcOrd="3" destOrd="0" parTransId="{A1F5A16F-D5EE-4451-A9E0-C05030724E91}" sibTransId="{FA7938D0-BFA7-440A-8DB1-03BB25DAE2B1}"/>
-    <dgm:cxn modelId="{866BA3BD-CBFD-49DB-B175-2CDDF4A7DD74}" type="presOf" srcId="{497D0993-E84E-4510-AD28-62C51A318D82}" destId="{82C1E690-C8C5-481D-98BD-DA98E4A16FE5}" srcOrd="0" destOrd="2" presId="urn:diagrams.loki3.com/BracketList"/>
-    <dgm:cxn modelId="{70FB38AE-14C2-4F49-9C69-6E0770251A65}" srcId="{DE6D2516-4118-4481-9AE1-239E68CF98D2}" destId="{A171A341-94B2-4D0E-A907-28EEDFED180C}" srcOrd="1" destOrd="0" parTransId="{794BA199-F8B9-420C-BC82-438436E7615C}" sibTransId="{A5867818-EBD0-4C68-B512-B0ED2157ED5B}"/>
-    <dgm:cxn modelId="{4CC13B6B-0E6E-432D-9108-128E5D91DE05}" srcId="{DE6D2516-4118-4481-9AE1-239E68CF98D2}" destId="{699459BF-9F52-4253-B5ED-310473273EAB}" srcOrd="0" destOrd="0" parTransId="{F8AB79B3-5B8A-49DD-8D81-C7C4BCD66DDD}" sibTransId="{78AE9A96-D090-4F74-8A5A-6706E6A31281}"/>
-    <dgm:cxn modelId="{55132EF4-AF34-467D-81C9-92CE7CD5C56C}" srcId="{B442EC3C-8DB9-4C63-A99D-58A8EAEE2802}" destId="{8A0E79FD-2837-4BFD-AC46-A82EA174AC4A}" srcOrd="0" destOrd="0" parTransId="{AD3B7FEB-B437-40F8-826B-CF4876EB1F3F}" sibTransId="{CCE41D1F-C35B-4D30-80B4-3CB0F19C92A4}"/>
+    <dgm:cxn modelId="{BC6F89CC-641D-4584-9884-9BDE13E7F31D}" srcId="{573A4C89-B15D-436D-AD79-383E719631BF}" destId="{881A90BF-7FCA-4536-A458-EBB6A0309B15}" srcOrd="0" destOrd="0" parTransId="{5B06E933-CF23-4DE2-AA71-A572D9BD2215}" sibTransId="{B696E601-4C26-469A-886E-60122FC4CA59}"/>
+    <dgm:cxn modelId="{E42D2982-F621-4BDD-B985-53B4A3B91981}" srcId="{1E4B0BD3-5642-4823-B6A4-04352150942B}" destId="{3ECF5029-6465-4278-B12D-C24019B5ABED}" srcOrd="0" destOrd="0" parTransId="{18F02463-1224-4093-924E-5328E8169987}" sibTransId="{E2ABAD00-7A9A-4A4D-B190-95A5DD72979A}"/>
     <dgm:cxn modelId="{4154886C-0FAD-493B-AB1B-199296681F54}" type="presOf" srcId="{71C4F53D-73F7-43C0-8068-C97792B04C36}" destId="{3FB101F4-D626-4CB9-B46F-A5D1E728A3EF}" srcOrd="0" destOrd="0" presId="urn:diagrams.loki3.com/BracketList"/>
-    <dgm:cxn modelId="{BCE7DD19-A062-479F-AC95-179080679FA3}" type="presOf" srcId="{774E5BB6-F157-406A-9CD7-C68B5D201872}" destId="{82C1E690-C8C5-481D-98BD-DA98E4A16FE5}" srcOrd="0" destOrd="1" presId="urn:diagrams.loki3.com/BracketList"/>
-    <dgm:cxn modelId="{CDC8B92B-465A-4DF0-AABA-F04E27DA36F8}" srcId="{71C4F53D-73F7-43C0-8068-C97792B04C36}" destId="{DE6D2516-4118-4481-9AE1-239E68CF98D2}" srcOrd="0" destOrd="0" parTransId="{A4C3CBF8-74E7-4C81-A89F-610B6D1D3679}" sibTransId="{12AE46C6-7A59-448D-B86D-4297AEB7A754}"/>
-    <dgm:cxn modelId="{B194201A-6F4A-4426-91A6-02F91E3EEA1F}" type="presOf" srcId="{DE6D2516-4118-4481-9AE1-239E68CF98D2}" destId="{7750B759-A213-40FA-BEB4-4C184A1AF0F6}" srcOrd="0" destOrd="0" presId="urn:diagrams.loki3.com/BracketList"/>
-    <dgm:cxn modelId="{B42CF900-1AF2-40E5-BC06-6E0C0807F12F}" srcId="{DE6D2516-4118-4481-9AE1-239E68CF98D2}" destId="{C8E40756-9366-4A5B-9723-0598A69970E0}" srcOrd="2" destOrd="0" parTransId="{128A2309-F248-4823-A0B9-D7CB12CC1775}" sibTransId="{057B20A8-F038-437E-81E3-4AF3FAEBB302}"/>
-    <dgm:cxn modelId="{79CDB838-F679-4B1C-A773-E10676986FA3}" type="presOf" srcId="{699459BF-9F52-4253-B5ED-310473273EAB}" destId="{446D2CC6-7E84-42BD-AD30-32D47A0F0399}" srcOrd="0" destOrd="0" presId="urn:diagrams.loki3.com/BracketList"/>
-    <dgm:cxn modelId="{CB4D371E-7619-41CC-8393-2BD5205FC1D4}" type="presOf" srcId="{3ECF5029-6465-4278-B12D-C24019B5ABED}" destId="{82C1E690-C8C5-481D-98BD-DA98E4A16FE5}" srcOrd="0" destOrd="0" presId="urn:diagrams.loki3.com/BracketList"/>
-    <dgm:cxn modelId="{E42D2982-F621-4BDD-B985-53B4A3B91981}" srcId="{1E4B0BD3-5642-4823-B6A4-04352150942B}" destId="{3ECF5029-6465-4278-B12D-C24019B5ABED}" srcOrd="0" destOrd="0" parTransId="{18F02463-1224-4093-924E-5328E8169987}" sibTransId="{E2ABAD00-7A9A-4A4D-B190-95A5DD72979A}"/>
-    <dgm:cxn modelId="{0B7039BD-7F96-4664-9AC3-77425F9607C6}" srcId="{71C4F53D-73F7-43C0-8068-C97792B04C36}" destId="{21C4817F-65F1-42DC-AEC0-8A3876F5CF6B}" srcOrd="1" destOrd="0" parTransId="{BCFF8BE3-7893-4363-92EB-DB424B6C8284}" sibTransId="{49C5D47E-F908-429B-A1A4-3B10CF93975A}"/>
-    <dgm:cxn modelId="{D672D515-0195-46DF-84B2-580C0353061E}" srcId="{1E4B0BD3-5642-4823-B6A4-04352150942B}" destId="{497D0993-E84E-4510-AD28-62C51A318D82}" srcOrd="2" destOrd="0" parTransId="{79DA9500-5861-468E-99B2-0842D723D03C}" sibTransId="{2574475E-935E-4511-9547-7D5ACDB4FA29}"/>
-    <dgm:cxn modelId="{7BDA078E-243E-45A0-9FB4-5D016FD867D9}" srcId="{1E4B0BD3-5642-4823-B6A4-04352150942B}" destId="{774E5BB6-F157-406A-9CD7-C68B5D201872}" srcOrd="1" destOrd="0" parTransId="{610CFC5F-F71C-4609-85E3-4E91E6BA23BD}" sibTransId="{E3EEB503-89BB-4F57-ABCB-E98D699C4B6A}"/>
     <dgm:cxn modelId="{2FC1D945-5346-47DF-A4E2-ADCDB0C4B37E}" type="presOf" srcId="{A171A341-94B2-4D0E-A907-28EEDFED180C}" destId="{446D2CC6-7E84-42BD-AD30-32D47A0F0399}" srcOrd="0" destOrd="1" presId="urn:diagrams.loki3.com/BracketList"/>
-    <dgm:cxn modelId="{4ACA428F-439F-447A-9419-7D258E36BA2C}" srcId="{71C4F53D-73F7-43C0-8068-C97792B04C36}" destId="{0A2BB538-E9A2-40F3-BA82-76728829BBBF}" srcOrd="2" destOrd="0" parTransId="{5043B0DE-DBFC-4188-BDC2-B808304C89B4}" sibTransId="{DDD00D69-B8C3-48AD-B53E-FE038DACC3AA}"/>
-    <dgm:cxn modelId="{C332B8DE-D2C8-4439-A58D-F94BA8E99C12}" srcId="{0A2BB538-E9A2-40F3-BA82-76728829BBBF}" destId="{4A0F1DA1-DE38-4685-BB51-5B84C5F89053}" srcOrd="0" destOrd="0" parTransId="{641B1121-467B-4A8B-9663-8649557FB65A}" sibTransId="{FFFC0C6C-F03B-4B7B-9781-ADA4B3AA4DCB}"/>
-    <dgm:cxn modelId="{6C5CFD74-18E3-4EB1-B7FD-EEE4A1EC4E08}" type="presOf" srcId="{0A2BB538-E9A2-40F3-BA82-76728829BBBF}" destId="{786962EE-063A-444D-9F24-DA8806182FC3}" srcOrd="0" destOrd="0" presId="urn:diagrams.loki3.com/BracketList"/>
-    <dgm:cxn modelId="{96738B1D-A52D-4037-BD62-F43BE962A4C8}" type="presOf" srcId="{4A0F1DA1-DE38-4685-BB51-5B84C5F89053}" destId="{79FE4C6C-0939-4E76-8471-EC38D3CAFE0F}" srcOrd="0" destOrd="0" presId="urn:diagrams.loki3.com/BracketList"/>
     <dgm:cxn modelId="{B904621D-F8DF-4513-8C10-1C9A166DC18B}" type="presParOf" srcId="{3FB101F4-D626-4CB9-B46F-A5D1E728A3EF}" destId="{F98A47C1-84A5-4B2A-A53D-7AEAF6CEB80C}" srcOrd="0" destOrd="0" presId="urn:diagrams.loki3.com/BracketList"/>
     <dgm:cxn modelId="{E94CFDF8-F494-4A74-A039-CCC7735480DC}" type="presParOf" srcId="{F98A47C1-84A5-4B2A-A53D-7AEAF6CEB80C}" destId="{7750B759-A213-40FA-BEB4-4C184A1AF0F6}" srcOrd="0" destOrd="0" presId="urn:diagrams.loki3.com/BracketList"/>
     <dgm:cxn modelId="{CE13D388-5A36-4028-A286-9DD1D612FC58}" type="presParOf" srcId="{F98A47C1-84A5-4B2A-A53D-7AEAF6CEB80C}" destId="{43C750AB-DAD2-4C07-9CAF-0A2F6A1FA388}" srcOrd="1" destOrd="0" presId="urn:diagrams.loki3.com/BracketList"/>
@@ -5356,6 +5626,12 @@
     <dgm:cxn modelId="{DE15BC4E-542F-4605-B3C2-D078C3443C11}" type="presParOf" srcId="{DD1ED7DA-B442-4D08-BF55-D7ADFD08A7EE}" destId="{50D48225-666A-40A3-BF9F-60CC702DB955}" srcOrd="1" destOrd="0" presId="urn:diagrams.loki3.com/BracketList"/>
     <dgm:cxn modelId="{C44D31CA-546E-4456-8C24-F2669D40C1FE}" type="presParOf" srcId="{DD1ED7DA-B442-4D08-BF55-D7ADFD08A7EE}" destId="{C582106F-D2C2-490B-AD2A-ACD26BC0D750}" srcOrd="2" destOrd="0" presId="urn:diagrams.loki3.com/BracketList"/>
     <dgm:cxn modelId="{A6BF2541-BD2A-4FD5-B6D3-B6776112A4CA}" type="presParOf" srcId="{DD1ED7DA-B442-4D08-BF55-D7ADFD08A7EE}" destId="{82C1E690-C8C5-481D-98BD-DA98E4A16FE5}" srcOrd="3" destOrd="0" presId="urn:diagrams.loki3.com/BracketList"/>
+    <dgm:cxn modelId="{8F3017A1-3451-405C-8DB6-38E84E24EE36}" type="presParOf" srcId="{3FB101F4-D626-4CB9-B46F-A5D1E728A3EF}" destId="{3D1BBA5C-FB3C-4CBE-84BD-4456BF042B20}" srcOrd="9" destOrd="0" presId="urn:diagrams.loki3.com/BracketList"/>
+    <dgm:cxn modelId="{B492A80B-1DFF-4EF8-A82B-BF6B865C3F32}" type="presParOf" srcId="{3FB101F4-D626-4CB9-B46F-A5D1E728A3EF}" destId="{BB7620A0-7830-45D8-B1D1-5BE0854AD1FC}" srcOrd="10" destOrd="0" presId="urn:diagrams.loki3.com/BracketList"/>
+    <dgm:cxn modelId="{50ABA693-82FE-48D0-902C-9A3F7E34DCB8}" type="presParOf" srcId="{BB7620A0-7830-45D8-B1D1-5BE0854AD1FC}" destId="{865354EB-F09A-4BEF-9288-CED6E42B7F5F}" srcOrd="0" destOrd="0" presId="urn:diagrams.loki3.com/BracketList"/>
+    <dgm:cxn modelId="{96E2153B-6022-47D6-A291-F06A85338484}" type="presParOf" srcId="{BB7620A0-7830-45D8-B1D1-5BE0854AD1FC}" destId="{EBE01F4D-61AC-4040-9EDE-4466A6279156}" srcOrd="1" destOrd="0" presId="urn:diagrams.loki3.com/BracketList"/>
+    <dgm:cxn modelId="{AF276733-8527-4823-B4DB-392FC1A8AFA7}" type="presParOf" srcId="{BB7620A0-7830-45D8-B1D1-5BE0854AD1FC}" destId="{61088FF2-9756-4606-AB52-1FF293EED3D0}" srcOrd="2" destOrd="0" presId="urn:diagrams.loki3.com/BracketList"/>
+    <dgm:cxn modelId="{2A66F5F8-D496-46E7-88F2-BBF6CF6C9BEF}" type="presParOf" srcId="{BB7620A0-7830-45D8-B1D1-5BE0854AD1FC}" destId="{8BBB3DE3-53A4-455F-BA3A-A24D00B6F76E}" srcOrd="3" destOrd="0" presId="urn:diagrams.loki3.com/BracketList"/>
   </dgm:cxnLst>
   <dgm:bg/>
   <dgm:whole/>
@@ -5970,6 +6246,1243 @@
       <dsp:cNvGrpSpPr/>
     </dsp:nvGrpSpPr>
     <dsp:grpSpPr/>
+    <dsp:sp modelId="{7750B759-A213-40FA-BEB4-4C184A1AF0F6}">
+      <dsp:nvSpPr>
+        <dsp:cNvPr id="0" name=""/>
+        <dsp:cNvSpPr/>
+      </dsp:nvSpPr>
+      <dsp:spPr>
+        <a:xfrm>
+          <a:off x="2761" y="448060"/>
+          <a:ext cx="1412470" cy="237600"/>
+        </a:xfrm>
+        <a:prstGeom prst="rect">
+          <a:avLst/>
+        </a:prstGeom>
+        <a:noFill/>
+        <a:ln>
+          <a:noFill/>
+        </a:ln>
+        <a:effectLst/>
+      </dsp:spPr>
+      <dsp:style>
+        <a:lnRef idx="0">
+          <a:scrgbClr r="0" g="0" b="0"/>
+        </a:lnRef>
+        <a:fillRef idx="0">
+          <a:scrgbClr r="0" g="0" b="0"/>
+        </a:fillRef>
+        <a:effectRef idx="0">
+          <a:scrgbClr r="0" g="0" b="0"/>
+        </a:effectRef>
+        <a:fontRef idx="minor"/>
+      </dsp:style>
+      <dsp:txBody>
+        <a:bodyPr spcFirstLastPara="0" vert="horz" wrap="square" lIns="85344" tIns="30480" rIns="85344" bIns="30480" numCol="1" spcCol="1270" anchor="ctr" anchorCtr="0">
+          <a:noAutofit/>
+        </a:bodyPr>
+        <a:lstStyle/>
+        <a:p>
+          <a:pPr lvl="0" algn="r" defTabSz="533400">
+            <a:lnSpc>
+              <a:spcPct val="90000"/>
+            </a:lnSpc>
+            <a:spcBef>
+              <a:spcPct val="0"/>
+            </a:spcBef>
+            <a:spcAft>
+              <a:spcPct val="35000"/>
+            </a:spcAft>
+          </a:pPr>
+          <a:r>
+            <a:rPr lang="en-US" sz="1200" kern="1200" dirty="0" smtClean="0"/>
+            <a:t>Step 1</a:t>
+          </a:r>
+          <a:endParaRPr lang="en-US" sz="1200" kern="1200" dirty="0"/>
+        </a:p>
+      </dsp:txBody>
+      <dsp:txXfrm>
+        <a:off x="2761" y="448060"/>
+        <a:ext cx="1412470" cy="237600"/>
+      </dsp:txXfrm>
+    </dsp:sp>
+    <dsp:sp modelId="{43C750AB-DAD2-4C07-9CAF-0A2F6A1FA388}">
+      <dsp:nvSpPr>
+        <dsp:cNvPr id="0" name=""/>
+        <dsp:cNvSpPr/>
+      </dsp:nvSpPr>
+      <dsp:spPr>
+        <a:xfrm>
+          <a:off x="1415232" y="151060"/>
+          <a:ext cx="282494" cy="831600"/>
+        </a:xfrm>
+        <a:prstGeom prst="leftBrace">
+          <a:avLst>
+            <a:gd name="adj1" fmla="val 35000"/>
+            <a:gd name="adj2" fmla="val 50000"/>
+          </a:avLst>
+        </a:prstGeom>
+        <a:noFill/>
+        <a:ln w="12700" cap="flat" cmpd="sng" algn="ctr">
+          <a:solidFill>
+            <a:schemeClr val="accent1">
+              <a:hueOff val="0"/>
+              <a:satOff val="0"/>
+              <a:lumOff val="0"/>
+              <a:alphaOff val="0"/>
+            </a:schemeClr>
+          </a:solidFill>
+          <a:prstDash val="solid"/>
+          <a:miter lim="800000"/>
+        </a:ln>
+        <a:effectLst/>
+      </dsp:spPr>
+      <dsp:style>
+        <a:lnRef idx="2">
+          <a:scrgbClr r="0" g="0" b="0"/>
+        </a:lnRef>
+        <a:fillRef idx="0">
+          <a:scrgbClr r="0" g="0" b="0"/>
+        </a:fillRef>
+        <a:effectRef idx="0">
+          <a:scrgbClr r="0" g="0" b="0"/>
+        </a:effectRef>
+        <a:fontRef idx="minor"/>
+      </dsp:style>
+    </dsp:sp>
+    <dsp:sp modelId="{446D2CC6-7E84-42BD-AD30-32D47A0F0399}">
+      <dsp:nvSpPr>
+        <dsp:cNvPr id="0" name=""/>
+        <dsp:cNvSpPr/>
+      </dsp:nvSpPr>
+      <dsp:spPr>
+        <a:xfrm>
+          <a:off x="1810724" y="151060"/>
+          <a:ext cx="3841920" cy="831600"/>
+        </a:xfrm>
+        <a:prstGeom prst="rect">
+          <a:avLst/>
+        </a:prstGeom>
+        <a:gradFill rotWithShape="0">
+          <a:gsLst>
+            <a:gs pos="0">
+              <a:srgbClr val="FF0000">
+                <a:lumMod val="50000"/>
+                <a:lumOff val="50000"/>
+                <a:alpha val="47000"/>
+              </a:srgbClr>
+            </a:gs>
+            <a:gs pos="100000">
+              <a:srgbClr val="FF0000">
+                <a:lumMod val="75000"/>
+                <a:lumOff val="25000"/>
+                <a:alpha val="75000"/>
+              </a:srgbClr>
+            </a:gs>
+          </a:gsLst>
+          <a:lin ang="2400000" scaled="0"/>
+        </a:gradFill>
+        <a:ln w="12700" cap="flat" cmpd="sng" algn="ctr">
+          <a:solidFill>
+            <a:schemeClr val="tx1"/>
+          </a:solidFill>
+          <a:prstDash val="solid"/>
+          <a:miter lim="800000"/>
+        </a:ln>
+        <a:effectLst/>
+      </dsp:spPr>
+      <dsp:style>
+        <a:lnRef idx="1">
+          <a:schemeClr val="accent1"/>
+        </a:lnRef>
+        <a:fillRef idx="2">
+          <a:schemeClr val="accent1"/>
+        </a:fillRef>
+        <a:effectRef idx="1">
+          <a:schemeClr val="accent1"/>
+        </a:effectRef>
+        <a:fontRef idx="minor">
+          <a:schemeClr val="dk1"/>
+        </a:fontRef>
+      </dsp:style>
+      <dsp:txBody>
+        <a:bodyPr spcFirstLastPara="0" vert="horz" wrap="square" lIns="45720" tIns="45720" rIns="45720" bIns="45720" numCol="1" spcCol="1270" anchor="ctr" anchorCtr="0">
+          <a:noAutofit/>
+        </a:bodyPr>
+        <a:lstStyle/>
+        <a:p>
+          <a:pPr marL="114300" lvl="1" indent="-114300" algn="l" defTabSz="533400">
+            <a:lnSpc>
+              <a:spcPct val="90000"/>
+            </a:lnSpc>
+            <a:spcBef>
+              <a:spcPct val="0"/>
+            </a:spcBef>
+            <a:spcAft>
+              <a:spcPct val="15000"/>
+            </a:spcAft>
+            <a:buChar char="••"/>
+          </a:pPr>
+          <a:r>
+            <a:rPr lang="en-US" sz="1200" kern="1200" dirty="0" smtClean="0"/>
+            <a:t>Decide on Java Object</a:t>
+          </a:r>
+          <a:endParaRPr lang="en-US" sz="1200" kern="1200" dirty="0"/>
+        </a:p>
+        <a:p>
+          <a:pPr marL="114300" lvl="1" indent="-114300" algn="l" defTabSz="533400">
+            <a:lnSpc>
+              <a:spcPct val="90000"/>
+            </a:lnSpc>
+            <a:spcBef>
+              <a:spcPct val="0"/>
+            </a:spcBef>
+            <a:spcAft>
+              <a:spcPct val="15000"/>
+            </a:spcAft>
+            <a:buChar char="••"/>
+          </a:pPr>
+          <a:r>
+            <a:rPr lang="en-US" sz="1200" kern="1200" dirty="0" smtClean="0"/>
+            <a:t>Can be standard Java library class like a </a:t>
+          </a:r>
+          <a:r>
+            <a:rPr lang="en-US" sz="1200" kern="1200" dirty="0" err="1" smtClean="0"/>
+            <a:t>ConcurrentSkipListSet</a:t>
+          </a:r>
+          <a:endParaRPr lang="en-US" sz="1200" kern="1200" dirty="0"/>
+        </a:p>
+        <a:p>
+          <a:pPr marL="114300" lvl="1" indent="-114300" algn="l" defTabSz="533400">
+            <a:lnSpc>
+              <a:spcPct val="90000"/>
+            </a:lnSpc>
+            <a:spcBef>
+              <a:spcPct val="0"/>
+            </a:spcBef>
+            <a:spcAft>
+              <a:spcPct val="15000"/>
+            </a:spcAft>
+            <a:buChar char="••"/>
+          </a:pPr>
+          <a:r>
+            <a:rPr lang="en-US" sz="1200" kern="1200" dirty="0" smtClean="0"/>
+            <a:t>Can be custom user-defined class</a:t>
+          </a:r>
+          <a:endParaRPr lang="en-US" sz="1200" kern="1200" dirty="0"/>
+        </a:p>
+      </dsp:txBody>
+      <dsp:txXfrm>
+        <a:off x="1810724" y="151060"/>
+        <a:ext cx="3841920" cy="831600"/>
+      </dsp:txXfrm>
+    </dsp:sp>
+    <dsp:sp modelId="{F7B03BAF-4A61-4897-885F-5DEDC69024C3}">
+      <dsp:nvSpPr>
+        <dsp:cNvPr id="0" name=""/>
+        <dsp:cNvSpPr/>
+      </dsp:nvSpPr>
+      <dsp:spPr>
+        <a:xfrm>
+          <a:off x="2761" y="1036998"/>
+          <a:ext cx="1412470" cy="237600"/>
+        </a:xfrm>
+        <a:prstGeom prst="rect">
+          <a:avLst/>
+        </a:prstGeom>
+        <a:noFill/>
+        <a:ln>
+          <a:noFill/>
+        </a:ln>
+        <a:effectLst/>
+      </dsp:spPr>
+      <dsp:style>
+        <a:lnRef idx="0">
+          <a:scrgbClr r="0" g="0" b="0"/>
+        </a:lnRef>
+        <a:fillRef idx="0">
+          <a:scrgbClr r="0" g="0" b="0"/>
+        </a:fillRef>
+        <a:effectRef idx="0">
+          <a:scrgbClr r="0" g="0" b="0"/>
+        </a:effectRef>
+        <a:fontRef idx="minor"/>
+      </dsp:style>
+      <dsp:txBody>
+        <a:bodyPr spcFirstLastPara="0" vert="horz" wrap="square" lIns="85344" tIns="30480" rIns="85344" bIns="30480" numCol="1" spcCol="1270" anchor="ctr" anchorCtr="0">
+          <a:noAutofit/>
+        </a:bodyPr>
+        <a:lstStyle/>
+        <a:p>
+          <a:pPr lvl="0" algn="r" defTabSz="533400">
+            <a:lnSpc>
+              <a:spcPct val="90000"/>
+            </a:lnSpc>
+            <a:spcBef>
+              <a:spcPct val="0"/>
+            </a:spcBef>
+            <a:spcAft>
+              <a:spcPct val="35000"/>
+            </a:spcAft>
+          </a:pPr>
+          <a:r>
+            <a:rPr lang="en-US" sz="1200" kern="1200" dirty="0" smtClean="0"/>
+            <a:t>Step 2</a:t>
+          </a:r>
+          <a:endParaRPr lang="en-US" sz="1200" kern="1200" dirty="0"/>
+        </a:p>
+      </dsp:txBody>
+      <dsp:txXfrm>
+        <a:off x="2761" y="1036998"/>
+        <a:ext cx="1412470" cy="237600"/>
+      </dsp:txXfrm>
+    </dsp:sp>
+    <dsp:sp modelId="{BEB0E3EA-8B29-4C3D-AD33-C275354954B4}">
+      <dsp:nvSpPr>
+        <dsp:cNvPr id="0" name=""/>
+        <dsp:cNvSpPr/>
+      </dsp:nvSpPr>
+      <dsp:spPr>
+        <a:xfrm>
+          <a:off x="1415232" y="1025860"/>
+          <a:ext cx="282494" cy="259875"/>
+        </a:xfrm>
+        <a:prstGeom prst="leftBrace">
+          <a:avLst>
+            <a:gd name="adj1" fmla="val 35000"/>
+            <a:gd name="adj2" fmla="val 50000"/>
+          </a:avLst>
+        </a:prstGeom>
+        <a:noFill/>
+        <a:ln w="12700" cap="flat" cmpd="sng" algn="ctr">
+          <a:solidFill>
+            <a:schemeClr val="accent1">
+              <a:hueOff val="0"/>
+              <a:satOff val="0"/>
+              <a:lumOff val="0"/>
+              <a:alphaOff val="0"/>
+            </a:schemeClr>
+          </a:solidFill>
+          <a:prstDash val="solid"/>
+          <a:miter lim="800000"/>
+        </a:ln>
+        <a:effectLst/>
+      </dsp:spPr>
+      <dsp:style>
+        <a:lnRef idx="2">
+          <a:scrgbClr r="0" g="0" b="0"/>
+        </a:lnRef>
+        <a:fillRef idx="0">
+          <a:scrgbClr r="0" g="0" b="0"/>
+        </a:fillRef>
+        <a:effectRef idx="0">
+          <a:scrgbClr r="0" g="0" b="0"/>
+        </a:effectRef>
+        <a:fontRef idx="minor"/>
+      </dsp:style>
+    </dsp:sp>
+    <dsp:sp modelId="{D35AC0B4-0EA2-4E5A-8208-E9F15E287E2B}">
+      <dsp:nvSpPr>
+        <dsp:cNvPr id="0" name=""/>
+        <dsp:cNvSpPr/>
+      </dsp:nvSpPr>
+      <dsp:spPr>
+        <a:xfrm>
+          <a:off x="1810724" y="1025860"/>
+          <a:ext cx="3841920" cy="259875"/>
+        </a:xfrm>
+        <a:prstGeom prst="rect">
+          <a:avLst/>
+        </a:prstGeom>
+        <a:gradFill rotWithShape="0">
+          <a:gsLst>
+            <a:gs pos="0">
+              <a:srgbClr val="FFC000">
+                <a:alpha val="50000"/>
+                <a:lumMod val="50000"/>
+                <a:lumOff val="50000"/>
+              </a:srgbClr>
+            </a:gs>
+            <a:gs pos="100000">
+              <a:srgbClr val="FFC000">
+                <a:lumMod val="75000"/>
+                <a:lumOff val="25000"/>
+                <a:alpha val="86000"/>
+              </a:srgbClr>
+            </a:gs>
+          </a:gsLst>
+          <a:lin ang="2400000" scaled="0"/>
+        </a:gradFill>
+        <a:ln w="12700" cap="flat" cmpd="sng" algn="ctr">
+          <a:solidFill>
+            <a:schemeClr val="tx1"/>
+          </a:solidFill>
+          <a:prstDash val="solid"/>
+          <a:miter lim="800000"/>
+        </a:ln>
+        <a:effectLst/>
+      </dsp:spPr>
+      <dsp:style>
+        <a:lnRef idx="1">
+          <a:schemeClr val="accent1"/>
+        </a:lnRef>
+        <a:fillRef idx="2">
+          <a:schemeClr val="accent1"/>
+        </a:fillRef>
+        <a:effectRef idx="1">
+          <a:schemeClr val="accent1"/>
+        </a:effectRef>
+        <a:fontRef idx="minor">
+          <a:schemeClr val="dk1"/>
+        </a:fontRef>
+      </dsp:style>
+      <dsp:txBody>
+        <a:bodyPr spcFirstLastPara="0" vert="horz" wrap="square" lIns="45720" tIns="45720" rIns="45720" bIns="45720" numCol="1" spcCol="1270" anchor="ctr" anchorCtr="0">
+          <a:noAutofit/>
+        </a:bodyPr>
+        <a:lstStyle/>
+        <a:p>
+          <a:pPr marL="114300" lvl="1" indent="-114300" algn="l" defTabSz="533400">
+            <a:lnSpc>
+              <a:spcPct val="90000"/>
+            </a:lnSpc>
+            <a:spcBef>
+              <a:spcPct val="0"/>
+            </a:spcBef>
+            <a:spcAft>
+              <a:spcPct val="15000"/>
+            </a:spcAft>
+            <a:buChar char="••"/>
+          </a:pPr>
+          <a:r>
+            <a:rPr lang="en-US" sz="1200" kern="1200" dirty="0" smtClean="0"/>
+            <a:t>Decide on CAS representation for the data in this object</a:t>
+          </a:r>
+          <a:endParaRPr lang="en-US" sz="1200" kern="1200" dirty="0"/>
+        </a:p>
+      </dsp:txBody>
+      <dsp:txXfrm>
+        <a:off x="1810724" y="1025860"/>
+        <a:ext cx="3841920" cy="259875"/>
+      </dsp:txXfrm>
+    </dsp:sp>
+    <dsp:sp modelId="{786962EE-063A-444D-9F24-DA8806182FC3}">
+      <dsp:nvSpPr>
+        <dsp:cNvPr id="0" name=""/>
+        <dsp:cNvSpPr/>
+      </dsp:nvSpPr>
+      <dsp:spPr>
+        <a:xfrm>
+          <a:off x="2761" y="1425460"/>
+          <a:ext cx="1412470" cy="237600"/>
+        </a:xfrm>
+        <a:prstGeom prst="rect">
+          <a:avLst/>
+        </a:prstGeom>
+        <a:noFill/>
+        <a:ln>
+          <a:noFill/>
+        </a:ln>
+        <a:effectLst/>
+      </dsp:spPr>
+      <dsp:style>
+        <a:lnRef idx="0">
+          <a:scrgbClr r="0" g="0" b="0"/>
+        </a:lnRef>
+        <a:fillRef idx="0">
+          <a:scrgbClr r="0" g="0" b="0"/>
+        </a:fillRef>
+        <a:effectRef idx="0">
+          <a:scrgbClr r="0" g="0" b="0"/>
+        </a:effectRef>
+        <a:fontRef idx="minor"/>
+      </dsp:style>
+      <dsp:txBody>
+        <a:bodyPr spcFirstLastPara="0" vert="horz" wrap="square" lIns="85344" tIns="30480" rIns="85344" bIns="30480" numCol="1" spcCol="1270" anchor="ctr" anchorCtr="0">
+          <a:noAutofit/>
+        </a:bodyPr>
+        <a:lstStyle/>
+        <a:p>
+          <a:pPr lvl="0" algn="r" defTabSz="533400">
+            <a:lnSpc>
+              <a:spcPct val="90000"/>
+            </a:lnSpc>
+            <a:spcBef>
+              <a:spcPct val="0"/>
+            </a:spcBef>
+            <a:spcAft>
+              <a:spcPct val="35000"/>
+            </a:spcAft>
+          </a:pPr>
+          <a:r>
+            <a:rPr lang="en-US" sz="1200" kern="1200" dirty="0" smtClean="0"/>
+            <a:t>Step 3</a:t>
+          </a:r>
+          <a:endParaRPr lang="en-US" sz="1200" kern="1200" dirty="0"/>
+        </a:p>
+      </dsp:txBody>
+      <dsp:txXfrm>
+        <a:off x="2761" y="1425460"/>
+        <a:ext cx="1412470" cy="237600"/>
+      </dsp:txXfrm>
+    </dsp:sp>
+    <dsp:sp modelId="{15C7BA9C-CF1F-4900-91E5-B2B5C4E3CC1C}">
+      <dsp:nvSpPr>
+        <dsp:cNvPr id="0" name=""/>
+        <dsp:cNvSpPr/>
+      </dsp:nvSpPr>
+      <dsp:spPr>
+        <a:xfrm>
+          <a:off x="1415232" y="1328935"/>
+          <a:ext cx="282494" cy="430650"/>
+        </a:xfrm>
+        <a:prstGeom prst="leftBrace">
+          <a:avLst>
+            <a:gd name="adj1" fmla="val 35000"/>
+            <a:gd name="adj2" fmla="val 50000"/>
+          </a:avLst>
+        </a:prstGeom>
+        <a:noFill/>
+        <a:ln w="12700" cap="flat" cmpd="sng" algn="ctr">
+          <a:solidFill>
+            <a:schemeClr val="accent1">
+              <a:hueOff val="0"/>
+              <a:satOff val="0"/>
+              <a:lumOff val="0"/>
+              <a:alphaOff val="0"/>
+            </a:schemeClr>
+          </a:solidFill>
+          <a:prstDash val="solid"/>
+          <a:miter lim="800000"/>
+        </a:ln>
+        <a:effectLst/>
+      </dsp:spPr>
+      <dsp:style>
+        <a:lnRef idx="2">
+          <a:scrgbClr r="0" g="0" b="0"/>
+        </a:lnRef>
+        <a:fillRef idx="0">
+          <a:scrgbClr r="0" g="0" b="0"/>
+        </a:fillRef>
+        <a:effectRef idx="0">
+          <a:scrgbClr r="0" g="0" b="0"/>
+        </a:effectRef>
+        <a:fontRef idx="minor"/>
+      </dsp:style>
+    </dsp:sp>
+    <dsp:sp modelId="{79FE4C6C-0939-4E76-8471-EC38D3CAFE0F}">
+      <dsp:nvSpPr>
+        <dsp:cNvPr id="0" name=""/>
+        <dsp:cNvSpPr/>
+      </dsp:nvSpPr>
+      <dsp:spPr>
+        <a:xfrm>
+          <a:off x="1810724" y="1328935"/>
+          <a:ext cx="3841920" cy="430650"/>
+        </a:xfrm>
+        <a:prstGeom prst="rect">
+          <a:avLst/>
+        </a:prstGeom>
+        <a:gradFill rotWithShape="0">
+          <a:gsLst>
+            <a:gs pos="0">
+              <a:srgbClr val="FFFF00">
+                <a:lumMod val="50000"/>
+                <a:lumOff val="50000"/>
+                <a:alpha val="35000"/>
+              </a:srgbClr>
+            </a:gs>
+            <a:gs pos="100000">
+              <a:srgbClr val="FFFF00">
+                <a:lumMod val="75000"/>
+                <a:lumOff val="25000"/>
+                <a:alpha val="82000"/>
+              </a:srgbClr>
+            </a:gs>
+          </a:gsLst>
+          <a:lin ang="2400000" scaled="0"/>
+        </a:gradFill>
+        <a:ln w="12700" cap="flat" cmpd="sng" algn="ctr">
+          <a:solidFill>
+            <a:schemeClr val="tx1"/>
+          </a:solidFill>
+          <a:prstDash val="solid"/>
+          <a:miter lim="800000"/>
+        </a:ln>
+        <a:effectLst/>
+      </dsp:spPr>
+      <dsp:style>
+        <a:lnRef idx="1">
+          <a:schemeClr val="accent1"/>
+        </a:lnRef>
+        <a:fillRef idx="2">
+          <a:schemeClr val="accent1"/>
+        </a:fillRef>
+        <a:effectRef idx="1">
+          <a:schemeClr val="accent1"/>
+        </a:effectRef>
+        <a:fontRef idx="minor">
+          <a:schemeClr val="dk1"/>
+        </a:fontRef>
+      </dsp:style>
+      <dsp:txBody>
+        <a:bodyPr spcFirstLastPara="0" vert="horz" wrap="square" lIns="45720" tIns="45720" rIns="45720" bIns="45720" numCol="1" spcCol="1270" anchor="ctr" anchorCtr="0">
+          <a:noAutofit/>
+        </a:bodyPr>
+        <a:lstStyle/>
+        <a:p>
+          <a:pPr marL="114300" lvl="1" indent="-114300" algn="l" defTabSz="533400">
+            <a:lnSpc>
+              <a:spcPct val="90000"/>
+            </a:lnSpc>
+            <a:spcBef>
+              <a:spcPct val="0"/>
+            </a:spcBef>
+            <a:spcAft>
+              <a:spcPct val="15000"/>
+            </a:spcAft>
+            <a:buChar char="••"/>
+          </a:pPr>
+          <a:r>
+            <a:rPr lang="en-US" sz="1200" kern="1200" dirty="0" smtClean="0"/>
+            <a:t>Define the UIMA type with features for the CAS representation of the data</a:t>
+          </a:r>
+          <a:endParaRPr lang="en-US" sz="1200" kern="1200" dirty="0"/>
+        </a:p>
+      </dsp:txBody>
+      <dsp:txXfrm>
+        <a:off x="1810724" y="1328935"/>
+        <a:ext cx="3841920" cy="430650"/>
+      </dsp:txXfrm>
+    </dsp:sp>
+    <dsp:sp modelId="{BA2B4D5C-F1D5-4206-89F2-1A674F6ECC6F}">
+      <dsp:nvSpPr>
+        <dsp:cNvPr id="0" name=""/>
+        <dsp:cNvSpPr/>
+      </dsp:nvSpPr>
+      <dsp:spPr>
+        <a:xfrm>
+          <a:off x="2761" y="1813923"/>
+          <a:ext cx="1412470" cy="237600"/>
+        </a:xfrm>
+        <a:prstGeom prst="rect">
+          <a:avLst/>
+        </a:prstGeom>
+        <a:noFill/>
+        <a:ln>
+          <a:noFill/>
+        </a:ln>
+        <a:effectLst/>
+      </dsp:spPr>
+      <dsp:style>
+        <a:lnRef idx="0">
+          <a:scrgbClr r="0" g="0" b="0"/>
+        </a:lnRef>
+        <a:fillRef idx="0">
+          <a:scrgbClr r="0" g="0" b="0"/>
+        </a:fillRef>
+        <a:effectRef idx="0">
+          <a:scrgbClr r="0" g="0" b="0"/>
+        </a:effectRef>
+        <a:fontRef idx="minor"/>
+      </dsp:style>
+      <dsp:txBody>
+        <a:bodyPr spcFirstLastPara="0" vert="horz" wrap="square" lIns="85344" tIns="30480" rIns="85344" bIns="30480" numCol="1" spcCol="1270" anchor="ctr" anchorCtr="0">
+          <a:noAutofit/>
+        </a:bodyPr>
+        <a:lstStyle/>
+        <a:p>
+          <a:pPr lvl="0" algn="r" defTabSz="533400">
+            <a:lnSpc>
+              <a:spcPct val="90000"/>
+            </a:lnSpc>
+            <a:spcBef>
+              <a:spcPct val="0"/>
+            </a:spcBef>
+            <a:spcAft>
+              <a:spcPct val="35000"/>
+            </a:spcAft>
+          </a:pPr>
+          <a:r>
+            <a:rPr lang="en-US" sz="1200" kern="1200" dirty="0" smtClean="0"/>
+            <a:t>Step 4</a:t>
+          </a:r>
+          <a:endParaRPr lang="en-US" sz="1200" kern="1200" dirty="0"/>
+        </a:p>
+      </dsp:txBody>
+      <dsp:txXfrm>
+        <a:off x="2761" y="1813923"/>
+        <a:ext cx="1412470" cy="237600"/>
+      </dsp:txXfrm>
+    </dsp:sp>
+    <dsp:sp modelId="{D66DA694-36E9-4D92-82B6-8C5FDBDB073A}">
+      <dsp:nvSpPr>
+        <dsp:cNvPr id="0" name=""/>
+        <dsp:cNvSpPr/>
+      </dsp:nvSpPr>
+      <dsp:spPr>
+        <a:xfrm>
+          <a:off x="1415232" y="1802785"/>
+          <a:ext cx="282494" cy="259875"/>
+        </a:xfrm>
+        <a:prstGeom prst="leftBrace">
+          <a:avLst>
+            <a:gd name="adj1" fmla="val 35000"/>
+            <a:gd name="adj2" fmla="val 50000"/>
+          </a:avLst>
+        </a:prstGeom>
+        <a:noFill/>
+        <a:ln w="12700" cap="flat" cmpd="sng" algn="ctr">
+          <a:solidFill>
+            <a:schemeClr val="accent1">
+              <a:hueOff val="0"/>
+              <a:satOff val="0"/>
+              <a:lumOff val="0"/>
+              <a:alphaOff val="0"/>
+            </a:schemeClr>
+          </a:solidFill>
+          <a:prstDash val="solid"/>
+          <a:miter lim="800000"/>
+        </a:ln>
+        <a:effectLst/>
+      </dsp:spPr>
+      <dsp:style>
+        <a:lnRef idx="2">
+          <a:scrgbClr r="0" g="0" b="0"/>
+        </a:lnRef>
+        <a:fillRef idx="0">
+          <a:scrgbClr r="0" g="0" b="0"/>
+        </a:fillRef>
+        <a:effectRef idx="0">
+          <a:scrgbClr r="0" g="0" b="0"/>
+        </a:effectRef>
+        <a:fontRef idx="minor"/>
+      </dsp:style>
+    </dsp:sp>
+    <dsp:sp modelId="{CAF7A30C-32B5-439A-AD55-840996077434}">
+      <dsp:nvSpPr>
+        <dsp:cNvPr id="0" name=""/>
+        <dsp:cNvSpPr/>
+      </dsp:nvSpPr>
+      <dsp:spPr>
+        <a:xfrm>
+          <a:off x="1810724" y="1802785"/>
+          <a:ext cx="3841920" cy="259875"/>
+        </a:xfrm>
+        <a:prstGeom prst="rect">
+          <a:avLst/>
+        </a:prstGeom>
+        <a:gradFill rotWithShape="0">
+          <a:gsLst>
+            <a:gs pos="0">
+              <a:srgbClr val="92D050">
+                <a:lumMod val="50000"/>
+                <a:lumOff val="50000"/>
+                <a:alpha val="50000"/>
+              </a:srgbClr>
+            </a:gs>
+            <a:gs pos="100000">
+              <a:srgbClr val="92D050">
+                <a:lumMod val="75000"/>
+                <a:lumOff val="25000"/>
+                <a:alpha val="80000"/>
+              </a:srgbClr>
+            </a:gs>
+          </a:gsLst>
+          <a:lin ang="2400000" scaled="0"/>
+        </a:gradFill>
+        <a:ln w="6350" cap="flat" cmpd="sng" algn="ctr">
+          <a:solidFill>
+            <a:schemeClr val="accent1"/>
+          </a:solidFill>
+          <a:prstDash val="solid"/>
+          <a:miter lim="800000"/>
+        </a:ln>
+        <a:effectLst/>
+      </dsp:spPr>
+      <dsp:style>
+        <a:lnRef idx="1">
+          <a:schemeClr val="accent1"/>
+        </a:lnRef>
+        <a:fillRef idx="2">
+          <a:schemeClr val="accent1"/>
+        </a:fillRef>
+        <a:effectRef idx="1">
+          <a:schemeClr val="accent1"/>
+        </a:effectRef>
+        <a:fontRef idx="minor">
+          <a:schemeClr val="dk1"/>
+        </a:fontRef>
+      </dsp:style>
+      <dsp:txBody>
+        <a:bodyPr spcFirstLastPara="0" vert="horz" wrap="square" lIns="45720" tIns="45720" rIns="45720" bIns="45720" numCol="1" spcCol="1270" anchor="ctr" anchorCtr="0">
+          <a:noAutofit/>
+        </a:bodyPr>
+        <a:lstStyle/>
+        <a:p>
+          <a:pPr marL="114300" lvl="1" indent="-114300" algn="l" defTabSz="533400">
+            <a:lnSpc>
+              <a:spcPct val="90000"/>
+            </a:lnSpc>
+            <a:spcBef>
+              <a:spcPct val="0"/>
+            </a:spcBef>
+            <a:spcAft>
+              <a:spcPct val="15000"/>
+            </a:spcAft>
+            <a:buChar char="••"/>
+          </a:pPr>
+          <a:r>
+            <a:rPr lang="en-US" sz="1200" kern="1200" dirty="0" smtClean="0"/>
+            <a:t>Run JCasGen to get the initial prototype for this class</a:t>
+          </a:r>
+          <a:endParaRPr lang="en-US" sz="1200" kern="1200" dirty="0"/>
+        </a:p>
+      </dsp:txBody>
+      <dsp:txXfrm>
+        <a:off x="1810724" y="1802785"/>
+        <a:ext cx="3841920" cy="259875"/>
+      </dsp:txXfrm>
+    </dsp:sp>
+    <dsp:sp modelId="{FF5960F5-4FEE-476C-A20A-30D655E9D5D1}">
+      <dsp:nvSpPr>
+        <dsp:cNvPr id="0" name=""/>
+        <dsp:cNvSpPr/>
+      </dsp:nvSpPr>
+      <dsp:spPr>
+        <a:xfrm>
+          <a:off x="2761" y="2491960"/>
+          <a:ext cx="1412470" cy="237600"/>
+        </a:xfrm>
+        <a:prstGeom prst="rect">
+          <a:avLst/>
+        </a:prstGeom>
+        <a:noFill/>
+        <a:ln>
+          <a:noFill/>
+        </a:ln>
+        <a:effectLst/>
+      </dsp:spPr>
+      <dsp:style>
+        <a:lnRef idx="0">
+          <a:scrgbClr r="0" g="0" b="0"/>
+        </a:lnRef>
+        <a:fillRef idx="0">
+          <a:scrgbClr r="0" g="0" b="0"/>
+        </a:fillRef>
+        <a:effectRef idx="0">
+          <a:scrgbClr r="0" g="0" b="0"/>
+        </a:effectRef>
+        <a:fontRef idx="minor"/>
+      </dsp:style>
+      <dsp:txBody>
+        <a:bodyPr spcFirstLastPara="0" vert="horz" wrap="square" lIns="85344" tIns="30480" rIns="85344" bIns="30480" numCol="1" spcCol="1270" anchor="ctr" anchorCtr="0">
+          <a:noAutofit/>
+        </a:bodyPr>
+        <a:lstStyle/>
+        <a:p>
+          <a:pPr lvl="0" algn="r" defTabSz="533400">
+            <a:lnSpc>
+              <a:spcPct val="90000"/>
+            </a:lnSpc>
+            <a:spcBef>
+              <a:spcPct val="0"/>
+            </a:spcBef>
+            <a:spcAft>
+              <a:spcPct val="35000"/>
+            </a:spcAft>
+          </a:pPr>
+          <a:r>
+            <a:rPr lang="en-US" sz="1200" kern="1200" dirty="0" smtClean="0"/>
+            <a:t>Step 5</a:t>
+          </a:r>
+          <a:endParaRPr lang="en-US" sz="1200" kern="1200" dirty="0"/>
+        </a:p>
+      </dsp:txBody>
+      <dsp:txXfrm>
+        <a:off x="2761" y="2491960"/>
+        <a:ext cx="1412470" cy="237600"/>
+      </dsp:txXfrm>
+    </dsp:sp>
+    <dsp:sp modelId="{50D48225-666A-40A3-BF9F-60CC702DB955}">
+      <dsp:nvSpPr>
+        <dsp:cNvPr id="0" name=""/>
+        <dsp:cNvSpPr/>
+      </dsp:nvSpPr>
+      <dsp:spPr>
+        <a:xfrm>
+          <a:off x="1415232" y="2105860"/>
+          <a:ext cx="282494" cy="1009800"/>
+        </a:xfrm>
+        <a:prstGeom prst="leftBrace">
+          <a:avLst>
+            <a:gd name="adj1" fmla="val 35000"/>
+            <a:gd name="adj2" fmla="val 50000"/>
+          </a:avLst>
+        </a:prstGeom>
+        <a:noFill/>
+        <a:ln w="12700" cap="flat" cmpd="sng" algn="ctr">
+          <a:solidFill>
+            <a:schemeClr val="accent1">
+              <a:hueOff val="0"/>
+              <a:satOff val="0"/>
+              <a:lumOff val="0"/>
+              <a:alphaOff val="0"/>
+            </a:schemeClr>
+          </a:solidFill>
+          <a:prstDash val="solid"/>
+          <a:miter lim="800000"/>
+        </a:ln>
+        <a:effectLst/>
+      </dsp:spPr>
+      <dsp:style>
+        <a:lnRef idx="2">
+          <a:scrgbClr r="0" g="0" b="0"/>
+        </a:lnRef>
+        <a:fillRef idx="0">
+          <a:scrgbClr r="0" g="0" b="0"/>
+        </a:fillRef>
+        <a:effectRef idx="0">
+          <a:scrgbClr r="0" g="0" b="0"/>
+        </a:effectRef>
+        <a:fontRef idx="minor"/>
+      </dsp:style>
+    </dsp:sp>
+    <dsp:sp modelId="{82C1E690-C8C5-481D-98BD-DA98E4A16FE5}">
+      <dsp:nvSpPr>
+        <dsp:cNvPr id="0" name=""/>
+        <dsp:cNvSpPr/>
+      </dsp:nvSpPr>
+      <dsp:spPr>
+        <a:xfrm>
+          <a:off x="1810724" y="2105860"/>
+          <a:ext cx="3841920" cy="1009800"/>
+        </a:xfrm>
+        <a:prstGeom prst="rect">
+          <a:avLst/>
+        </a:prstGeom>
+        <a:gradFill rotWithShape="0">
+          <a:gsLst>
+            <a:gs pos="0">
+              <a:srgbClr val="00B050">
+                <a:lumMod val="50000"/>
+                <a:lumOff val="50000"/>
+                <a:alpha val="25000"/>
+              </a:srgbClr>
+            </a:gs>
+            <a:gs pos="100000">
+              <a:srgbClr val="00B050">
+                <a:lumMod val="75000"/>
+                <a:lumOff val="25000"/>
+                <a:alpha val="50000"/>
+              </a:srgbClr>
+            </a:gs>
+          </a:gsLst>
+          <a:lin ang="2400000" scaled="0"/>
+        </a:gradFill>
+        <a:ln w="12700" cap="flat" cmpd="sng" algn="ctr">
+          <a:solidFill>
+            <a:schemeClr val="tx1"/>
+          </a:solidFill>
+          <a:prstDash val="solid"/>
+          <a:miter lim="800000"/>
+        </a:ln>
+        <a:effectLst/>
+      </dsp:spPr>
+      <dsp:style>
+        <a:lnRef idx="1">
+          <a:schemeClr val="accent1"/>
+        </a:lnRef>
+        <a:fillRef idx="2">
+          <a:schemeClr val="accent1"/>
+        </a:fillRef>
+        <a:effectRef idx="1">
+          <a:schemeClr val="accent1"/>
+        </a:effectRef>
+        <a:fontRef idx="minor">
+          <a:schemeClr val="dk1"/>
+        </a:fontRef>
+      </dsp:style>
+      <dsp:txBody>
+        <a:bodyPr spcFirstLastPara="0" vert="horz" wrap="square" lIns="45720" tIns="45720" rIns="45720" bIns="45720" numCol="1" spcCol="1270" anchor="ctr" anchorCtr="0">
+          <a:noAutofit/>
+        </a:bodyPr>
+        <a:lstStyle/>
+        <a:p>
+          <a:pPr marL="114300" lvl="1" indent="-114300" algn="l" defTabSz="533400">
+            <a:lnSpc>
+              <a:spcPct val="90000"/>
+            </a:lnSpc>
+            <a:spcBef>
+              <a:spcPct val="0"/>
+            </a:spcBef>
+            <a:spcAft>
+              <a:spcPct val="15000"/>
+            </a:spcAft>
+            <a:buChar char="••"/>
+          </a:pPr>
+          <a:r>
+            <a:rPr lang="en-US" sz="1200" kern="1200" dirty="0" smtClean="0"/>
+            <a:t>Mark the JCas class with a special interface</a:t>
+          </a:r>
+          <a:endParaRPr lang="en-US" sz="1200" kern="1200" dirty="0"/>
+        </a:p>
+        <a:p>
+          <a:pPr marL="114300" lvl="1" indent="-114300" algn="l" defTabSz="533400">
+            <a:lnSpc>
+              <a:spcPct val="90000"/>
+            </a:lnSpc>
+            <a:spcBef>
+              <a:spcPct val="0"/>
+            </a:spcBef>
+            <a:spcAft>
+              <a:spcPct val="15000"/>
+            </a:spcAft>
+            <a:buChar char="••"/>
+          </a:pPr>
+          <a:r>
+            <a:rPr lang="en-US" sz="1200" kern="1200" dirty="0" smtClean="0"/>
+            <a:t>Modify the JCas class: add an additional field representing the new Java Object</a:t>
+          </a:r>
+          <a:endParaRPr lang="en-US" sz="1200" kern="1200" dirty="0"/>
+        </a:p>
+        <a:p>
+          <a:pPr marL="114300" lvl="1" indent="-114300" algn="l" defTabSz="533400">
+            <a:lnSpc>
+              <a:spcPct val="90000"/>
+            </a:lnSpc>
+            <a:spcBef>
+              <a:spcPct val="0"/>
+            </a:spcBef>
+            <a:spcAft>
+              <a:spcPct val="15000"/>
+            </a:spcAft>
+            <a:buChar char="••"/>
+          </a:pPr>
+          <a:r>
+            <a:rPr lang="en-US" sz="1200" kern="1200" dirty="0" smtClean="0"/>
+            <a:t>Write 2 methods to transfer data to/from the object and the CAS data</a:t>
+          </a:r>
+          <a:endParaRPr lang="en-US" sz="1200" kern="1200" dirty="0"/>
+        </a:p>
+      </dsp:txBody>
+      <dsp:txXfrm>
+        <a:off x="1810724" y="2105860"/>
+        <a:ext cx="3841920" cy="1009800"/>
+      </dsp:txXfrm>
+    </dsp:sp>
+    <dsp:sp modelId="{865354EB-F09A-4BEF-9288-CED6E42B7F5F}">
+      <dsp:nvSpPr>
+        <dsp:cNvPr id="0" name=""/>
+        <dsp:cNvSpPr/>
+      </dsp:nvSpPr>
+      <dsp:spPr>
+        <a:xfrm>
+          <a:off x="2761" y="3270235"/>
+          <a:ext cx="1412470" cy="237600"/>
+        </a:xfrm>
+        <a:prstGeom prst="rect">
+          <a:avLst/>
+        </a:prstGeom>
+        <a:noFill/>
+        <a:ln w="12700" cap="flat" cmpd="sng" algn="ctr">
+          <a:noFill/>
+          <a:prstDash val="solid"/>
+          <a:miter lim="800000"/>
+        </a:ln>
+        <a:effectLst/>
+      </dsp:spPr>
+      <dsp:style>
+        <a:lnRef idx="1">
+          <a:schemeClr val="accent1"/>
+        </a:lnRef>
+        <a:fillRef idx="2">
+          <a:schemeClr val="accent1"/>
+        </a:fillRef>
+        <a:effectRef idx="1">
+          <a:schemeClr val="accent1"/>
+        </a:effectRef>
+        <a:fontRef idx="minor">
+          <a:schemeClr val="dk1"/>
+        </a:fontRef>
+      </dsp:style>
+      <dsp:txBody>
+        <a:bodyPr spcFirstLastPara="0" vert="horz" wrap="square" lIns="85344" tIns="30480" rIns="85344" bIns="30480" numCol="1" spcCol="1270" anchor="ctr" anchorCtr="0">
+          <a:noAutofit/>
+        </a:bodyPr>
+        <a:lstStyle/>
+        <a:p>
+          <a:pPr lvl="0" algn="r" defTabSz="533400">
+            <a:lnSpc>
+              <a:spcPct val="90000"/>
+            </a:lnSpc>
+            <a:spcBef>
+              <a:spcPct val="0"/>
+            </a:spcBef>
+            <a:spcAft>
+              <a:spcPct val="35000"/>
+            </a:spcAft>
+          </a:pPr>
+          <a:r>
+            <a:rPr lang="en-US" sz="1200" kern="1200" dirty="0" smtClean="0"/>
+            <a:t>(optional)</a:t>
+          </a:r>
+          <a:endParaRPr lang="en-US" sz="1200" kern="1200" dirty="0"/>
+        </a:p>
+      </dsp:txBody>
+      <dsp:txXfrm>
+        <a:off x="2761" y="3270235"/>
+        <a:ext cx="1412470" cy="237600"/>
+      </dsp:txXfrm>
+    </dsp:sp>
+    <dsp:sp modelId="{EBE01F4D-61AC-4040-9EDE-4466A6279156}">
+      <dsp:nvSpPr>
+        <dsp:cNvPr id="0" name=""/>
+        <dsp:cNvSpPr/>
+      </dsp:nvSpPr>
+      <dsp:spPr>
+        <a:xfrm>
+          <a:off x="1415232" y="3158860"/>
+          <a:ext cx="282494" cy="460350"/>
+        </a:xfrm>
+        <a:prstGeom prst="leftBrace">
+          <a:avLst>
+            <a:gd name="adj1" fmla="val 35000"/>
+            <a:gd name="adj2" fmla="val 50000"/>
+          </a:avLst>
+        </a:prstGeom>
+        <a:noFill/>
+        <a:ln w="12700" cap="flat" cmpd="sng" algn="ctr">
+          <a:solidFill>
+            <a:schemeClr val="accent1">
+              <a:hueOff val="0"/>
+              <a:satOff val="0"/>
+              <a:lumOff val="0"/>
+              <a:alphaOff val="0"/>
+            </a:schemeClr>
+          </a:solidFill>
+          <a:prstDash val="solid"/>
+          <a:miter lim="800000"/>
+        </a:ln>
+        <a:effectLst/>
+      </dsp:spPr>
+      <dsp:style>
+        <a:lnRef idx="2">
+          <a:scrgbClr r="0" g="0" b="0"/>
+        </a:lnRef>
+        <a:fillRef idx="0">
+          <a:scrgbClr r="0" g="0" b="0"/>
+        </a:fillRef>
+        <a:effectRef idx="0">
+          <a:scrgbClr r="0" g="0" b="0"/>
+        </a:effectRef>
+        <a:fontRef idx="minor"/>
+      </dsp:style>
+    </dsp:sp>
+    <dsp:sp modelId="{8BBB3DE3-53A4-455F-BA3A-A24D00B6F76E}">
+      <dsp:nvSpPr>
+        <dsp:cNvPr id="0" name=""/>
+        <dsp:cNvSpPr/>
+      </dsp:nvSpPr>
+      <dsp:spPr>
+        <a:xfrm>
+          <a:off x="1810724" y="3158860"/>
+          <a:ext cx="3841920" cy="460350"/>
+        </a:xfrm>
+        <a:prstGeom prst="rect">
+          <a:avLst/>
+        </a:prstGeom>
+        <a:gradFill rotWithShape="0">
+          <a:gsLst>
+            <a:gs pos="0">
+              <a:srgbClr val="00B0F0">
+                <a:alpha val="25000"/>
+                <a:lumMod val="50000"/>
+                <a:lumOff val="50000"/>
+              </a:srgbClr>
+            </a:gs>
+            <a:gs pos="100000">
+              <a:srgbClr val="00B0F0">
+                <a:alpha val="50000"/>
+                <a:lumMod val="75000"/>
+                <a:lumOff val="25000"/>
+              </a:srgbClr>
+            </a:gs>
+          </a:gsLst>
+          <a:lin ang="2400000" scaled="0"/>
+        </a:gradFill>
+        <a:ln w="12700" cap="flat" cmpd="sng" algn="ctr">
+          <a:solidFill>
+            <a:schemeClr val="tx1"/>
+          </a:solidFill>
+          <a:prstDash val="solid"/>
+          <a:miter lim="800000"/>
+        </a:ln>
+        <a:effectLst/>
+      </dsp:spPr>
+      <dsp:style>
+        <a:lnRef idx="1">
+          <a:schemeClr val="accent1"/>
+        </a:lnRef>
+        <a:fillRef idx="2">
+          <a:schemeClr val="accent1"/>
+        </a:fillRef>
+        <a:effectRef idx="1">
+          <a:schemeClr val="accent1"/>
+        </a:effectRef>
+        <a:fontRef idx="minor">
+          <a:schemeClr val="dk1"/>
+        </a:fontRef>
+      </dsp:style>
+      <dsp:txBody>
+        <a:bodyPr spcFirstLastPara="0" vert="horz" wrap="square" lIns="45720" tIns="45720" rIns="45720" bIns="45720" numCol="1" spcCol="1270" anchor="ctr" anchorCtr="0">
+          <a:noAutofit/>
+        </a:bodyPr>
+        <a:lstStyle/>
+        <a:p>
+          <a:pPr marL="114300" lvl="1" indent="-114300" algn="l" defTabSz="533400">
+            <a:lnSpc>
+              <a:spcPct val="90000"/>
+            </a:lnSpc>
+            <a:spcBef>
+              <a:spcPct val="0"/>
+            </a:spcBef>
+            <a:spcAft>
+              <a:spcPct val="15000"/>
+            </a:spcAft>
+            <a:buChar char="••"/>
+          </a:pPr>
+          <a:r>
+            <a:rPr lang="en-US" sz="1200" kern="1200" dirty="0" smtClean="0"/>
+            <a:t>Support Select</a:t>
+          </a:r>
+          <a:endParaRPr lang="en-US" sz="1200" kern="1200" dirty="0"/>
+        </a:p>
+        <a:p>
+          <a:pPr marL="228600" lvl="2" indent="-114300" algn="l" defTabSz="533400">
+            <a:lnSpc>
+              <a:spcPct val="90000"/>
+            </a:lnSpc>
+            <a:spcBef>
+              <a:spcPct val="0"/>
+            </a:spcBef>
+            <a:spcAft>
+              <a:spcPct val="15000"/>
+            </a:spcAft>
+            <a:buChar char="••"/>
+          </a:pPr>
+          <a:r>
+            <a:rPr lang="en-US" sz="1200" kern="1200" smtClean="0"/>
+            <a:t>Implement SelectViaCopyToArray</a:t>
+          </a:r>
+          <a:endParaRPr lang="en-US" sz="1200" kern="1200" dirty="0"/>
+        </a:p>
+      </dsp:txBody>
+      <dsp:txXfrm>
+        <a:off x="1810724" y="3158860"/>
+        <a:ext cx="3841920" cy="460350"/>
+      </dsp:txXfrm>
+    </dsp:sp>
   </dsp:spTree>
 </dsp:drawing>
 </file>
@@ -9876,7 +11389,7 @@
           <a:p>
             <a:fld id="{FA88A723-210D-49FB-911D-CC70F62696A5}" type="datetimeFigureOut">
               <a:rPr lang="en-US" smtClean="0"/>
-              <a:t>11/14/2016</a:t>
+              <a:t>1/26/2017</a:t>
             </a:fld>
             <a:endParaRPr lang="en-US"/>
           </a:p>
@@ -10046,7 +11559,7 @@
           <a:p>
             <a:fld id="{FA88A723-210D-49FB-911D-CC70F62696A5}" type="datetimeFigureOut">
               <a:rPr lang="en-US" smtClean="0"/>
-              <a:t>11/14/2016</a:t>
+              <a:t>1/26/2017</a:t>
             </a:fld>
             <a:endParaRPr lang="en-US"/>
           </a:p>
@@ -10226,7 +11739,7 @@
           <a:p>
             <a:fld id="{FA88A723-210D-49FB-911D-CC70F62696A5}" type="datetimeFigureOut">
               <a:rPr lang="en-US" smtClean="0"/>
-              <a:t>11/14/2016</a:t>
+              <a:t>1/26/2017</a:t>
             </a:fld>
             <a:endParaRPr lang="en-US"/>
           </a:p>
@@ -10396,7 +11909,7 @@
           <a:p>
             <a:fld id="{FA88A723-210D-49FB-911D-CC70F62696A5}" type="datetimeFigureOut">
               <a:rPr lang="en-US" smtClean="0"/>
-              <a:t>11/14/2016</a:t>
+              <a:t>1/26/2017</a:t>
             </a:fld>
             <a:endParaRPr lang="en-US"/>
           </a:p>
@@ -10642,7 +12155,7 @@
           <a:p>
             <a:fld id="{FA88A723-210D-49FB-911D-CC70F62696A5}" type="datetimeFigureOut">
               <a:rPr lang="en-US" smtClean="0"/>
-              <a:t>11/14/2016</a:t>
+              <a:t>1/26/2017</a:t>
             </a:fld>
             <a:endParaRPr lang="en-US"/>
           </a:p>
@@ -10874,7 +12387,7 @@
           <a:p>
             <a:fld id="{FA88A723-210D-49FB-911D-CC70F62696A5}" type="datetimeFigureOut">
               <a:rPr lang="en-US" smtClean="0"/>
-              <a:t>11/14/2016</a:t>
+              <a:t>1/26/2017</a:t>
             </a:fld>
             <a:endParaRPr lang="en-US"/>
           </a:p>
@@ -11241,7 +12754,7 @@
           <a:p>
             <a:fld id="{FA88A723-210D-49FB-911D-CC70F62696A5}" type="datetimeFigureOut">
               <a:rPr lang="en-US" smtClean="0"/>
-              <a:t>11/14/2016</a:t>
+              <a:t>1/26/2017</a:t>
             </a:fld>
             <a:endParaRPr lang="en-US"/>
           </a:p>
@@ -11359,7 +12872,7 @@
           <a:p>
             <a:fld id="{FA88A723-210D-49FB-911D-CC70F62696A5}" type="datetimeFigureOut">
               <a:rPr lang="en-US" smtClean="0"/>
-              <a:t>11/14/2016</a:t>
+              <a:t>1/26/2017</a:t>
             </a:fld>
             <a:endParaRPr lang="en-US"/>
           </a:p>
@@ -11454,7 +12967,7 @@
           <a:p>
             <a:fld id="{FA88A723-210D-49FB-911D-CC70F62696A5}" type="datetimeFigureOut">
               <a:rPr lang="en-US" smtClean="0"/>
-              <a:t>11/14/2016</a:t>
+              <a:t>1/26/2017</a:t>
             </a:fld>
             <a:endParaRPr lang="en-US"/>
           </a:p>
@@ -11731,7 +13244,7 @@
           <a:p>
             <a:fld id="{FA88A723-210D-49FB-911D-CC70F62696A5}" type="datetimeFigureOut">
               <a:rPr lang="en-US" smtClean="0"/>
-              <a:t>11/14/2016</a:t>
+              <a:t>1/26/2017</a:t>
             </a:fld>
             <a:endParaRPr lang="en-US"/>
           </a:p>
@@ -11984,7 +13497,7 @@
           <a:p>
             <a:fld id="{FA88A723-210D-49FB-911D-CC70F62696A5}" type="datetimeFigureOut">
               <a:rPr lang="en-US" smtClean="0"/>
-              <a:t>11/14/2016</a:t>
+              <a:t>1/26/2017</a:t>
             </a:fld>
             <a:endParaRPr lang="en-US"/>
           </a:p>
@@ -12197,7 +13710,7 @@
           <a:p>
             <a:fld id="{FA88A723-210D-49FB-911D-CC70F62696A5}" type="datetimeFigureOut">
               <a:rPr lang="en-US" smtClean="0"/>
-              <a:t>11/14/2016</a:t>
+              <a:t>1/26/2017</a:t>
             </a:fld>
             <a:endParaRPr lang="en-US"/>
           </a:p>
@@ -22719,7 +24232,7 @@
           <p:nvPr>
             <p:extLst>
               <p:ext uri="{D42A27DB-BD31-4B8C-83A1-F6EECF244321}">
-                <p14:modId xmlns:p14="http://schemas.microsoft.com/office/powerpoint/2010/main" val="1663175443"/>
+                <p14:modId xmlns:p14="http://schemas.microsoft.com/office/powerpoint/2010/main" val="2563742591"/>
               </p:ext>
             </p:extLst>
           </p:nvPr>

</xml_diff>

<commit_message>
[UIMA-5287] bunch of small improvements to uv3 doc
git-svn-id: https://svn.apache.org/repos/asf/uima/uimaj/branches/experiment-v3-jcas@1781265 13f79535-47bb-0310-9956-ffa450edef68
</commit_message>
<xml_diff>
--- a/uima-docbook-v3-users-guide/src/image-source/source.pptx
+++ b/uima-docbook-v3-users-guide/src/image-source/source.pptx
@@ -6234,6 +6234,1826 @@
       <dsp:cNvGrpSpPr/>
     </dsp:nvGrpSpPr>
     <dsp:grpSpPr/>
+    <dsp:sp modelId="{FA3637AE-5E0F-478A-BA47-28082756EE59}">
+      <dsp:nvSpPr>
+        <dsp:cNvPr id="0" name=""/>
+        <dsp:cNvSpPr/>
+      </dsp:nvSpPr>
+      <dsp:spPr>
+        <a:xfrm>
+          <a:off x="112154" y="39361"/>
+          <a:ext cx="1646967" cy="718258"/>
+        </a:xfrm>
+        <a:prstGeom prst="roundRect">
+          <a:avLst>
+            <a:gd name="adj" fmla="val 10000"/>
+          </a:avLst>
+        </a:prstGeom>
+        <a:gradFill rotWithShape="0">
+          <a:gsLst>
+            <a:gs pos="0">
+              <a:srgbClr val="FFCCFF">
+                <a:lumMod val="50000"/>
+                <a:lumOff val="50000"/>
+              </a:srgbClr>
+            </a:gs>
+            <a:gs pos="100000">
+              <a:srgbClr val="FFCCFF"/>
+            </a:gs>
+          </a:gsLst>
+          <a:lin ang="5400000" scaled="0"/>
+        </a:gradFill>
+        <a:ln w="6350" cap="flat" cmpd="sng" algn="ctr">
+          <a:solidFill>
+            <a:schemeClr val="accent2"/>
+          </a:solidFill>
+          <a:prstDash val="solid"/>
+          <a:miter lim="800000"/>
+        </a:ln>
+        <a:effectLst/>
+      </dsp:spPr>
+      <dsp:style>
+        <a:lnRef idx="1">
+          <a:schemeClr val="accent2"/>
+        </a:lnRef>
+        <a:fillRef idx="2">
+          <a:schemeClr val="accent2"/>
+        </a:fillRef>
+        <a:effectRef idx="1">
+          <a:schemeClr val="accent2"/>
+        </a:effectRef>
+        <a:fontRef idx="minor">
+          <a:schemeClr val="dk1"/>
+        </a:fontRef>
+      </dsp:style>
+      <dsp:txBody>
+        <a:bodyPr spcFirstLastPara="0" vert="horz" wrap="square" lIns="28575" tIns="19050" rIns="28575" bIns="19050" numCol="1" spcCol="1270" anchor="ctr" anchorCtr="0">
+          <a:noAutofit/>
+        </a:bodyPr>
+        <a:lstStyle/>
+        <a:p>
+          <a:pPr lvl="0" algn="ctr" defTabSz="666750">
+            <a:lnSpc>
+              <a:spcPct val="90000"/>
+            </a:lnSpc>
+            <a:spcBef>
+              <a:spcPct val="0"/>
+            </a:spcBef>
+            <a:spcAft>
+              <a:spcPct val="35000"/>
+            </a:spcAft>
+          </a:pPr>
+          <a:r>
+            <a:rPr lang="en-US" sz="1500" kern="1200" dirty="0" smtClean="0"/>
+            <a:t>Annotation index - </a:t>
+          </a:r>
+          <a:r>
+            <a:rPr lang="en-US" sz="1500" kern="1200" dirty="0" err="1" smtClean="0"/>
+            <a:t>subselect</a:t>
+          </a:r>
+          <a:endParaRPr lang="en-US" sz="1500" kern="1200" dirty="0"/>
+        </a:p>
+      </dsp:txBody>
+      <dsp:txXfrm>
+        <a:off x="133191" y="60398"/>
+        <a:ext cx="1604893" cy="676184"/>
+      </dsp:txXfrm>
+    </dsp:sp>
+    <dsp:sp modelId="{8C37D885-6593-462C-AA05-6CD8EA638401}">
+      <dsp:nvSpPr>
+        <dsp:cNvPr id="0" name=""/>
+        <dsp:cNvSpPr/>
+      </dsp:nvSpPr>
+      <dsp:spPr>
+        <a:xfrm>
+          <a:off x="231131" y="757619"/>
+          <a:ext cx="91440" cy="384961"/>
+        </a:xfrm>
+        <a:custGeom>
+          <a:avLst/>
+          <a:gdLst/>
+          <a:ahLst/>
+          <a:cxnLst/>
+          <a:rect l="0" t="0" r="0" b="0"/>
+          <a:pathLst>
+            <a:path>
+              <a:moveTo>
+                <a:pt x="45720" y="0"/>
+              </a:moveTo>
+              <a:lnTo>
+                <a:pt x="45720" y="384961"/>
+              </a:lnTo>
+              <a:lnTo>
+                <a:pt x="130868" y="384961"/>
+              </a:lnTo>
+            </a:path>
+          </a:pathLst>
+        </a:custGeom>
+        <a:noFill/>
+        <a:ln w="12700" cap="flat" cmpd="sng" algn="ctr">
+          <a:solidFill>
+            <a:schemeClr val="accent1">
+              <a:shade val="60000"/>
+              <a:hueOff val="0"/>
+              <a:satOff val="0"/>
+              <a:lumOff val="0"/>
+              <a:alphaOff val="0"/>
+            </a:schemeClr>
+          </a:solidFill>
+          <a:prstDash val="solid"/>
+          <a:miter lim="800000"/>
+        </a:ln>
+        <a:effectLst/>
+      </dsp:spPr>
+      <dsp:style>
+        <a:lnRef idx="2">
+          <a:scrgbClr r="0" g="0" b="0"/>
+        </a:lnRef>
+        <a:fillRef idx="0">
+          <a:scrgbClr r="0" g="0" b="0"/>
+        </a:fillRef>
+        <a:effectRef idx="0">
+          <a:scrgbClr r="0" g="0" b="0"/>
+        </a:effectRef>
+        <a:fontRef idx="minor"/>
+      </dsp:style>
+    </dsp:sp>
+    <dsp:sp modelId="{3AC43A25-BC81-4A6B-BE8D-FB2B2029355A}">
+      <dsp:nvSpPr>
+        <dsp:cNvPr id="0" name=""/>
+        <dsp:cNvSpPr/>
+      </dsp:nvSpPr>
+      <dsp:spPr>
+        <a:xfrm>
+          <a:off x="361999" y="1012659"/>
+          <a:ext cx="1067665" cy="259844"/>
+        </a:xfrm>
+        <a:prstGeom prst="roundRect">
+          <a:avLst>
+            <a:gd name="adj" fmla="val 10000"/>
+          </a:avLst>
+        </a:prstGeom>
+        <a:gradFill rotWithShape="0">
+          <a:gsLst>
+            <a:gs pos="0">
+              <a:srgbClr val="FFD9D1">
+                <a:alpha val="49804"/>
+              </a:srgbClr>
+            </a:gs>
+            <a:gs pos="100000">
+              <a:srgbClr val="FFD9D1"/>
+            </a:gs>
+          </a:gsLst>
+          <a:lin ang="5400000" scaled="0"/>
+        </a:gradFill>
+        <a:ln w="6350" cap="flat" cmpd="sng" algn="ctr">
+          <a:solidFill>
+            <a:schemeClr val="accent1">
+              <a:hueOff val="0"/>
+              <a:satOff val="0"/>
+              <a:lumOff val="0"/>
+              <a:alphaOff val="0"/>
+            </a:schemeClr>
+          </a:solidFill>
+          <a:prstDash val="solid"/>
+          <a:miter lim="800000"/>
+        </a:ln>
+        <a:effectLst/>
+      </dsp:spPr>
+      <dsp:style>
+        <a:lnRef idx="1">
+          <a:scrgbClr r="0" g="0" b="0"/>
+        </a:lnRef>
+        <a:fillRef idx="1">
+          <a:scrgbClr r="0" g="0" b="0"/>
+        </a:fillRef>
+        <a:effectRef idx="2">
+          <a:scrgbClr r="0" g="0" b="0"/>
+        </a:effectRef>
+        <a:fontRef idx="minor"/>
+      </dsp:style>
+      <dsp:txBody>
+        <a:bodyPr spcFirstLastPara="0" vert="horz" wrap="square" lIns="26670" tIns="17780" rIns="26670" bIns="17780" numCol="1" spcCol="1270" anchor="ctr" anchorCtr="0">
+          <a:noAutofit/>
+        </a:bodyPr>
+        <a:lstStyle/>
+        <a:p>
+          <a:pPr lvl="0" algn="ctr" defTabSz="622300">
+            <a:lnSpc>
+              <a:spcPct val="90000"/>
+            </a:lnSpc>
+            <a:spcBef>
+              <a:spcPct val="0"/>
+            </a:spcBef>
+            <a:spcAft>
+              <a:spcPct val="35000"/>
+            </a:spcAft>
+          </a:pPr>
+          <a:r>
+            <a:rPr lang="en-US" sz="1400" kern="1200" dirty="0" err="1" smtClean="0"/>
+            <a:t>coveredBy</a:t>
+          </a:r>
+          <a:endParaRPr lang="en-US" sz="1400" kern="1200" dirty="0"/>
+        </a:p>
+      </dsp:txBody>
+      <dsp:txXfrm>
+        <a:off x="369610" y="1020270"/>
+        <a:ext cx="1052443" cy="244622"/>
+      </dsp:txXfrm>
+    </dsp:sp>
+    <dsp:sp modelId="{5FA849F3-2870-4117-B35F-44C7C5D9D3F5}">
+      <dsp:nvSpPr>
+        <dsp:cNvPr id="0" name=""/>
+        <dsp:cNvSpPr/>
+      </dsp:nvSpPr>
+      <dsp:spPr>
+        <a:xfrm>
+          <a:off x="231131" y="757619"/>
+          <a:ext cx="91440" cy="793449"/>
+        </a:xfrm>
+        <a:custGeom>
+          <a:avLst/>
+          <a:gdLst/>
+          <a:ahLst/>
+          <a:cxnLst/>
+          <a:rect l="0" t="0" r="0" b="0"/>
+          <a:pathLst>
+            <a:path>
+              <a:moveTo>
+                <a:pt x="45720" y="0"/>
+              </a:moveTo>
+              <a:lnTo>
+                <a:pt x="45720" y="793449"/>
+              </a:lnTo>
+              <a:lnTo>
+                <a:pt x="120168" y="793449"/>
+              </a:lnTo>
+            </a:path>
+          </a:pathLst>
+        </a:custGeom>
+        <a:noFill/>
+        <a:ln w="12700" cap="flat" cmpd="sng" algn="ctr">
+          <a:solidFill>
+            <a:schemeClr val="accent1">
+              <a:shade val="60000"/>
+              <a:hueOff val="0"/>
+              <a:satOff val="0"/>
+              <a:lumOff val="0"/>
+              <a:alphaOff val="0"/>
+            </a:schemeClr>
+          </a:solidFill>
+          <a:prstDash val="solid"/>
+          <a:miter lim="800000"/>
+        </a:ln>
+        <a:effectLst/>
+      </dsp:spPr>
+      <dsp:style>
+        <a:lnRef idx="2">
+          <a:scrgbClr r="0" g="0" b="0"/>
+        </a:lnRef>
+        <a:fillRef idx="0">
+          <a:scrgbClr r="0" g="0" b="0"/>
+        </a:fillRef>
+        <a:effectRef idx="0">
+          <a:scrgbClr r="0" g="0" b="0"/>
+        </a:effectRef>
+        <a:fontRef idx="minor"/>
+      </dsp:style>
+    </dsp:sp>
+    <dsp:sp modelId="{D87CF371-4165-4ECD-9CC4-97F516956AB5}">
+      <dsp:nvSpPr>
+        <dsp:cNvPr id="0" name=""/>
+        <dsp:cNvSpPr/>
+      </dsp:nvSpPr>
+      <dsp:spPr>
+        <a:xfrm>
+          <a:off x="351300" y="1421147"/>
+          <a:ext cx="1067665" cy="259844"/>
+        </a:xfrm>
+        <a:prstGeom prst="roundRect">
+          <a:avLst>
+            <a:gd name="adj" fmla="val 10000"/>
+          </a:avLst>
+        </a:prstGeom>
+        <a:gradFill rotWithShape="0">
+          <a:gsLst>
+            <a:gs pos="0">
+              <a:srgbClr val="FFD9D1">
+                <a:alpha val="49804"/>
+              </a:srgbClr>
+            </a:gs>
+            <a:gs pos="100000">
+              <a:srgbClr val="FFD9D1"/>
+            </a:gs>
+          </a:gsLst>
+          <a:lin ang="5400000" scaled="0"/>
+        </a:gradFill>
+        <a:ln w="6350" cap="flat" cmpd="sng" algn="ctr">
+          <a:solidFill>
+            <a:schemeClr val="accent1">
+              <a:hueOff val="0"/>
+              <a:satOff val="0"/>
+              <a:lumOff val="0"/>
+              <a:alphaOff val="0"/>
+            </a:schemeClr>
+          </a:solidFill>
+          <a:prstDash val="solid"/>
+          <a:miter lim="800000"/>
+        </a:ln>
+        <a:effectLst/>
+      </dsp:spPr>
+      <dsp:style>
+        <a:lnRef idx="1">
+          <a:scrgbClr r="0" g="0" b="0"/>
+        </a:lnRef>
+        <a:fillRef idx="1">
+          <a:scrgbClr r="0" g="0" b="0"/>
+        </a:fillRef>
+        <a:effectRef idx="2">
+          <a:scrgbClr r="0" g="0" b="0"/>
+        </a:effectRef>
+        <a:fontRef idx="minor"/>
+      </dsp:style>
+      <dsp:txBody>
+        <a:bodyPr spcFirstLastPara="0" vert="horz" wrap="square" lIns="26670" tIns="17780" rIns="26670" bIns="17780" numCol="1" spcCol="1270" anchor="ctr" anchorCtr="0">
+          <a:noAutofit/>
+        </a:bodyPr>
+        <a:lstStyle/>
+        <a:p>
+          <a:pPr lvl="0" algn="ctr" defTabSz="622300">
+            <a:lnSpc>
+              <a:spcPct val="90000"/>
+            </a:lnSpc>
+            <a:spcBef>
+              <a:spcPct val="0"/>
+            </a:spcBef>
+            <a:spcAft>
+              <a:spcPct val="35000"/>
+            </a:spcAft>
+          </a:pPr>
+          <a:r>
+            <a:rPr lang="en-US" sz="1400" kern="1200" dirty="0" smtClean="0"/>
+            <a:t>covering</a:t>
+          </a:r>
+          <a:endParaRPr lang="en-US" sz="1400" kern="1200" dirty="0"/>
+        </a:p>
+      </dsp:txBody>
+      <dsp:txXfrm>
+        <a:off x="358911" y="1428758"/>
+        <a:ext cx="1052443" cy="244622"/>
+      </dsp:txXfrm>
+    </dsp:sp>
+    <dsp:sp modelId="{7292F0EE-BF4C-4928-999E-A35FCFE0A11A}">
+      <dsp:nvSpPr>
+        <dsp:cNvPr id="0" name=""/>
+        <dsp:cNvSpPr/>
+      </dsp:nvSpPr>
+      <dsp:spPr>
+        <a:xfrm>
+          <a:off x="231131" y="757619"/>
+          <a:ext cx="91440" cy="1197663"/>
+        </a:xfrm>
+        <a:custGeom>
+          <a:avLst/>
+          <a:gdLst/>
+          <a:ahLst/>
+          <a:cxnLst/>
+          <a:rect l="0" t="0" r="0" b="0"/>
+          <a:pathLst>
+            <a:path>
+              <a:moveTo>
+                <a:pt x="45720" y="0"/>
+              </a:moveTo>
+              <a:lnTo>
+                <a:pt x="45720" y="1197663"/>
+              </a:lnTo>
+              <a:lnTo>
+                <a:pt x="130063" y="1197663"/>
+              </a:lnTo>
+            </a:path>
+          </a:pathLst>
+        </a:custGeom>
+        <a:noFill/>
+        <a:ln w="12700" cap="flat" cmpd="sng" algn="ctr">
+          <a:solidFill>
+            <a:schemeClr val="accent1">
+              <a:shade val="60000"/>
+              <a:hueOff val="0"/>
+              <a:satOff val="0"/>
+              <a:lumOff val="0"/>
+              <a:alphaOff val="0"/>
+            </a:schemeClr>
+          </a:solidFill>
+          <a:prstDash val="solid"/>
+          <a:miter lim="800000"/>
+        </a:ln>
+        <a:effectLst/>
+      </dsp:spPr>
+      <dsp:style>
+        <a:lnRef idx="2">
+          <a:scrgbClr r="0" g="0" b="0"/>
+        </a:lnRef>
+        <a:fillRef idx="0">
+          <a:scrgbClr r="0" g="0" b="0"/>
+        </a:fillRef>
+        <a:effectRef idx="0">
+          <a:scrgbClr r="0" g="0" b="0"/>
+        </a:effectRef>
+        <a:fontRef idx="minor"/>
+      </dsp:style>
+    </dsp:sp>
+    <dsp:sp modelId="{902E56C3-7153-4967-A765-4755747B76A3}">
+      <dsp:nvSpPr>
+        <dsp:cNvPr id="0" name=""/>
+        <dsp:cNvSpPr/>
+      </dsp:nvSpPr>
+      <dsp:spPr>
+        <a:xfrm>
+          <a:off x="361195" y="1825361"/>
+          <a:ext cx="1067665" cy="259844"/>
+        </a:xfrm>
+        <a:prstGeom prst="roundRect">
+          <a:avLst>
+            <a:gd name="adj" fmla="val 10000"/>
+          </a:avLst>
+        </a:prstGeom>
+        <a:gradFill rotWithShape="0">
+          <a:gsLst>
+            <a:gs pos="0">
+              <a:srgbClr val="FFD9D1">
+                <a:alpha val="49804"/>
+              </a:srgbClr>
+            </a:gs>
+            <a:gs pos="100000">
+              <a:srgbClr val="FFD9D1"/>
+            </a:gs>
+          </a:gsLst>
+          <a:lin ang="5400000" scaled="0"/>
+        </a:gradFill>
+        <a:ln w="6350" cap="flat" cmpd="sng" algn="ctr">
+          <a:solidFill>
+            <a:schemeClr val="accent1">
+              <a:hueOff val="0"/>
+              <a:satOff val="0"/>
+              <a:lumOff val="0"/>
+              <a:alphaOff val="0"/>
+            </a:schemeClr>
+          </a:solidFill>
+          <a:prstDash val="solid"/>
+          <a:miter lim="800000"/>
+        </a:ln>
+        <a:effectLst/>
+      </dsp:spPr>
+      <dsp:style>
+        <a:lnRef idx="1">
+          <a:scrgbClr r="0" g="0" b="0"/>
+        </a:lnRef>
+        <a:fillRef idx="1">
+          <a:scrgbClr r="0" g="0" b="0"/>
+        </a:fillRef>
+        <a:effectRef idx="2">
+          <a:scrgbClr r="0" g="0" b="0"/>
+        </a:effectRef>
+        <a:fontRef idx="minor"/>
+      </dsp:style>
+      <dsp:txBody>
+        <a:bodyPr spcFirstLastPara="0" vert="horz" wrap="square" lIns="26670" tIns="17780" rIns="26670" bIns="17780" numCol="1" spcCol="1270" anchor="ctr" anchorCtr="0">
+          <a:noAutofit/>
+        </a:bodyPr>
+        <a:lstStyle/>
+        <a:p>
+          <a:pPr lvl="0" algn="ctr" defTabSz="622300">
+            <a:lnSpc>
+              <a:spcPct val="90000"/>
+            </a:lnSpc>
+            <a:spcBef>
+              <a:spcPct val="0"/>
+            </a:spcBef>
+            <a:spcAft>
+              <a:spcPct val="35000"/>
+            </a:spcAft>
+          </a:pPr>
+          <a:r>
+            <a:rPr lang="en-US" sz="1400" kern="1200" dirty="0" smtClean="0"/>
+            <a:t>at</a:t>
+          </a:r>
+          <a:endParaRPr lang="en-US" sz="1400" kern="1200" dirty="0"/>
+        </a:p>
+      </dsp:txBody>
+      <dsp:txXfrm>
+        <a:off x="368806" y="1832972"/>
+        <a:ext cx="1052443" cy="244622"/>
+      </dsp:txXfrm>
+    </dsp:sp>
+    <dsp:sp modelId="{CCEF3560-3C73-4128-89F8-DC7E6E2E204B}">
+      <dsp:nvSpPr>
+        <dsp:cNvPr id="0" name=""/>
+        <dsp:cNvSpPr/>
+      </dsp:nvSpPr>
+      <dsp:spPr>
+        <a:xfrm>
+          <a:off x="231131" y="757619"/>
+          <a:ext cx="91440" cy="1661070"/>
+        </a:xfrm>
+        <a:custGeom>
+          <a:avLst/>
+          <a:gdLst/>
+          <a:ahLst/>
+          <a:cxnLst/>
+          <a:rect l="0" t="0" r="0" b="0"/>
+          <a:pathLst>
+            <a:path>
+              <a:moveTo>
+                <a:pt x="45720" y="0"/>
+              </a:moveTo>
+              <a:lnTo>
+                <a:pt x="45720" y="1661070"/>
+              </a:lnTo>
+              <a:lnTo>
+                <a:pt x="130063" y="1661070"/>
+              </a:lnTo>
+            </a:path>
+          </a:pathLst>
+        </a:custGeom>
+        <a:noFill/>
+        <a:ln w="12700" cap="flat" cmpd="sng" algn="ctr">
+          <a:solidFill>
+            <a:schemeClr val="accent1">
+              <a:shade val="60000"/>
+              <a:hueOff val="0"/>
+              <a:satOff val="0"/>
+              <a:lumOff val="0"/>
+              <a:alphaOff val="0"/>
+            </a:schemeClr>
+          </a:solidFill>
+          <a:prstDash val="solid"/>
+          <a:miter lim="800000"/>
+        </a:ln>
+        <a:effectLst/>
+      </dsp:spPr>
+      <dsp:style>
+        <a:lnRef idx="2">
+          <a:scrgbClr r="0" g="0" b="0"/>
+        </a:lnRef>
+        <a:fillRef idx="0">
+          <a:scrgbClr r="0" g="0" b="0"/>
+        </a:fillRef>
+        <a:effectRef idx="0">
+          <a:scrgbClr r="0" g="0" b="0"/>
+        </a:effectRef>
+        <a:fontRef idx="minor"/>
+      </dsp:style>
+    </dsp:sp>
+    <dsp:sp modelId="{964BD0A1-575D-4561-A934-3A5596A69899}">
+      <dsp:nvSpPr>
+        <dsp:cNvPr id="0" name=""/>
+        <dsp:cNvSpPr/>
+      </dsp:nvSpPr>
+      <dsp:spPr>
+        <a:xfrm>
+          <a:off x="361195" y="2288767"/>
+          <a:ext cx="1067665" cy="259844"/>
+        </a:xfrm>
+        <a:prstGeom prst="roundRect">
+          <a:avLst>
+            <a:gd name="adj" fmla="val 10000"/>
+          </a:avLst>
+        </a:prstGeom>
+        <a:gradFill rotWithShape="0">
+          <a:gsLst>
+            <a:gs pos="0">
+              <a:srgbClr val="FFD9D1">
+                <a:alpha val="49804"/>
+              </a:srgbClr>
+            </a:gs>
+            <a:gs pos="100000">
+              <a:srgbClr val="FFD9D1"/>
+            </a:gs>
+          </a:gsLst>
+          <a:lin ang="5400000" scaled="0"/>
+        </a:gradFill>
+        <a:ln w="6350" cap="flat" cmpd="sng" algn="ctr">
+          <a:solidFill>
+            <a:schemeClr val="accent1">
+              <a:hueOff val="0"/>
+              <a:satOff val="0"/>
+              <a:lumOff val="0"/>
+              <a:alphaOff val="0"/>
+            </a:schemeClr>
+          </a:solidFill>
+          <a:prstDash val="solid"/>
+          <a:miter lim="800000"/>
+        </a:ln>
+        <a:effectLst/>
+      </dsp:spPr>
+      <dsp:style>
+        <a:lnRef idx="1">
+          <a:scrgbClr r="0" g="0" b="0"/>
+        </a:lnRef>
+        <a:fillRef idx="1">
+          <a:scrgbClr r="0" g="0" b="0"/>
+        </a:fillRef>
+        <a:effectRef idx="2">
+          <a:scrgbClr r="0" g="0" b="0"/>
+        </a:effectRef>
+        <a:fontRef idx="minor"/>
+      </dsp:style>
+      <dsp:txBody>
+        <a:bodyPr spcFirstLastPara="0" vert="horz" wrap="square" lIns="26670" tIns="17780" rIns="26670" bIns="17780" numCol="1" spcCol="1270" anchor="ctr" anchorCtr="0">
+          <a:noAutofit/>
+        </a:bodyPr>
+        <a:lstStyle/>
+        <a:p>
+          <a:pPr lvl="0" algn="ctr" defTabSz="622300">
+            <a:lnSpc>
+              <a:spcPct val="90000"/>
+            </a:lnSpc>
+            <a:spcBef>
+              <a:spcPct val="0"/>
+            </a:spcBef>
+            <a:spcAft>
+              <a:spcPct val="35000"/>
+            </a:spcAft>
+          </a:pPr>
+          <a:r>
+            <a:rPr lang="en-US" sz="1400" kern="1200" dirty="0" smtClean="0"/>
+            <a:t>between</a:t>
+          </a:r>
+          <a:endParaRPr lang="en-US" sz="1400" kern="1200" dirty="0"/>
+        </a:p>
+      </dsp:txBody>
+      <dsp:txXfrm>
+        <a:off x="368806" y="2296378"/>
+        <a:ext cx="1052443" cy="244622"/>
+      </dsp:txXfrm>
+    </dsp:sp>
+    <dsp:sp modelId="{508C05A8-918D-425D-B9FA-95D7693DA324}">
+      <dsp:nvSpPr>
+        <dsp:cNvPr id="0" name=""/>
+        <dsp:cNvSpPr/>
+      </dsp:nvSpPr>
+      <dsp:spPr>
+        <a:xfrm>
+          <a:off x="1987844" y="48885"/>
+          <a:ext cx="1436517" cy="718258"/>
+        </a:xfrm>
+        <a:prstGeom prst="roundRect">
+          <a:avLst>
+            <a:gd name="adj" fmla="val 10000"/>
+          </a:avLst>
+        </a:prstGeom>
+        <a:gradFill rotWithShape="0">
+          <a:gsLst>
+            <a:gs pos="0">
+              <a:srgbClr val="FFCCFF">
+                <a:lumMod val="50000"/>
+                <a:lumOff val="50000"/>
+              </a:srgbClr>
+            </a:gs>
+            <a:gs pos="100000">
+              <a:srgbClr val="FFCCFF"/>
+            </a:gs>
+          </a:gsLst>
+          <a:lin ang="5400000" scaled="0"/>
+        </a:gradFill>
+        <a:ln w="6350" cap="flat" cmpd="sng" algn="ctr">
+          <a:solidFill>
+            <a:schemeClr val="accent2"/>
+          </a:solidFill>
+          <a:prstDash val="solid"/>
+          <a:miter lim="800000"/>
+        </a:ln>
+        <a:effectLst/>
+      </dsp:spPr>
+      <dsp:style>
+        <a:lnRef idx="1">
+          <a:schemeClr val="accent2"/>
+        </a:lnRef>
+        <a:fillRef idx="2">
+          <a:schemeClr val="accent2"/>
+        </a:fillRef>
+        <a:effectRef idx="1">
+          <a:schemeClr val="accent2"/>
+        </a:effectRef>
+        <a:fontRef idx="minor">
+          <a:schemeClr val="dk1"/>
+        </a:fontRef>
+      </dsp:style>
+      <dsp:txBody>
+        <a:bodyPr spcFirstLastPara="0" vert="horz" wrap="square" lIns="28575" tIns="19050" rIns="28575" bIns="19050" numCol="1" spcCol="1270" anchor="ctr" anchorCtr="0">
+          <a:noAutofit/>
+        </a:bodyPr>
+        <a:lstStyle/>
+        <a:p>
+          <a:pPr lvl="0" algn="ctr" defTabSz="666750">
+            <a:lnSpc>
+              <a:spcPct val="90000"/>
+            </a:lnSpc>
+            <a:spcBef>
+              <a:spcPct val="0"/>
+            </a:spcBef>
+            <a:spcAft>
+              <a:spcPct val="35000"/>
+            </a:spcAft>
+          </a:pPr>
+          <a:r>
+            <a:rPr lang="en-US" sz="1500" kern="1200" dirty="0" smtClean="0"/>
+            <a:t>Annotation index - variations</a:t>
+          </a:r>
+          <a:endParaRPr lang="en-US" sz="1500" kern="1200" dirty="0"/>
+        </a:p>
+      </dsp:txBody>
+      <dsp:txXfrm>
+        <a:off x="2008881" y="69922"/>
+        <a:ext cx="1394443" cy="676184"/>
+      </dsp:txXfrm>
+    </dsp:sp>
+    <dsp:sp modelId="{06ACC55D-1859-48B9-923E-41A7399F42ED}">
+      <dsp:nvSpPr>
+        <dsp:cNvPr id="0" name=""/>
+        <dsp:cNvSpPr/>
+      </dsp:nvSpPr>
+      <dsp:spPr>
+        <a:xfrm>
+          <a:off x="2131495" y="767143"/>
+          <a:ext cx="127028" cy="383050"/>
+        </a:xfrm>
+        <a:custGeom>
+          <a:avLst/>
+          <a:gdLst/>
+          <a:ahLst/>
+          <a:cxnLst/>
+          <a:rect l="0" t="0" r="0" b="0"/>
+          <a:pathLst>
+            <a:path>
+              <a:moveTo>
+                <a:pt x="0" y="0"/>
+              </a:moveTo>
+              <a:lnTo>
+                <a:pt x="0" y="383050"/>
+              </a:lnTo>
+              <a:lnTo>
+                <a:pt x="127028" y="383050"/>
+              </a:lnTo>
+            </a:path>
+          </a:pathLst>
+        </a:custGeom>
+        <a:noFill/>
+        <a:ln w="12700" cap="flat" cmpd="sng" algn="ctr">
+          <a:solidFill>
+            <a:schemeClr val="accent1">
+              <a:shade val="60000"/>
+              <a:hueOff val="0"/>
+              <a:satOff val="0"/>
+              <a:lumOff val="0"/>
+              <a:alphaOff val="0"/>
+            </a:schemeClr>
+          </a:solidFill>
+          <a:prstDash val="solid"/>
+          <a:miter lim="800000"/>
+        </a:ln>
+        <a:effectLst/>
+      </dsp:spPr>
+      <dsp:style>
+        <a:lnRef idx="2">
+          <a:scrgbClr r="0" g="0" b="0"/>
+        </a:lnRef>
+        <a:fillRef idx="0">
+          <a:scrgbClr r="0" g="0" b="0"/>
+        </a:fillRef>
+        <a:effectRef idx="0">
+          <a:scrgbClr r="0" g="0" b="0"/>
+        </a:effectRef>
+        <a:fontRef idx="minor"/>
+      </dsp:style>
+    </dsp:sp>
+    <dsp:sp modelId="{2AFCFA76-6F7A-4479-983C-FEF5916C6BD8}">
+      <dsp:nvSpPr>
+        <dsp:cNvPr id="0" name=""/>
+        <dsp:cNvSpPr/>
+      </dsp:nvSpPr>
+      <dsp:spPr>
+        <a:xfrm>
+          <a:off x="2258524" y="1020272"/>
+          <a:ext cx="1391514" cy="259844"/>
+        </a:xfrm>
+        <a:prstGeom prst="roundRect">
+          <a:avLst>
+            <a:gd name="adj" fmla="val 10000"/>
+          </a:avLst>
+        </a:prstGeom>
+        <a:gradFill rotWithShape="0">
+          <a:gsLst>
+            <a:gs pos="0">
+              <a:srgbClr val="FFD9D1">
+                <a:alpha val="49804"/>
+              </a:srgbClr>
+            </a:gs>
+            <a:gs pos="100000">
+              <a:srgbClr val="FFD9D1"/>
+            </a:gs>
+          </a:gsLst>
+          <a:lin ang="5400000" scaled="0"/>
+        </a:gradFill>
+        <a:ln w="6350" cap="flat" cmpd="sng" algn="ctr">
+          <a:solidFill>
+            <a:schemeClr val="accent1">
+              <a:hueOff val="0"/>
+              <a:satOff val="0"/>
+              <a:lumOff val="0"/>
+              <a:alphaOff val="0"/>
+            </a:schemeClr>
+          </a:solidFill>
+          <a:prstDash val="solid"/>
+          <a:miter lim="800000"/>
+        </a:ln>
+        <a:effectLst/>
+      </dsp:spPr>
+      <dsp:style>
+        <a:lnRef idx="1">
+          <a:scrgbClr r="0" g="0" b="0"/>
+        </a:lnRef>
+        <a:fillRef idx="1">
+          <a:scrgbClr r="0" g="0" b="0"/>
+        </a:fillRef>
+        <a:effectRef idx="2">
+          <a:scrgbClr r="0" g="0" b="0"/>
+        </a:effectRef>
+        <a:fontRef idx="minor"/>
+      </dsp:style>
+      <dsp:txBody>
+        <a:bodyPr spcFirstLastPara="0" vert="horz" wrap="square" lIns="26670" tIns="17780" rIns="26670" bIns="17780" numCol="1" spcCol="1270" anchor="ctr" anchorCtr="0">
+          <a:noAutofit/>
+        </a:bodyPr>
+        <a:lstStyle/>
+        <a:p>
+          <a:pPr lvl="0" algn="ctr" defTabSz="622300">
+            <a:lnSpc>
+              <a:spcPct val="90000"/>
+            </a:lnSpc>
+            <a:spcBef>
+              <a:spcPct val="0"/>
+            </a:spcBef>
+            <a:spcAft>
+              <a:spcPct val="35000"/>
+            </a:spcAft>
+          </a:pPr>
+          <a:r>
+            <a:rPr lang="en-US" sz="1400" kern="1200" dirty="0" err="1" smtClean="0"/>
+            <a:t>typePriority</a:t>
+          </a:r>
+          <a:endParaRPr lang="en-US" sz="1400" kern="1200" dirty="0"/>
+        </a:p>
+      </dsp:txBody>
+      <dsp:txXfrm>
+        <a:off x="2266135" y="1027883"/>
+        <a:ext cx="1376292" cy="244622"/>
+      </dsp:txXfrm>
+    </dsp:sp>
+    <dsp:sp modelId="{457EBE8C-597D-433F-966E-30FD815E5E2D}">
+      <dsp:nvSpPr>
+        <dsp:cNvPr id="0" name=""/>
+        <dsp:cNvSpPr/>
+      </dsp:nvSpPr>
+      <dsp:spPr>
+        <a:xfrm>
+          <a:off x="2131495" y="767143"/>
+          <a:ext cx="127545" cy="803749"/>
+        </a:xfrm>
+        <a:custGeom>
+          <a:avLst/>
+          <a:gdLst/>
+          <a:ahLst/>
+          <a:cxnLst/>
+          <a:rect l="0" t="0" r="0" b="0"/>
+          <a:pathLst>
+            <a:path>
+              <a:moveTo>
+                <a:pt x="0" y="0"/>
+              </a:moveTo>
+              <a:lnTo>
+                <a:pt x="0" y="803749"/>
+              </a:lnTo>
+              <a:lnTo>
+                <a:pt x="127545" y="803749"/>
+              </a:lnTo>
+            </a:path>
+          </a:pathLst>
+        </a:custGeom>
+        <a:noFill/>
+        <a:ln w="12700" cap="flat" cmpd="sng" algn="ctr">
+          <a:solidFill>
+            <a:schemeClr val="accent1">
+              <a:shade val="60000"/>
+              <a:hueOff val="0"/>
+              <a:satOff val="0"/>
+              <a:lumOff val="0"/>
+              <a:alphaOff val="0"/>
+            </a:schemeClr>
+          </a:solidFill>
+          <a:prstDash val="solid"/>
+          <a:miter lim="800000"/>
+        </a:ln>
+        <a:effectLst/>
+      </dsp:spPr>
+      <dsp:style>
+        <a:lnRef idx="2">
+          <a:scrgbClr r="0" g="0" b="0"/>
+        </a:lnRef>
+        <a:fillRef idx="0">
+          <a:scrgbClr r="0" g="0" b="0"/>
+        </a:fillRef>
+        <a:effectRef idx="0">
+          <a:scrgbClr r="0" g="0" b="0"/>
+        </a:effectRef>
+        <a:fontRef idx="minor"/>
+      </dsp:style>
+    </dsp:sp>
+    <dsp:sp modelId="{9A1BCF8B-3F39-4A73-B539-DCCD4108908A}">
+      <dsp:nvSpPr>
+        <dsp:cNvPr id="0" name=""/>
+        <dsp:cNvSpPr/>
+      </dsp:nvSpPr>
+      <dsp:spPr>
+        <a:xfrm>
+          <a:off x="2259041" y="1440971"/>
+          <a:ext cx="1391514" cy="259844"/>
+        </a:xfrm>
+        <a:prstGeom prst="roundRect">
+          <a:avLst>
+            <a:gd name="adj" fmla="val 10000"/>
+          </a:avLst>
+        </a:prstGeom>
+        <a:gradFill rotWithShape="0">
+          <a:gsLst>
+            <a:gs pos="0">
+              <a:srgbClr val="FFD9D1">
+                <a:alpha val="49804"/>
+              </a:srgbClr>
+            </a:gs>
+            <a:gs pos="100000">
+              <a:srgbClr val="FFD9D1"/>
+            </a:gs>
+          </a:gsLst>
+          <a:lin ang="5400000" scaled="0"/>
+        </a:gradFill>
+        <a:ln w="6350" cap="flat" cmpd="sng" algn="ctr">
+          <a:solidFill>
+            <a:schemeClr val="accent1">
+              <a:hueOff val="0"/>
+              <a:satOff val="0"/>
+              <a:lumOff val="0"/>
+              <a:alphaOff val="0"/>
+            </a:schemeClr>
+          </a:solidFill>
+          <a:prstDash val="solid"/>
+          <a:miter lim="800000"/>
+        </a:ln>
+        <a:effectLst/>
+      </dsp:spPr>
+      <dsp:style>
+        <a:lnRef idx="1">
+          <a:scrgbClr r="0" g="0" b="0"/>
+        </a:lnRef>
+        <a:fillRef idx="1">
+          <a:scrgbClr r="0" g="0" b="0"/>
+        </a:fillRef>
+        <a:effectRef idx="2">
+          <a:scrgbClr r="0" g="0" b="0"/>
+        </a:effectRef>
+        <a:fontRef idx="minor"/>
+      </dsp:style>
+      <dsp:txBody>
+        <a:bodyPr spcFirstLastPara="0" vert="horz" wrap="square" lIns="26670" tIns="17780" rIns="26670" bIns="17780" numCol="1" spcCol="1270" anchor="ctr" anchorCtr="0">
+          <a:noAutofit/>
+        </a:bodyPr>
+        <a:lstStyle/>
+        <a:p>
+          <a:pPr lvl="0" algn="ctr" defTabSz="622300">
+            <a:lnSpc>
+              <a:spcPct val="90000"/>
+            </a:lnSpc>
+            <a:spcBef>
+              <a:spcPct val="0"/>
+            </a:spcBef>
+            <a:spcAft>
+              <a:spcPct val="35000"/>
+            </a:spcAft>
+          </a:pPr>
+          <a:r>
+            <a:rPr lang="en-US" sz="1400" kern="1200" dirty="0" err="1" smtClean="0"/>
+            <a:t>positionUsesType</a:t>
+          </a:r>
+          <a:endParaRPr lang="en-US" sz="1400" kern="1200" dirty="0"/>
+        </a:p>
+      </dsp:txBody>
+      <dsp:txXfrm>
+        <a:off x="2266652" y="1448582"/>
+        <a:ext cx="1376292" cy="244622"/>
+      </dsp:txXfrm>
+    </dsp:sp>
+    <dsp:sp modelId="{11740182-5826-4EB6-9212-29EFE8CA856D}">
+      <dsp:nvSpPr>
+        <dsp:cNvPr id="0" name=""/>
+        <dsp:cNvSpPr/>
+      </dsp:nvSpPr>
+      <dsp:spPr>
+        <a:xfrm>
+          <a:off x="2131495" y="767143"/>
+          <a:ext cx="138761" cy="1188305"/>
+        </a:xfrm>
+        <a:custGeom>
+          <a:avLst/>
+          <a:gdLst/>
+          <a:ahLst/>
+          <a:cxnLst/>
+          <a:rect l="0" t="0" r="0" b="0"/>
+          <a:pathLst>
+            <a:path>
+              <a:moveTo>
+                <a:pt x="0" y="0"/>
+              </a:moveTo>
+              <a:lnTo>
+                <a:pt x="0" y="1188305"/>
+              </a:lnTo>
+              <a:lnTo>
+                <a:pt x="138761" y="1188305"/>
+              </a:lnTo>
+            </a:path>
+          </a:pathLst>
+        </a:custGeom>
+        <a:noFill/>
+        <a:ln w="12700" cap="flat" cmpd="sng" algn="ctr">
+          <a:solidFill>
+            <a:schemeClr val="accent1">
+              <a:shade val="60000"/>
+              <a:hueOff val="0"/>
+              <a:satOff val="0"/>
+              <a:lumOff val="0"/>
+              <a:alphaOff val="0"/>
+            </a:schemeClr>
+          </a:solidFill>
+          <a:prstDash val="solid"/>
+          <a:miter lim="800000"/>
+        </a:ln>
+        <a:effectLst/>
+      </dsp:spPr>
+      <dsp:style>
+        <a:lnRef idx="2">
+          <a:scrgbClr r="0" g="0" b="0"/>
+        </a:lnRef>
+        <a:fillRef idx="0">
+          <a:scrgbClr r="0" g="0" b="0"/>
+        </a:fillRef>
+        <a:effectRef idx="0">
+          <a:scrgbClr r="0" g="0" b="0"/>
+        </a:effectRef>
+        <a:fontRef idx="minor"/>
+      </dsp:style>
+    </dsp:sp>
+    <dsp:sp modelId="{DC9C9830-AE78-4B49-8B2D-0881B6509383}">
+      <dsp:nvSpPr>
+        <dsp:cNvPr id="0" name=""/>
+        <dsp:cNvSpPr/>
+      </dsp:nvSpPr>
+      <dsp:spPr>
+        <a:xfrm>
+          <a:off x="2270257" y="1825526"/>
+          <a:ext cx="1391514" cy="259844"/>
+        </a:xfrm>
+        <a:prstGeom prst="roundRect">
+          <a:avLst>
+            <a:gd name="adj" fmla="val 10000"/>
+          </a:avLst>
+        </a:prstGeom>
+        <a:gradFill rotWithShape="0">
+          <a:gsLst>
+            <a:gs pos="0">
+              <a:srgbClr val="FFD9D1">
+                <a:alpha val="49804"/>
+              </a:srgbClr>
+            </a:gs>
+            <a:gs pos="100000">
+              <a:srgbClr val="FFD9D1"/>
+            </a:gs>
+          </a:gsLst>
+          <a:lin ang="5400000" scaled="0"/>
+        </a:gradFill>
+        <a:ln w="6350" cap="flat" cmpd="sng" algn="ctr">
+          <a:solidFill>
+            <a:schemeClr val="accent1">
+              <a:hueOff val="0"/>
+              <a:satOff val="0"/>
+              <a:lumOff val="0"/>
+              <a:alphaOff val="0"/>
+            </a:schemeClr>
+          </a:solidFill>
+          <a:prstDash val="solid"/>
+          <a:miter lim="800000"/>
+        </a:ln>
+        <a:effectLst/>
+      </dsp:spPr>
+      <dsp:style>
+        <a:lnRef idx="1">
+          <a:scrgbClr r="0" g="0" b="0"/>
+        </a:lnRef>
+        <a:fillRef idx="1">
+          <a:scrgbClr r="0" g="0" b="0"/>
+        </a:fillRef>
+        <a:effectRef idx="2">
+          <a:scrgbClr r="0" g="0" b="0"/>
+        </a:effectRef>
+        <a:fontRef idx="minor"/>
+      </dsp:style>
+      <dsp:txBody>
+        <a:bodyPr spcFirstLastPara="0" vert="horz" wrap="square" lIns="26670" tIns="17780" rIns="26670" bIns="17780" numCol="1" spcCol="1270" anchor="ctr" anchorCtr="0">
+          <a:noAutofit/>
+        </a:bodyPr>
+        <a:lstStyle/>
+        <a:p>
+          <a:pPr lvl="0" algn="ctr" defTabSz="622300">
+            <a:lnSpc>
+              <a:spcPct val="90000"/>
+            </a:lnSpc>
+            <a:spcBef>
+              <a:spcPct val="0"/>
+            </a:spcBef>
+            <a:spcAft>
+              <a:spcPct val="35000"/>
+            </a:spcAft>
+          </a:pPr>
+          <a:r>
+            <a:rPr lang="en-US" sz="1400" kern="1200" dirty="0" err="1" smtClean="0"/>
+            <a:t>nonOverlapping</a:t>
+          </a:r>
+          <a:endParaRPr lang="en-US" sz="1400" kern="1200" dirty="0"/>
+        </a:p>
+      </dsp:txBody>
+      <dsp:txXfrm>
+        <a:off x="2277868" y="1833137"/>
+        <a:ext cx="1376292" cy="244622"/>
+      </dsp:txXfrm>
+    </dsp:sp>
+    <dsp:sp modelId="{C745C9FC-4960-4848-9000-F4D085284BD6}">
+      <dsp:nvSpPr>
+        <dsp:cNvPr id="0" name=""/>
+        <dsp:cNvSpPr/>
+      </dsp:nvSpPr>
+      <dsp:spPr>
+        <a:xfrm>
+          <a:off x="2131495" y="767143"/>
+          <a:ext cx="138761" cy="1634943"/>
+        </a:xfrm>
+        <a:custGeom>
+          <a:avLst/>
+          <a:gdLst/>
+          <a:ahLst/>
+          <a:cxnLst/>
+          <a:rect l="0" t="0" r="0" b="0"/>
+          <a:pathLst>
+            <a:path>
+              <a:moveTo>
+                <a:pt x="0" y="0"/>
+              </a:moveTo>
+              <a:lnTo>
+                <a:pt x="0" y="1634943"/>
+              </a:lnTo>
+              <a:lnTo>
+                <a:pt x="138761" y="1634943"/>
+              </a:lnTo>
+            </a:path>
+          </a:pathLst>
+        </a:custGeom>
+        <a:noFill/>
+        <a:ln w="12700" cap="flat" cmpd="sng" algn="ctr">
+          <a:solidFill>
+            <a:schemeClr val="accent1">
+              <a:shade val="60000"/>
+              <a:hueOff val="0"/>
+              <a:satOff val="0"/>
+              <a:lumOff val="0"/>
+              <a:alphaOff val="0"/>
+            </a:schemeClr>
+          </a:solidFill>
+          <a:prstDash val="solid"/>
+          <a:miter lim="800000"/>
+        </a:ln>
+        <a:effectLst/>
+      </dsp:spPr>
+      <dsp:style>
+        <a:lnRef idx="2">
+          <a:scrgbClr r="0" g="0" b="0"/>
+        </a:lnRef>
+        <a:fillRef idx="0">
+          <a:scrgbClr r="0" g="0" b="0"/>
+        </a:fillRef>
+        <a:effectRef idx="0">
+          <a:scrgbClr r="0" g="0" b="0"/>
+        </a:effectRef>
+        <a:fontRef idx="minor"/>
+      </dsp:style>
+    </dsp:sp>
+    <dsp:sp modelId="{3F8D49A2-3284-499F-B53F-A3C02EC0E048}">
+      <dsp:nvSpPr>
+        <dsp:cNvPr id="0" name=""/>
+        <dsp:cNvSpPr/>
+      </dsp:nvSpPr>
+      <dsp:spPr>
+        <a:xfrm>
+          <a:off x="2270257" y="2264935"/>
+          <a:ext cx="2783947" cy="274302"/>
+        </a:xfrm>
+        <a:prstGeom prst="roundRect">
+          <a:avLst>
+            <a:gd name="adj" fmla="val 10000"/>
+          </a:avLst>
+        </a:prstGeom>
+        <a:gradFill rotWithShape="0">
+          <a:gsLst>
+            <a:gs pos="0">
+              <a:srgbClr val="FFD9D1">
+                <a:alpha val="49804"/>
+              </a:srgbClr>
+            </a:gs>
+            <a:gs pos="100000">
+              <a:srgbClr val="FFD9D1"/>
+            </a:gs>
+          </a:gsLst>
+          <a:lin ang="5400000" scaled="0"/>
+        </a:gradFill>
+        <a:ln w="6350" cap="flat" cmpd="sng" algn="ctr">
+          <a:solidFill>
+            <a:schemeClr val="accent1">
+              <a:hueOff val="0"/>
+              <a:satOff val="0"/>
+              <a:lumOff val="0"/>
+              <a:alphaOff val="0"/>
+            </a:schemeClr>
+          </a:solidFill>
+          <a:prstDash val="solid"/>
+          <a:miter lim="800000"/>
+        </a:ln>
+        <a:effectLst/>
+      </dsp:spPr>
+      <dsp:style>
+        <a:lnRef idx="1">
+          <a:scrgbClr r="0" g="0" b="0"/>
+        </a:lnRef>
+        <a:fillRef idx="1">
+          <a:scrgbClr r="0" g="0" b="0"/>
+        </a:fillRef>
+        <a:effectRef idx="2">
+          <a:scrgbClr r="0" g="0" b="0"/>
+        </a:effectRef>
+        <a:fontRef idx="minor"/>
+      </dsp:style>
+      <dsp:txBody>
+        <a:bodyPr spcFirstLastPara="0" vert="horz" wrap="square" lIns="22860" tIns="15240" rIns="22860" bIns="15240" numCol="1" spcCol="1270" anchor="ctr" anchorCtr="0">
+          <a:noAutofit/>
+        </a:bodyPr>
+        <a:lstStyle/>
+        <a:p>
+          <a:pPr lvl="0" algn="ctr" defTabSz="533400">
+            <a:lnSpc>
+              <a:spcPct val="90000"/>
+            </a:lnSpc>
+            <a:spcBef>
+              <a:spcPct val="0"/>
+            </a:spcBef>
+            <a:spcAft>
+              <a:spcPct val="35000"/>
+            </a:spcAft>
+          </a:pPr>
+          <a:r>
+            <a:rPr lang="en-US" sz="1200" kern="1200" dirty="0" smtClean="0"/>
+            <a:t>includeAnnotationsWithEndBeyondBounds</a:t>
+          </a:r>
+          <a:endParaRPr lang="en-US" sz="1200" kern="1200" dirty="0"/>
+        </a:p>
+      </dsp:txBody>
+      <dsp:txXfrm>
+        <a:off x="2278291" y="2272969"/>
+        <a:ext cx="2767879" cy="258234"/>
+      </dsp:txXfrm>
+    </dsp:sp>
+    <dsp:sp modelId="{F693726E-1BD8-4CF5-A624-39208FF42DB3}">
+      <dsp:nvSpPr>
+        <dsp:cNvPr id="0" name=""/>
+        <dsp:cNvSpPr/>
+      </dsp:nvSpPr>
+      <dsp:spPr>
+        <a:xfrm>
+          <a:off x="2131495" y="767143"/>
+          <a:ext cx="144209" cy="2061998"/>
+        </a:xfrm>
+        <a:custGeom>
+          <a:avLst/>
+          <a:gdLst/>
+          <a:ahLst/>
+          <a:cxnLst/>
+          <a:rect l="0" t="0" r="0" b="0"/>
+          <a:pathLst>
+            <a:path>
+              <a:moveTo>
+                <a:pt x="0" y="0"/>
+              </a:moveTo>
+              <a:lnTo>
+                <a:pt x="0" y="2061998"/>
+              </a:lnTo>
+              <a:lnTo>
+                <a:pt x="144209" y="2061998"/>
+              </a:lnTo>
+            </a:path>
+          </a:pathLst>
+        </a:custGeom>
+        <a:noFill/>
+        <a:ln w="12700" cap="flat" cmpd="sng" algn="ctr">
+          <a:solidFill>
+            <a:schemeClr val="accent1">
+              <a:shade val="60000"/>
+              <a:hueOff val="0"/>
+              <a:satOff val="0"/>
+              <a:lumOff val="0"/>
+              <a:alphaOff val="0"/>
+            </a:schemeClr>
+          </a:solidFill>
+          <a:prstDash val="solid"/>
+          <a:miter lim="800000"/>
+        </a:ln>
+        <a:effectLst/>
+      </dsp:spPr>
+      <dsp:style>
+        <a:lnRef idx="2">
+          <a:scrgbClr r="0" g="0" b="0"/>
+        </a:lnRef>
+        <a:fillRef idx="0">
+          <a:scrgbClr r="0" g="0" b="0"/>
+        </a:fillRef>
+        <a:effectRef idx="0">
+          <a:scrgbClr r="0" g="0" b="0"/>
+        </a:effectRef>
+        <a:fontRef idx="minor"/>
+      </dsp:style>
+    </dsp:sp>
+    <dsp:sp modelId="{AC11EBD0-8383-469D-B57B-D8ABFF513D43}">
+      <dsp:nvSpPr>
+        <dsp:cNvPr id="0" name=""/>
+        <dsp:cNvSpPr/>
+      </dsp:nvSpPr>
+      <dsp:spPr>
+        <a:xfrm>
+          <a:off x="2275705" y="2708036"/>
+          <a:ext cx="1701663" cy="242211"/>
+        </a:xfrm>
+        <a:prstGeom prst="roundRect">
+          <a:avLst>
+            <a:gd name="adj" fmla="val 10000"/>
+          </a:avLst>
+        </a:prstGeom>
+        <a:gradFill rotWithShape="0">
+          <a:gsLst>
+            <a:gs pos="0">
+              <a:srgbClr val="FFD9D1">
+                <a:alpha val="49804"/>
+              </a:srgbClr>
+            </a:gs>
+            <a:gs pos="100000">
+              <a:srgbClr val="FFD9D1"/>
+            </a:gs>
+          </a:gsLst>
+          <a:lin ang="5400000" scaled="0"/>
+        </a:gradFill>
+        <a:ln w="6350" cap="flat" cmpd="sng" algn="ctr">
+          <a:solidFill>
+            <a:schemeClr val="accent1">
+              <a:hueOff val="0"/>
+              <a:satOff val="0"/>
+              <a:lumOff val="0"/>
+              <a:alphaOff val="0"/>
+            </a:schemeClr>
+          </a:solidFill>
+          <a:prstDash val="solid"/>
+          <a:miter lim="800000"/>
+        </a:ln>
+        <a:effectLst/>
+      </dsp:spPr>
+      <dsp:style>
+        <a:lnRef idx="1">
+          <a:scrgbClr r="0" g="0" b="0"/>
+        </a:lnRef>
+        <a:fillRef idx="1">
+          <a:scrgbClr r="0" g="0" b="0"/>
+        </a:fillRef>
+        <a:effectRef idx="2">
+          <a:scrgbClr r="0" g="0" b="0"/>
+        </a:effectRef>
+        <a:fontRef idx="minor"/>
+      </dsp:style>
+      <dsp:txBody>
+        <a:bodyPr spcFirstLastPara="0" vert="horz" wrap="square" lIns="26670" tIns="17780" rIns="26670" bIns="17780" numCol="1" spcCol="1270" anchor="ctr" anchorCtr="0">
+          <a:noAutofit/>
+        </a:bodyPr>
+        <a:lstStyle/>
+        <a:p>
+          <a:pPr lvl="0" algn="ctr" defTabSz="622300">
+            <a:lnSpc>
+              <a:spcPct val="90000"/>
+            </a:lnSpc>
+            <a:spcBef>
+              <a:spcPct val="0"/>
+            </a:spcBef>
+            <a:spcAft>
+              <a:spcPct val="35000"/>
+            </a:spcAft>
+          </a:pPr>
+          <a:r>
+            <a:rPr lang="en-US" sz="1400" kern="1200" dirty="0" err="1" smtClean="0"/>
+            <a:t>useAnnotationEquals</a:t>
+          </a:r>
+          <a:endParaRPr lang="en-US" sz="1400" kern="1200" dirty="0"/>
+        </a:p>
+      </dsp:txBody>
+      <dsp:txXfrm>
+        <a:off x="2282799" y="2715130"/>
+        <a:ext cx="1687475" cy="228023"/>
+      </dsp:txXfrm>
+    </dsp:sp>
+    <dsp:sp modelId="{3C8E8F72-4C43-4FFC-AEFF-219062D96DB2}">
+      <dsp:nvSpPr>
+        <dsp:cNvPr id="0" name=""/>
+        <dsp:cNvSpPr/>
+      </dsp:nvSpPr>
+      <dsp:spPr>
+        <a:xfrm>
+          <a:off x="3640629" y="48885"/>
+          <a:ext cx="1536024" cy="718258"/>
+        </a:xfrm>
+        <a:prstGeom prst="roundRect">
+          <a:avLst>
+            <a:gd name="adj" fmla="val 10000"/>
+          </a:avLst>
+        </a:prstGeom>
+        <a:gradFill rotWithShape="0">
+          <a:gsLst>
+            <a:gs pos="0">
+              <a:srgbClr val="FFCCFF">
+                <a:lumMod val="50000"/>
+                <a:lumOff val="50000"/>
+              </a:srgbClr>
+            </a:gs>
+            <a:gs pos="100000">
+              <a:srgbClr val="FFCCFF"/>
+            </a:gs>
+          </a:gsLst>
+          <a:lin ang="5400000" scaled="0"/>
+        </a:gradFill>
+        <a:ln w="6350" cap="flat" cmpd="sng" algn="ctr">
+          <a:solidFill>
+            <a:schemeClr val="accent2"/>
+          </a:solidFill>
+          <a:prstDash val="solid"/>
+          <a:miter lim="800000"/>
+        </a:ln>
+        <a:effectLst/>
+      </dsp:spPr>
+      <dsp:style>
+        <a:lnRef idx="1">
+          <a:schemeClr val="accent2"/>
+        </a:lnRef>
+        <a:fillRef idx="2">
+          <a:schemeClr val="accent2"/>
+        </a:fillRef>
+        <a:effectRef idx="1">
+          <a:schemeClr val="accent2"/>
+        </a:effectRef>
+        <a:fontRef idx="minor">
+          <a:schemeClr val="dk1"/>
+        </a:fontRef>
+      </dsp:style>
+      <dsp:txBody>
+        <a:bodyPr spcFirstLastPara="0" vert="horz" wrap="square" lIns="28575" tIns="19050" rIns="28575" bIns="19050" numCol="1" spcCol="1270" anchor="ctr" anchorCtr="0">
+          <a:noAutofit/>
+        </a:bodyPr>
+        <a:lstStyle/>
+        <a:p>
+          <a:pPr lvl="0" algn="ctr" defTabSz="666750">
+            <a:lnSpc>
+              <a:spcPct val="90000"/>
+            </a:lnSpc>
+            <a:spcBef>
+              <a:spcPct val="0"/>
+            </a:spcBef>
+            <a:spcAft>
+              <a:spcPct val="35000"/>
+            </a:spcAft>
+          </a:pPr>
+          <a:r>
+            <a:rPr lang="en-US" sz="1500" kern="1200" dirty="0" smtClean="0"/>
+            <a:t>Annotation index </a:t>
+          </a:r>
+          <a:br>
+            <a:rPr lang="en-US" sz="1500" kern="1200" dirty="0" smtClean="0"/>
+          </a:br>
+          <a:r>
+            <a:rPr lang="en-US" sz="1500" kern="1200" dirty="0" smtClean="0"/>
+            <a:t> follow / </a:t>
+          </a:r>
+          <a:r>
+            <a:rPr lang="en-US" sz="1500" kern="1200" smtClean="0"/>
+            <a:t>preceed</a:t>
+          </a:r>
+          <a:endParaRPr lang="en-US" sz="1500" kern="1200" dirty="0"/>
+        </a:p>
+      </dsp:txBody>
+      <dsp:txXfrm>
+        <a:off x="3661666" y="69922"/>
+        <a:ext cx="1493950" cy="676184"/>
+      </dsp:txXfrm>
+    </dsp:sp>
+    <dsp:sp modelId="{87CA1243-0E0D-4CB9-A20E-711DFC058565}">
+      <dsp:nvSpPr>
+        <dsp:cNvPr id="0" name=""/>
+        <dsp:cNvSpPr/>
+      </dsp:nvSpPr>
+      <dsp:spPr>
+        <a:xfrm>
+          <a:off x="3748511" y="767143"/>
+          <a:ext cx="91440" cy="371163"/>
+        </a:xfrm>
+        <a:custGeom>
+          <a:avLst/>
+          <a:gdLst/>
+          <a:ahLst/>
+          <a:cxnLst/>
+          <a:rect l="0" t="0" r="0" b="0"/>
+          <a:pathLst>
+            <a:path>
+              <a:moveTo>
+                <a:pt x="45720" y="0"/>
+              </a:moveTo>
+              <a:lnTo>
+                <a:pt x="45720" y="371163"/>
+              </a:lnTo>
+              <a:lnTo>
+                <a:pt x="123701" y="371163"/>
+              </a:lnTo>
+            </a:path>
+          </a:pathLst>
+        </a:custGeom>
+        <a:noFill/>
+        <a:ln w="12700" cap="flat" cmpd="sng" algn="ctr">
+          <a:solidFill>
+            <a:schemeClr val="accent1">
+              <a:shade val="60000"/>
+              <a:hueOff val="0"/>
+              <a:satOff val="0"/>
+              <a:lumOff val="0"/>
+              <a:alphaOff val="0"/>
+            </a:schemeClr>
+          </a:solidFill>
+          <a:prstDash val="solid"/>
+          <a:miter lim="800000"/>
+        </a:ln>
+        <a:effectLst/>
+      </dsp:spPr>
+      <dsp:style>
+        <a:lnRef idx="2">
+          <a:scrgbClr r="0" g="0" b="0"/>
+        </a:lnRef>
+        <a:fillRef idx="0">
+          <a:scrgbClr r="0" g="0" b="0"/>
+        </a:fillRef>
+        <a:effectRef idx="0">
+          <a:scrgbClr r="0" g="0" b="0"/>
+        </a:effectRef>
+        <a:fontRef idx="minor"/>
+      </dsp:style>
+    </dsp:sp>
+    <dsp:sp modelId="{AD96485D-9021-4AE3-9AF1-91BF9C7DC4A9}">
+      <dsp:nvSpPr>
+        <dsp:cNvPr id="0" name=""/>
+        <dsp:cNvSpPr/>
+      </dsp:nvSpPr>
+      <dsp:spPr>
+        <a:xfrm>
+          <a:off x="3872213" y="1008385"/>
+          <a:ext cx="1176093" cy="259844"/>
+        </a:xfrm>
+        <a:prstGeom prst="roundRect">
+          <a:avLst>
+            <a:gd name="adj" fmla="val 10000"/>
+          </a:avLst>
+        </a:prstGeom>
+        <a:gradFill rotWithShape="0">
+          <a:gsLst>
+            <a:gs pos="0">
+              <a:srgbClr val="FFD9D1">
+                <a:alpha val="49804"/>
+              </a:srgbClr>
+            </a:gs>
+            <a:gs pos="100000">
+              <a:srgbClr val="FFD9D1"/>
+            </a:gs>
+          </a:gsLst>
+          <a:lin ang="5400000" scaled="0"/>
+        </a:gradFill>
+        <a:ln w="6350" cap="flat" cmpd="sng" algn="ctr">
+          <a:solidFill>
+            <a:schemeClr val="accent1">
+              <a:hueOff val="0"/>
+              <a:satOff val="0"/>
+              <a:lumOff val="0"/>
+              <a:alphaOff val="0"/>
+            </a:schemeClr>
+          </a:solidFill>
+          <a:prstDash val="solid"/>
+          <a:miter lim="800000"/>
+        </a:ln>
+        <a:effectLst/>
+      </dsp:spPr>
+      <dsp:style>
+        <a:lnRef idx="1">
+          <a:scrgbClr r="0" g="0" b="0"/>
+        </a:lnRef>
+        <a:fillRef idx="1">
+          <a:scrgbClr r="0" g="0" b="0"/>
+        </a:fillRef>
+        <a:effectRef idx="2">
+          <a:scrgbClr r="0" g="0" b="0"/>
+        </a:effectRef>
+        <a:fontRef idx="minor"/>
+      </dsp:style>
+      <dsp:txBody>
+        <a:bodyPr spcFirstLastPara="0" vert="horz" wrap="square" lIns="26670" tIns="17780" rIns="26670" bIns="17780" numCol="1" spcCol="1270" anchor="ctr" anchorCtr="0">
+          <a:noAutofit/>
+        </a:bodyPr>
+        <a:lstStyle/>
+        <a:p>
+          <a:pPr lvl="0" algn="ctr" defTabSz="622300">
+            <a:lnSpc>
+              <a:spcPct val="90000"/>
+            </a:lnSpc>
+            <a:spcBef>
+              <a:spcPct val="0"/>
+            </a:spcBef>
+            <a:spcAft>
+              <a:spcPct val="35000"/>
+            </a:spcAft>
+          </a:pPr>
+          <a:r>
+            <a:rPr lang="en-US" sz="1400" kern="1200" dirty="0" smtClean="0"/>
+            <a:t>following</a:t>
+          </a:r>
+          <a:endParaRPr lang="en-US" sz="1400" kern="1200" dirty="0"/>
+        </a:p>
+      </dsp:txBody>
+      <dsp:txXfrm>
+        <a:off x="3879824" y="1015996"/>
+        <a:ext cx="1160871" cy="244622"/>
+      </dsp:txXfrm>
+    </dsp:sp>
+    <dsp:sp modelId="{EFA0C431-24CD-4099-9BAE-EC52CFA42898}">
+      <dsp:nvSpPr>
+        <dsp:cNvPr id="0" name=""/>
+        <dsp:cNvSpPr/>
+      </dsp:nvSpPr>
+      <dsp:spPr>
+        <a:xfrm>
+          <a:off x="3748511" y="767143"/>
+          <a:ext cx="91440" cy="810572"/>
+        </a:xfrm>
+        <a:custGeom>
+          <a:avLst/>
+          <a:gdLst/>
+          <a:ahLst/>
+          <a:cxnLst/>
+          <a:rect l="0" t="0" r="0" b="0"/>
+          <a:pathLst>
+            <a:path>
+              <a:moveTo>
+                <a:pt x="45720" y="0"/>
+              </a:moveTo>
+              <a:lnTo>
+                <a:pt x="45720" y="810572"/>
+              </a:lnTo>
+              <a:lnTo>
+                <a:pt x="123701" y="810572"/>
+              </a:lnTo>
+            </a:path>
+          </a:pathLst>
+        </a:custGeom>
+        <a:noFill/>
+        <a:ln w="12700" cap="flat" cmpd="sng" algn="ctr">
+          <a:solidFill>
+            <a:schemeClr val="accent1">
+              <a:shade val="60000"/>
+              <a:hueOff val="0"/>
+              <a:satOff val="0"/>
+              <a:lumOff val="0"/>
+              <a:alphaOff val="0"/>
+            </a:schemeClr>
+          </a:solidFill>
+          <a:prstDash val="solid"/>
+          <a:miter lim="800000"/>
+        </a:ln>
+        <a:effectLst/>
+      </dsp:spPr>
+      <dsp:style>
+        <a:lnRef idx="2">
+          <a:scrgbClr r="0" g="0" b="0"/>
+        </a:lnRef>
+        <a:fillRef idx="0">
+          <a:scrgbClr r="0" g="0" b="0"/>
+        </a:fillRef>
+        <a:effectRef idx="0">
+          <a:scrgbClr r="0" g="0" b="0"/>
+        </a:effectRef>
+        <a:fontRef idx="minor"/>
+      </dsp:style>
+    </dsp:sp>
+    <dsp:sp modelId="{E592C975-6A58-42A6-8A1C-546B354206FF}">
+      <dsp:nvSpPr>
+        <dsp:cNvPr id="0" name=""/>
+        <dsp:cNvSpPr/>
+      </dsp:nvSpPr>
+      <dsp:spPr>
+        <a:xfrm>
+          <a:off x="3872213" y="1447794"/>
+          <a:ext cx="1176093" cy="259844"/>
+        </a:xfrm>
+        <a:prstGeom prst="roundRect">
+          <a:avLst>
+            <a:gd name="adj" fmla="val 10000"/>
+          </a:avLst>
+        </a:prstGeom>
+        <a:gradFill rotWithShape="0">
+          <a:gsLst>
+            <a:gs pos="0">
+              <a:srgbClr val="FFD9D1">
+                <a:alpha val="49804"/>
+              </a:srgbClr>
+            </a:gs>
+            <a:gs pos="100000">
+              <a:srgbClr val="FFD9D1"/>
+            </a:gs>
+          </a:gsLst>
+          <a:lin ang="5400000" scaled="0"/>
+        </a:gradFill>
+        <a:ln w="6350" cap="flat" cmpd="sng" algn="ctr">
+          <a:solidFill>
+            <a:schemeClr val="accent1">
+              <a:hueOff val="0"/>
+              <a:satOff val="0"/>
+              <a:lumOff val="0"/>
+              <a:alphaOff val="0"/>
+            </a:schemeClr>
+          </a:solidFill>
+          <a:prstDash val="solid"/>
+          <a:miter lim="800000"/>
+        </a:ln>
+        <a:effectLst/>
+      </dsp:spPr>
+      <dsp:style>
+        <a:lnRef idx="1">
+          <a:scrgbClr r="0" g="0" b="0"/>
+        </a:lnRef>
+        <a:fillRef idx="1">
+          <a:scrgbClr r="0" g="0" b="0"/>
+        </a:fillRef>
+        <a:effectRef idx="2">
+          <a:scrgbClr r="0" g="0" b="0"/>
+        </a:effectRef>
+        <a:fontRef idx="minor"/>
+      </dsp:style>
+      <dsp:txBody>
+        <a:bodyPr spcFirstLastPara="0" vert="horz" wrap="square" lIns="26670" tIns="17780" rIns="26670" bIns="17780" numCol="1" spcCol="1270" anchor="ctr" anchorCtr="0">
+          <a:noAutofit/>
+        </a:bodyPr>
+        <a:lstStyle/>
+        <a:p>
+          <a:pPr lvl="0" algn="ctr" defTabSz="622300">
+            <a:lnSpc>
+              <a:spcPct val="90000"/>
+            </a:lnSpc>
+            <a:spcBef>
+              <a:spcPct val="0"/>
+            </a:spcBef>
+            <a:spcAft>
+              <a:spcPct val="35000"/>
+            </a:spcAft>
+          </a:pPr>
+          <a:r>
+            <a:rPr lang="en-US" sz="1400" kern="1200" dirty="0" smtClean="0"/>
+            <a:t>preceding</a:t>
+          </a:r>
+          <a:endParaRPr lang="en-US" sz="1400" kern="1200" dirty="0"/>
+        </a:p>
+      </dsp:txBody>
+      <dsp:txXfrm>
+        <a:off x="3879824" y="1455405"/>
+        <a:ext cx="1160871" cy="244622"/>
+      </dsp:txXfrm>
+    </dsp:sp>
   </dsp:spTree>
 </dsp:drawing>
 </file>
@@ -11389,7 +13209,7 @@
           <a:p>
             <a:fld id="{FA88A723-210D-49FB-911D-CC70F62696A5}" type="datetimeFigureOut">
               <a:rPr lang="en-US" smtClean="0"/>
-              <a:t>1/26/2017</a:t>
+              <a:t>2/1/2017</a:t>
             </a:fld>
             <a:endParaRPr lang="en-US"/>
           </a:p>
@@ -11559,7 +13379,7 @@
           <a:p>
             <a:fld id="{FA88A723-210D-49FB-911D-CC70F62696A5}" type="datetimeFigureOut">
               <a:rPr lang="en-US" smtClean="0"/>
-              <a:t>1/26/2017</a:t>
+              <a:t>2/1/2017</a:t>
             </a:fld>
             <a:endParaRPr lang="en-US"/>
           </a:p>
@@ -11739,7 +13559,7 @@
           <a:p>
             <a:fld id="{FA88A723-210D-49FB-911D-CC70F62696A5}" type="datetimeFigureOut">
               <a:rPr lang="en-US" smtClean="0"/>
-              <a:t>1/26/2017</a:t>
+              <a:t>2/1/2017</a:t>
             </a:fld>
             <a:endParaRPr lang="en-US"/>
           </a:p>
@@ -11909,7 +13729,7 @@
           <a:p>
             <a:fld id="{FA88A723-210D-49FB-911D-CC70F62696A5}" type="datetimeFigureOut">
               <a:rPr lang="en-US" smtClean="0"/>
-              <a:t>1/26/2017</a:t>
+              <a:t>2/1/2017</a:t>
             </a:fld>
             <a:endParaRPr lang="en-US"/>
           </a:p>
@@ -12155,7 +13975,7 @@
           <a:p>
             <a:fld id="{FA88A723-210D-49FB-911D-CC70F62696A5}" type="datetimeFigureOut">
               <a:rPr lang="en-US" smtClean="0"/>
-              <a:t>1/26/2017</a:t>
+              <a:t>2/1/2017</a:t>
             </a:fld>
             <a:endParaRPr lang="en-US"/>
           </a:p>
@@ -12387,7 +14207,7 @@
           <a:p>
             <a:fld id="{FA88A723-210D-49FB-911D-CC70F62696A5}" type="datetimeFigureOut">
               <a:rPr lang="en-US" smtClean="0"/>
-              <a:t>1/26/2017</a:t>
+              <a:t>2/1/2017</a:t>
             </a:fld>
             <a:endParaRPr lang="en-US"/>
           </a:p>
@@ -12754,7 +14574,7 @@
           <a:p>
             <a:fld id="{FA88A723-210D-49FB-911D-CC70F62696A5}" type="datetimeFigureOut">
               <a:rPr lang="en-US" smtClean="0"/>
-              <a:t>1/26/2017</a:t>
+              <a:t>2/1/2017</a:t>
             </a:fld>
             <a:endParaRPr lang="en-US"/>
           </a:p>
@@ -12872,7 +14692,7 @@
           <a:p>
             <a:fld id="{FA88A723-210D-49FB-911D-CC70F62696A5}" type="datetimeFigureOut">
               <a:rPr lang="en-US" smtClean="0"/>
-              <a:t>1/26/2017</a:t>
+              <a:t>2/1/2017</a:t>
             </a:fld>
             <a:endParaRPr lang="en-US"/>
           </a:p>
@@ -12967,7 +14787,7 @@
           <a:p>
             <a:fld id="{FA88A723-210D-49FB-911D-CC70F62696A5}" type="datetimeFigureOut">
               <a:rPr lang="en-US" smtClean="0"/>
-              <a:t>1/26/2017</a:t>
+              <a:t>2/1/2017</a:t>
             </a:fld>
             <a:endParaRPr lang="en-US"/>
           </a:p>
@@ -13244,7 +15064,7 @@
           <a:p>
             <a:fld id="{FA88A723-210D-49FB-911D-CC70F62696A5}" type="datetimeFigureOut">
               <a:rPr lang="en-US" smtClean="0"/>
-              <a:t>1/26/2017</a:t>
+              <a:t>2/1/2017</a:t>
             </a:fld>
             <a:endParaRPr lang="en-US"/>
           </a:p>
@@ -13497,7 +15317,7 @@
           <a:p>
             <a:fld id="{FA88A723-210D-49FB-911D-CC70F62696A5}" type="datetimeFigureOut">
               <a:rPr lang="en-US" smtClean="0"/>
-              <a:t>1/26/2017</a:t>
+              <a:t>2/1/2017</a:t>
             </a:fld>
             <a:endParaRPr lang="en-US"/>
           </a:p>
@@ -13710,7 +15530,7 @@
           <a:p>
             <a:fld id="{FA88A723-210D-49FB-911D-CC70F62696A5}" type="datetimeFigureOut">
               <a:rPr lang="en-US" smtClean="0"/>
-              <a:t>1/26/2017</a:t>
+              <a:t>2/1/2017</a:t>
             </a:fld>
             <a:endParaRPr lang="en-US"/>
           </a:p>
@@ -16156,8 +17976,8 @@
         </p:nvSpPr>
         <p:spPr>
           <a:xfrm>
-            <a:off x="4166756" y="3621623"/>
-            <a:ext cx="1437190" cy="644362"/>
+            <a:off x="4166755" y="3517383"/>
+            <a:ext cx="1437191" cy="869266"/>
           </a:xfrm>
           <a:custGeom>
             <a:avLst/>
@@ -16335,8 +18155,13 @@
                   <a:noFill/>
                 </a:ln>
               </a:rPr>
-              <a:t>built-in</a:t>
+              <a:t>(semi) built-in</a:t>
             </a:r>
+            <a:endParaRPr lang="en-US" dirty="0" smtClean="0">
+              <a:ln w="12700">
+                <a:noFill/>
+              </a:ln>
+            </a:endParaRPr>
           </a:p>
         </p:txBody>
       </p:sp>

</xml_diff>

<commit_message>
[UIMA-5421] migration update, plus some clarifications for logging dependencies
git-svn-id: https://svn.apache.org/repos/asf/uima/uv3/uimaj-v3/trunk@1796917 13f79535-47bb-0310-9956-ffa450edef68
</commit_message>
<xml_diff>
--- a/uima-docbook-v3-users-guide/src/image-source/source.pptx
+++ b/uima-docbook-v3-users-guide/src/image-source/source.pptx
@@ -11,6 +11,7 @@
     <p:sldId id="262" r:id="rId5"/>
     <p:sldId id="264" r:id="rId6"/>
     <p:sldId id="263" r:id="rId7"/>
+    <p:sldId id="265" r:id="rId8"/>
   </p:sldIdLst>
   <p:sldSz cx="12192000" cy="6858000"/>
   <p:notesSz cx="6858000" cy="9144000"/>
@@ -6234,1826 +6235,6 @@
       <dsp:cNvGrpSpPr/>
     </dsp:nvGrpSpPr>
     <dsp:grpSpPr/>
-    <dsp:sp modelId="{FA3637AE-5E0F-478A-BA47-28082756EE59}">
-      <dsp:nvSpPr>
-        <dsp:cNvPr id="0" name=""/>
-        <dsp:cNvSpPr/>
-      </dsp:nvSpPr>
-      <dsp:spPr>
-        <a:xfrm>
-          <a:off x="112154" y="39361"/>
-          <a:ext cx="1646967" cy="718258"/>
-        </a:xfrm>
-        <a:prstGeom prst="roundRect">
-          <a:avLst>
-            <a:gd name="adj" fmla="val 10000"/>
-          </a:avLst>
-        </a:prstGeom>
-        <a:gradFill rotWithShape="0">
-          <a:gsLst>
-            <a:gs pos="0">
-              <a:srgbClr val="FFCCFF">
-                <a:lumMod val="50000"/>
-                <a:lumOff val="50000"/>
-              </a:srgbClr>
-            </a:gs>
-            <a:gs pos="100000">
-              <a:srgbClr val="FFCCFF"/>
-            </a:gs>
-          </a:gsLst>
-          <a:lin ang="5400000" scaled="0"/>
-        </a:gradFill>
-        <a:ln w="6350" cap="flat" cmpd="sng" algn="ctr">
-          <a:solidFill>
-            <a:schemeClr val="accent2"/>
-          </a:solidFill>
-          <a:prstDash val="solid"/>
-          <a:miter lim="800000"/>
-        </a:ln>
-        <a:effectLst/>
-      </dsp:spPr>
-      <dsp:style>
-        <a:lnRef idx="1">
-          <a:schemeClr val="accent2"/>
-        </a:lnRef>
-        <a:fillRef idx="2">
-          <a:schemeClr val="accent2"/>
-        </a:fillRef>
-        <a:effectRef idx="1">
-          <a:schemeClr val="accent2"/>
-        </a:effectRef>
-        <a:fontRef idx="minor">
-          <a:schemeClr val="dk1"/>
-        </a:fontRef>
-      </dsp:style>
-      <dsp:txBody>
-        <a:bodyPr spcFirstLastPara="0" vert="horz" wrap="square" lIns="28575" tIns="19050" rIns="28575" bIns="19050" numCol="1" spcCol="1270" anchor="ctr" anchorCtr="0">
-          <a:noAutofit/>
-        </a:bodyPr>
-        <a:lstStyle/>
-        <a:p>
-          <a:pPr lvl="0" algn="ctr" defTabSz="666750">
-            <a:lnSpc>
-              <a:spcPct val="90000"/>
-            </a:lnSpc>
-            <a:spcBef>
-              <a:spcPct val="0"/>
-            </a:spcBef>
-            <a:spcAft>
-              <a:spcPct val="35000"/>
-            </a:spcAft>
-          </a:pPr>
-          <a:r>
-            <a:rPr lang="en-US" sz="1500" kern="1200" dirty="0" smtClean="0"/>
-            <a:t>Annotation index - </a:t>
-          </a:r>
-          <a:r>
-            <a:rPr lang="en-US" sz="1500" kern="1200" dirty="0" err="1" smtClean="0"/>
-            <a:t>subselect</a:t>
-          </a:r>
-          <a:endParaRPr lang="en-US" sz="1500" kern="1200" dirty="0"/>
-        </a:p>
-      </dsp:txBody>
-      <dsp:txXfrm>
-        <a:off x="133191" y="60398"/>
-        <a:ext cx="1604893" cy="676184"/>
-      </dsp:txXfrm>
-    </dsp:sp>
-    <dsp:sp modelId="{8C37D885-6593-462C-AA05-6CD8EA638401}">
-      <dsp:nvSpPr>
-        <dsp:cNvPr id="0" name=""/>
-        <dsp:cNvSpPr/>
-      </dsp:nvSpPr>
-      <dsp:spPr>
-        <a:xfrm>
-          <a:off x="231131" y="757619"/>
-          <a:ext cx="91440" cy="384961"/>
-        </a:xfrm>
-        <a:custGeom>
-          <a:avLst/>
-          <a:gdLst/>
-          <a:ahLst/>
-          <a:cxnLst/>
-          <a:rect l="0" t="0" r="0" b="0"/>
-          <a:pathLst>
-            <a:path>
-              <a:moveTo>
-                <a:pt x="45720" y="0"/>
-              </a:moveTo>
-              <a:lnTo>
-                <a:pt x="45720" y="384961"/>
-              </a:lnTo>
-              <a:lnTo>
-                <a:pt x="130868" y="384961"/>
-              </a:lnTo>
-            </a:path>
-          </a:pathLst>
-        </a:custGeom>
-        <a:noFill/>
-        <a:ln w="12700" cap="flat" cmpd="sng" algn="ctr">
-          <a:solidFill>
-            <a:schemeClr val="accent1">
-              <a:shade val="60000"/>
-              <a:hueOff val="0"/>
-              <a:satOff val="0"/>
-              <a:lumOff val="0"/>
-              <a:alphaOff val="0"/>
-            </a:schemeClr>
-          </a:solidFill>
-          <a:prstDash val="solid"/>
-          <a:miter lim="800000"/>
-        </a:ln>
-        <a:effectLst/>
-      </dsp:spPr>
-      <dsp:style>
-        <a:lnRef idx="2">
-          <a:scrgbClr r="0" g="0" b="0"/>
-        </a:lnRef>
-        <a:fillRef idx="0">
-          <a:scrgbClr r="0" g="0" b="0"/>
-        </a:fillRef>
-        <a:effectRef idx="0">
-          <a:scrgbClr r="0" g="0" b="0"/>
-        </a:effectRef>
-        <a:fontRef idx="minor"/>
-      </dsp:style>
-    </dsp:sp>
-    <dsp:sp modelId="{3AC43A25-BC81-4A6B-BE8D-FB2B2029355A}">
-      <dsp:nvSpPr>
-        <dsp:cNvPr id="0" name=""/>
-        <dsp:cNvSpPr/>
-      </dsp:nvSpPr>
-      <dsp:spPr>
-        <a:xfrm>
-          <a:off x="361999" y="1012659"/>
-          <a:ext cx="1067665" cy="259844"/>
-        </a:xfrm>
-        <a:prstGeom prst="roundRect">
-          <a:avLst>
-            <a:gd name="adj" fmla="val 10000"/>
-          </a:avLst>
-        </a:prstGeom>
-        <a:gradFill rotWithShape="0">
-          <a:gsLst>
-            <a:gs pos="0">
-              <a:srgbClr val="FFD9D1">
-                <a:alpha val="49804"/>
-              </a:srgbClr>
-            </a:gs>
-            <a:gs pos="100000">
-              <a:srgbClr val="FFD9D1"/>
-            </a:gs>
-          </a:gsLst>
-          <a:lin ang="5400000" scaled="0"/>
-        </a:gradFill>
-        <a:ln w="6350" cap="flat" cmpd="sng" algn="ctr">
-          <a:solidFill>
-            <a:schemeClr val="accent1">
-              <a:hueOff val="0"/>
-              <a:satOff val="0"/>
-              <a:lumOff val="0"/>
-              <a:alphaOff val="0"/>
-            </a:schemeClr>
-          </a:solidFill>
-          <a:prstDash val="solid"/>
-          <a:miter lim="800000"/>
-        </a:ln>
-        <a:effectLst/>
-      </dsp:spPr>
-      <dsp:style>
-        <a:lnRef idx="1">
-          <a:scrgbClr r="0" g="0" b="0"/>
-        </a:lnRef>
-        <a:fillRef idx="1">
-          <a:scrgbClr r="0" g="0" b="0"/>
-        </a:fillRef>
-        <a:effectRef idx="2">
-          <a:scrgbClr r="0" g="0" b="0"/>
-        </a:effectRef>
-        <a:fontRef idx="minor"/>
-      </dsp:style>
-      <dsp:txBody>
-        <a:bodyPr spcFirstLastPara="0" vert="horz" wrap="square" lIns="26670" tIns="17780" rIns="26670" bIns="17780" numCol="1" spcCol="1270" anchor="ctr" anchorCtr="0">
-          <a:noAutofit/>
-        </a:bodyPr>
-        <a:lstStyle/>
-        <a:p>
-          <a:pPr lvl="0" algn="ctr" defTabSz="622300">
-            <a:lnSpc>
-              <a:spcPct val="90000"/>
-            </a:lnSpc>
-            <a:spcBef>
-              <a:spcPct val="0"/>
-            </a:spcBef>
-            <a:spcAft>
-              <a:spcPct val="35000"/>
-            </a:spcAft>
-          </a:pPr>
-          <a:r>
-            <a:rPr lang="en-US" sz="1400" kern="1200" dirty="0" err="1" smtClean="0"/>
-            <a:t>coveredBy</a:t>
-          </a:r>
-          <a:endParaRPr lang="en-US" sz="1400" kern="1200" dirty="0"/>
-        </a:p>
-      </dsp:txBody>
-      <dsp:txXfrm>
-        <a:off x="369610" y="1020270"/>
-        <a:ext cx="1052443" cy="244622"/>
-      </dsp:txXfrm>
-    </dsp:sp>
-    <dsp:sp modelId="{5FA849F3-2870-4117-B35F-44C7C5D9D3F5}">
-      <dsp:nvSpPr>
-        <dsp:cNvPr id="0" name=""/>
-        <dsp:cNvSpPr/>
-      </dsp:nvSpPr>
-      <dsp:spPr>
-        <a:xfrm>
-          <a:off x="231131" y="757619"/>
-          <a:ext cx="91440" cy="793449"/>
-        </a:xfrm>
-        <a:custGeom>
-          <a:avLst/>
-          <a:gdLst/>
-          <a:ahLst/>
-          <a:cxnLst/>
-          <a:rect l="0" t="0" r="0" b="0"/>
-          <a:pathLst>
-            <a:path>
-              <a:moveTo>
-                <a:pt x="45720" y="0"/>
-              </a:moveTo>
-              <a:lnTo>
-                <a:pt x="45720" y="793449"/>
-              </a:lnTo>
-              <a:lnTo>
-                <a:pt x="120168" y="793449"/>
-              </a:lnTo>
-            </a:path>
-          </a:pathLst>
-        </a:custGeom>
-        <a:noFill/>
-        <a:ln w="12700" cap="flat" cmpd="sng" algn="ctr">
-          <a:solidFill>
-            <a:schemeClr val="accent1">
-              <a:shade val="60000"/>
-              <a:hueOff val="0"/>
-              <a:satOff val="0"/>
-              <a:lumOff val="0"/>
-              <a:alphaOff val="0"/>
-            </a:schemeClr>
-          </a:solidFill>
-          <a:prstDash val="solid"/>
-          <a:miter lim="800000"/>
-        </a:ln>
-        <a:effectLst/>
-      </dsp:spPr>
-      <dsp:style>
-        <a:lnRef idx="2">
-          <a:scrgbClr r="0" g="0" b="0"/>
-        </a:lnRef>
-        <a:fillRef idx="0">
-          <a:scrgbClr r="0" g="0" b="0"/>
-        </a:fillRef>
-        <a:effectRef idx="0">
-          <a:scrgbClr r="0" g="0" b="0"/>
-        </a:effectRef>
-        <a:fontRef idx="minor"/>
-      </dsp:style>
-    </dsp:sp>
-    <dsp:sp modelId="{D87CF371-4165-4ECD-9CC4-97F516956AB5}">
-      <dsp:nvSpPr>
-        <dsp:cNvPr id="0" name=""/>
-        <dsp:cNvSpPr/>
-      </dsp:nvSpPr>
-      <dsp:spPr>
-        <a:xfrm>
-          <a:off x="351300" y="1421147"/>
-          <a:ext cx="1067665" cy="259844"/>
-        </a:xfrm>
-        <a:prstGeom prst="roundRect">
-          <a:avLst>
-            <a:gd name="adj" fmla="val 10000"/>
-          </a:avLst>
-        </a:prstGeom>
-        <a:gradFill rotWithShape="0">
-          <a:gsLst>
-            <a:gs pos="0">
-              <a:srgbClr val="FFD9D1">
-                <a:alpha val="49804"/>
-              </a:srgbClr>
-            </a:gs>
-            <a:gs pos="100000">
-              <a:srgbClr val="FFD9D1"/>
-            </a:gs>
-          </a:gsLst>
-          <a:lin ang="5400000" scaled="0"/>
-        </a:gradFill>
-        <a:ln w="6350" cap="flat" cmpd="sng" algn="ctr">
-          <a:solidFill>
-            <a:schemeClr val="accent1">
-              <a:hueOff val="0"/>
-              <a:satOff val="0"/>
-              <a:lumOff val="0"/>
-              <a:alphaOff val="0"/>
-            </a:schemeClr>
-          </a:solidFill>
-          <a:prstDash val="solid"/>
-          <a:miter lim="800000"/>
-        </a:ln>
-        <a:effectLst/>
-      </dsp:spPr>
-      <dsp:style>
-        <a:lnRef idx="1">
-          <a:scrgbClr r="0" g="0" b="0"/>
-        </a:lnRef>
-        <a:fillRef idx="1">
-          <a:scrgbClr r="0" g="0" b="0"/>
-        </a:fillRef>
-        <a:effectRef idx="2">
-          <a:scrgbClr r="0" g="0" b="0"/>
-        </a:effectRef>
-        <a:fontRef idx="minor"/>
-      </dsp:style>
-      <dsp:txBody>
-        <a:bodyPr spcFirstLastPara="0" vert="horz" wrap="square" lIns="26670" tIns="17780" rIns="26670" bIns="17780" numCol="1" spcCol="1270" anchor="ctr" anchorCtr="0">
-          <a:noAutofit/>
-        </a:bodyPr>
-        <a:lstStyle/>
-        <a:p>
-          <a:pPr lvl="0" algn="ctr" defTabSz="622300">
-            <a:lnSpc>
-              <a:spcPct val="90000"/>
-            </a:lnSpc>
-            <a:spcBef>
-              <a:spcPct val="0"/>
-            </a:spcBef>
-            <a:spcAft>
-              <a:spcPct val="35000"/>
-            </a:spcAft>
-          </a:pPr>
-          <a:r>
-            <a:rPr lang="en-US" sz="1400" kern="1200" dirty="0" smtClean="0"/>
-            <a:t>covering</a:t>
-          </a:r>
-          <a:endParaRPr lang="en-US" sz="1400" kern="1200" dirty="0"/>
-        </a:p>
-      </dsp:txBody>
-      <dsp:txXfrm>
-        <a:off x="358911" y="1428758"/>
-        <a:ext cx="1052443" cy="244622"/>
-      </dsp:txXfrm>
-    </dsp:sp>
-    <dsp:sp modelId="{7292F0EE-BF4C-4928-999E-A35FCFE0A11A}">
-      <dsp:nvSpPr>
-        <dsp:cNvPr id="0" name=""/>
-        <dsp:cNvSpPr/>
-      </dsp:nvSpPr>
-      <dsp:spPr>
-        <a:xfrm>
-          <a:off x="231131" y="757619"/>
-          <a:ext cx="91440" cy="1197663"/>
-        </a:xfrm>
-        <a:custGeom>
-          <a:avLst/>
-          <a:gdLst/>
-          <a:ahLst/>
-          <a:cxnLst/>
-          <a:rect l="0" t="0" r="0" b="0"/>
-          <a:pathLst>
-            <a:path>
-              <a:moveTo>
-                <a:pt x="45720" y="0"/>
-              </a:moveTo>
-              <a:lnTo>
-                <a:pt x="45720" y="1197663"/>
-              </a:lnTo>
-              <a:lnTo>
-                <a:pt x="130063" y="1197663"/>
-              </a:lnTo>
-            </a:path>
-          </a:pathLst>
-        </a:custGeom>
-        <a:noFill/>
-        <a:ln w="12700" cap="flat" cmpd="sng" algn="ctr">
-          <a:solidFill>
-            <a:schemeClr val="accent1">
-              <a:shade val="60000"/>
-              <a:hueOff val="0"/>
-              <a:satOff val="0"/>
-              <a:lumOff val="0"/>
-              <a:alphaOff val="0"/>
-            </a:schemeClr>
-          </a:solidFill>
-          <a:prstDash val="solid"/>
-          <a:miter lim="800000"/>
-        </a:ln>
-        <a:effectLst/>
-      </dsp:spPr>
-      <dsp:style>
-        <a:lnRef idx="2">
-          <a:scrgbClr r="0" g="0" b="0"/>
-        </a:lnRef>
-        <a:fillRef idx="0">
-          <a:scrgbClr r="0" g="0" b="0"/>
-        </a:fillRef>
-        <a:effectRef idx="0">
-          <a:scrgbClr r="0" g="0" b="0"/>
-        </a:effectRef>
-        <a:fontRef idx="minor"/>
-      </dsp:style>
-    </dsp:sp>
-    <dsp:sp modelId="{902E56C3-7153-4967-A765-4755747B76A3}">
-      <dsp:nvSpPr>
-        <dsp:cNvPr id="0" name=""/>
-        <dsp:cNvSpPr/>
-      </dsp:nvSpPr>
-      <dsp:spPr>
-        <a:xfrm>
-          <a:off x="361195" y="1825361"/>
-          <a:ext cx="1067665" cy="259844"/>
-        </a:xfrm>
-        <a:prstGeom prst="roundRect">
-          <a:avLst>
-            <a:gd name="adj" fmla="val 10000"/>
-          </a:avLst>
-        </a:prstGeom>
-        <a:gradFill rotWithShape="0">
-          <a:gsLst>
-            <a:gs pos="0">
-              <a:srgbClr val="FFD9D1">
-                <a:alpha val="49804"/>
-              </a:srgbClr>
-            </a:gs>
-            <a:gs pos="100000">
-              <a:srgbClr val="FFD9D1"/>
-            </a:gs>
-          </a:gsLst>
-          <a:lin ang="5400000" scaled="0"/>
-        </a:gradFill>
-        <a:ln w="6350" cap="flat" cmpd="sng" algn="ctr">
-          <a:solidFill>
-            <a:schemeClr val="accent1">
-              <a:hueOff val="0"/>
-              <a:satOff val="0"/>
-              <a:lumOff val="0"/>
-              <a:alphaOff val="0"/>
-            </a:schemeClr>
-          </a:solidFill>
-          <a:prstDash val="solid"/>
-          <a:miter lim="800000"/>
-        </a:ln>
-        <a:effectLst/>
-      </dsp:spPr>
-      <dsp:style>
-        <a:lnRef idx="1">
-          <a:scrgbClr r="0" g="0" b="0"/>
-        </a:lnRef>
-        <a:fillRef idx="1">
-          <a:scrgbClr r="0" g="0" b="0"/>
-        </a:fillRef>
-        <a:effectRef idx="2">
-          <a:scrgbClr r="0" g="0" b="0"/>
-        </a:effectRef>
-        <a:fontRef idx="minor"/>
-      </dsp:style>
-      <dsp:txBody>
-        <a:bodyPr spcFirstLastPara="0" vert="horz" wrap="square" lIns="26670" tIns="17780" rIns="26670" bIns="17780" numCol="1" spcCol="1270" anchor="ctr" anchorCtr="0">
-          <a:noAutofit/>
-        </a:bodyPr>
-        <a:lstStyle/>
-        <a:p>
-          <a:pPr lvl="0" algn="ctr" defTabSz="622300">
-            <a:lnSpc>
-              <a:spcPct val="90000"/>
-            </a:lnSpc>
-            <a:spcBef>
-              <a:spcPct val="0"/>
-            </a:spcBef>
-            <a:spcAft>
-              <a:spcPct val="35000"/>
-            </a:spcAft>
-          </a:pPr>
-          <a:r>
-            <a:rPr lang="en-US" sz="1400" kern="1200" dirty="0" smtClean="0"/>
-            <a:t>at</a:t>
-          </a:r>
-          <a:endParaRPr lang="en-US" sz="1400" kern="1200" dirty="0"/>
-        </a:p>
-      </dsp:txBody>
-      <dsp:txXfrm>
-        <a:off x="368806" y="1832972"/>
-        <a:ext cx="1052443" cy="244622"/>
-      </dsp:txXfrm>
-    </dsp:sp>
-    <dsp:sp modelId="{CCEF3560-3C73-4128-89F8-DC7E6E2E204B}">
-      <dsp:nvSpPr>
-        <dsp:cNvPr id="0" name=""/>
-        <dsp:cNvSpPr/>
-      </dsp:nvSpPr>
-      <dsp:spPr>
-        <a:xfrm>
-          <a:off x="231131" y="757619"/>
-          <a:ext cx="91440" cy="1661070"/>
-        </a:xfrm>
-        <a:custGeom>
-          <a:avLst/>
-          <a:gdLst/>
-          <a:ahLst/>
-          <a:cxnLst/>
-          <a:rect l="0" t="0" r="0" b="0"/>
-          <a:pathLst>
-            <a:path>
-              <a:moveTo>
-                <a:pt x="45720" y="0"/>
-              </a:moveTo>
-              <a:lnTo>
-                <a:pt x="45720" y="1661070"/>
-              </a:lnTo>
-              <a:lnTo>
-                <a:pt x="130063" y="1661070"/>
-              </a:lnTo>
-            </a:path>
-          </a:pathLst>
-        </a:custGeom>
-        <a:noFill/>
-        <a:ln w="12700" cap="flat" cmpd="sng" algn="ctr">
-          <a:solidFill>
-            <a:schemeClr val="accent1">
-              <a:shade val="60000"/>
-              <a:hueOff val="0"/>
-              <a:satOff val="0"/>
-              <a:lumOff val="0"/>
-              <a:alphaOff val="0"/>
-            </a:schemeClr>
-          </a:solidFill>
-          <a:prstDash val="solid"/>
-          <a:miter lim="800000"/>
-        </a:ln>
-        <a:effectLst/>
-      </dsp:spPr>
-      <dsp:style>
-        <a:lnRef idx="2">
-          <a:scrgbClr r="0" g="0" b="0"/>
-        </a:lnRef>
-        <a:fillRef idx="0">
-          <a:scrgbClr r="0" g="0" b="0"/>
-        </a:fillRef>
-        <a:effectRef idx="0">
-          <a:scrgbClr r="0" g="0" b="0"/>
-        </a:effectRef>
-        <a:fontRef idx="minor"/>
-      </dsp:style>
-    </dsp:sp>
-    <dsp:sp modelId="{964BD0A1-575D-4561-A934-3A5596A69899}">
-      <dsp:nvSpPr>
-        <dsp:cNvPr id="0" name=""/>
-        <dsp:cNvSpPr/>
-      </dsp:nvSpPr>
-      <dsp:spPr>
-        <a:xfrm>
-          <a:off x="361195" y="2288767"/>
-          <a:ext cx="1067665" cy="259844"/>
-        </a:xfrm>
-        <a:prstGeom prst="roundRect">
-          <a:avLst>
-            <a:gd name="adj" fmla="val 10000"/>
-          </a:avLst>
-        </a:prstGeom>
-        <a:gradFill rotWithShape="0">
-          <a:gsLst>
-            <a:gs pos="0">
-              <a:srgbClr val="FFD9D1">
-                <a:alpha val="49804"/>
-              </a:srgbClr>
-            </a:gs>
-            <a:gs pos="100000">
-              <a:srgbClr val="FFD9D1"/>
-            </a:gs>
-          </a:gsLst>
-          <a:lin ang="5400000" scaled="0"/>
-        </a:gradFill>
-        <a:ln w="6350" cap="flat" cmpd="sng" algn="ctr">
-          <a:solidFill>
-            <a:schemeClr val="accent1">
-              <a:hueOff val="0"/>
-              <a:satOff val="0"/>
-              <a:lumOff val="0"/>
-              <a:alphaOff val="0"/>
-            </a:schemeClr>
-          </a:solidFill>
-          <a:prstDash val="solid"/>
-          <a:miter lim="800000"/>
-        </a:ln>
-        <a:effectLst/>
-      </dsp:spPr>
-      <dsp:style>
-        <a:lnRef idx="1">
-          <a:scrgbClr r="0" g="0" b="0"/>
-        </a:lnRef>
-        <a:fillRef idx="1">
-          <a:scrgbClr r="0" g="0" b="0"/>
-        </a:fillRef>
-        <a:effectRef idx="2">
-          <a:scrgbClr r="0" g="0" b="0"/>
-        </a:effectRef>
-        <a:fontRef idx="minor"/>
-      </dsp:style>
-      <dsp:txBody>
-        <a:bodyPr spcFirstLastPara="0" vert="horz" wrap="square" lIns="26670" tIns="17780" rIns="26670" bIns="17780" numCol="1" spcCol="1270" anchor="ctr" anchorCtr="0">
-          <a:noAutofit/>
-        </a:bodyPr>
-        <a:lstStyle/>
-        <a:p>
-          <a:pPr lvl="0" algn="ctr" defTabSz="622300">
-            <a:lnSpc>
-              <a:spcPct val="90000"/>
-            </a:lnSpc>
-            <a:spcBef>
-              <a:spcPct val="0"/>
-            </a:spcBef>
-            <a:spcAft>
-              <a:spcPct val="35000"/>
-            </a:spcAft>
-          </a:pPr>
-          <a:r>
-            <a:rPr lang="en-US" sz="1400" kern="1200" dirty="0" smtClean="0"/>
-            <a:t>between</a:t>
-          </a:r>
-          <a:endParaRPr lang="en-US" sz="1400" kern="1200" dirty="0"/>
-        </a:p>
-      </dsp:txBody>
-      <dsp:txXfrm>
-        <a:off x="368806" y="2296378"/>
-        <a:ext cx="1052443" cy="244622"/>
-      </dsp:txXfrm>
-    </dsp:sp>
-    <dsp:sp modelId="{508C05A8-918D-425D-B9FA-95D7693DA324}">
-      <dsp:nvSpPr>
-        <dsp:cNvPr id="0" name=""/>
-        <dsp:cNvSpPr/>
-      </dsp:nvSpPr>
-      <dsp:spPr>
-        <a:xfrm>
-          <a:off x="1987844" y="48885"/>
-          <a:ext cx="1436517" cy="718258"/>
-        </a:xfrm>
-        <a:prstGeom prst="roundRect">
-          <a:avLst>
-            <a:gd name="adj" fmla="val 10000"/>
-          </a:avLst>
-        </a:prstGeom>
-        <a:gradFill rotWithShape="0">
-          <a:gsLst>
-            <a:gs pos="0">
-              <a:srgbClr val="FFCCFF">
-                <a:lumMod val="50000"/>
-                <a:lumOff val="50000"/>
-              </a:srgbClr>
-            </a:gs>
-            <a:gs pos="100000">
-              <a:srgbClr val="FFCCFF"/>
-            </a:gs>
-          </a:gsLst>
-          <a:lin ang="5400000" scaled="0"/>
-        </a:gradFill>
-        <a:ln w="6350" cap="flat" cmpd="sng" algn="ctr">
-          <a:solidFill>
-            <a:schemeClr val="accent2"/>
-          </a:solidFill>
-          <a:prstDash val="solid"/>
-          <a:miter lim="800000"/>
-        </a:ln>
-        <a:effectLst/>
-      </dsp:spPr>
-      <dsp:style>
-        <a:lnRef idx="1">
-          <a:schemeClr val="accent2"/>
-        </a:lnRef>
-        <a:fillRef idx="2">
-          <a:schemeClr val="accent2"/>
-        </a:fillRef>
-        <a:effectRef idx="1">
-          <a:schemeClr val="accent2"/>
-        </a:effectRef>
-        <a:fontRef idx="minor">
-          <a:schemeClr val="dk1"/>
-        </a:fontRef>
-      </dsp:style>
-      <dsp:txBody>
-        <a:bodyPr spcFirstLastPara="0" vert="horz" wrap="square" lIns="28575" tIns="19050" rIns="28575" bIns="19050" numCol="1" spcCol="1270" anchor="ctr" anchorCtr="0">
-          <a:noAutofit/>
-        </a:bodyPr>
-        <a:lstStyle/>
-        <a:p>
-          <a:pPr lvl="0" algn="ctr" defTabSz="666750">
-            <a:lnSpc>
-              <a:spcPct val="90000"/>
-            </a:lnSpc>
-            <a:spcBef>
-              <a:spcPct val="0"/>
-            </a:spcBef>
-            <a:spcAft>
-              <a:spcPct val="35000"/>
-            </a:spcAft>
-          </a:pPr>
-          <a:r>
-            <a:rPr lang="en-US" sz="1500" kern="1200" dirty="0" smtClean="0"/>
-            <a:t>Annotation index - variations</a:t>
-          </a:r>
-          <a:endParaRPr lang="en-US" sz="1500" kern="1200" dirty="0"/>
-        </a:p>
-      </dsp:txBody>
-      <dsp:txXfrm>
-        <a:off x="2008881" y="69922"/>
-        <a:ext cx="1394443" cy="676184"/>
-      </dsp:txXfrm>
-    </dsp:sp>
-    <dsp:sp modelId="{06ACC55D-1859-48B9-923E-41A7399F42ED}">
-      <dsp:nvSpPr>
-        <dsp:cNvPr id="0" name=""/>
-        <dsp:cNvSpPr/>
-      </dsp:nvSpPr>
-      <dsp:spPr>
-        <a:xfrm>
-          <a:off x="2131495" y="767143"/>
-          <a:ext cx="127028" cy="383050"/>
-        </a:xfrm>
-        <a:custGeom>
-          <a:avLst/>
-          <a:gdLst/>
-          <a:ahLst/>
-          <a:cxnLst/>
-          <a:rect l="0" t="0" r="0" b="0"/>
-          <a:pathLst>
-            <a:path>
-              <a:moveTo>
-                <a:pt x="0" y="0"/>
-              </a:moveTo>
-              <a:lnTo>
-                <a:pt x="0" y="383050"/>
-              </a:lnTo>
-              <a:lnTo>
-                <a:pt x="127028" y="383050"/>
-              </a:lnTo>
-            </a:path>
-          </a:pathLst>
-        </a:custGeom>
-        <a:noFill/>
-        <a:ln w="12700" cap="flat" cmpd="sng" algn="ctr">
-          <a:solidFill>
-            <a:schemeClr val="accent1">
-              <a:shade val="60000"/>
-              <a:hueOff val="0"/>
-              <a:satOff val="0"/>
-              <a:lumOff val="0"/>
-              <a:alphaOff val="0"/>
-            </a:schemeClr>
-          </a:solidFill>
-          <a:prstDash val="solid"/>
-          <a:miter lim="800000"/>
-        </a:ln>
-        <a:effectLst/>
-      </dsp:spPr>
-      <dsp:style>
-        <a:lnRef idx="2">
-          <a:scrgbClr r="0" g="0" b="0"/>
-        </a:lnRef>
-        <a:fillRef idx="0">
-          <a:scrgbClr r="0" g="0" b="0"/>
-        </a:fillRef>
-        <a:effectRef idx="0">
-          <a:scrgbClr r="0" g="0" b="0"/>
-        </a:effectRef>
-        <a:fontRef idx="minor"/>
-      </dsp:style>
-    </dsp:sp>
-    <dsp:sp modelId="{2AFCFA76-6F7A-4479-983C-FEF5916C6BD8}">
-      <dsp:nvSpPr>
-        <dsp:cNvPr id="0" name=""/>
-        <dsp:cNvSpPr/>
-      </dsp:nvSpPr>
-      <dsp:spPr>
-        <a:xfrm>
-          <a:off x="2258524" y="1020272"/>
-          <a:ext cx="1391514" cy="259844"/>
-        </a:xfrm>
-        <a:prstGeom prst="roundRect">
-          <a:avLst>
-            <a:gd name="adj" fmla="val 10000"/>
-          </a:avLst>
-        </a:prstGeom>
-        <a:gradFill rotWithShape="0">
-          <a:gsLst>
-            <a:gs pos="0">
-              <a:srgbClr val="FFD9D1">
-                <a:alpha val="49804"/>
-              </a:srgbClr>
-            </a:gs>
-            <a:gs pos="100000">
-              <a:srgbClr val="FFD9D1"/>
-            </a:gs>
-          </a:gsLst>
-          <a:lin ang="5400000" scaled="0"/>
-        </a:gradFill>
-        <a:ln w="6350" cap="flat" cmpd="sng" algn="ctr">
-          <a:solidFill>
-            <a:schemeClr val="accent1">
-              <a:hueOff val="0"/>
-              <a:satOff val="0"/>
-              <a:lumOff val="0"/>
-              <a:alphaOff val="0"/>
-            </a:schemeClr>
-          </a:solidFill>
-          <a:prstDash val="solid"/>
-          <a:miter lim="800000"/>
-        </a:ln>
-        <a:effectLst/>
-      </dsp:spPr>
-      <dsp:style>
-        <a:lnRef idx="1">
-          <a:scrgbClr r="0" g="0" b="0"/>
-        </a:lnRef>
-        <a:fillRef idx="1">
-          <a:scrgbClr r="0" g="0" b="0"/>
-        </a:fillRef>
-        <a:effectRef idx="2">
-          <a:scrgbClr r="0" g="0" b="0"/>
-        </a:effectRef>
-        <a:fontRef idx="minor"/>
-      </dsp:style>
-      <dsp:txBody>
-        <a:bodyPr spcFirstLastPara="0" vert="horz" wrap="square" lIns="26670" tIns="17780" rIns="26670" bIns="17780" numCol="1" spcCol="1270" anchor="ctr" anchorCtr="0">
-          <a:noAutofit/>
-        </a:bodyPr>
-        <a:lstStyle/>
-        <a:p>
-          <a:pPr lvl="0" algn="ctr" defTabSz="622300">
-            <a:lnSpc>
-              <a:spcPct val="90000"/>
-            </a:lnSpc>
-            <a:spcBef>
-              <a:spcPct val="0"/>
-            </a:spcBef>
-            <a:spcAft>
-              <a:spcPct val="35000"/>
-            </a:spcAft>
-          </a:pPr>
-          <a:r>
-            <a:rPr lang="en-US" sz="1400" kern="1200" dirty="0" err="1" smtClean="0"/>
-            <a:t>typePriority</a:t>
-          </a:r>
-          <a:endParaRPr lang="en-US" sz="1400" kern="1200" dirty="0"/>
-        </a:p>
-      </dsp:txBody>
-      <dsp:txXfrm>
-        <a:off x="2266135" y="1027883"/>
-        <a:ext cx="1376292" cy="244622"/>
-      </dsp:txXfrm>
-    </dsp:sp>
-    <dsp:sp modelId="{457EBE8C-597D-433F-966E-30FD815E5E2D}">
-      <dsp:nvSpPr>
-        <dsp:cNvPr id="0" name=""/>
-        <dsp:cNvSpPr/>
-      </dsp:nvSpPr>
-      <dsp:spPr>
-        <a:xfrm>
-          <a:off x="2131495" y="767143"/>
-          <a:ext cx="127545" cy="803749"/>
-        </a:xfrm>
-        <a:custGeom>
-          <a:avLst/>
-          <a:gdLst/>
-          <a:ahLst/>
-          <a:cxnLst/>
-          <a:rect l="0" t="0" r="0" b="0"/>
-          <a:pathLst>
-            <a:path>
-              <a:moveTo>
-                <a:pt x="0" y="0"/>
-              </a:moveTo>
-              <a:lnTo>
-                <a:pt x="0" y="803749"/>
-              </a:lnTo>
-              <a:lnTo>
-                <a:pt x="127545" y="803749"/>
-              </a:lnTo>
-            </a:path>
-          </a:pathLst>
-        </a:custGeom>
-        <a:noFill/>
-        <a:ln w="12700" cap="flat" cmpd="sng" algn="ctr">
-          <a:solidFill>
-            <a:schemeClr val="accent1">
-              <a:shade val="60000"/>
-              <a:hueOff val="0"/>
-              <a:satOff val="0"/>
-              <a:lumOff val="0"/>
-              <a:alphaOff val="0"/>
-            </a:schemeClr>
-          </a:solidFill>
-          <a:prstDash val="solid"/>
-          <a:miter lim="800000"/>
-        </a:ln>
-        <a:effectLst/>
-      </dsp:spPr>
-      <dsp:style>
-        <a:lnRef idx="2">
-          <a:scrgbClr r="0" g="0" b="0"/>
-        </a:lnRef>
-        <a:fillRef idx="0">
-          <a:scrgbClr r="0" g="0" b="0"/>
-        </a:fillRef>
-        <a:effectRef idx="0">
-          <a:scrgbClr r="0" g="0" b="0"/>
-        </a:effectRef>
-        <a:fontRef idx="minor"/>
-      </dsp:style>
-    </dsp:sp>
-    <dsp:sp modelId="{9A1BCF8B-3F39-4A73-B539-DCCD4108908A}">
-      <dsp:nvSpPr>
-        <dsp:cNvPr id="0" name=""/>
-        <dsp:cNvSpPr/>
-      </dsp:nvSpPr>
-      <dsp:spPr>
-        <a:xfrm>
-          <a:off x="2259041" y="1440971"/>
-          <a:ext cx="1391514" cy="259844"/>
-        </a:xfrm>
-        <a:prstGeom prst="roundRect">
-          <a:avLst>
-            <a:gd name="adj" fmla="val 10000"/>
-          </a:avLst>
-        </a:prstGeom>
-        <a:gradFill rotWithShape="0">
-          <a:gsLst>
-            <a:gs pos="0">
-              <a:srgbClr val="FFD9D1">
-                <a:alpha val="49804"/>
-              </a:srgbClr>
-            </a:gs>
-            <a:gs pos="100000">
-              <a:srgbClr val="FFD9D1"/>
-            </a:gs>
-          </a:gsLst>
-          <a:lin ang="5400000" scaled="0"/>
-        </a:gradFill>
-        <a:ln w="6350" cap="flat" cmpd="sng" algn="ctr">
-          <a:solidFill>
-            <a:schemeClr val="accent1">
-              <a:hueOff val="0"/>
-              <a:satOff val="0"/>
-              <a:lumOff val="0"/>
-              <a:alphaOff val="0"/>
-            </a:schemeClr>
-          </a:solidFill>
-          <a:prstDash val="solid"/>
-          <a:miter lim="800000"/>
-        </a:ln>
-        <a:effectLst/>
-      </dsp:spPr>
-      <dsp:style>
-        <a:lnRef idx="1">
-          <a:scrgbClr r="0" g="0" b="0"/>
-        </a:lnRef>
-        <a:fillRef idx="1">
-          <a:scrgbClr r="0" g="0" b="0"/>
-        </a:fillRef>
-        <a:effectRef idx="2">
-          <a:scrgbClr r="0" g="0" b="0"/>
-        </a:effectRef>
-        <a:fontRef idx="minor"/>
-      </dsp:style>
-      <dsp:txBody>
-        <a:bodyPr spcFirstLastPara="0" vert="horz" wrap="square" lIns="26670" tIns="17780" rIns="26670" bIns="17780" numCol="1" spcCol="1270" anchor="ctr" anchorCtr="0">
-          <a:noAutofit/>
-        </a:bodyPr>
-        <a:lstStyle/>
-        <a:p>
-          <a:pPr lvl="0" algn="ctr" defTabSz="622300">
-            <a:lnSpc>
-              <a:spcPct val="90000"/>
-            </a:lnSpc>
-            <a:spcBef>
-              <a:spcPct val="0"/>
-            </a:spcBef>
-            <a:spcAft>
-              <a:spcPct val="35000"/>
-            </a:spcAft>
-          </a:pPr>
-          <a:r>
-            <a:rPr lang="en-US" sz="1400" kern="1200" dirty="0" err="1" smtClean="0"/>
-            <a:t>positionUsesType</a:t>
-          </a:r>
-          <a:endParaRPr lang="en-US" sz="1400" kern="1200" dirty="0"/>
-        </a:p>
-      </dsp:txBody>
-      <dsp:txXfrm>
-        <a:off x="2266652" y="1448582"/>
-        <a:ext cx="1376292" cy="244622"/>
-      </dsp:txXfrm>
-    </dsp:sp>
-    <dsp:sp modelId="{11740182-5826-4EB6-9212-29EFE8CA856D}">
-      <dsp:nvSpPr>
-        <dsp:cNvPr id="0" name=""/>
-        <dsp:cNvSpPr/>
-      </dsp:nvSpPr>
-      <dsp:spPr>
-        <a:xfrm>
-          <a:off x="2131495" y="767143"/>
-          <a:ext cx="138761" cy="1188305"/>
-        </a:xfrm>
-        <a:custGeom>
-          <a:avLst/>
-          <a:gdLst/>
-          <a:ahLst/>
-          <a:cxnLst/>
-          <a:rect l="0" t="0" r="0" b="0"/>
-          <a:pathLst>
-            <a:path>
-              <a:moveTo>
-                <a:pt x="0" y="0"/>
-              </a:moveTo>
-              <a:lnTo>
-                <a:pt x="0" y="1188305"/>
-              </a:lnTo>
-              <a:lnTo>
-                <a:pt x="138761" y="1188305"/>
-              </a:lnTo>
-            </a:path>
-          </a:pathLst>
-        </a:custGeom>
-        <a:noFill/>
-        <a:ln w="12700" cap="flat" cmpd="sng" algn="ctr">
-          <a:solidFill>
-            <a:schemeClr val="accent1">
-              <a:shade val="60000"/>
-              <a:hueOff val="0"/>
-              <a:satOff val="0"/>
-              <a:lumOff val="0"/>
-              <a:alphaOff val="0"/>
-            </a:schemeClr>
-          </a:solidFill>
-          <a:prstDash val="solid"/>
-          <a:miter lim="800000"/>
-        </a:ln>
-        <a:effectLst/>
-      </dsp:spPr>
-      <dsp:style>
-        <a:lnRef idx="2">
-          <a:scrgbClr r="0" g="0" b="0"/>
-        </a:lnRef>
-        <a:fillRef idx="0">
-          <a:scrgbClr r="0" g="0" b="0"/>
-        </a:fillRef>
-        <a:effectRef idx="0">
-          <a:scrgbClr r="0" g="0" b="0"/>
-        </a:effectRef>
-        <a:fontRef idx="minor"/>
-      </dsp:style>
-    </dsp:sp>
-    <dsp:sp modelId="{DC9C9830-AE78-4B49-8B2D-0881B6509383}">
-      <dsp:nvSpPr>
-        <dsp:cNvPr id="0" name=""/>
-        <dsp:cNvSpPr/>
-      </dsp:nvSpPr>
-      <dsp:spPr>
-        <a:xfrm>
-          <a:off x="2270257" y="1825526"/>
-          <a:ext cx="1391514" cy="259844"/>
-        </a:xfrm>
-        <a:prstGeom prst="roundRect">
-          <a:avLst>
-            <a:gd name="adj" fmla="val 10000"/>
-          </a:avLst>
-        </a:prstGeom>
-        <a:gradFill rotWithShape="0">
-          <a:gsLst>
-            <a:gs pos="0">
-              <a:srgbClr val="FFD9D1">
-                <a:alpha val="49804"/>
-              </a:srgbClr>
-            </a:gs>
-            <a:gs pos="100000">
-              <a:srgbClr val="FFD9D1"/>
-            </a:gs>
-          </a:gsLst>
-          <a:lin ang="5400000" scaled="0"/>
-        </a:gradFill>
-        <a:ln w="6350" cap="flat" cmpd="sng" algn="ctr">
-          <a:solidFill>
-            <a:schemeClr val="accent1">
-              <a:hueOff val="0"/>
-              <a:satOff val="0"/>
-              <a:lumOff val="0"/>
-              <a:alphaOff val="0"/>
-            </a:schemeClr>
-          </a:solidFill>
-          <a:prstDash val="solid"/>
-          <a:miter lim="800000"/>
-        </a:ln>
-        <a:effectLst/>
-      </dsp:spPr>
-      <dsp:style>
-        <a:lnRef idx="1">
-          <a:scrgbClr r="0" g="0" b="0"/>
-        </a:lnRef>
-        <a:fillRef idx="1">
-          <a:scrgbClr r="0" g="0" b="0"/>
-        </a:fillRef>
-        <a:effectRef idx="2">
-          <a:scrgbClr r="0" g="0" b="0"/>
-        </a:effectRef>
-        <a:fontRef idx="minor"/>
-      </dsp:style>
-      <dsp:txBody>
-        <a:bodyPr spcFirstLastPara="0" vert="horz" wrap="square" lIns="26670" tIns="17780" rIns="26670" bIns="17780" numCol="1" spcCol="1270" anchor="ctr" anchorCtr="0">
-          <a:noAutofit/>
-        </a:bodyPr>
-        <a:lstStyle/>
-        <a:p>
-          <a:pPr lvl="0" algn="ctr" defTabSz="622300">
-            <a:lnSpc>
-              <a:spcPct val="90000"/>
-            </a:lnSpc>
-            <a:spcBef>
-              <a:spcPct val="0"/>
-            </a:spcBef>
-            <a:spcAft>
-              <a:spcPct val="35000"/>
-            </a:spcAft>
-          </a:pPr>
-          <a:r>
-            <a:rPr lang="en-US" sz="1400" kern="1200" dirty="0" err="1" smtClean="0"/>
-            <a:t>nonOverlapping</a:t>
-          </a:r>
-          <a:endParaRPr lang="en-US" sz="1400" kern="1200" dirty="0"/>
-        </a:p>
-      </dsp:txBody>
-      <dsp:txXfrm>
-        <a:off x="2277868" y="1833137"/>
-        <a:ext cx="1376292" cy="244622"/>
-      </dsp:txXfrm>
-    </dsp:sp>
-    <dsp:sp modelId="{C745C9FC-4960-4848-9000-F4D085284BD6}">
-      <dsp:nvSpPr>
-        <dsp:cNvPr id="0" name=""/>
-        <dsp:cNvSpPr/>
-      </dsp:nvSpPr>
-      <dsp:spPr>
-        <a:xfrm>
-          <a:off x="2131495" y="767143"/>
-          <a:ext cx="138761" cy="1634943"/>
-        </a:xfrm>
-        <a:custGeom>
-          <a:avLst/>
-          <a:gdLst/>
-          <a:ahLst/>
-          <a:cxnLst/>
-          <a:rect l="0" t="0" r="0" b="0"/>
-          <a:pathLst>
-            <a:path>
-              <a:moveTo>
-                <a:pt x="0" y="0"/>
-              </a:moveTo>
-              <a:lnTo>
-                <a:pt x="0" y="1634943"/>
-              </a:lnTo>
-              <a:lnTo>
-                <a:pt x="138761" y="1634943"/>
-              </a:lnTo>
-            </a:path>
-          </a:pathLst>
-        </a:custGeom>
-        <a:noFill/>
-        <a:ln w="12700" cap="flat" cmpd="sng" algn="ctr">
-          <a:solidFill>
-            <a:schemeClr val="accent1">
-              <a:shade val="60000"/>
-              <a:hueOff val="0"/>
-              <a:satOff val="0"/>
-              <a:lumOff val="0"/>
-              <a:alphaOff val="0"/>
-            </a:schemeClr>
-          </a:solidFill>
-          <a:prstDash val="solid"/>
-          <a:miter lim="800000"/>
-        </a:ln>
-        <a:effectLst/>
-      </dsp:spPr>
-      <dsp:style>
-        <a:lnRef idx="2">
-          <a:scrgbClr r="0" g="0" b="0"/>
-        </a:lnRef>
-        <a:fillRef idx="0">
-          <a:scrgbClr r="0" g="0" b="0"/>
-        </a:fillRef>
-        <a:effectRef idx="0">
-          <a:scrgbClr r="0" g="0" b="0"/>
-        </a:effectRef>
-        <a:fontRef idx="minor"/>
-      </dsp:style>
-    </dsp:sp>
-    <dsp:sp modelId="{3F8D49A2-3284-499F-B53F-A3C02EC0E048}">
-      <dsp:nvSpPr>
-        <dsp:cNvPr id="0" name=""/>
-        <dsp:cNvSpPr/>
-      </dsp:nvSpPr>
-      <dsp:spPr>
-        <a:xfrm>
-          <a:off x="2270257" y="2264935"/>
-          <a:ext cx="2783947" cy="274302"/>
-        </a:xfrm>
-        <a:prstGeom prst="roundRect">
-          <a:avLst>
-            <a:gd name="adj" fmla="val 10000"/>
-          </a:avLst>
-        </a:prstGeom>
-        <a:gradFill rotWithShape="0">
-          <a:gsLst>
-            <a:gs pos="0">
-              <a:srgbClr val="FFD9D1">
-                <a:alpha val="49804"/>
-              </a:srgbClr>
-            </a:gs>
-            <a:gs pos="100000">
-              <a:srgbClr val="FFD9D1"/>
-            </a:gs>
-          </a:gsLst>
-          <a:lin ang="5400000" scaled="0"/>
-        </a:gradFill>
-        <a:ln w="6350" cap="flat" cmpd="sng" algn="ctr">
-          <a:solidFill>
-            <a:schemeClr val="accent1">
-              <a:hueOff val="0"/>
-              <a:satOff val="0"/>
-              <a:lumOff val="0"/>
-              <a:alphaOff val="0"/>
-            </a:schemeClr>
-          </a:solidFill>
-          <a:prstDash val="solid"/>
-          <a:miter lim="800000"/>
-        </a:ln>
-        <a:effectLst/>
-      </dsp:spPr>
-      <dsp:style>
-        <a:lnRef idx="1">
-          <a:scrgbClr r="0" g="0" b="0"/>
-        </a:lnRef>
-        <a:fillRef idx="1">
-          <a:scrgbClr r="0" g="0" b="0"/>
-        </a:fillRef>
-        <a:effectRef idx="2">
-          <a:scrgbClr r="0" g="0" b="0"/>
-        </a:effectRef>
-        <a:fontRef idx="minor"/>
-      </dsp:style>
-      <dsp:txBody>
-        <a:bodyPr spcFirstLastPara="0" vert="horz" wrap="square" lIns="22860" tIns="15240" rIns="22860" bIns="15240" numCol="1" spcCol="1270" anchor="ctr" anchorCtr="0">
-          <a:noAutofit/>
-        </a:bodyPr>
-        <a:lstStyle/>
-        <a:p>
-          <a:pPr lvl="0" algn="ctr" defTabSz="533400">
-            <a:lnSpc>
-              <a:spcPct val="90000"/>
-            </a:lnSpc>
-            <a:spcBef>
-              <a:spcPct val="0"/>
-            </a:spcBef>
-            <a:spcAft>
-              <a:spcPct val="35000"/>
-            </a:spcAft>
-          </a:pPr>
-          <a:r>
-            <a:rPr lang="en-US" sz="1200" kern="1200" dirty="0" smtClean="0"/>
-            <a:t>includeAnnotationsWithEndBeyondBounds</a:t>
-          </a:r>
-          <a:endParaRPr lang="en-US" sz="1200" kern="1200" dirty="0"/>
-        </a:p>
-      </dsp:txBody>
-      <dsp:txXfrm>
-        <a:off x="2278291" y="2272969"/>
-        <a:ext cx="2767879" cy="258234"/>
-      </dsp:txXfrm>
-    </dsp:sp>
-    <dsp:sp modelId="{F693726E-1BD8-4CF5-A624-39208FF42DB3}">
-      <dsp:nvSpPr>
-        <dsp:cNvPr id="0" name=""/>
-        <dsp:cNvSpPr/>
-      </dsp:nvSpPr>
-      <dsp:spPr>
-        <a:xfrm>
-          <a:off x="2131495" y="767143"/>
-          <a:ext cx="144209" cy="2061998"/>
-        </a:xfrm>
-        <a:custGeom>
-          <a:avLst/>
-          <a:gdLst/>
-          <a:ahLst/>
-          <a:cxnLst/>
-          <a:rect l="0" t="0" r="0" b="0"/>
-          <a:pathLst>
-            <a:path>
-              <a:moveTo>
-                <a:pt x="0" y="0"/>
-              </a:moveTo>
-              <a:lnTo>
-                <a:pt x="0" y="2061998"/>
-              </a:lnTo>
-              <a:lnTo>
-                <a:pt x="144209" y="2061998"/>
-              </a:lnTo>
-            </a:path>
-          </a:pathLst>
-        </a:custGeom>
-        <a:noFill/>
-        <a:ln w="12700" cap="flat" cmpd="sng" algn="ctr">
-          <a:solidFill>
-            <a:schemeClr val="accent1">
-              <a:shade val="60000"/>
-              <a:hueOff val="0"/>
-              <a:satOff val="0"/>
-              <a:lumOff val="0"/>
-              <a:alphaOff val="0"/>
-            </a:schemeClr>
-          </a:solidFill>
-          <a:prstDash val="solid"/>
-          <a:miter lim="800000"/>
-        </a:ln>
-        <a:effectLst/>
-      </dsp:spPr>
-      <dsp:style>
-        <a:lnRef idx="2">
-          <a:scrgbClr r="0" g="0" b="0"/>
-        </a:lnRef>
-        <a:fillRef idx="0">
-          <a:scrgbClr r="0" g="0" b="0"/>
-        </a:fillRef>
-        <a:effectRef idx="0">
-          <a:scrgbClr r="0" g="0" b="0"/>
-        </a:effectRef>
-        <a:fontRef idx="minor"/>
-      </dsp:style>
-    </dsp:sp>
-    <dsp:sp modelId="{AC11EBD0-8383-469D-B57B-D8ABFF513D43}">
-      <dsp:nvSpPr>
-        <dsp:cNvPr id="0" name=""/>
-        <dsp:cNvSpPr/>
-      </dsp:nvSpPr>
-      <dsp:spPr>
-        <a:xfrm>
-          <a:off x="2275705" y="2708036"/>
-          <a:ext cx="1701663" cy="242211"/>
-        </a:xfrm>
-        <a:prstGeom prst="roundRect">
-          <a:avLst>
-            <a:gd name="adj" fmla="val 10000"/>
-          </a:avLst>
-        </a:prstGeom>
-        <a:gradFill rotWithShape="0">
-          <a:gsLst>
-            <a:gs pos="0">
-              <a:srgbClr val="FFD9D1">
-                <a:alpha val="49804"/>
-              </a:srgbClr>
-            </a:gs>
-            <a:gs pos="100000">
-              <a:srgbClr val="FFD9D1"/>
-            </a:gs>
-          </a:gsLst>
-          <a:lin ang="5400000" scaled="0"/>
-        </a:gradFill>
-        <a:ln w="6350" cap="flat" cmpd="sng" algn="ctr">
-          <a:solidFill>
-            <a:schemeClr val="accent1">
-              <a:hueOff val="0"/>
-              <a:satOff val="0"/>
-              <a:lumOff val="0"/>
-              <a:alphaOff val="0"/>
-            </a:schemeClr>
-          </a:solidFill>
-          <a:prstDash val="solid"/>
-          <a:miter lim="800000"/>
-        </a:ln>
-        <a:effectLst/>
-      </dsp:spPr>
-      <dsp:style>
-        <a:lnRef idx="1">
-          <a:scrgbClr r="0" g="0" b="0"/>
-        </a:lnRef>
-        <a:fillRef idx="1">
-          <a:scrgbClr r="0" g="0" b="0"/>
-        </a:fillRef>
-        <a:effectRef idx="2">
-          <a:scrgbClr r="0" g="0" b="0"/>
-        </a:effectRef>
-        <a:fontRef idx="minor"/>
-      </dsp:style>
-      <dsp:txBody>
-        <a:bodyPr spcFirstLastPara="0" vert="horz" wrap="square" lIns="26670" tIns="17780" rIns="26670" bIns="17780" numCol="1" spcCol="1270" anchor="ctr" anchorCtr="0">
-          <a:noAutofit/>
-        </a:bodyPr>
-        <a:lstStyle/>
-        <a:p>
-          <a:pPr lvl="0" algn="ctr" defTabSz="622300">
-            <a:lnSpc>
-              <a:spcPct val="90000"/>
-            </a:lnSpc>
-            <a:spcBef>
-              <a:spcPct val="0"/>
-            </a:spcBef>
-            <a:spcAft>
-              <a:spcPct val="35000"/>
-            </a:spcAft>
-          </a:pPr>
-          <a:r>
-            <a:rPr lang="en-US" sz="1400" kern="1200" dirty="0" err="1" smtClean="0"/>
-            <a:t>useAnnotationEquals</a:t>
-          </a:r>
-          <a:endParaRPr lang="en-US" sz="1400" kern="1200" dirty="0"/>
-        </a:p>
-      </dsp:txBody>
-      <dsp:txXfrm>
-        <a:off x="2282799" y="2715130"/>
-        <a:ext cx="1687475" cy="228023"/>
-      </dsp:txXfrm>
-    </dsp:sp>
-    <dsp:sp modelId="{3C8E8F72-4C43-4FFC-AEFF-219062D96DB2}">
-      <dsp:nvSpPr>
-        <dsp:cNvPr id="0" name=""/>
-        <dsp:cNvSpPr/>
-      </dsp:nvSpPr>
-      <dsp:spPr>
-        <a:xfrm>
-          <a:off x="3640629" y="48885"/>
-          <a:ext cx="1536024" cy="718258"/>
-        </a:xfrm>
-        <a:prstGeom prst="roundRect">
-          <a:avLst>
-            <a:gd name="adj" fmla="val 10000"/>
-          </a:avLst>
-        </a:prstGeom>
-        <a:gradFill rotWithShape="0">
-          <a:gsLst>
-            <a:gs pos="0">
-              <a:srgbClr val="FFCCFF">
-                <a:lumMod val="50000"/>
-                <a:lumOff val="50000"/>
-              </a:srgbClr>
-            </a:gs>
-            <a:gs pos="100000">
-              <a:srgbClr val="FFCCFF"/>
-            </a:gs>
-          </a:gsLst>
-          <a:lin ang="5400000" scaled="0"/>
-        </a:gradFill>
-        <a:ln w="6350" cap="flat" cmpd="sng" algn="ctr">
-          <a:solidFill>
-            <a:schemeClr val="accent2"/>
-          </a:solidFill>
-          <a:prstDash val="solid"/>
-          <a:miter lim="800000"/>
-        </a:ln>
-        <a:effectLst/>
-      </dsp:spPr>
-      <dsp:style>
-        <a:lnRef idx="1">
-          <a:schemeClr val="accent2"/>
-        </a:lnRef>
-        <a:fillRef idx="2">
-          <a:schemeClr val="accent2"/>
-        </a:fillRef>
-        <a:effectRef idx="1">
-          <a:schemeClr val="accent2"/>
-        </a:effectRef>
-        <a:fontRef idx="minor">
-          <a:schemeClr val="dk1"/>
-        </a:fontRef>
-      </dsp:style>
-      <dsp:txBody>
-        <a:bodyPr spcFirstLastPara="0" vert="horz" wrap="square" lIns="28575" tIns="19050" rIns="28575" bIns="19050" numCol="1" spcCol="1270" anchor="ctr" anchorCtr="0">
-          <a:noAutofit/>
-        </a:bodyPr>
-        <a:lstStyle/>
-        <a:p>
-          <a:pPr lvl="0" algn="ctr" defTabSz="666750">
-            <a:lnSpc>
-              <a:spcPct val="90000"/>
-            </a:lnSpc>
-            <a:spcBef>
-              <a:spcPct val="0"/>
-            </a:spcBef>
-            <a:spcAft>
-              <a:spcPct val="35000"/>
-            </a:spcAft>
-          </a:pPr>
-          <a:r>
-            <a:rPr lang="en-US" sz="1500" kern="1200" dirty="0" smtClean="0"/>
-            <a:t>Annotation index </a:t>
-          </a:r>
-          <a:br>
-            <a:rPr lang="en-US" sz="1500" kern="1200" dirty="0" smtClean="0"/>
-          </a:br>
-          <a:r>
-            <a:rPr lang="en-US" sz="1500" kern="1200" dirty="0" smtClean="0"/>
-            <a:t> follow / </a:t>
-          </a:r>
-          <a:r>
-            <a:rPr lang="en-US" sz="1500" kern="1200" smtClean="0"/>
-            <a:t>preceed</a:t>
-          </a:r>
-          <a:endParaRPr lang="en-US" sz="1500" kern="1200" dirty="0"/>
-        </a:p>
-      </dsp:txBody>
-      <dsp:txXfrm>
-        <a:off x="3661666" y="69922"/>
-        <a:ext cx="1493950" cy="676184"/>
-      </dsp:txXfrm>
-    </dsp:sp>
-    <dsp:sp modelId="{87CA1243-0E0D-4CB9-A20E-711DFC058565}">
-      <dsp:nvSpPr>
-        <dsp:cNvPr id="0" name=""/>
-        <dsp:cNvSpPr/>
-      </dsp:nvSpPr>
-      <dsp:spPr>
-        <a:xfrm>
-          <a:off x="3748511" y="767143"/>
-          <a:ext cx="91440" cy="371163"/>
-        </a:xfrm>
-        <a:custGeom>
-          <a:avLst/>
-          <a:gdLst/>
-          <a:ahLst/>
-          <a:cxnLst/>
-          <a:rect l="0" t="0" r="0" b="0"/>
-          <a:pathLst>
-            <a:path>
-              <a:moveTo>
-                <a:pt x="45720" y="0"/>
-              </a:moveTo>
-              <a:lnTo>
-                <a:pt x="45720" y="371163"/>
-              </a:lnTo>
-              <a:lnTo>
-                <a:pt x="123701" y="371163"/>
-              </a:lnTo>
-            </a:path>
-          </a:pathLst>
-        </a:custGeom>
-        <a:noFill/>
-        <a:ln w="12700" cap="flat" cmpd="sng" algn="ctr">
-          <a:solidFill>
-            <a:schemeClr val="accent1">
-              <a:shade val="60000"/>
-              <a:hueOff val="0"/>
-              <a:satOff val="0"/>
-              <a:lumOff val="0"/>
-              <a:alphaOff val="0"/>
-            </a:schemeClr>
-          </a:solidFill>
-          <a:prstDash val="solid"/>
-          <a:miter lim="800000"/>
-        </a:ln>
-        <a:effectLst/>
-      </dsp:spPr>
-      <dsp:style>
-        <a:lnRef idx="2">
-          <a:scrgbClr r="0" g="0" b="0"/>
-        </a:lnRef>
-        <a:fillRef idx="0">
-          <a:scrgbClr r="0" g="0" b="0"/>
-        </a:fillRef>
-        <a:effectRef idx="0">
-          <a:scrgbClr r="0" g="0" b="0"/>
-        </a:effectRef>
-        <a:fontRef idx="minor"/>
-      </dsp:style>
-    </dsp:sp>
-    <dsp:sp modelId="{AD96485D-9021-4AE3-9AF1-91BF9C7DC4A9}">
-      <dsp:nvSpPr>
-        <dsp:cNvPr id="0" name=""/>
-        <dsp:cNvSpPr/>
-      </dsp:nvSpPr>
-      <dsp:spPr>
-        <a:xfrm>
-          <a:off x="3872213" y="1008385"/>
-          <a:ext cx="1176093" cy="259844"/>
-        </a:xfrm>
-        <a:prstGeom prst="roundRect">
-          <a:avLst>
-            <a:gd name="adj" fmla="val 10000"/>
-          </a:avLst>
-        </a:prstGeom>
-        <a:gradFill rotWithShape="0">
-          <a:gsLst>
-            <a:gs pos="0">
-              <a:srgbClr val="FFD9D1">
-                <a:alpha val="49804"/>
-              </a:srgbClr>
-            </a:gs>
-            <a:gs pos="100000">
-              <a:srgbClr val="FFD9D1"/>
-            </a:gs>
-          </a:gsLst>
-          <a:lin ang="5400000" scaled="0"/>
-        </a:gradFill>
-        <a:ln w="6350" cap="flat" cmpd="sng" algn="ctr">
-          <a:solidFill>
-            <a:schemeClr val="accent1">
-              <a:hueOff val="0"/>
-              <a:satOff val="0"/>
-              <a:lumOff val="0"/>
-              <a:alphaOff val="0"/>
-            </a:schemeClr>
-          </a:solidFill>
-          <a:prstDash val="solid"/>
-          <a:miter lim="800000"/>
-        </a:ln>
-        <a:effectLst/>
-      </dsp:spPr>
-      <dsp:style>
-        <a:lnRef idx="1">
-          <a:scrgbClr r="0" g="0" b="0"/>
-        </a:lnRef>
-        <a:fillRef idx="1">
-          <a:scrgbClr r="0" g="0" b="0"/>
-        </a:fillRef>
-        <a:effectRef idx="2">
-          <a:scrgbClr r="0" g="0" b="0"/>
-        </a:effectRef>
-        <a:fontRef idx="minor"/>
-      </dsp:style>
-      <dsp:txBody>
-        <a:bodyPr spcFirstLastPara="0" vert="horz" wrap="square" lIns="26670" tIns="17780" rIns="26670" bIns="17780" numCol="1" spcCol="1270" anchor="ctr" anchorCtr="0">
-          <a:noAutofit/>
-        </a:bodyPr>
-        <a:lstStyle/>
-        <a:p>
-          <a:pPr lvl="0" algn="ctr" defTabSz="622300">
-            <a:lnSpc>
-              <a:spcPct val="90000"/>
-            </a:lnSpc>
-            <a:spcBef>
-              <a:spcPct val="0"/>
-            </a:spcBef>
-            <a:spcAft>
-              <a:spcPct val="35000"/>
-            </a:spcAft>
-          </a:pPr>
-          <a:r>
-            <a:rPr lang="en-US" sz="1400" kern="1200" dirty="0" smtClean="0"/>
-            <a:t>following</a:t>
-          </a:r>
-          <a:endParaRPr lang="en-US" sz="1400" kern="1200" dirty="0"/>
-        </a:p>
-      </dsp:txBody>
-      <dsp:txXfrm>
-        <a:off x="3879824" y="1015996"/>
-        <a:ext cx="1160871" cy="244622"/>
-      </dsp:txXfrm>
-    </dsp:sp>
-    <dsp:sp modelId="{EFA0C431-24CD-4099-9BAE-EC52CFA42898}">
-      <dsp:nvSpPr>
-        <dsp:cNvPr id="0" name=""/>
-        <dsp:cNvSpPr/>
-      </dsp:nvSpPr>
-      <dsp:spPr>
-        <a:xfrm>
-          <a:off x="3748511" y="767143"/>
-          <a:ext cx="91440" cy="810572"/>
-        </a:xfrm>
-        <a:custGeom>
-          <a:avLst/>
-          <a:gdLst/>
-          <a:ahLst/>
-          <a:cxnLst/>
-          <a:rect l="0" t="0" r="0" b="0"/>
-          <a:pathLst>
-            <a:path>
-              <a:moveTo>
-                <a:pt x="45720" y="0"/>
-              </a:moveTo>
-              <a:lnTo>
-                <a:pt x="45720" y="810572"/>
-              </a:lnTo>
-              <a:lnTo>
-                <a:pt x="123701" y="810572"/>
-              </a:lnTo>
-            </a:path>
-          </a:pathLst>
-        </a:custGeom>
-        <a:noFill/>
-        <a:ln w="12700" cap="flat" cmpd="sng" algn="ctr">
-          <a:solidFill>
-            <a:schemeClr val="accent1">
-              <a:shade val="60000"/>
-              <a:hueOff val="0"/>
-              <a:satOff val="0"/>
-              <a:lumOff val="0"/>
-              <a:alphaOff val="0"/>
-            </a:schemeClr>
-          </a:solidFill>
-          <a:prstDash val="solid"/>
-          <a:miter lim="800000"/>
-        </a:ln>
-        <a:effectLst/>
-      </dsp:spPr>
-      <dsp:style>
-        <a:lnRef idx="2">
-          <a:scrgbClr r="0" g="0" b="0"/>
-        </a:lnRef>
-        <a:fillRef idx="0">
-          <a:scrgbClr r="0" g="0" b="0"/>
-        </a:fillRef>
-        <a:effectRef idx="0">
-          <a:scrgbClr r="0" g="0" b="0"/>
-        </a:effectRef>
-        <a:fontRef idx="minor"/>
-      </dsp:style>
-    </dsp:sp>
-    <dsp:sp modelId="{E592C975-6A58-42A6-8A1C-546B354206FF}">
-      <dsp:nvSpPr>
-        <dsp:cNvPr id="0" name=""/>
-        <dsp:cNvSpPr/>
-      </dsp:nvSpPr>
-      <dsp:spPr>
-        <a:xfrm>
-          <a:off x="3872213" y="1447794"/>
-          <a:ext cx="1176093" cy="259844"/>
-        </a:xfrm>
-        <a:prstGeom prst="roundRect">
-          <a:avLst>
-            <a:gd name="adj" fmla="val 10000"/>
-          </a:avLst>
-        </a:prstGeom>
-        <a:gradFill rotWithShape="0">
-          <a:gsLst>
-            <a:gs pos="0">
-              <a:srgbClr val="FFD9D1">
-                <a:alpha val="49804"/>
-              </a:srgbClr>
-            </a:gs>
-            <a:gs pos="100000">
-              <a:srgbClr val="FFD9D1"/>
-            </a:gs>
-          </a:gsLst>
-          <a:lin ang="5400000" scaled="0"/>
-        </a:gradFill>
-        <a:ln w="6350" cap="flat" cmpd="sng" algn="ctr">
-          <a:solidFill>
-            <a:schemeClr val="accent1">
-              <a:hueOff val="0"/>
-              <a:satOff val="0"/>
-              <a:lumOff val="0"/>
-              <a:alphaOff val="0"/>
-            </a:schemeClr>
-          </a:solidFill>
-          <a:prstDash val="solid"/>
-          <a:miter lim="800000"/>
-        </a:ln>
-        <a:effectLst/>
-      </dsp:spPr>
-      <dsp:style>
-        <a:lnRef idx="1">
-          <a:scrgbClr r="0" g="0" b="0"/>
-        </a:lnRef>
-        <a:fillRef idx="1">
-          <a:scrgbClr r="0" g="0" b="0"/>
-        </a:fillRef>
-        <a:effectRef idx="2">
-          <a:scrgbClr r="0" g="0" b="0"/>
-        </a:effectRef>
-        <a:fontRef idx="minor"/>
-      </dsp:style>
-      <dsp:txBody>
-        <a:bodyPr spcFirstLastPara="0" vert="horz" wrap="square" lIns="26670" tIns="17780" rIns="26670" bIns="17780" numCol="1" spcCol="1270" anchor="ctr" anchorCtr="0">
-          <a:noAutofit/>
-        </a:bodyPr>
-        <a:lstStyle/>
-        <a:p>
-          <a:pPr lvl="0" algn="ctr" defTabSz="622300">
-            <a:lnSpc>
-              <a:spcPct val="90000"/>
-            </a:lnSpc>
-            <a:spcBef>
-              <a:spcPct val="0"/>
-            </a:spcBef>
-            <a:spcAft>
-              <a:spcPct val="35000"/>
-            </a:spcAft>
-          </a:pPr>
-          <a:r>
-            <a:rPr lang="en-US" sz="1400" kern="1200" dirty="0" smtClean="0"/>
-            <a:t>preceding</a:t>
-          </a:r>
-          <a:endParaRPr lang="en-US" sz="1400" kern="1200" dirty="0"/>
-        </a:p>
-      </dsp:txBody>
-      <dsp:txXfrm>
-        <a:off x="3879824" y="1455405"/>
-        <a:ext cx="1160871" cy="244622"/>
-      </dsp:txXfrm>
-    </dsp:sp>
   </dsp:spTree>
 </dsp:drawing>
 </file>
@@ -13209,7 +11390,7 @@
           <a:p>
             <a:fld id="{FA88A723-210D-49FB-911D-CC70F62696A5}" type="datetimeFigureOut">
               <a:rPr lang="en-US" smtClean="0"/>
-              <a:t>2/1/2017</a:t>
+              <a:t>5/30/2017</a:t>
             </a:fld>
             <a:endParaRPr lang="en-US"/>
           </a:p>
@@ -13379,7 +11560,7 @@
           <a:p>
             <a:fld id="{FA88A723-210D-49FB-911D-CC70F62696A5}" type="datetimeFigureOut">
               <a:rPr lang="en-US" smtClean="0"/>
-              <a:t>2/1/2017</a:t>
+              <a:t>5/30/2017</a:t>
             </a:fld>
             <a:endParaRPr lang="en-US"/>
           </a:p>
@@ -13559,7 +11740,7 @@
           <a:p>
             <a:fld id="{FA88A723-210D-49FB-911D-CC70F62696A5}" type="datetimeFigureOut">
               <a:rPr lang="en-US" smtClean="0"/>
-              <a:t>2/1/2017</a:t>
+              <a:t>5/30/2017</a:t>
             </a:fld>
             <a:endParaRPr lang="en-US"/>
           </a:p>
@@ -13729,7 +11910,7 @@
           <a:p>
             <a:fld id="{FA88A723-210D-49FB-911D-CC70F62696A5}" type="datetimeFigureOut">
               <a:rPr lang="en-US" smtClean="0"/>
-              <a:t>2/1/2017</a:t>
+              <a:t>5/30/2017</a:t>
             </a:fld>
             <a:endParaRPr lang="en-US"/>
           </a:p>
@@ -13975,7 +12156,7 @@
           <a:p>
             <a:fld id="{FA88A723-210D-49FB-911D-CC70F62696A5}" type="datetimeFigureOut">
               <a:rPr lang="en-US" smtClean="0"/>
-              <a:t>2/1/2017</a:t>
+              <a:t>5/30/2017</a:t>
             </a:fld>
             <a:endParaRPr lang="en-US"/>
           </a:p>
@@ -14207,7 +12388,7 @@
           <a:p>
             <a:fld id="{FA88A723-210D-49FB-911D-CC70F62696A5}" type="datetimeFigureOut">
               <a:rPr lang="en-US" smtClean="0"/>
-              <a:t>2/1/2017</a:t>
+              <a:t>5/30/2017</a:t>
             </a:fld>
             <a:endParaRPr lang="en-US"/>
           </a:p>
@@ -14574,7 +12755,7 @@
           <a:p>
             <a:fld id="{FA88A723-210D-49FB-911D-CC70F62696A5}" type="datetimeFigureOut">
               <a:rPr lang="en-US" smtClean="0"/>
-              <a:t>2/1/2017</a:t>
+              <a:t>5/30/2017</a:t>
             </a:fld>
             <a:endParaRPr lang="en-US"/>
           </a:p>
@@ -14692,7 +12873,7 @@
           <a:p>
             <a:fld id="{FA88A723-210D-49FB-911D-CC70F62696A5}" type="datetimeFigureOut">
               <a:rPr lang="en-US" smtClean="0"/>
-              <a:t>2/1/2017</a:t>
+              <a:t>5/30/2017</a:t>
             </a:fld>
             <a:endParaRPr lang="en-US"/>
           </a:p>
@@ -14787,7 +12968,7 @@
           <a:p>
             <a:fld id="{FA88A723-210D-49FB-911D-CC70F62696A5}" type="datetimeFigureOut">
               <a:rPr lang="en-US" smtClean="0"/>
-              <a:t>2/1/2017</a:t>
+              <a:t>5/30/2017</a:t>
             </a:fld>
             <a:endParaRPr lang="en-US"/>
           </a:p>
@@ -15064,7 +13245,7 @@
           <a:p>
             <a:fld id="{FA88A723-210D-49FB-911D-CC70F62696A5}" type="datetimeFigureOut">
               <a:rPr lang="en-US" smtClean="0"/>
-              <a:t>2/1/2017</a:t>
+              <a:t>5/30/2017</a:t>
             </a:fld>
             <a:endParaRPr lang="en-US"/>
           </a:p>
@@ -15317,7 +13498,7 @@
           <a:p>
             <a:fld id="{FA88A723-210D-49FB-911D-CC70F62696A5}" type="datetimeFigureOut">
               <a:rPr lang="en-US" smtClean="0"/>
-              <a:t>2/1/2017</a:t>
+              <a:t>5/30/2017</a:t>
             </a:fld>
             <a:endParaRPr lang="en-US"/>
           </a:p>
@@ -15530,7 +13711,7 @@
           <a:p>
             <a:fld id="{FA88A723-210D-49FB-911D-CC70F62696A5}" type="datetimeFigureOut">
               <a:rPr lang="en-US" smtClean="0"/>
-              <a:t>2/1/2017</a:t>
+              <a:t>5/30/2017</a:t>
             </a:fld>
             <a:endParaRPr lang="en-US"/>
           </a:p>
@@ -18157,11 +16338,6 @@
               </a:rPr>
               <a:t>(semi) built-in</a:t>
             </a:r>
-            <a:endParaRPr lang="en-US" dirty="0" smtClean="0">
-              <a:ln w="12700">
-                <a:noFill/>
-              </a:ln>
-            </a:endParaRPr>
           </a:p>
         </p:txBody>
       </p:sp>
@@ -26082,6 +24258,2203 @@
   <p:clrMapOvr>
     <a:masterClrMapping/>
   </p:clrMapOvr>
+  <p:timing>
+    <p:tnLst>
+      <p:par>
+        <p:cTn id="1" dur="indefinite" restart="never" nodeType="tmRoot"/>
+      </p:par>
+    </p:tnLst>
+  </p:timing>
+</p:sld>
+</file>
+
+<file path=ppt/slides/slide7.xml><?xml version="1.0" encoding="utf-8"?>
+<p:sld xmlns:a="http://schemas.openxmlformats.org/drawingml/2006/main" xmlns:r="http://schemas.openxmlformats.org/officeDocument/2006/relationships" xmlns:p="http://schemas.openxmlformats.org/presentationml/2006/main">
+  <p:cSld>
+    <p:spTree>
+      <p:nvGrpSpPr>
+        <p:cNvPr id="1" name=""/>
+        <p:cNvGrpSpPr/>
+        <p:nvPr/>
+      </p:nvGrpSpPr>
+      <p:grpSpPr>
+        <a:xfrm>
+          <a:off x="0" y="0"/>
+          <a:ext cx="0" cy="0"/>
+          <a:chOff x="0" y="0"/>
+          <a:chExt cx="0" cy="0"/>
+        </a:xfrm>
+      </p:grpSpPr>
+      <p:sp>
+        <p:nvSpPr>
+          <p:cNvPr id="2" name="Rounded Rectangle 1"/>
+          <p:cNvSpPr/>
+          <p:nvPr/>
+        </p:nvSpPr>
+        <p:spPr>
+          <a:xfrm>
+            <a:off x="1682592" y="742950"/>
+            <a:ext cx="818196" cy="400050"/>
+          </a:xfrm>
+          <a:prstGeom prst="roundRect">
+            <a:avLst/>
+          </a:prstGeom>
+        </p:spPr>
+        <p:style>
+          <a:lnRef idx="1">
+            <a:schemeClr val="accent1"/>
+          </a:lnRef>
+          <a:fillRef idx="2">
+            <a:schemeClr val="accent1"/>
+          </a:fillRef>
+          <a:effectRef idx="1">
+            <a:schemeClr val="accent1"/>
+          </a:effectRef>
+          <a:fontRef idx="minor">
+            <a:schemeClr val="dk1"/>
+          </a:fontRef>
+        </p:style>
+        <p:txBody>
+          <a:bodyPr rtlCol="0" anchor="ctr"/>
+          <a:lstStyle/>
+          <a:p>
+            <a:pPr algn="ctr"/>
+            <a:r>
+              <a:rPr lang="en-US" dirty="0" smtClean="0"/>
+              <a:t>Root1</a:t>
+            </a:r>
+            <a:endParaRPr lang="en-US" dirty="0"/>
+          </a:p>
+        </p:txBody>
+      </p:sp>
+      <p:sp>
+        <p:nvSpPr>
+          <p:cNvPr id="3" name="Rounded Rectangle 2"/>
+          <p:cNvSpPr/>
+          <p:nvPr/>
+        </p:nvSpPr>
+        <p:spPr>
+          <a:xfrm>
+            <a:off x="952500" y="1306830"/>
+            <a:ext cx="617220" cy="400050"/>
+          </a:xfrm>
+          <a:prstGeom prst="roundRect">
+            <a:avLst/>
+          </a:prstGeom>
+        </p:spPr>
+        <p:style>
+          <a:lnRef idx="1">
+            <a:schemeClr val="accent1"/>
+          </a:lnRef>
+          <a:fillRef idx="2">
+            <a:schemeClr val="accent1"/>
+          </a:fillRef>
+          <a:effectRef idx="1">
+            <a:schemeClr val="accent1"/>
+          </a:effectRef>
+          <a:fontRef idx="minor">
+            <a:schemeClr val="dk1"/>
+          </a:fontRef>
+        </p:style>
+        <p:txBody>
+          <a:bodyPr rtlCol="0" anchor="ctr"/>
+          <a:lstStyle/>
+          <a:p>
+            <a:pPr algn="ctr"/>
+            <a:endParaRPr lang="en-US"/>
+          </a:p>
+        </p:txBody>
+      </p:sp>
+      <p:sp>
+        <p:nvSpPr>
+          <p:cNvPr id="4" name="Rounded Rectangle 3"/>
+          <p:cNvSpPr/>
+          <p:nvPr/>
+        </p:nvSpPr>
+        <p:spPr>
+          <a:xfrm>
+            <a:off x="1783080" y="1306830"/>
+            <a:ext cx="617220" cy="400050"/>
+          </a:xfrm>
+          <a:prstGeom prst="roundRect">
+            <a:avLst/>
+          </a:prstGeom>
+        </p:spPr>
+        <p:style>
+          <a:lnRef idx="1">
+            <a:schemeClr val="accent2"/>
+          </a:lnRef>
+          <a:fillRef idx="2">
+            <a:schemeClr val="accent2"/>
+          </a:fillRef>
+          <a:effectRef idx="1">
+            <a:schemeClr val="accent2"/>
+          </a:effectRef>
+          <a:fontRef idx="minor">
+            <a:schemeClr val="dk1"/>
+          </a:fontRef>
+        </p:style>
+        <p:txBody>
+          <a:bodyPr rtlCol="0" anchor="ctr"/>
+          <a:lstStyle/>
+          <a:p>
+            <a:pPr algn="ctr"/>
+            <a:r>
+              <a:rPr lang="en-US" dirty="0"/>
+              <a:t>Cn1</a:t>
+            </a:r>
+          </a:p>
+        </p:txBody>
+      </p:sp>
+      <p:sp>
+        <p:nvSpPr>
+          <p:cNvPr id="5" name="Rounded Rectangle 4"/>
+          <p:cNvSpPr/>
+          <p:nvPr/>
+        </p:nvSpPr>
+        <p:spPr>
+          <a:xfrm>
+            <a:off x="2602230" y="1306830"/>
+            <a:ext cx="617220" cy="400050"/>
+          </a:xfrm>
+          <a:prstGeom prst="roundRect">
+            <a:avLst/>
+          </a:prstGeom>
+        </p:spPr>
+        <p:style>
+          <a:lnRef idx="1">
+            <a:schemeClr val="accent2"/>
+          </a:lnRef>
+          <a:fillRef idx="2">
+            <a:schemeClr val="accent2"/>
+          </a:fillRef>
+          <a:effectRef idx="1">
+            <a:schemeClr val="accent2"/>
+          </a:effectRef>
+          <a:fontRef idx="minor">
+            <a:schemeClr val="dk1"/>
+          </a:fontRef>
+        </p:style>
+        <p:txBody>
+          <a:bodyPr rtlCol="0" anchor="ctr"/>
+          <a:lstStyle/>
+          <a:p>
+            <a:pPr algn="ctr"/>
+            <a:r>
+              <a:rPr lang="en-US" dirty="0" smtClean="0">
+                <a:solidFill>
+                  <a:schemeClr val="dk1"/>
+                </a:solidFill>
+              </a:rPr>
+              <a:t>Cn2</a:t>
+            </a:r>
+            <a:endParaRPr lang="en-US" dirty="0">
+              <a:solidFill>
+                <a:schemeClr val="dk1"/>
+              </a:solidFill>
+            </a:endParaRPr>
+          </a:p>
+        </p:txBody>
+      </p:sp>
+      <p:sp>
+        <p:nvSpPr>
+          <p:cNvPr id="6" name="Rounded Rectangle 5"/>
+          <p:cNvSpPr/>
+          <p:nvPr/>
+        </p:nvSpPr>
+        <p:spPr>
+          <a:xfrm>
+            <a:off x="544830" y="1878330"/>
+            <a:ext cx="617220" cy="400050"/>
+          </a:xfrm>
+          <a:prstGeom prst="roundRect">
+            <a:avLst/>
+          </a:prstGeom>
+        </p:spPr>
+        <p:style>
+          <a:lnRef idx="1">
+            <a:schemeClr val="accent1"/>
+          </a:lnRef>
+          <a:fillRef idx="2">
+            <a:schemeClr val="accent1"/>
+          </a:fillRef>
+          <a:effectRef idx="1">
+            <a:schemeClr val="accent1"/>
+          </a:effectRef>
+          <a:fontRef idx="minor">
+            <a:schemeClr val="dk1"/>
+          </a:fontRef>
+        </p:style>
+        <p:txBody>
+          <a:bodyPr rtlCol="0" anchor="ctr"/>
+          <a:lstStyle/>
+          <a:p>
+            <a:pPr algn="ctr"/>
+            <a:endParaRPr lang="en-US"/>
+          </a:p>
+        </p:txBody>
+      </p:sp>
+      <p:sp>
+        <p:nvSpPr>
+          <p:cNvPr id="7" name="Rounded Rectangle 6"/>
+          <p:cNvSpPr/>
+          <p:nvPr/>
+        </p:nvSpPr>
+        <p:spPr>
+          <a:xfrm>
+            <a:off x="127635" y="2449830"/>
+            <a:ext cx="617220" cy="400050"/>
+          </a:xfrm>
+          <a:prstGeom prst="roundRect">
+            <a:avLst/>
+          </a:prstGeom>
+        </p:spPr>
+        <p:style>
+          <a:lnRef idx="1">
+            <a:schemeClr val="accent4"/>
+          </a:lnRef>
+          <a:fillRef idx="2">
+            <a:schemeClr val="accent4"/>
+          </a:fillRef>
+          <a:effectRef idx="1">
+            <a:schemeClr val="accent4"/>
+          </a:effectRef>
+          <a:fontRef idx="minor">
+            <a:schemeClr val="dk1"/>
+          </a:fontRef>
+        </p:style>
+        <p:txBody>
+          <a:bodyPr rtlCol="0" anchor="ctr"/>
+          <a:lstStyle/>
+          <a:p>
+            <a:pPr algn="ctr"/>
+            <a:r>
+              <a:rPr lang="en-US" dirty="0" smtClean="0">
+                <a:solidFill>
+                  <a:schemeClr val="dk1"/>
+                </a:solidFill>
+              </a:rPr>
+              <a:t>Cn1</a:t>
+            </a:r>
+            <a:endParaRPr lang="en-US" dirty="0">
+              <a:solidFill>
+                <a:schemeClr val="dk1"/>
+              </a:solidFill>
+            </a:endParaRPr>
+          </a:p>
+        </p:txBody>
+      </p:sp>
+      <p:sp>
+        <p:nvSpPr>
+          <p:cNvPr id="8" name="Rounded Rectangle 7"/>
+          <p:cNvSpPr/>
+          <p:nvPr/>
+        </p:nvSpPr>
+        <p:spPr>
+          <a:xfrm>
+            <a:off x="952500" y="2449830"/>
+            <a:ext cx="617220" cy="400050"/>
+          </a:xfrm>
+          <a:prstGeom prst="roundRect">
+            <a:avLst/>
+          </a:prstGeom>
+        </p:spPr>
+        <p:style>
+          <a:lnRef idx="1">
+            <a:schemeClr val="accent4"/>
+          </a:lnRef>
+          <a:fillRef idx="2">
+            <a:schemeClr val="accent4"/>
+          </a:fillRef>
+          <a:effectRef idx="1">
+            <a:schemeClr val="accent4"/>
+          </a:effectRef>
+          <a:fontRef idx="minor">
+            <a:schemeClr val="dk1"/>
+          </a:fontRef>
+        </p:style>
+        <p:txBody>
+          <a:bodyPr rtlCol="0" anchor="ctr"/>
+          <a:lstStyle/>
+          <a:p>
+            <a:pPr algn="ctr"/>
+            <a:r>
+              <a:rPr lang="en-US" dirty="0" smtClean="0">
+                <a:solidFill>
+                  <a:schemeClr val="dk1"/>
+                </a:solidFill>
+              </a:rPr>
+              <a:t>Cn2</a:t>
+            </a:r>
+            <a:endParaRPr lang="en-US" dirty="0">
+              <a:solidFill>
+                <a:schemeClr val="dk1"/>
+              </a:solidFill>
+            </a:endParaRPr>
+          </a:p>
+        </p:txBody>
+      </p:sp>
+      <p:cxnSp>
+        <p:nvCxnSpPr>
+          <p:cNvPr id="10" name="Straight Arrow Connector 9"/>
+          <p:cNvCxnSpPr>
+            <a:stCxn id="2" idx="2"/>
+            <a:endCxn id="3" idx="0"/>
+          </p:cNvCxnSpPr>
+          <p:nvPr/>
+        </p:nvCxnSpPr>
+        <p:spPr>
+          <a:xfrm flipH="1">
+            <a:off x="1261110" y="1143000"/>
+            <a:ext cx="830580" cy="163830"/>
+          </a:xfrm>
+          <a:prstGeom prst="straightConnector1">
+            <a:avLst/>
+          </a:prstGeom>
+          <a:ln>
+            <a:tailEnd type="triangle"/>
+          </a:ln>
+        </p:spPr>
+        <p:style>
+          <a:lnRef idx="3">
+            <a:schemeClr val="dk1"/>
+          </a:lnRef>
+          <a:fillRef idx="0">
+            <a:schemeClr val="dk1"/>
+          </a:fillRef>
+          <a:effectRef idx="2">
+            <a:schemeClr val="dk1"/>
+          </a:effectRef>
+          <a:fontRef idx="minor">
+            <a:schemeClr val="tx1"/>
+          </a:fontRef>
+        </p:style>
+      </p:cxnSp>
+      <p:cxnSp>
+        <p:nvCxnSpPr>
+          <p:cNvPr id="11" name="Straight Arrow Connector 10"/>
+          <p:cNvCxnSpPr>
+            <a:stCxn id="2" idx="2"/>
+            <a:endCxn id="4" idx="0"/>
+          </p:cNvCxnSpPr>
+          <p:nvPr/>
+        </p:nvCxnSpPr>
+        <p:spPr>
+          <a:xfrm>
+            <a:off x="2091690" y="1143000"/>
+            <a:ext cx="0" cy="163830"/>
+          </a:xfrm>
+          <a:prstGeom prst="straightConnector1">
+            <a:avLst/>
+          </a:prstGeom>
+          <a:ln>
+            <a:tailEnd type="triangle"/>
+          </a:ln>
+        </p:spPr>
+        <p:style>
+          <a:lnRef idx="3">
+            <a:schemeClr val="dk1"/>
+          </a:lnRef>
+          <a:fillRef idx="0">
+            <a:schemeClr val="dk1"/>
+          </a:fillRef>
+          <a:effectRef idx="2">
+            <a:schemeClr val="dk1"/>
+          </a:effectRef>
+          <a:fontRef idx="minor">
+            <a:schemeClr val="tx1"/>
+          </a:fontRef>
+        </p:style>
+      </p:cxnSp>
+      <p:cxnSp>
+        <p:nvCxnSpPr>
+          <p:cNvPr id="14" name="Straight Arrow Connector 13"/>
+          <p:cNvCxnSpPr>
+            <a:stCxn id="2" idx="2"/>
+            <a:endCxn id="5" idx="0"/>
+          </p:cNvCxnSpPr>
+          <p:nvPr/>
+        </p:nvCxnSpPr>
+        <p:spPr>
+          <a:xfrm>
+            <a:off x="2091690" y="1143000"/>
+            <a:ext cx="819150" cy="163830"/>
+          </a:xfrm>
+          <a:prstGeom prst="straightConnector1">
+            <a:avLst/>
+          </a:prstGeom>
+          <a:ln>
+            <a:tailEnd type="triangle"/>
+          </a:ln>
+        </p:spPr>
+        <p:style>
+          <a:lnRef idx="3">
+            <a:schemeClr val="dk1"/>
+          </a:lnRef>
+          <a:fillRef idx="0">
+            <a:schemeClr val="dk1"/>
+          </a:fillRef>
+          <a:effectRef idx="2">
+            <a:schemeClr val="dk1"/>
+          </a:effectRef>
+          <a:fontRef idx="minor">
+            <a:schemeClr val="tx1"/>
+          </a:fontRef>
+        </p:style>
+      </p:cxnSp>
+      <p:cxnSp>
+        <p:nvCxnSpPr>
+          <p:cNvPr id="17" name="Straight Arrow Connector 16"/>
+          <p:cNvCxnSpPr>
+            <a:stCxn id="3" idx="2"/>
+            <a:endCxn id="6" idx="0"/>
+          </p:cNvCxnSpPr>
+          <p:nvPr/>
+        </p:nvCxnSpPr>
+        <p:spPr>
+          <a:xfrm flipH="1">
+            <a:off x="853440" y="1706880"/>
+            <a:ext cx="407670" cy="171450"/>
+          </a:xfrm>
+          <a:prstGeom prst="straightConnector1">
+            <a:avLst/>
+          </a:prstGeom>
+          <a:ln>
+            <a:tailEnd type="triangle"/>
+          </a:ln>
+        </p:spPr>
+        <p:style>
+          <a:lnRef idx="3">
+            <a:schemeClr val="dk1"/>
+          </a:lnRef>
+          <a:fillRef idx="0">
+            <a:schemeClr val="dk1"/>
+          </a:fillRef>
+          <a:effectRef idx="2">
+            <a:schemeClr val="dk1"/>
+          </a:effectRef>
+          <a:fontRef idx="minor">
+            <a:schemeClr val="tx1"/>
+          </a:fontRef>
+        </p:style>
+      </p:cxnSp>
+      <p:cxnSp>
+        <p:nvCxnSpPr>
+          <p:cNvPr id="20" name="Straight Arrow Connector 19"/>
+          <p:cNvCxnSpPr>
+            <a:stCxn id="6" idx="2"/>
+          </p:cNvCxnSpPr>
+          <p:nvPr/>
+        </p:nvCxnSpPr>
+        <p:spPr>
+          <a:xfrm flipH="1">
+            <a:off x="445770" y="2278380"/>
+            <a:ext cx="407670" cy="171450"/>
+          </a:xfrm>
+          <a:prstGeom prst="straightConnector1">
+            <a:avLst/>
+          </a:prstGeom>
+          <a:ln>
+            <a:tailEnd type="triangle"/>
+          </a:ln>
+        </p:spPr>
+        <p:style>
+          <a:lnRef idx="3">
+            <a:schemeClr val="dk1"/>
+          </a:lnRef>
+          <a:fillRef idx="0">
+            <a:schemeClr val="dk1"/>
+          </a:fillRef>
+          <a:effectRef idx="2">
+            <a:schemeClr val="dk1"/>
+          </a:effectRef>
+          <a:fontRef idx="minor">
+            <a:schemeClr val="tx1"/>
+          </a:fontRef>
+        </p:style>
+      </p:cxnSp>
+      <p:cxnSp>
+        <p:nvCxnSpPr>
+          <p:cNvPr id="23" name="Straight Arrow Connector 22"/>
+          <p:cNvCxnSpPr>
+            <a:stCxn id="6" idx="2"/>
+            <a:endCxn id="8" idx="0"/>
+          </p:cNvCxnSpPr>
+          <p:nvPr/>
+        </p:nvCxnSpPr>
+        <p:spPr>
+          <a:xfrm>
+            <a:off x="853440" y="2278380"/>
+            <a:ext cx="407670" cy="171450"/>
+          </a:xfrm>
+          <a:prstGeom prst="straightConnector1">
+            <a:avLst/>
+          </a:prstGeom>
+          <a:ln>
+            <a:tailEnd type="triangle"/>
+          </a:ln>
+        </p:spPr>
+        <p:style>
+          <a:lnRef idx="3">
+            <a:schemeClr val="dk1"/>
+          </a:lnRef>
+          <a:fillRef idx="0">
+            <a:schemeClr val="dk1"/>
+          </a:fillRef>
+          <a:effectRef idx="2">
+            <a:schemeClr val="dk1"/>
+          </a:effectRef>
+          <a:fontRef idx="minor">
+            <a:schemeClr val="tx1"/>
+          </a:fontRef>
+        </p:style>
+      </p:cxnSp>
+      <p:sp>
+        <p:nvSpPr>
+          <p:cNvPr id="26" name="Rounded Rectangle 25"/>
+          <p:cNvSpPr/>
+          <p:nvPr/>
+        </p:nvSpPr>
+        <p:spPr>
+          <a:xfrm>
+            <a:off x="3540034" y="3114176"/>
+            <a:ext cx="368323" cy="238728"/>
+          </a:xfrm>
+          <a:prstGeom prst="roundRect">
+            <a:avLst/>
+          </a:prstGeom>
+        </p:spPr>
+        <p:style>
+          <a:lnRef idx="1">
+            <a:schemeClr val="accent1"/>
+          </a:lnRef>
+          <a:fillRef idx="2">
+            <a:schemeClr val="accent1"/>
+          </a:fillRef>
+          <a:effectRef idx="1">
+            <a:schemeClr val="accent1"/>
+          </a:effectRef>
+          <a:fontRef idx="minor">
+            <a:schemeClr val="dk1"/>
+          </a:fontRef>
+        </p:style>
+        <p:txBody>
+          <a:bodyPr rtlCol="0" anchor="ctr"/>
+          <a:lstStyle/>
+          <a:p>
+            <a:pPr algn="ctr"/>
+            <a:endParaRPr lang="en-US" sz="800"/>
+          </a:p>
+        </p:txBody>
+      </p:sp>
+      <p:sp>
+        <p:nvSpPr>
+          <p:cNvPr id="27" name="Rounded Rectangle 26"/>
+          <p:cNvSpPr/>
+          <p:nvPr/>
+        </p:nvSpPr>
+        <p:spPr>
+          <a:xfrm>
+            <a:off x="3044390" y="3450669"/>
+            <a:ext cx="368323" cy="238728"/>
+          </a:xfrm>
+          <a:prstGeom prst="roundRect">
+            <a:avLst/>
+          </a:prstGeom>
+        </p:spPr>
+        <p:style>
+          <a:lnRef idx="1">
+            <a:schemeClr val="accent1"/>
+          </a:lnRef>
+          <a:fillRef idx="2">
+            <a:schemeClr val="accent1"/>
+          </a:fillRef>
+          <a:effectRef idx="1">
+            <a:schemeClr val="accent1"/>
+          </a:effectRef>
+          <a:fontRef idx="minor">
+            <a:schemeClr val="dk1"/>
+          </a:fontRef>
+        </p:style>
+        <p:txBody>
+          <a:bodyPr rtlCol="0" anchor="ctr"/>
+          <a:lstStyle/>
+          <a:p>
+            <a:pPr algn="ctr"/>
+            <a:endParaRPr lang="en-US" sz="800"/>
+          </a:p>
+        </p:txBody>
+      </p:sp>
+      <p:sp>
+        <p:nvSpPr>
+          <p:cNvPr id="28" name="Rounded Rectangle 27"/>
+          <p:cNvSpPr/>
+          <p:nvPr/>
+        </p:nvSpPr>
+        <p:spPr>
+          <a:xfrm>
+            <a:off x="3540034" y="3450669"/>
+            <a:ext cx="368323" cy="238728"/>
+          </a:xfrm>
+          <a:prstGeom prst="roundRect">
+            <a:avLst/>
+          </a:prstGeom>
+        </p:spPr>
+        <p:style>
+          <a:lnRef idx="1">
+            <a:schemeClr val="accent4"/>
+          </a:lnRef>
+          <a:fillRef idx="2">
+            <a:schemeClr val="accent4"/>
+          </a:fillRef>
+          <a:effectRef idx="1">
+            <a:schemeClr val="accent4"/>
+          </a:effectRef>
+          <a:fontRef idx="minor">
+            <a:schemeClr val="dk1"/>
+          </a:fontRef>
+        </p:style>
+        <p:txBody>
+          <a:bodyPr rtlCol="0" anchor="ctr"/>
+          <a:lstStyle/>
+          <a:p>
+            <a:pPr algn="ctr"/>
+            <a:r>
+              <a:rPr lang="en-US" sz="800" dirty="0"/>
+              <a:t>Cn1</a:t>
+            </a:r>
+          </a:p>
+        </p:txBody>
+      </p:sp>
+      <p:sp>
+        <p:nvSpPr>
+          <p:cNvPr id="29" name="Rounded Rectangle 28"/>
+          <p:cNvSpPr/>
+          <p:nvPr/>
+        </p:nvSpPr>
+        <p:spPr>
+          <a:xfrm>
+            <a:off x="4028858" y="3450669"/>
+            <a:ext cx="368323" cy="238728"/>
+          </a:xfrm>
+          <a:prstGeom prst="roundRect">
+            <a:avLst/>
+          </a:prstGeom>
+        </p:spPr>
+        <p:style>
+          <a:lnRef idx="1">
+            <a:schemeClr val="accent4"/>
+          </a:lnRef>
+          <a:fillRef idx="2">
+            <a:schemeClr val="accent4"/>
+          </a:fillRef>
+          <a:effectRef idx="1">
+            <a:schemeClr val="accent4"/>
+          </a:effectRef>
+          <a:fontRef idx="minor">
+            <a:schemeClr val="dk1"/>
+          </a:fontRef>
+        </p:style>
+        <p:txBody>
+          <a:bodyPr rtlCol="0" anchor="ctr"/>
+          <a:lstStyle/>
+          <a:p>
+            <a:pPr algn="ctr"/>
+            <a:r>
+              <a:rPr lang="en-US" sz="800" dirty="0" smtClean="0">
+                <a:solidFill>
+                  <a:schemeClr val="dk1"/>
+                </a:solidFill>
+              </a:rPr>
+              <a:t>Cn2</a:t>
+            </a:r>
+            <a:endParaRPr lang="en-US" sz="800" dirty="0">
+              <a:solidFill>
+                <a:schemeClr val="dk1"/>
+              </a:solidFill>
+            </a:endParaRPr>
+          </a:p>
+        </p:txBody>
+      </p:sp>
+      <p:sp>
+        <p:nvSpPr>
+          <p:cNvPr id="30" name="Rounded Rectangle 29"/>
+          <p:cNvSpPr/>
+          <p:nvPr/>
+        </p:nvSpPr>
+        <p:spPr>
+          <a:xfrm>
+            <a:off x="2801115" y="3791708"/>
+            <a:ext cx="368323" cy="238728"/>
+          </a:xfrm>
+          <a:prstGeom prst="roundRect">
+            <a:avLst/>
+          </a:prstGeom>
+        </p:spPr>
+        <p:style>
+          <a:lnRef idx="1">
+            <a:schemeClr val="accent1"/>
+          </a:lnRef>
+          <a:fillRef idx="2">
+            <a:schemeClr val="accent1"/>
+          </a:fillRef>
+          <a:effectRef idx="1">
+            <a:schemeClr val="accent1"/>
+          </a:effectRef>
+          <a:fontRef idx="minor">
+            <a:schemeClr val="dk1"/>
+          </a:fontRef>
+        </p:style>
+        <p:txBody>
+          <a:bodyPr rtlCol="0" anchor="ctr"/>
+          <a:lstStyle/>
+          <a:p>
+            <a:pPr algn="ctr"/>
+            <a:endParaRPr lang="en-US" sz="800"/>
+          </a:p>
+        </p:txBody>
+      </p:sp>
+      <p:sp>
+        <p:nvSpPr>
+          <p:cNvPr id="31" name="Rounded Rectangle 30"/>
+          <p:cNvSpPr/>
+          <p:nvPr/>
+        </p:nvSpPr>
+        <p:spPr>
+          <a:xfrm>
+            <a:off x="2552156" y="4132748"/>
+            <a:ext cx="368323" cy="238728"/>
+          </a:xfrm>
+          <a:prstGeom prst="roundRect">
+            <a:avLst/>
+          </a:prstGeom>
+        </p:spPr>
+        <p:style>
+          <a:lnRef idx="1">
+            <a:schemeClr val="accent4"/>
+          </a:lnRef>
+          <a:fillRef idx="2">
+            <a:schemeClr val="accent4"/>
+          </a:fillRef>
+          <a:effectRef idx="1">
+            <a:schemeClr val="accent4"/>
+          </a:effectRef>
+          <a:fontRef idx="minor">
+            <a:schemeClr val="dk1"/>
+          </a:fontRef>
+        </p:style>
+        <p:txBody>
+          <a:bodyPr rtlCol="0" anchor="ctr"/>
+          <a:lstStyle/>
+          <a:p>
+            <a:pPr algn="ctr"/>
+            <a:r>
+              <a:rPr lang="en-US" sz="800" dirty="0" smtClean="0">
+                <a:solidFill>
+                  <a:schemeClr val="dk1"/>
+                </a:solidFill>
+              </a:rPr>
+              <a:t>Cn1</a:t>
+            </a:r>
+            <a:endParaRPr lang="en-US" sz="800" dirty="0">
+              <a:solidFill>
+                <a:schemeClr val="dk1"/>
+              </a:solidFill>
+            </a:endParaRPr>
+          </a:p>
+        </p:txBody>
+      </p:sp>
+      <p:sp>
+        <p:nvSpPr>
+          <p:cNvPr id="32" name="Rounded Rectangle 31"/>
+          <p:cNvSpPr/>
+          <p:nvPr/>
+        </p:nvSpPr>
+        <p:spPr>
+          <a:xfrm>
+            <a:off x="3044390" y="4132748"/>
+            <a:ext cx="368323" cy="238728"/>
+          </a:xfrm>
+          <a:prstGeom prst="roundRect">
+            <a:avLst/>
+          </a:prstGeom>
+        </p:spPr>
+        <p:style>
+          <a:lnRef idx="1">
+            <a:schemeClr val="accent4"/>
+          </a:lnRef>
+          <a:fillRef idx="2">
+            <a:schemeClr val="accent4"/>
+          </a:fillRef>
+          <a:effectRef idx="1">
+            <a:schemeClr val="accent4"/>
+          </a:effectRef>
+          <a:fontRef idx="minor">
+            <a:schemeClr val="dk1"/>
+          </a:fontRef>
+        </p:style>
+        <p:txBody>
+          <a:bodyPr rtlCol="0" anchor="ctr"/>
+          <a:lstStyle/>
+          <a:p>
+            <a:pPr algn="ctr"/>
+            <a:r>
+              <a:rPr lang="en-US" sz="800" dirty="0" smtClean="0">
+                <a:solidFill>
+                  <a:schemeClr val="dk1"/>
+                </a:solidFill>
+              </a:rPr>
+              <a:t>Cn2</a:t>
+            </a:r>
+            <a:endParaRPr lang="en-US" sz="800" dirty="0">
+              <a:solidFill>
+                <a:schemeClr val="dk1"/>
+              </a:solidFill>
+            </a:endParaRPr>
+          </a:p>
+        </p:txBody>
+      </p:sp>
+      <p:cxnSp>
+        <p:nvCxnSpPr>
+          <p:cNvPr id="33" name="Straight Arrow Connector 32"/>
+          <p:cNvCxnSpPr>
+            <a:stCxn id="26" idx="2"/>
+            <a:endCxn id="27" idx="0"/>
+          </p:cNvCxnSpPr>
+          <p:nvPr/>
+        </p:nvCxnSpPr>
+        <p:spPr>
+          <a:xfrm flipH="1">
+            <a:off x="3228551" y="3352904"/>
+            <a:ext cx="495644" cy="97765"/>
+          </a:xfrm>
+          <a:prstGeom prst="straightConnector1">
+            <a:avLst/>
+          </a:prstGeom>
+          <a:ln>
+            <a:tailEnd type="triangle"/>
+          </a:ln>
+        </p:spPr>
+        <p:style>
+          <a:lnRef idx="3">
+            <a:schemeClr val="dk1"/>
+          </a:lnRef>
+          <a:fillRef idx="0">
+            <a:schemeClr val="dk1"/>
+          </a:fillRef>
+          <a:effectRef idx="2">
+            <a:schemeClr val="dk1"/>
+          </a:effectRef>
+          <a:fontRef idx="minor">
+            <a:schemeClr val="tx1"/>
+          </a:fontRef>
+        </p:style>
+      </p:cxnSp>
+      <p:cxnSp>
+        <p:nvCxnSpPr>
+          <p:cNvPr id="34" name="Straight Arrow Connector 33"/>
+          <p:cNvCxnSpPr>
+            <a:stCxn id="26" idx="2"/>
+            <a:endCxn id="28" idx="0"/>
+          </p:cNvCxnSpPr>
+          <p:nvPr/>
+        </p:nvCxnSpPr>
+        <p:spPr>
+          <a:xfrm>
+            <a:off x="3724196" y="3352904"/>
+            <a:ext cx="0" cy="97765"/>
+          </a:xfrm>
+          <a:prstGeom prst="straightConnector1">
+            <a:avLst/>
+          </a:prstGeom>
+          <a:ln>
+            <a:tailEnd type="triangle"/>
+          </a:ln>
+        </p:spPr>
+        <p:style>
+          <a:lnRef idx="3">
+            <a:schemeClr val="dk1"/>
+          </a:lnRef>
+          <a:fillRef idx="0">
+            <a:schemeClr val="dk1"/>
+          </a:fillRef>
+          <a:effectRef idx="2">
+            <a:schemeClr val="dk1"/>
+          </a:effectRef>
+          <a:fontRef idx="minor">
+            <a:schemeClr val="tx1"/>
+          </a:fontRef>
+        </p:style>
+      </p:cxnSp>
+      <p:cxnSp>
+        <p:nvCxnSpPr>
+          <p:cNvPr id="35" name="Straight Arrow Connector 34"/>
+          <p:cNvCxnSpPr>
+            <a:stCxn id="26" idx="2"/>
+            <a:endCxn id="29" idx="0"/>
+          </p:cNvCxnSpPr>
+          <p:nvPr/>
+        </p:nvCxnSpPr>
+        <p:spPr>
+          <a:xfrm>
+            <a:off x="3724196" y="3352904"/>
+            <a:ext cx="488824" cy="97765"/>
+          </a:xfrm>
+          <a:prstGeom prst="straightConnector1">
+            <a:avLst/>
+          </a:prstGeom>
+          <a:ln>
+            <a:tailEnd type="triangle"/>
+          </a:ln>
+        </p:spPr>
+        <p:style>
+          <a:lnRef idx="3">
+            <a:schemeClr val="dk1"/>
+          </a:lnRef>
+          <a:fillRef idx="0">
+            <a:schemeClr val="dk1"/>
+          </a:fillRef>
+          <a:effectRef idx="2">
+            <a:schemeClr val="dk1"/>
+          </a:effectRef>
+          <a:fontRef idx="minor">
+            <a:schemeClr val="tx1"/>
+          </a:fontRef>
+        </p:style>
+      </p:cxnSp>
+      <p:cxnSp>
+        <p:nvCxnSpPr>
+          <p:cNvPr id="36" name="Straight Arrow Connector 35"/>
+          <p:cNvCxnSpPr>
+            <a:stCxn id="27" idx="2"/>
+            <a:endCxn id="30" idx="0"/>
+          </p:cNvCxnSpPr>
+          <p:nvPr/>
+        </p:nvCxnSpPr>
+        <p:spPr>
+          <a:xfrm flipH="1">
+            <a:off x="2985276" y="3689396"/>
+            <a:ext cx="243275" cy="102312"/>
+          </a:xfrm>
+          <a:prstGeom prst="straightConnector1">
+            <a:avLst/>
+          </a:prstGeom>
+          <a:ln>
+            <a:tailEnd type="triangle"/>
+          </a:ln>
+        </p:spPr>
+        <p:style>
+          <a:lnRef idx="3">
+            <a:schemeClr val="dk1"/>
+          </a:lnRef>
+          <a:fillRef idx="0">
+            <a:schemeClr val="dk1"/>
+          </a:fillRef>
+          <a:effectRef idx="2">
+            <a:schemeClr val="dk1"/>
+          </a:effectRef>
+          <a:fontRef idx="minor">
+            <a:schemeClr val="tx1"/>
+          </a:fontRef>
+        </p:style>
+      </p:cxnSp>
+      <p:cxnSp>
+        <p:nvCxnSpPr>
+          <p:cNvPr id="37" name="Straight Arrow Connector 36"/>
+          <p:cNvCxnSpPr>
+            <a:stCxn id="30" idx="2"/>
+          </p:cNvCxnSpPr>
+          <p:nvPr/>
+        </p:nvCxnSpPr>
+        <p:spPr>
+          <a:xfrm flipH="1">
+            <a:off x="2742001" y="4030436"/>
+            <a:ext cx="243275" cy="102312"/>
+          </a:xfrm>
+          <a:prstGeom prst="straightConnector1">
+            <a:avLst/>
+          </a:prstGeom>
+          <a:ln>
+            <a:tailEnd type="triangle"/>
+          </a:ln>
+        </p:spPr>
+        <p:style>
+          <a:lnRef idx="3">
+            <a:schemeClr val="dk1"/>
+          </a:lnRef>
+          <a:fillRef idx="0">
+            <a:schemeClr val="dk1"/>
+          </a:fillRef>
+          <a:effectRef idx="2">
+            <a:schemeClr val="dk1"/>
+          </a:effectRef>
+          <a:fontRef idx="minor">
+            <a:schemeClr val="tx1"/>
+          </a:fontRef>
+        </p:style>
+      </p:cxnSp>
+      <p:cxnSp>
+        <p:nvCxnSpPr>
+          <p:cNvPr id="38" name="Straight Arrow Connector 37"/>
+          <p:cNvCxnSpPr>
+            <a:stCxn id="30" idx="2"/>
+            <a:endCxn id="32" idx="0"/>
+          </p:cNvCxnSpPr>
+          <p:nvPr/>
+        </p:nvCxnSpPr>
+        <p:spPr>
+          <a:xfrm>
+            <a:off x="2985276" y="4030436"/>
+            <a:ext cx="243275" cy="102312"/>
+          </a:xfrm>
+          <a:prstGeom prst="straightConnector1">
+            <a:avLst/>
+          </a:prstGeom>
+          <a:ln>
+            <a:tailEnd type="triangle"/>
+          </a:ln>
+        </p:spPr>
+        <p:style>
+          <a:lnRef idx="3">
+            <a:schemeClr val="dk1"/>
+          </a:lnRef>
+          <a:fillRef idx="0">
+            <a:schemeClr val="dk1"/>
+          </a:fillRef>
+          <a:effectRef idx="2">
+            <a:schemeClr val="dk1"/>
+          </a:effectRef>
+          <a:fontRef idx="minor">
+            <a:schemeClr val="tx1"/>
+          </a:fontRef>
+        </p:style>
+      </p:cxnSp>
+      <p:sp>
+        <p:nvSpPr>
+          <p:cNvPr id="40" name="Rounded Rectangle 39"/>
+          <p:cNvSpPr/>
+          <p:nvPr/>
+        </p:nvSpPr>
+        <p:spPr>
+          <a:xfrm>
+            <a:off x="4159015" y="742950"/>
+            <a:ext cx="803522" cy="400050"/>
+          </a:xfrm>
+          <a:prstGeom prst="roundRect">
+            <a:avLst/>
+          </a:prstGeom>
+        </p:spPr>
+        <p:style>
+          <a:lnRef idx="1">
+            <a:schemeClr val="accent1"/>
+          </a:lnRef>
+          <a:fillRef idx="2">
+            <a:schemeClr val="accent1"/>
+          </a:fillRef>
+          <a:effectRef idx="1">
+            <a:schemeClr val="accent1"/>
+          </a:effectRef>
+          <a:fontRef idx="minor">
+            <a:schemeClr val="dk1"/>
+          </a:fontRef>
+        </p:style>
+        <p:txBody>
+          <a:bodyPr rtlCol="0" anchor="ctr"/>
+          <a:lstStyle/>
+          <a:p>
+            <a:pPr algn="ctr"/>
+            <a:r>
+              <a:rPr lang="en-US" dirty="0" smtClean="0"/>
+              <a:t>Root2</a:t>
+            </a:r>
+            <a:endParaRPr lang="en-US" dirty="0"/>
+          </a:p>
+        </p:txBody>
+      </p:sp>
+      <p:sp>
+        <p:nvSpPr>
+          <p:cNvPr id="41" name="Rounded Rectangle 40"/>
+          <p:cNvSpPr/>
+          <p:nvPr/>
+        </p:nvSpPr>
+        <p:spPr>
+          <a:xfrm>
+            <a:off x="3429231" y="1318305"/>
+            <a:ext cx="617220" cy="400050"/>
+          </a:xfrm>
+          <a:prstGeom prst="roundRect">
+            <a:avLst/>
+          </a:prstGeom>
+        </p:spPr>
+        <p:style>
+          <a:lnRef idx="1">
+            <a:schemeClr val="accent1"/>
+          </a:lnRef>
+          <a:fillRef idx="2">
+            <a:schemeClr val="accent1"/>
+          </a:fillRef>
+          <a:effectRef idx="1">
+            <a:schemeClr val="accent1"/>
+          </a:effectRef>
+          <a:fontRef idx="minor">
+            <a:schemeClr val="dk1"/>
+          </a:fontRef>
+        </p:style>
+        <p:txBody>
+          <a:bodyPr rtlCol="0" anchor="ctr"/>
+          <a:lstStyle/>
+          <a:p>
+            <a:pPr algn="ctr"/>
+            <a:endParaRPr lang="en-US"/>
+          </a:p>
+        </p:txBody>
+      </p:sp>
+      <p:sp>
+        <p:nvSpPr>
+          <p:cNvPr id="42" name="Rounded Rectangle 41"/>
+          <p:cNvSpPr/>
+          <p:nvPr/>
+        </p:nvSpPr>
+        <p:spPr>
+          <a:xfrm>
+            <a:off x="4252166" y="1955226"/>
+            <a:ext cx="617220" cy="400050"/>
+          </a:xfrm>
+          <a:prstGeom prst="roundRect">
+            <a:avLst/>
+          </a:prstGeom>
+        </p:spPr>
+        <p:style>
+          <a:lnRef idx="1">
+            <a:schemeClr val="accent4"/>
+          </a:lnRef>
+          <a:fillRef idx="2">
+            <a:schemeClr val="accent4"/>
+          </a:fillRef>
+          <a:effectRef idx="1">
+            <a:schemeClr val="accent4"/>
+          </a:effectRef>
+          <a:fontRef idx="minor">
+            <a:schemeClr val="dk1"/>
+          </a:fontRef>
+        </p:style>
+        <p:txBody>
+          <a:bodyPr rtlCol="0" anchor="ctr"/>
+          <a:lstStyle/>
+          <a:p>
+            <a:pPr algn="ctr"/>
+            <a:r>
+              <a:rPr lang="en-US" dirty="0"/>
+              <a:t>Cn1</a:t>
+            </a:r>
+          </a:p>
+        </p:txBody>
+      </p:sp>
+      <p:sp>
+        <p:nvSpPr>
+          <p:cNvPr id="43" name="Rounded Rectangle 42"/>
+          <p:cNvSpPr/>
+          <p:nvPr/>
+        </p:nvSpPr>
+        <p:spPr>
+          <a:xfrm>
+            <a:off x="5078961" y="1318305"/>
+            <a:ext cx="617220" cy="400050"/>
+          </a:xfrm>
+          <a:prstGeom prst="roundRect">
+            <a:avLst/>
+          </a:prstGeom>
+        </p:spPr>
+        <p:style>
+          <a:lnRef idx="1">
+            <a:schemeClr val="accent2"/>
+          </a:lnRef>
+          <a:fillRef idx="2">
+            <a:schemeClr val="accent2"/>
+          </a:fillRef>
+          <a:effectRef idx="1">
+            <a:schemeClr val="accent2"/>
+          </a:effectRef>
+          <a:fontRef idx="minor">
+            <a:schemeClr val="dk1"/>
+          </a:fontRef>
+        </p:style>
+        <p:txBody>
+          <a:bodyPr rtlCol="0" anchor="ctr"/>
+          <a:lstStyle/>
+          <a:p>
+            <a:pPr algn="ctr"/>
+            <a:r>
+              <a:rPr lang="en-US" dirty="0" smtClean="0">
+                <a:solidFill>
+                  <a:schemeClr val="dk1"/>
+                </a:solidFill>
+              </a:rPr>
+              <a:t>Cn2</a:t>
+            </a:r>
+            <a:endParaRPr lang="en-US" dirty="0">
+              <a:solidFill>
+                <a:schemeClr val="dk1"/>
+              </a:solidFill>
+            </a:endParaRPr>
+          </a:p>
+        </p:txBody>
+      </p:sp>
+      <p:cxnSp>
+        <p:nvCxnSpPr>
+          <p:cNvPr id="47" name="Straight Arrow Connector 46"/>
+          <p:cNvCxnSpPr>
+            <a:stCxn id="40" idx="2"/>
+            <a:endCxn id="41" idx="0"/>
+          </p:cNvCxnSpPr>
+          <p:nvPr/>
+        </p:nvCxnSpPr>
+        <p:spPr>
+          <a:xfrm flipH="1">
+            <a:off x="3737841" y="1143000"/>
+            <a:ext cx="822935" cy="175305"/>
+          </a:xfrm>
+          <a:prstGeom prst="straightConnector1">
+            <a:avLst/>
+          </a:prstGeom>
+          <a:ln>
+            <a:tailEnd type="triangle"/>
+          </a:ln>
+        </p:spPr>
+        <p:style>
+          <a:lnRef idx="3">
+            <a:schemeClr val="dk1"/>
+          </a:lnRef>
+          <a:fillRef idx="0">
+            <a:schemeClr val="dk1"/>
+          </a:fillRef>
+          <a:effectRef idx="2">
+            <a:schemeClr val="dk1"/>
+          </a:effectRef>
+          <a:fontRef idx="minor">
+            <a:schemeClr val="tx1"/>
+          </a:fontRef>
+        </p:style>
+      </p:cxnSp>
+      <p:cxnSp>
+        <p:nvCxnSpPr>
+          <p:cNvPr id="48" name="Straight Arrow Connector 47"/>
+          <p:cNvCxnSpPr>
+            <a:stCxn id="54" idx="2"/>
+            <a:endCxn id="42" idx="0"/>
+          </p:cNvCxnSpPr>
+          <p:nvPr/>
+        </p:nvCxnSpPr>
+        <p:spPr>
+          <a:xfrm flipH="1">
+            <a:off x="4560776" y="1718355"/>
+            <a:ext cx="4198" cy="236871"/>
+          </a:xfrm>
+          <a:prstGeom prst="straightConnector1">
+            <a:avLst/>
+          </a:prstGeom>
+          <a:ln>
+            <a:tailEnd type="triangle"/>
+          </a:ln>
+        </p:spPr>
+        <p:style>
+          <a:lnRef idx="3">
+            <a:schemeClr val="dk1"/>
+          </a:lnRef>
+          <a:fillRef idx="0">
+            <a:schemeClr val="dk1"/>
+          </a:fillRef>
+          <a:effectRef idx="2">
+            <a:schemeClr val="dk1"/>
+          </a:effectRef>
+          <a:fontRef idx="minor">
+            <a:schemeClr val="tx1"/>
+          </a:fontRef>
+        </p:style>
+      </p:cxnSp>
+      <p:cxnSp>
+        <p:nvCxnSpPr>
+          <p:cNvPr id="49" name="Straight Arrow Connector 48"/>
+          <p:cNvCxnSpPr>
+            <a:stCxn id="40" idx="2"/>
+            <a:endCxn id="43" idx="0"/>
+          </p:cNvCxnSpPr>
+          <p:nvPr/>
+        </p:nvCxnSpPr>
+        <p:spPr>
+          <a:xfrm>
+            <a:off x="4560776" y="1143000"/>
+            <a:ext cx="826795" cy="175305"/>
+          </a:xfrm>
+          <a:prstGeom prst="straightConnector1">
+            <a:avLst/>
+          </a:prstGeom>
+          <a:ln>
+            <a:tailEnd type="triangle"/>
+          </a:ln>
+        </p:spPr>
+        <p:style>
+          <a:lnRef idx="3">
+            <a:schemeClr val="dk1"/>
+          </a:lnRef>
+          <a:fillRef idx="0">
+            <a:schemeClr val="dk1"/>
+          </a:fillRef>
+          <a:effectRef idx="2">
+            <a:schemeClr val="dk1"/>
+          </a:effectRef>
+          <a:fontRef idx="minor">
+            <a:schemeClr val="tx1"/>
+          </a:fontRef>
+        </p:style>
+      </p:cxnSp>
+      <p:sp>
+        <p:nvSpPr>
+          <p:cNvPr id="54" name="Rounded Rectangle 53"/>
+          <p:cNvSpPr/>
+          <p:nvPr/>
+        </p:nvSpPr>
+        <p:spPr>
+          <a:xfrm>
+            <a:off x="4256364" y="1318305"/>
+            <a:ext cx="617220" cy="400050"/>
+          </a:xfrm>
+          <a:prstGeom prst="roundRect">
+            <a:avLst/>
+          </a:prstGeom>
+        </p:spPr>
+        <p:style>
+          <a:lnRef idx="1">
+            <a:schemeClr val="accent1"/>
+          </a:lnRef>
+          <a:fillRef idx="2">
+            <a:schemeClr val="accent1"/>
+          </a:fillRef>
+          <a:effectRef idx="1">
+            <a:schemeClr val="accent1"/>
+          </a:effectRef>
+          <a:fontRef idx="minor">
+            <a:schemeClr val="dk1"/>
+          </a:fontRef>
+        </p:style>
+        <p:txBody>
+          <a:bodyPr rtlCol="0" anchor="ctr"/>
+          <a:lstStyle/>
+          <a:p>
+            <a:pPr algn="ctr"/>
+            <a:endParaRPr lang="en-US"/>
+          </a:p>
+        </p:txBody>
+      </p:sp>
+      <p:cxnSp>
+        <p:nvCxnSpPr>
+          <p:cNvPr id="57" name="Straight Arrow Connector 56"/>
+          <p:cNvCxnSpPr>
+            <a:stCxn id="40" idx="2"/>
+            <a:endCxn id="54" idx="0"/>
+          </p:cNvCxnSpPr>
+          <p:nvPr/>
+        </p:nvCxnSpPr>
+        <p:spPr>
+          <a:xfrm>
+            <a:off x="4560776" y="1143000"/>
+            <a:ext cx="4198" cy="175305"/>
+          </a:xfrm>
+          <a:prstGeom prst="straightConnector1">
+            <a:avLst/>
+          </a:prstGeom>
+          <a:ln>
+            <a:tailEnd type="triangle"/>
+          </a:ln>
+        </p:spPr>
+        <p:style>
+          <a:lnRef idx="3">
+            <a:schemeClr val="dk1"/>
+          </a:lnRef>
+          <a:fillRef idx="0">
+            <a:schemeClr val="dk1"/>
+          </a:fillRef>
+          <a:effectRef idx="2">
+            <a:schemeClr val="dk1"/>
+          </a:effectRef>
+          <a:fontRef idx="minor">
+            <a:schemeClr val="tx1"/>
+          </a:fontRef>
+        </p:style>
+      </p:cxnSp>
+      <p:sp>
+        <p:nvSpPr>
+          <p:cNvPr id="72" name="Rounded Rectangle 71"/>
+          <p:cNvSpPr/>
+          <p:nvPr/>
+        </p:nvSpPr>
+        <p:spPr>
+          <a:xfrm>
+            <a:off x="3419387" y="2596109"/>
+            <a:ext cx="617220" cy="400050"/>
+          </a:xfrm>
+          <a:prstGeom prst="roundRect">
+            <a:avLst/>
+          </a:prstGeom>
+        </p:spPr>
+        <p:style>
+          <a:lnRef idx="1">
+            <a:schemeClr val="accent1"/>
+          </a:lnRef>
+          <a:fillRef idx="2">
+            <a:schemeClr val="accent1"/>
+          </a:fillRef>
+          <a:effectRef idx="1">
+            <a:schemeClr val="accent1"/>
+          </a:effectRef>
+          <a:fontRef idx="minor">
+            <a:schemeClr val="dk1"/>
+          </a:fontRef>
+        </p:style>
+        <p:txBody>
+          <a:bodyPr rtlCol="0" anchor="ctr"/>
+          <a:lstStyle/>
+          <a:p>
+            <a:pPr algn="ctr"/>
+            <a:r>
+              <a:rPr lang="en-US" dirty="0" smtClean="0"/>
+              <a:t>Jar1</a:t>
+            </a:r>
+            <a:endParaRPr lang="en-US" dirty="0"/>
+          </a:p>
+        </p:txBody>
+      </p:sp>
+      <p:cxnSp>
+        <p:nvCxnSpPr>
+          <p:cNvPr id="73" name="Straight Arrow Connector 72"/>
+          <p:cNvCxnSpPr>
+            <a:stCxn id="72" idx="2"/>
+            <a:endCxn id="26" idx="0"/>
+          </p:cNvCxnSpPr>
+          <p:nvPr/>
+        </p:nvCxnSpPr>
+        <p:spPr>
+          <a:xfrm flipH="1">
+            <a:off x="3724196" y="2996159"/>
+            <a:ext cx="3801" cy="118017"/>
+          </a:xfrm>
+          <a:prstGeom prst="straightConnector1">
+            <a:avLst/>
+          </a:prstGeom>
+          <a:ln>
+            <a:tailEnd type="triangle"/>
+          </a:ln>
+        </p:spPr>
+        <p:style>
+          <a:lnRef idx="3">
+            <a:schemeClr val="dk1"/>
+          </a:lnRef>
+          <a:fillRef idx="0">
+            <a:schemeClr val="dk1"/>
+          </a:fillRef>
+          <a:effectRef idx="2">
+            <a:schemeClr val="dk1"/>
+          </a:effectRef>
+          <a:fontRef idx="minor">
+            <a:schemeClr val="tx1"/>
+          </a:fontRef>
+        </p:style>
+      </p:cxnSp>
+      <p:cxnSp>
+        <p:nvCxnSpPr>
+          <p:cNvPr id="76" name="Straight Arrow Connector 75"/>
+          <p:cNvCxnSpPr>
+            <a:stCxn id="41" idx="2"/>
+            <a:endCxn id="72" idx="0"/>
+          </p:cNvCxnSpPr>
+          <p:nvPr/>
+        </p:nvCxnSpPr>
+        <p:spPr>
+          <a:xfrm flipH="1">
+            <a:off x="3727997" y="1718355"/>
+            <a:ext cx="9844" cy="877754"/>
+          </a:xfrm>
+          <a:prstGeom prst="straightConnector1">
+            <a:avLst/>
+          </a:prstGeom>
+          <a:ln>
+            <a:tailEnd type="triangle"/>
+          </a:ln>
+        </p:spPr>
+        <p:style>
+          <a:lnRef idx="3">
+            <a:schemeClr val="dk1"/>
+          </a:lnRef>
+          <a:fillRef idx="0">
+            <a:schemeClr val="dk1"/>
+          </a:fillRef>
+          <a:effectRef idx="2">
+            <a:schemeClr val="dk1"/>
+          </a:effectRef>
+          <a:fontRef idx="minor">
+            <a:schemeClr val="tx1"/>
+          </a:fontRef>
+        </p:style>
+      </p:cxnSp>
+      <p:sp>
+        <p:nvSpPr>
+          <p:cNvPr id="79" name="Rectangle 78"/>
+          <p:cNvSpPr/>
+          <p:nvPr/>
+        </p:nvSpPr>
+        <p:spPr>
+          <a:xfrm>
+            <a:off x="2552156" y="2563358"/>
+            <a:ext cx="1845025" cy="1851660"/>
+          </a:xfrm>
+          <a:prstGeom prst="rect">
+            <a:avLst/>
+          </a:prstGeom>
+          <a:noFill/>
+        </p:spPr>
+        <p:style>
+          <a:lnRef idx="2">
+            <a:schemeClr val="accent1">
+              <a:shade val="50000"/>
+            </a:schemeClr>
+          </a:lnRef>
+          <a:fillRef idx="1">
+            <a:schemeClr val="accent1"/>
+          </a:fillRef>
+          <a:effectRef idx="0">
+            <a:schemeClr val="accent1"/>
+          </a:effectRef>
+          <a:fontRef idx="minor">
+            <a:schemeClr val="lt1"/>
+          </a:fontRef>
+        </p:style>
+        <p:txBody>
+          <a:bodyPr rtlCol="0" anchor="ctr"/>
+          <a:lstStyle/>
+          <a:p>
+            <a:pPr algn="ctr"/>
+            <a:endParaRPr lang="en-US"/>
+          </a:p>
+        </p:txBody>
+      </p:sp>
+      <p:sp>
+        <p:nvSpPr>
+          <p:cNvPr id="82" name="Rounded Rectangle 81"/>
+          <p:cNvSpPr/>
+          <p:nvPr/>
+        </p:nvSpPr>
+        <p:spPr>
+          <a:xfrm>
+            <a:off x="3599389" y="4090018"/>
+            <a:ext cx="368323" cy="238728"/>
+          </a:xfrm>
+          <a:prstGeom prst="roundRect">
+            <a:avLst/>
+          </a:prstGeom>
+        </p:spPr>
+        <p:style>
+          <a:lnRef idx="1">
+            <a:schemeClr val="accent1"/>
+          </a:lnRef>
+          <a:fillRef idx="2">
+            <a:schemeClr val="accent1"/>
+          </a:fillRef>
+          <a:effectRef idx="1">
+            <a:schemeClr val="accent1"/>
+          </a:effectRef>
+          <a:fontRef idx="minor">
+            <a:schemeClr val="dk1"/>
+          </a:fontRef>
+        </p:style>
+        <p:txBody>
+          <a:bodyPr rtlCol="0" anchor="ctr"/>
+          <a:lstStyle/>
+          <a:p>
+            <a:pPr algn="ctr"/>
+            <a:r>
+              <a:rPr lang="en-US" sz="800" dirty="0" smtClean="0"/>
+              <a:t>Jar2</a:t>
+            </a:r>
+            <a:endParaRPr lang="en-US" sz="800" dirty="0"/>
+          </a:p>
+        </p:txBody>
+      </p:sp>
+      <p:cxnSp>
+        <p:nvCxnSpPr>
+          <p:cNvPr id="83" name="Straight Arrow Connector 82"/>
+          <p:cNvCxnSpPr>
+            <a:stCxn id="27" idx="2"/>
+            <a:endCxn id="82" idx="0"/>
+          </p:cNvCxnSpPr>
+          <p:nvPr/>
+        </p:nvCxnSpPr>
+        <p:spPr>
+          <a:xfrm>
+            <a:off x="3228552" y="3689397"/>
+            <a:ext cx="554999" cy="400621"/>
+          </a:xfrm>
+          <a:prstGeom prst="straightConnector1">
+            <a:avLst/>
+          </a:prstGeom>
+          <a:ln>
+            <a:tailEnd type="triangle"/>
+          </a:ln>
+        </p:spPr>
+        <p:style>
+          <a:lnRef idx="3">
+            <a:schemeClr val="dk1"/>
+          </a:lnRef>
+          <a:fillRef idx="0">
+            <a:schemeClr val="dk1"/>
+          </a:fillRef>
+          <a:effectRef idx="2">
+            <a:schemeClr val="dk1"/>
+          </a:effectRef>
+          <a:fontRef idx="minor">
+            <a:schemeClr val="tx1"/>
+          </a:fontRef>
+        </p:style>
+      </p:cxnSp>
+      <p:sp>
+        <p:nvSpPr>
+          <p:cNvPr id="86" name="Rounded Rectangle 85"/>
+          <p:cNvSpPr/>
+          <p:nvPr/>
+        </p:nvSpPr>
+        <p:spPr>
+          <a:xfrm>
+            <a:off x="3581973" y="5194365"/>
+            <a:ext cx="368323" cy="238728"/>
+          </a:xfrm>
+          <a:prstGeom prst="roundRect">
+            <a:avLst/>
+          </a:prstGeom>
+        </p:spPr>
+        <p:style>
+          <a:lnRef idx="1">
+            <a:schemeClr val="accent1"/>
+          </a:lnRef>
+          <a:fillRef idx="2">
+            <a:schemeClr val="accent1"/>
+          </a:fillRef>
+          <a:effectRef idx="1">
+            <a:schemeClr val="accent1"/>
+          </a:effectRef>
+          <a:fontRef idx="minor">
+            <a:schemeClr val="dk1"/>
+          </a:fontRef>
+        </p:style>
+        <p:txBody>
+          <a:bodyPr rtlCol="0" anchor="ctr"/>
+          <a:lstStyle/>
+          <a:p>
+            <a:pPr algn="ctr"/>
+            <a:endParaRPr lang="en-US" sz="800"/>
+          </a:p>
+        </p:txBody>
+      </p:sp>
+      <p:sp>
+        <p:nvSpPr>
+          <p:cNvPr id="89" name="Rounded Rectangle 88"/>
+          <p:cNvSpPr/>
+          <p:nvPr/>
+        </p:nvSpPr>
+        <p:spPr>
+          <a:xfrm>
+            <a:off x="3950296" y="5671546"/>
+            <a:ext cx="368323" cy="238728"/>
+          </a:xfrm>
+          <a:prstGeom prst="roundRect">
+            <a:avLst/>
+          </a:prstGeom>
+        </p:spPr>
+        <p:style>
+          <a:lnRef idx="1">
+            <a:schemeClr val="accent2"/>
+          </a:lnRef>
+          <a:fillRef idx="2">
+            <a:schemeClr val="accent2"/>
+          </a:fillRef>
+          <a:effectRef idx="1">
+            <a:schemeClr val="accent2"/>
+          </a:effectRef>
+          <a:fontRef idx="minor">
+            <a:schemeClr val="dk1"/>
+          </a:fontRef>
+        </p:style>
+        <p:txBody>
+          <a:bodyPr rtlCol="0" anchor="ctr"/>
+          <a:lstStyle/>
+          <a:p>
+            <a:pPr algn="ctr"/>
+            <a:r>
+              <a:rPr lang="en-US" sz="800" dirty="0" smtClean="0">
+                <a:solidFill>
+                  <a:schemeClr val="dk1"/>
+                </a:solidFill>
+              </a:rPr>
+              <a:t>Cn2</a:t>
+            </a:r>
+            <a:endParaRPr lang="en-US" sz="800" dirty="0">
+              <a:solidFill>
+                <a:schemeClr val="dk1"/>
+              </a:solidFill>
+            </a:endParaRPr>
+          </a:p>
+        </p:txBody>
+      </p:sp>
+      <p:sp>
+        <p:nvSpPr>
+          <p:cNvPr id="90" name="Rounded Rectangle 89"/>
+          <p:cNvSpPr/>
+          <p:nvPr/>
+        </p:nvSpPr>
+        <p:spPr>
+          <a:xfrm>
+            <a:off x="2843054" y="5871897"/>
+            <a:ext cx="368323" cy="238728"/>
+          </a:xfrm>
+          <a:prstGeom prst="roundRect">
+            <a:avLst/>
+          </a:prstGeom>
+        </p:spPr>
+        <p:style>
+          <a:lnRef idx="1">
+            <a:schemeClr val="accent1"/>
+          </a:lnRef>
+          <a:fillRef idx="2">
+            <a:schemeClr val="accent1"/>
+          </a:fillRef>
+          <a:effectRef idx="1">
+            <a:schemeClr val="accent1"/>
+          </a:effectRef>
+          <a:fontRef idx="minor">
+            <a:schemeClr val="dk1"/>
+          </a:fontRef>
+        </p:style>
+        <p:txBody>
+          <a:bodyPr rtlCol="0" anchor="ctr"/>
+          <a:lstStyle/>
+          <a:p>
+            <a:pPr algn="ctr"/>
+            <a:endParaRPr lang="en-US" sz="800"/>
+          </a:p>
+        </p:txBody>
+      </p:sp>
+      <p:sp>
+        <p:nvSpPr>
+          <p:cNvPr id="91" name="Rounded Rectangle 90"/>
+          <p:cNvSpPr/>
+          <p:nvPr/>
+        </p:nvSpPr>
+        <p:spPr>
+          <a:xfrm>
+            <a:off x="2594095" y="6212937"/>
+            <a:ext cx="368323" cy="238728"/>
+          </a:xfrm>
+          <a:prstGeom prst="roundRect">
+            <a:avLst/>
+          </a:prstGeom>
+        </p:spPr>
+        <p:style>
+          <a:lnRef idx="1">
+            <a:schemeClr val="accent4"/>
+          </a:lnRef>
+          <a:fillRef idx="2">
+            <a:schemeClr val="accent4"/>
+          </a:fillRef>
+          <a:effectRef idx="1">
+            <a:schemeClr val="accent4"/>
+          </a:effectRef>
+          <a:fontRef idx="minor">
+            <a:schemeClr val="dk1"/>
+          </a:fontRef>
+        </p:style>
+        <p:txBody>
+          <a:bodyPr rtlCol="0" anchor="ctr"/>
+          <a:lstStyle/>
+          <a:p>
+            <a:pPr algn="ctr"/>
+            <a:r>
+              <a:rPr lang="en-US" sz="800" dirty="0" smtClean="0">
+                <a:solidFill>
+                  <a:schemeClr val="dk1"/>
+                </a:solidFill>
+              </a:rPr>
+              <a:t>Cn1</a:t>
+            </a:r>
+            <a:endParaRPr lang="en-US" sz="800" dirty="0">
+              <a:solidFill>
+                <a:schemeClr val="dk1"/>
+              </a:solidFill>
+            </a:endParaRPr>
+          </a:p>
+        </p:txBody>
+      </p:sp>
+      <p:sp>
+        <p:nvSpPr>
+          <p:cNvPr id="92" name="Rounded Rectangle 91"/>
+          <p:cNvSpPr/>
+          <p:nvPr/>
+        </p:nvSpPr>
+        <p:spPr>
+          <a:xfrm>
+            <a:off x="3086329" y="6212937"/>
+            <a:ext cx="368323" cy="238728"/>
+          </a:xfrm>
+          <a:prstGeom prst="roundRect">
+            <a:avLst/>
+          </a:prstGeom>
+        </p:spPr>
+        <p:style>
+          <a:lnRef idx="1">
+            <a:schemeClr val="accent4"/>
+          </a:lnRef>
+          <a:fillRef idx="2">
+            <a:schemeClr val="accent4"/>
+          </a:fillRef>
+          <a:effectRef idx="1">
+            <a:schemeClr val="accent4"/>
+          </a:effectRef>
+          <a:fontRef idx="minor">
+            <a:schemeClr val="dk1"/>
+          </a:fontRef>
+        </p:style>
+        <p:txBody>
+          <a:bodyPr rtlCol="0" anchor="ctr"/>
+          <a:lstStyle/>
+          <a:p>
+            <a:pPr algn="ctr"/>
+            <a:r>
+              <a:rPr lang="en-US" sz="800" dirty="0" smtClean="0">
+                <a:solidFill>
+                  <a:schemeClr val="dk1"/>
+                </a:solidFill>
+              </a:rPr>
+              <a:t>Cn2</a:t>
+            </a:r>
+            <a:endParaRPr lang="en-US" sz="800" dirty="0">
+              <a:solidFill>
+                <a:schemeClr val="dk1"/>
+              </a:solidFill>
+            </a:endParaRPr>
+          </a:p>
+        </p:txBody>
+      </p:sp>
+      <p:cxnSp>
+        <p:nvCxnSpPr>
+          <p:cNvPr id="95" name="Straight Arrow Connector 94"/>
+          <p:cNvCxnSpPr>
+            <a:stCxn id="86" idx="2"/>
+            <a:endCxn id="89" idx="0"/>
+          </p:cNvCxnSpPr>
+          <p:nvPr/>
+        </p:nvCxnSpPr>
+        <p:spPr>
+          <a:xfrm>
+            <a:off x="3766135" y="5433093"/>
+            <a:ext cx="368323" cy="238453"/>
+          </a:xfrm>
+          <a:prstGeom prst="straightConnector1">
+            <a:avLst/>
+          </a:prstGeom>
+          <a:ln>
+            <a:tailEnd type="triangle"/>
+          </a:ln>
+        </p:spPr>
+        <p:style>
+          <a:lnRef idx="3">
+            <a:schemeClr val="dk1"/>
+          </a:lnRef>
+          <a:fillRef idx="0">
+            <a:schemeClr val="dk1"/>
+          </a:fillRef>
+          <a:effectRef idx="2">
+            <a:schemeClr val="dk1"/>
+          </a:effectRef>
+          <a:fontRef idx="minor">
+            <a:schemeClr val="tx1"/>
+          </a:fontRef>
+        </p:style>
+      </p:cxnSp>
+      <p:cxnSp>
+        <p:nvCxnSpPr>
+          <p:cNvPr id="96" name="Straight Arrow Connector 95"/>
+          <p:cNvCxnSpPr>
+            <a:stCxn id="86" idx="2"/>
+            <a:endCxn id="90" idx="0"/>
+          </p:cNvCxnSpPr>
+          <p:nvPr/>
+        </p:nvCxnSpPr>
+        <p:spPr>
+          <a:xfrm flipH="1">
+            <a:off x="3027216" y="5433093"/>
+            <a:ext cx="738919" cy="438804"/>
+          </a:xfrm>
+          <a:prstGeom prst="straightConnector1">
+            <a:avLst/>
+          </a:prstGeom>
+          <a:ln>
+            <a:tailEnd type="triangle"/>
+          </a:ln>
+        </p:spPr>
+        <p:style>
+          <a:lnRef idx="3">
+            <a:schemeClr val="dk1"/>
+          </a:lnRef>
+          <a:fillRef idx="0">
+            <a:schemeClr val="dk1"/>
+          </a:fillRef>
+          <a:effectRef idx="2">
+            <a:schemeClr val="dk1"/>
+          </a:effectRef>
+          <a:fontRef idx="minor">
+            <a:schemeClr val="tx1"/>
+          </a:fontRef>
+        </p:style>
+      </p:cxnSp>
+      <p:cxnSp>
+        <p:nvCxnSpPr>
+          <p:cNvPr id="97" name="Straight Arrow Connector 96"/>
+          <p:cNvCxnSpPr>
+            <a:stCxn id="90" idx="2"/>
+          </p:cNvCxnSpPr>
+          <p:nvPr/>
+        </p:nvCxnSpPr>
+        <p:spPr>
+          <a:xfrm flipH="1">
+            <a:off x="2783940" y="6110625"/>
+            <a:ext cx="243275" cy="102312"/>
+          </a:xfrm>
+          <a:prstGeom prst="straightConnector1">
+            <a:avLst/>
+          </a:prstGeom>
+          <a:ln>
+            <a:tailEnd type="triangle"/>
+          </a:ln>
+        </p:spPr>
+        <p:style>
+          <a:lnRef idx="3">
+            <a:schemeClr val="dk1"/>
+          </a:lnRef>
+          <a:fillRef idx="0">
+            <a:schemeClr val="dk1"/>
+          </a:fillRef>
+          <a:effectRef idx="2">
+            <a:schemeClr val="dk1"/>
+          </a:effectRef>
+          <a:fontRef idx="minor">
+            <a:schemeClr val="tx1"/>
+          </a:fontRef>
+        </p:style>
+      </p:cxnSp>
+      <p:cxnSp>
+        <p:nvCxnSpPr>
+          <p:cNvPr id="98" name="Straight Arrow Connector 97"/>
+          <p:cNvCxnSpPr>
+            <a:stCxn id="90" idx="2"/>
+            <a:endCxn id="92" idx="0"/>
+          </p:cNvCxnSpPr>
+          <p:nvPr/>
+        </p:nvCxnSpPr>
+        <p:spPr>
+          <a:xfrm>
+            <a:off x="3027215" y="6110625"/>
+            <a:ext cx="243275" cy="102312"/>
+          </a:xfrm>
+          <a:prstGeom prst="straightConnector1">
+            <a:avLst/>
+          </a:prstGeom>
+          <a:ln>
+            <a:tailEnd type="triangle"/>
+          </a:ln>
+        </p:spPr>
+        <p:style>
+          <a:lnRef idx="3">
+            <a:schemeClr val="dk1"/>
+          </a:lnRef>
+          <a:fillRef idx="0">
+            <a:schemeClr val="dk1"/>
+          </a:fillRef>
+          <a:effectRef idx="2">
+            <a:schemeClr val="dk1"/>
+          </a:effectRef>
+          <a:fontRef idx="minor">
+            <a:schemeClr val="tx1"/>
+          </a:fontRef>
+        </p:style>
+      </p:cxnSp>
+      <p:sp>
+        <p:nvSpPr>
+          <p:cNvPr id="99" name="Rounded Rectangle 98"/>
+          <p:cNvSpPr/>
+          <p:nvPr/>
+        </p:nvSpPr>
+        <p:spPr>
+          <a:xfrm>
+            <a:off x="3461326" y="4676298"/>
+            <a:ext cx="617220" cy="400050"/>
+          </a:xfrm>
+          <a:prstGeom prst="roundRect">
+            <a:avLst/>
+          </a:prstGeom>
+        </p:spPr>
+        <p:style>
+          <a:lnRef idx="1">
+            <a:schemeClr val="accent1"/>
+          </a:lnRef>
+          <a:fillRef idx="2">
+            <a:schemeClr val="accent1"/>
+          </a:fillRef>
+          <a:effectRef idx="1">
+            <a:schemeClr val="accent1"/>
+          </a:effectRef>
+          <a:fontRef idx="minor">
+            <a:schemeClr val="dk1"/>
+          </a:fontRef>
+        </p:style>
+        <p:txBody>
+          <a:bodyPr rtlCol="0" anchor="ctr"/>
+          <a:lstStyle/>
+          <a:p>
+            <a:pPr algn="ctr"/>
+            <a:r>
+              <a:rPr lang="en-US" dirty="0" smtClean="0"/>
+              <a:t>Jar2</a:t>
+            </a:r>
+            <a:endParaRPr lang="en-US" dirty="0"/>
+          </a:p>
+        </p:txBody>
+      </p:sp>
+      <p:cxnSp>
+        <p:nvCxnSpPr>
+          <p:cNvPr id="100" name="Straight Arrow Connector 99"/>
+          <p:cNvCxnSpPr>
+            <a:stCxn id="99" idx="2"/>
+            <a:endCxn id="86" idx="0"/>
+          </p:cNvCxnSpPr>
+          <p:nvPr/>
+        </p:nvCxnSpPr>
+        <p:spPr>
+          <a:xfrm flipH="1">
+            <a:off x="3766135" y="5076348"/>
+            <a:ext cx="3801" cy="118017"/>
+          </a:xfrm>
+          <a:prstGeom prst="straightConnector1">
+            <a:avLst/>
+          </a:prstGeom>
+          <a:ln>
+            <a:tailEnd type="triangle"/>
+          </a:ln>
+        </p:spPr>
+        <p:style>
+          <a:lnRef idx="3">
+            <a:schemeClr val="dk1"/>
+          </a:lnRef>
+          <a:fillRef idx="0">
+            <a:schemeClr val="dk1"/>
+          </a:fillRef>
+          <a:effectRef idx="2">
+            <a:schemeClr val="dk1"/>
+          </a:effectRef>
+          <a:fontRef idx="minor">
+            <a:schemeClr val="tx1"/>
+          </a:fontRef>
+        </p:style>
+      </p:cxnSp>
+      <p:sp>
+        <p:nvSpPr>
+          <p:cNvPr id="101" name="Rectangle 100"/>
+          <p:cNvSpPr/>
+          <p:nvPr/>
+        </p:nvSpPr>
+        <p:spPr>
+          <a:xfrm>
+            <a:off x="2594095" y="4643547"/>
+            <a:ext cx="1845025" cy="1851660"/>
+          </a:xfrm>
+          <a:prstGeom prst="rect">
+            <a:avLst/>
+          </a:prstGeom>
+          <a:noFill/>
+        </p:spPr>
+        <p:style>
+          <a:lnRef idx="2">
+            <a:schemeClr val="accent1">
+              <a:shade val="50000"/>
+            </a:schemeClr>
+          </a:lnRef>
+          <a:fillRef idx="1">
+            <a:schemeClr val="accent1"/>
+          </a:fillRef>
+          <a:effectRef idx="0">
+            <a:schemeClr val="accent1"/>
+          </a:effectRef>
+          <a:fontRef idx="minor">
+            <a:schemeClr val="lt1"/>
+          </a:fontRef>
+        </p:style>
+        <p:txBody>
+          <a:bodyPr rtlCol="0" anchor="ctr"/>
+          <a:lstStyle/>
+          <a:p>
+            <a:pPr algn="ctr"/>
+            <a:endParaRPr lang="en-US"/>
+          </a:p>
+        </p:txBody>
+      </p:sp>
+      <p:cxnSp>
+        <p:nvCxnSpPr>
+          <p:cNvPr id="104" name="Straight Arrow Connector 103"/>
+          <p:cNvCxnSpPr>
+            <a:stCxn id="82" idx="2"/>
+          </p:cNvCxnSpPr>
+          <p:nvPr/>
+        </p:nvCxnSpPr>
+        <p:spPr>
+          <a:xfrm flipH="1">
+            <a:off x="3766135" y="4328746"/>
+            <a:ext cx="17416" cy="325000"/>
+          </a:xfrm>
+          <a:prstGeom prst="straightConnector1">
+            <a:avLst/>
+          </a:prstGeom>
+          <a:ln>
+            <a:tailEnd type="triangle"/>
+          </a:ln>
+        </p:spPr>
+        <p:style>
+          <a:lnRef idx="3">
+            <a:schemeClr val="dk1"/>
+          </a:lnRef>
+          <a:fillRef idx="0">
+            <a:schemeClr val="dk1"/>
+          </a:fillRef>
+          <a:effectRef idx="2">
+            <a:schemeClr val="dk1"/>
+          </a:effectRef>
+          <a:fontRef idx="minor">
+            <a:schemeClr val="tx1"/>
+          </a:fontRef>
+        </p:style>
+      </p:cxnSp>
+    </p:spTree>
+    <p:extLst>
+      <p:ext uri="{BB962C8B-B14F-4D97-AF65-F5344CB8AC3E}">
+        <p14:creationId xmlns:p14="http://schemas.microsoft.com/office/powerpoint/2010/main" val="565888106"/>
+      </p:ext>
+    </p:extLst>
+  </p:cSld>
+  <p:clrMapOvr>
+    <a:masterClrMapping/>
+  </p:clrMapOvr>
+  <p:timing>
+    <p:tnLst>
+      <p:par>
+        <p:cTn id="1" dur="indefinite" restart="never" nodeType="tmRoot"/>
+      </p:par>
+    </p:tnLst>
+  </p:timing>
 </p:sld>
 </file>
 

</xml_diff>